<commit_message>
additions/edits to ProjPresentation ppt
</commit_message>
<xml_diff>
--- a/ProjPresentation.pptx
+++ b/ProjPresentation.pptx
@@ -12,11 +12,11 @@
   <p:sldIdLst>
     <p:sldId id="266" r:id="rId4"/>
     <p:sldId id="267" r:id="rId5"/>
-    <p:sldId id="268" r:id="rId6"/>
-    <p:sldId id="269" r:id="rId7"/>
-    <p:sldId id="276" r:id="rId8"/>
-    <p:sldId id="277" r:id="rId9"/>
-    <p:sldId id="280" r:id="rId10"/>
+    <p:sldId id="283" r:id="rId6"/>
+    <p:sldId id="268" r:id="rId7"/>
+    <p:sldId id="282" r:id="rId8"/>
+    <p:sldId id="269" r:id="rId9"/>
+    <p:sldId id="276" r:id="rId10"/>
     <p:sldId id="281" r:id="rId11"/>
     <p:sldId id="275" r:id="rId12"/>
     <p:sldId id="270" r:id="rId13"/>
@@ -129,11 +129,11 @@
           <p14:sldIdLst>
             <p14:sldId id="266"/>
             <p14:sldId id="267"/>
+            <p14:sldId id="283"/>
             <p14:sldId id="268"/>
+            <p14:sldId id="282"/>
             <p14:sldId id="269"/>
             <p14:sldId id="276"/>
-            <p14:sldId id="277"/>
-            <p14:sldId id="280"/>
             <p14:sldId id="281"/>
             <p14:sldId id="275"/>
             <p14:sldId id="270"/>
@@ -257,7 +257,7 @@
           <a:p>
             <a:fld id="{18E5118F-6A56-44B4-8CD4-2559404DE2D8}" type="datetimeFigureOut">
               <a:rPr lang="en-US" smtClean="0"/>
-              <a:t>4/15/2024</a:t>
+              <a:t>4/16/2024</a:t>
             </a:fld>
             <a:endParaRPr lang="en-US"/>
           </a:p>
@@ -568,6 +568,582 @@
           <a:bodyPr/>
           <a:lstStyle/>
           <a:p>
+            <a:pPr marL="0" marR="0" lvl="0" indent="0" algn="l" defTabSz="914400" rtl="0" eaLnBrk="1" fontAlgn="auto" latinLnBrk="0" hangingPunct="1">
+              <a:lnSpc>
+                <a:spcPct val="100000"/>
+              </a:lnSpc>
+              <a:spcBef>
+                <a:spcPts val="0"/>
+              </a:spcBef>
+              <a:spcAft>
+                <a:spcPts val="0"/>
+              </a:spcAft>
+              <a:buClrTx/>
+              <a:buSzTx/>
+              <a:buFontTx/>
+              <a:buNone/>
+              <a:tabLst/>
+              <a:defRPr/>
+            </a:pPr>
+            <a:r>
+              <a:rPr lang="en-US" sz="1200" dirty="0"/>
+              <a:t>Aim: The goal was to get acquainted with the different datasets that would be used in our analysis.</a:t>
+            </a:r>
+          </a:p>
+          <a:p>
+            <a:endParaRPr lang="en-US" dirty="0"/>
+          </a:p>
+        </p:txBody>
+      </p:sp>
+      <p:sp>
+        <p:nvSpPr>
+          <p:cNvPr id="4" name="Slide Number Placeholder 3"/>
+          <p:cNvSpPr>
+            <a:spLocks noGrp="1"/>
+          </p:cNvSpPr>
+          <p:nvPr>
+            <p:ph type="sldNum" sz="quarter" idx="5"/>
+          </p:nvPr>
+        </p:nvSpPr>
+        <p:spPr/>
+        <p:txBody>
+          <a:bodyPr/>
+          <a:lstStyle/>
+          <a:p>
+            <a:fld id="{EC6F6E41-1F62-4E61-82DC-4FF03C9667B9}" type="slidenum">
+              <a:rPr lang="en-US" smtClean="0"/>
+              <a:t>2</a:t>
+            </a:fld>
+            <a:endParaRPr lang="en-US"/>
+          </a:p>
+        </p:txBody>
+      </p:sp>
+    </p:spTree>
+    <p:extLst>
+      <p:ext uri="{BB962C8B-B14F-4D97-AF65-F5344CB8AC3E}">
+        <p14:creationId xmlns:p14="http://schemas.microsoft.com/office/powerpoint/2010/main" val="1344592458"/>
+      </p:ext>
+    </p:extLst>
+  </p:cSld>
+  <p:clrMapOvr>
+    <a:masterClrMapping/>
+  </p:clrMapOvr>
+</p:notes>
+</file>
+
+<file path=ppt/notesSlides/notesSlide2.xml><?xml version="1.0" encoding="utf-8"?>
+<p:notes xmlns:a="http://schemas.openxmlformats.org/drawingml/2006/main" xmlns:r="http://schemas.openxmlformats.org/officeDocument/2006/relationships" xmlns:p="http://schemas.openxmlformats.org/presentationml/2006/main">
+  <p:cSld>
+    <p:spTree>
+      <p:nvGrpSpPr>
+        <p:cNvPr id="1" name=""/>
+        <p:cNvGrpSpPr/>
+        <p:nvPr/>
+      </p:nvGrpSpPr>
+      <p:grpSpPr>
+        <a:xfrm>
+          <a:off x="0" y="0"/>
+          <a:ext cx="0" cy="0"/>
+          <a:chOff x="0" y="0"/>
+          <a:chExt cx="0" cy="0"/>
+        </a:xfrm>
+      </p:grpSpPr>
+      <p:sp>
+        <p:nvSpPr>
+          <p:cNvPr id="2" name="Slide Image Placeholder 1"/>
+          <p:cNvSpPr>
+            <a:spLocks noGrp="1" noRot="1" noChangeAspect="1"/>
+          </p:cNvSpPr>
+          <p:nvPr>
+            <p:ph type="sldImg"/>
+          </p:nvPr>
+        </p:nvSpPr>
+        <p:spPr/>
+      </p:sp>
+      <p:sp>
+        <p:nvSpPr>
+          <p:cNvPr id="3" name="Notes Placeholder 2"/>
+          <p:cNvSpPr>
+            <a:spLocks noGrp="1"/>
+          </p:cNvSpPr>
+          <p:nvPr>
+            <p:ph type="body" idx="1"/>
+          </p:nvPr>
+        </p:nvSpPr>
+        <p:spPr/>
+        <p:txBody>
+          <a:bodyPr/>
+          <a:lstStyle/>
+          <a:p>
+            <a:pPr marL="0" marR="0" lvl="0" indent="0" algn="l" defTabSz="914400" rtl="0" eaLnBrk="1" fontAlgn="auto" latinLnBrk="0" hangingPunct="1">
+              <a:lnSpc>
+                <a:spcPct val="100000"/>
+              </a:lnSpc>
+              <a:spcBef>
+                <a:spcPts val="0"/>
+              </a:spcBef>
+              <a:spcAft>
+                <a:spcPts val="0"/>
+              </a:spcAft>
+              <a:buClrTx/>
+              <a:buSzTx/>
+              <a:buFontTx/>
+              <a:buNone/>
+              <a:tabLst/>
+              <a:defRPr/>
+            </a:pPr>
+            <a:r>
+              <a:rPr lang="en-US" sz="1200" dirty="0"/>
+              <a:t>Aim: The goal of Stage II was to develop the data for modeling and comparative analysis. </a:t>
+            </a:r>
+          </a:p>
+          <a:p>
+            <a:endParaRPr lang="en-US" dirty="0"/>
+          </a:p>
+        </p:txBody>
+      </p:sp>
+      <p:sp>
+        <p:nvSpPr>
+          <p:cNvPr id="4" name="Slide Number Placeholder 3"/>
+          <p:cNvSpPr>
+            <a:spLocks noGrp="1"/>
+          </p:cNvSpPr>
+          <p:nvPr>
+            <p:ph type="sldNum" sz="quarter" idx="5"/>
+          </p:nvPr>
+        </p:nvSpPr>
+        <p:spPr/>
+        <p:txBody>
+          <a:bodyPr/>
+          <a:lstStyle/>
+          <a:p>
+            <a:fld id="{EC6F6E41-1F62-4E61-82DC-4FF03C9667B9}" type="slidenum">
+              <a:rPr lang="en-US" smtClean="0"/>
+              <a:t>4</a:t>
+            </a:fld>
+            <a:endParaRPr lang="en-US"/>
+          </a:p>
+        </p:txBody>
+      </p:sp>
+    </p:spTree>
+    <p:extLst>
+      <p:ext uri="{BB962C8B-B14F-4D97-AF65-F5344CB8AC3E}">
+        <p14:creationId xmlns:p14="http://schemas.microsoft.com/office/powerpoint/2010/main" val="285236062"/>
+      </p:ext>
+    </p:extLst>
+  </p:cSld>
+  <p:clrMapOvr>
+    <a:masterClrMapping/>
+  </p:clrMapOvr>
+</p:notes>
+</file>
+
+<file path=ppt/notesSlides/notesSlide3.xml><?xml version="1.0" encoding="utf-8"?>
+<p:notes xmlns:a="http://schemas.openxmlformats.org/drawingml/2006/main" xmlns:r="http://schemas.openxmlformats.org/officeDocument/2006/relationships" xmlns:p="http://schemas.openxmlformats.org/presentationml/2006/main">
+  <p:cSld>
+    <p:spTree>
+      <p:nvGrpSpPr>
+        <p:cNvPr id="1" name=""/>
+        <p:cNvGrpSpPr/>
+        <p:nvPr/>
+      </p:nvGrpSpPr>
+      <p:grpSpPr>
+        <a:xfrm>
+          <a:off x="0" y="0"/>
+          <a:ext cx="0" cy="0"/>
+          <a:chOff x="0" y="0"/>
+          <a:chExt cx="0" cy="0"/>
+        </a:xfrm>
+      </p:grpSpPr>
+      <p:sp>
+        <p:nvSpPr>
+          <p:cNvPr id="2" name="Slide Image Placeholder 1"/>
+          <p:cNvSpPr>
+            <a:spLocks noGrp="1" noRot="1" noChangeAspect="1"/>
+          </p:cNvSpPr>
+          <p:nvPr>
+            <p:ph type="sldImg"/>
+          </p:nvPr>
+        </p:nvSpPr>
+        <p:spPr/>
+      </p:sp>
+      <p:sp>
+        <p:nvSpPr>
+          <p:cNvPr id="3" name="Notes Placeholder 2"/>
+          <p:cNvSpPr>
+            <a:spLocks noGrp="1"/>
+          </p:cNvSpPr>
+          <p:nvPr>
+            <p:ph type="body" idx="1"/>
+          </p:nvPr>
+        </p:nvSpPr>
+        <p:spPr/>
+        <p:txBody>
+          <a:bodyPr/>
+          <a:lstStyle/>
+          <a:p>
+            <a:r>
+              <a:rPr lang="en-US" dirty="0"/>
+              <a:t>Mode was always 0 for both</a:t>
+            </a:r>
+          </a:p>
+        </p:txBody>
+      </p:sp>
+      <p:sp>
+        <p:nvSpPr>
+          <p:cNvPr id="4" name="Slide Number Placeholder 3"/>
+          <p:cNvSpPr>
+            <a:spLocks noGrp="1"/>
+          </p:cNvSpPr>
+          <p:nvPr>
+            <p:ph type="sldNum" sz="quarter" idx="5"/>
+          </p:nvPr>
+        </p:nvSpPr>
+        <p:spPr/>
+        <p:txBody>
+          <a:bodyPr/>
+          <a:lstStyle/>
+          <a:p>
+            <a:fld id="{EC6F6E41-1F62-4E61-82DC-4FF03C9667B9}" type="slidenum">
+              <a:rPr lang="en-US" smtClean="0"/>
+              <a:t>5</a:t>
+            </a:fld>
+            <a:endParaRPr lang="en-US"/>
+          </a:p>
+        </p:txBody>
+      </p:sp>
+    </p:spTree>
+    <p:extLst>
+      <p:ext uri="{BB962C8B-B14F-4D97-AF65-F5344CB8AC3E}">
+        <p14:creationId xmlns:p14="http://schemas.microsoft.com/office/powerpoint/2010/main" val="2501845649"/>
+      </p:ext>
+    </p:extLst>
+  </p:cSld>
+  <p:clrMapOvr>
+    <a:masterClrMapping/>
+  </p:clrMapOvr>
+</p:notes>
+</file>
+
+<file path=ppt/notesSlides/notesSlide4.xml><?xml version="1.0" encoding="utf-8"?>
+<p:notes xmlns:a="http://schemas.openxmlformats.org/drawingml/2006/main" xmlns:r="http://schemas.openxmlformats.org/officeDocument/2006/relationships" xmlns:p="http://schemas.openxmlformats.org/presentationml/2006/main">
+  <p:cSld>
+    <p:spTree>
+      <p:nvGrpSpPr>
+        <p:cNvPr id="1" name=""/>
+        <p:cNvGrpSpPr/>
+        <p:nvPr/>
+      </p:nvGrpSpPr>
+      <p:grpSpPr>
+        <a:xfrm>
+          <a:off x="0" y="0"/>
+          <a:ext cx="0" cy="0"/>
+          <a:chOff x="0" y="0"/>
+          <a:chExt cx="0" cy="0"/>
+        </a:xfrm>
+      </p:grpSpPr>
+      <p:sp>
+        <p:nvSpPr>
+          <p:cNvPr id="2" name="Slide Image Placeholder 1"/>
+          <p:cNvSpPr>
+            <a:spLocks noGrp="1" noRot="1" noChangeAspect="1"/>
+          </p:cNvSpPr>
+          <p:nvPr>
+            <p:ph type="sldImg"/>
+          </p:nvPr>
+        </p:nvSpPr>
+        <p:spPr/>
+      </p:sp>
+      <p:sp>
+        <p:nvSpPr>
+          <p:cNvPr id="3" name="Notes Placeholder 2"/>
+          <p:cNvSpPr>
+            <a:spLocks noGrp="1"/>
+          </p:cNvSpPr>
+          <p:nvPr>
+            <p:ph type="body" idx="1"/>
+          </p:nvPr>
+        </p:nvSpPr>
+        <p:spPr/>
+        <p:txBody>
+          <a:bodyPr/>
+          <a:lstStyle/>
+          <a:p>
+            <a:pPr marL="0" marR="0" lvl="0" indent="0" algn="l" defTabSz="914400" rtl="0" eaLnBrk="1" fontAlgn="auto" latinLnBrk="0" hangingPunct="1">
+              <a:lnSpc>
+                <a:spcPct val="100000"/>
+              </a:lnSpc>
+              <a:spcBef>
+                <a:spcPts val="0"/>
+              </a:spcBef>
+              <a:spcAft>
+                <a:spcPts val="0"/>
+              </a:spcAft>
+              <a:buClrTx/>
+              <a:buSzTx/>
+              <a:buFontTx/>
+              <a:buNone/>
+              <a:tabLst/>
+              <a:defRPr/>
+            </a:pPr>
+            <a:r>
+              <a:rPr lang="en-US" sz="1200" dirty="0"/>
+              <a:t>Aim: The goal of Stage III was to develop distributions and formal hypothesis tests for the intuitions had in Stage I and II and utilize statistical modeling to prove/disprove them.</a:t>
+            </a:r>
+          </a:p>
+          <a:p>
+            <a:endParaRPr lang="en-US" dirty="0"/>
+          </a:p>
+        </p:txBody>
+      </p:sp>
+      <p:sp>
+        <p:nvSpPr>
+          <p:cNvPr id="4" name="Slide Number Placeholder 3"/>
+          <p:cNvSpPr>
+            <a:spLocks noGrp="1"/>
+          </p:cNvSpPr>
+          <p:nvPr>
+            <p:ph type="sldNum" sz="quarter" idx="5"/>
+          </p:nvPr>
+        </p:nvSpPr>
+        <p:spPr/>
+        <p:txBody>
+          <a:bodyPr/>
+          <a:lstStyle/>
+          <a:p>
+            <a:fld id="{EC6F6E41-1F62-4E61-82DC-4FF03C9667B9}" type="slidenum">
+              <a:rPr lang="en-US" smtClean="0"/>
+              <a:t>6</a:t>
+            </a:fld>
+            <a:endParaRPr lang="en-US"/>
+          </a:p>
+        </p:txBody>
+      </p:sp>
+    </p:spTree>
+    <p:extLst>
+      <p:ext uri="{BB962C8B-B14F-4D97-AF65-F5344CB8AC3E}">
+        <p14:creationId xmlns:p14="http://schemas.microsoft.com/office/powerpoint/2010/main" val="2718240240"/>
+      </p:ext>
+    </p:extLst>
+  </p:cSld>
+  <p:clrMapOvr>
+    <a:masterClrMapping/>
+  </p:clrMapOvr>
+</p:notes>
+</file>
+
+<file path=ppt/notesSlides/notesSlide5.xml><?xml version="1.0" encoding="utf-8"?>
+<p:notes xmlns:a="http://schemas.openxmlformats.org/drawingml/2006/main" xmlns:r="http://schemas.openxmlformats.org/officeDocument/2006/relationships" xmlns:p="http://schemas.openxmlformats.org/presentationml/2006/main">
+  <p:cSld>
+    <p:spTree>
+      <p:nvGrpSpPr>
+        <p:cNvPr id="1" name=""/>
+        <p:cNvGrpSpPr/>
+        <p:nvPr/>
+      </p:nvGrpSpPr>
+      <p:grpSpPr>
+        <a:xfrm>
+          <a:off x="0" y="0"/>
+          <a:ext cx="0" cy="0"/>
+          <a:chOff x="0" y="0"/>
+          <a:chExt cx="0" cy="0"/>
+        </a:xfrm>
+      </p:grpSpPr>
+      <p:sp>
+        <p:nvSpPr>
+          <p:cNvPr id="2" name="Slide Image Placeholder 1"/>
+          <p:cNvSpPr>
+            <a:spLocks noGrp="1" noRot="1" noChangeAspect="1"/>
+          </p:cNvSpPr>
+          <p:nvPr>
+            <p:ph type="sldImg"/>
+          </p:nvPr>
+        </p:nvSpPr>
+        <p:spPr/>
+      </p:sp>
+      <p:sp>
+        <p:nvSpPr>
+          <p:cNvPr id="3" name="Notes Placeholder 2"/>
+          <p:cNvSpPr>
+            <a:spLocks noGrp="1"/>
+          </p:cNvSpPr>
+          <p:nvPr>
+            <p:ph type="body" idx="1"/>
+          </p:nvPr>
+        </p:nvSpPr>
+        <p:spPr/>
+        <p:txBody>
+          <a:bodyPr/>
+          <a:lstStyle/>
+          <a:p>
+            <a:endParaRPr lang="en-US" dirty="0"/>
+          </a:p>
+        </p:txBody>
+      </p:sp>
+      <p:sp>
+        <p:nvSpPr>
+          <p:cNvPr id="4" name="Slide Number Placeholder 3"/>
+          <p:cNvSpPr>
+            <a:spLocks noGrp="1"/>
+          </p:cNvSpPr>
+          <p:nvPr>
+            <p:ph type="sldNum" sz="quarter" idx="5"/>
+          </p:nvPr>
+        </p:nvSpPr>
+        <p:spPr/>
+        <p:txBody>
+          <a:bodyPr/>
+          <a:lstStyle/>
+          <a:p>
+            <a:fld id="{EC6F6E41-1F62-4E61-82DC-4FF03C9667B9}" type="slidenum">
+              <a:rPr lang="en-US" smtClean="0"/>
+              <a:t>7</a:t>
+            </a:fld>
+            <a:endParaRPr lang="en-US"/>
+          </a:p>
+        </p:txBody>
+      </p:sp>
+    </p:spTree>
+    <p:extLst>
+      <p:ext uri="{BB962C8B-B14F-4D97-AF65-F5344CB8AC3E}">
+        <p14:creationId xmlns:p14="http://schemas.microsoft.com/office/powerpoint/2010/main" val="2035426889"/>
+      </p:ext>
+    </p:extLst>
+  </p:cSld>
+  <p:clrMapOvr>
+    <a:masterClrMapping/>
+  </p:clrMapOvr>
+</p:notes>
+</file>
+
+<file path=ppt/notesSlides/notesSlide6.xml><?xml version="1.0" encoding="utf-8"?>
+<p:notes xmlns:a="http://schemas.openxmlformats.org/drawingml/2006/main" xmlns:r="http://schemas.openxmlformats.org/officeDocument/2006/relationships" xmlns:p="http://schemas.openxmlformats.org/presentationml/2006/main">
+  <p:cSld>
+    <p:spTree>
+      <p:nvGrpSpPr>
+        <p:cNvPr id="1" name=""/>
+        <p:cNvGrpSpPr/>
+        <p:nvPr/>
+      </p:nvGrpSpPr>
+      <p:grpSpPr>
+        <a:xfrm>
+          <a:off x="0" y="0"/>
+          <a:ext cx="0" cy="0"/>
+          <a:chOff x="0" y="0"/>
+          <a:chExt cx="0" cy="0"/>
+        </a:xfrm>
+      </p:grpSpPr>
+      <p:sp>
+        <p:nvSpPr>
+          <p:cNvPr id="2" name="Slide Image Placeholder 1"/>
+          <p:cNvSpPr>
+            <a:spLocks noGrp="1" noRot="1" noChangeAspect="1"/>
+          </p:cNvSpPr>
+          <p:nvPr>
+            <p:ph type="sldImg"/>
+          </p:nvPr>
+        </p:nvSpPr>
+        <p:spPr/>
+      </p:sp>
+      <p:sp>
+        <p:nvSpPr>
+          <p:cNvPr id="3" name="Notes Placeholder 2"/>
+          <p:cNvSpPr>
+            <a:spLocks noGrp="1"/>
+          </p:cNvSpPr>
+          <p:nvPr>
+            <p:ph type="body" idx="1"/>
+          </p:nvPr>
+        </p:nvSpPr>
+        <p:spPr/>
+        <p:txBody>
+          <a:bodyPr/>
+          <a:lstStyle/>
+          <a:p>
+            <a:endParaRPr lang="en-US" dirty="0"/>
+          </a:p>
+        </p:txBody>
+      </p:sp>
+      <p:sp>
+        <p:nvSpPr>
+          <p:cNvPr id="4" name="Slide Number Placeholder 3"/>
+          <p:cNvSpPr>
+            <a:spLocks noGrp="1"/>
+          </p:cNvSpPr>
+          <p:nvPr>
+            <p:ph type="sldNum" sz="quarter" idx="5"/>
+          </p:nvPr>
+        </p:nvSpPr>
+        <p:spPr/>
+        <p:txBody>
+          <a:bodyPr/>
+          <a:lstStyle/>
+          <a:p>
+            <a:fld id="{EC6F6E41-1F62-4E61-82DC-4FF03C9667B9}" type="slidenum">
+              <a:rPr lang="en-US" smtClean="0"/>
+              <a:t>8</a:t>
+            </a:fld>
+            <a:endParaRPr lang="en-US"/>
+          </a:p>
+        </p:txBody>
+      </p:sp>
+    </p:spTree>
+    <p:extLst>
+      <p:ext uri="{BB962C8B-B14F-4D97-AF65-F5344CB8AC3E}">
+        <p14:creationId xmlns:p14="http://schemas.microsoft.com/office/powerpoint/2010/main" val="3294284303"/>
+      </p:ext>
+    </p:extLst>
+  </p:cSld>
+  <p:clrMapOvr>
+    <a:masterClrMapping/>
+  </p:clrMapOvr>
+</p:notes>
+</file>
+
+<file path=ppt/notesSlides/notesSlide7.xml><?xml version="1.0" encoding="utf-8"?>
+<p:notes xmlns:a="http://schemas.openxmlformats.org/drawingml/2006/main" xmlns:r="http://schemas.openxmlformats.org/officeDocument/2006/relationships" xmlns:p="http://schemas.openxmlformats.org/presentationml/2006/main">
+  <p:cSld>
+    <p:spTree>
+      <p:nvGrpSpPr>
+        <p:cNvPr id="1" name=""/>
+        <p:cNvGrpSpPr/>
+        <p:nvPr/>
+      </p:nvGrpSpPr>
+      <p:grpSpPr>
+        <a:xfrm>
+          <a:off x="0" y="0"/>
+          <a:ext cx="0" cy="0"/>
+          <a:chOff x="0" y="0"/>
+          <a:chExt cx="0" cy="0"/>
+        </a:xfrm>
+      </p:grpSpPr>
+      <p:sp>
+        <p:nvSpPr>
+          <p:cNvPr id="2" name="Slide Image Placeholder 1"/>
+          <p:cNvSpPr>
+            <a:spLocks noGrp="1" noRot="1" noChangeAspect="1"/>
+          </p:cNvSpPr>
+          <p:nvPr>
+            <p:ph type="sldImg"/>
+          </p:nvPr>
+        </p:nvSpPr>
+        <p:spPr/>
+      </p:sp>
+      <p:sp>
+        <p:nvSpPr>
+          <p:cNvPr id="3" name="Notes Placeholder 2"/>
+          <p:cNvSpPr>
+            <a:spLocks noGrp="1"/>
+          </p:cNvSpPr>
+          <p:nvPr>
+            <p:ph type="body" idx="1"/>
+          </p:nvPr>
+        </p:nvSpPr>
+        <p:spPr/>
+        <p:txBody>
+          <a:bodyPr/>
+          <a:lstStyle/>
+          <a:p>
             <a:endParaRPr lang="en-US" dirty="0"/>
           </a:p>
         </p:txBody>
@@ -599,6 +1175,228 @@
     <p:extLst>
       <p:ext uri="{BB962C8B-B14F-4D97-AF65-F5344CB8AC3E}">
         <p14:creationId xmlns:p14="http://schemas.microsoft.com/office/powerpoint/2010/main" val="3900447505"/>
+      </p:ext>
+    </p:extLst>
+  </p:cSld>
+  <p:clrMapOvr>
+    <a:masterClrMapping/>
+  </p:clrMapOvr>
+</p:notes>
+</file>
+
+<file path=ppt/notesSlides/notesSlide8.xml><?xml version="1.0" encoding="utf-8"?>
+<p:notes xmlns:a="http://schemas.openxmlformats.org/drawingml/2006/main" xmlns:r="http://schemas.openxmlformats.org/officeDocument/2006/relationships" xmlns:p="http://schemas.openxmlformats.org/presentationml/2006/main">
+  <p:cSld>
+    <p:spTree>
+      <p:nvGrpSpPr>
+        <p:cNvPr id="1" name=""/>
+        <p:cNvGrpSpPr/>
+        <p:nvPr/>
+      </p:nvGrpSpPr>
+      <p:grpSpPr>
+        <a:xfrm>
+          <a:off x="0" y="0"/>
+          <a:ext cx="0" cy="0"/>
+          <a:chOff x="0" y="0"/>
+          <a:chExt cx="0" cy="0"/>
+        </a:xfrm>
+      </p:grpSpPr>
+      <p:sp>
+        <p:nvSpPr>
+          <p:cNvPr id="2" name="Slide Image Placeholder 1"/>
+          <p:cNvSpPr>
+            <a:spLocks noGrp="1" noRot="1" noChangeAspect="1"/>
+          </p:cNvSpPr>
+          <p:nvPr>
+            <p:ph type="sldImg"/>
+          </p:nvPr>
+        </p:nvSpPr>
+        <p:spPr/>
+      </p:sp>
+      <p:sp>
+        <p:nvSpPr>
+          <p:cNvPr id="3" name="Notes Placeholder 2"/>
+          <p:cNvSpPr>
+            <a:spLocks noGrp="1"/>
+          </p:cNvSpPr>
+          <p:nvPr>
+            <p:ph type="body" idx="1"/>
+          </p:nvPr>
+        </p:nvSpPr>
+        <p:spPr/>
+        <p:txBody>
+          <a:bodyPr/>
+          <a:lstStyle/>
+          <a:p>
+            <a:pPr marL="0" marR="0" lvl="0" indent="0" algn="l" defTabSz="914400" rtl="0" eaLnBrk="1" fontAlgn="auto" latinLnBrk="0" hangingPunct="1">
+              <a:lnSpc>
+                <a:spcPct val="100000"/>
+              </a:lnSpc>
+              <a:spcBef>
+                <a:spcPts val="0"/>
+              </a:spcBef>
+              <a:spcAft>
+                <a:spcPts val="0"/>
+              </a:spcAft>
+              <a:buClrTx/>
+              <a:buSzTx/>
+              <a:buFontTx/>
+              <a:buNone/>
+              <a:tabLst/>
+              <a:defRPr/>
+            </a:pPr>
+            <a:r>
+              <a:rPr lang="en-US" sz="1200" dirty="0"/>
+              <a:t>Aim: The goal of Stage IV was to </a:t>
+            </a:r>
+            <a:r>
+              <a:rPr lang="en-US" sz="1200" dirty="0" err="1"/>
+              <a:t>utlize</a:t>
+            </a:r>
+            <a:r>
+              <a:rPr lang="en-US" sz="1200" dirty="0"/>
+              <a:t> machine learning and statistical models to predict the trend of COVID-19 cases / deaths.</a:t>
+            </a:r>
+          </a:p>
+          <a:p>
+            <a:endParaRPr lang="en-US" dirty="0"/>
+          </a:p>
+        </p:txBody>
+      </p:sp>
+      <p:sp>
+        <p:nvSpPr>
+          <p:cNvPr id="4" name="Slide Number Placeholder 3"/>
+          <p:cNvSpPr>
+            <a:spLocks noGrp="1"/>
+          </p:cNvSpPr>
+          <p:nvPr>
+            <p:ph type="sldNum" sz="quarter" idx="5"/>
+          </p:nvPr>
+        </p:nvSpPr>
+        <p:spPr/>
+        <p:txBody>
+          <a:bodyPr/>
+          <a:lstStyle/>
+          <a:p>
+            <a:fld id="{EC6F6E41-1F62-4E61-82DC-4FF03C9667B9}" type="slidenum">
+              <a:rPr lang="en-US" smtClean="0"/>
+              <a:t>10</a:t>
+            </a:fld>
+            <a:endParaRPr lang="en-US"/>
+          </a:p>
+        </p:txBody>
+      </p:sp>
+    </p:spTree>
+    <p:extLst>
+      <p:ext uri="{BB962C8B-B14F-4D97-AF65-F5344CB8AC3E}">
+        <p14:creationId xmlns:p14="http://schemas.microsoft.com/office/powerpoint/2010/main" val="3195875454"/>
+      </p:ext>
+    </p:extLst>
+  </p:cSld>
+  <p:clrMapOvr>
+    <a:masterClrMapping/>
+  </p:clrMapOvr>
+</p:notes>
+</file>
+
+<file path=ppt/notesSlides/notesSlide9.xml><?xml version="1.0" encoding="utf-8"?>
+<p:notes xmlns:a="http://schemas.openxmlformats.org/drawingml/2006/main" xmlns:r="http://schemas.openxmlformats.org/officeDocument/2006/relationships" xmlns:p="http://schemas.openxmlformats.org/presentationml/2006/main">
+  <p:cSld>
+    <p:spTree>
+      <p:nvGrpSpPr>
+        <p:cNvPr id="1" name=""/>
+        <p:cNvGrpSpPr/>
+        <p:nvPr/>
+      </p:nvGrpSpPr>
+      <p:grpSpPr>
+        <a:xfrm>
+          <a:off x="0" y="0"/>
+          <a:ext cx="0" cy="0"/>
+          <a:chOff x="0" y="0"/>
+          <a:chExt cx="0" cy="0"/>
+        </a:xfrm>
+      </p:grpSpPr>
+      <p:sp>
+        <p:nvSpPr>
+          <p:cNvPr id="2" name="Slide Image Placeholder 1"/>
+          <p:cNvSpPr>
+            <a:spLocks noGrp="1" noRot="1" noChangeAspect="1"/>
+          </p:cNvSpPr>
+          <p:nvPr>
+            <p:ph type="sldImg"/>
+          </p:nvPr>
+        </p:nvSpPr>
+        <p:spPr/>
+      </p:sp>
+      <p:sp>
+        <p:nvSpPr>
+          <p:cNvPr id="3" name="Notes Placeholder 2"/>
+          <p:cNvSpPr>
+            <a:spLocks noGrp="1"/>
+          </p:cNvSpPr>
+          <p:nvPr>
+            <p:ph type="body" idx="1"/>
+          </p:nvPr>
+        </p:nvSpPr>
+        <p:spPr/>
+        <p:txBody>
+          <a:bodyPr/>
+          <a:lstStyle/>
+          <a:p>
+            <a:pPr marL="0" marR="0" lvl="0" indent="0" algn="l" defTabSz="914400" rtl="0" eaLnBrk="1" fontAlgn="auto" latinLnBrk="0" hangingPunct="1">
+              <a:lnSpc>
+                <a:spcPct val="100000"/>
+              </a:lnSpc>
+              <a:spcBef>
+                <a:spcPts val="0"/>
+              </a:spcBef>
+              <a:spcAft>
+                <a:spcPts val="0"/>
+              </a:spcAft>
+              <a:buClrTx/>
+              <a:buSzTx/>
+              <a:buFontTx/>
+              <a:buNone/>
+              <a:tabLst/>
+              <a:defRPr/>
+            </a:pPr>
+            <a:r>
+              <a:rPr lang="en-US" sz="1200" dirty="0"/>
+              <a:t>Aim: Stage V aimed at developing a simple interactive dashboard based on the analysis done so far.</a:t>
+            </a:r>
+          </a:p>
+          <a:p>
+            <a:endParaRPr lang="en-US" dirty="0"/>
+          </a:p>
+        </p:txBody>
+      </p:sp>
+      <p:sp>
+        <p:nvSpPr>
+          <p:cNvPr id="4" name="Slide Number Placeholder 3"/>
+          <p:cNvSpPr>
+            <a:spLocks noGrp="1"/>
+          </p:cNvSpPr>
+          <p:nvPr>
+            <p:ph type="sldNum" sz="quarter" idx="5"/>
+          </p:nvPr>
+        </p:nvSpPr>
+        <p:spPr/>
+        <p:txBody>
+          <a:bodyPr/>
+          <a:lstStyle/>
+          <a:p>
+            <a:fld id="{EC6F6E41-1F62-4E61-82DC-4FF03C9667B9}" type="slidenum">
+              <a:rPr lang="en-US" smtClean="0"/>
+              <a:t>11</a:t>
+            </a:fld>
+            <a:endParaRPr lang="en-US"/>
+          </a:p>
+        </p:txBody>
+      </p:sp>
+    </p:spTree>
+    <p:extLst>
+      <p:ext uri="{BB962C8B-B14F-4D97-AF65-F5344CB8AC3E}">
+        <p14:creationId xmlns:p14="http://schemas.microsoft.com/office/powerpoint/2010/main" val="3451712410"/>
       </p:ext>
     </p:extLst>
   </p:cSld>
@@ -7103,7 +7901,7 @@
         </p:nvSpPr>
         <p:spPr>
           <a:xfrm>
-            <a:off x="743797" y="1188855"/>
+            <a:off x="838200" y="2949921"/>
             <a:ext cx="10515600" cy="958158"/>
           </a:xfrm>
         </p:spPr>
@@ -7137,18 +7935,20 @@
         </p:nvSpPr>
         <p:spPr>
           <a:xfrm>
-            <a:off x="838200" y="4288249"/>
+            <a:off x="838200" y="4040823"/>
             <a:ext cx="10515600" cy="1500187"/>
           </a:xfrm>
         </p:spPr>
         <p:txBody>
-          <a:bodyPr/>
+          <a:bodyPr>
+            <a:normAutofit lnSpcReduction="10000"/>
+          </a:bodyPr>
           <a:lstStyle/>
           <a:p>
             <a:pPr algn="ctr"/>
             <a:r>
               <a:rPr lang="en-US" dirty="0"/>
-              <a:t>Regression models (linear, polynomial), predictions</a:t>
+              <a:t>Regression models (linear, polynomial), machine learning, predictions on COVID-19 cases/deaths</a:t>
             </a:r>
           </a:p>
           <a:p>
@@ -7159,50 +7959,6 @@
                 </a:highlight>
               </a:rPr>
               <a:t>One slide each on individual predictions and whether they were correct or not</a:t>
-            </a:r>
-          </a:p>
-        </p:txBody>
-      </p:sp>
-      <p:sp>
-        <p:nvSpPr>
-          <p:cNvPr id="5" name="TextBox 4">
-            <a:extLst>
-              <a:ext uri="{FF2B5EF4-FFF2-40B4-BE49-F238E27FC236}">
-                <a16:creationId xmlns:a16="http://schemas.microsoft.com/office/drawing/2014/main" id="{7A89BE17-3F82-D9F3-0750-1102B57DB370}"/>
-              </a:ext>
-            </a:extLst>
-          </p:cNvPr>
-          <p:cNvSpPr txBox="1"/>
-          <p:nvPr/>
-        </p:nvSpPr>
-        <p:spPr>
-          <a:xfrm>
-            <a:off x="237067" y="2302933"/>
-            <a:ext cx="11521440" cy="954107"/>
-          </a:xfrm>
-          <a:prstGeom prst="rect">
-            <a:avLst/>
-          </a:prstGeom>
-          <a:noFill/>
-        </p:spPr>
-        <p:txBody>
-          <a:bodyPr wrap="square">
-            <a:spAutoFit/>
-          </a:bodyPr>
-          <a:lstStyle/>
-          <a:p>
-            <a:pPr algn="just"/>
-            <a:r>
-              <a:rPr lang="en-US" sz="2800" dirty="0"/>
-              <a:t>Aim: 	The goal of Stage IV was to </a:t>
-            </a:r>
-            <a:r>
-              <a:rPr lang="en-US" sz="2800" dirty="0" err="1"/>
-              <a:t>utlize</a:t>
-            </a:r>
-            <a:r>
-              <a:rPr lang="en-US" sz="2800" dirty="0"/>
-              <a:t> machine learning and 	statistical models to predict the trend of COVID-19 cases / deaths.</a:t>
             </a:r>
           </a:p>
         </p:txBody>
@@ -7284,8 +8040,8 @@
         </p:nvSpPr>
         <p:spPr>
           <a:xfrm>
-            <a:off x="770467" y="1114370"/>
-            <a:ext cx="10515600" cy="998753"/>
+            <a:off x="838200" y="2885375"/>
+            <a:ext cx="10515600" cy="1087250"/>
           </a:xfrm>
         </p:spPr>
         <p:txBody>
@@ -7302,37 +8058,38 @@
       </p:sp>
       <p:sp>
         <p:nvSpPr>
-          <p:cNvPr id="4" name="TextBox 3">
-            <a:extLst>
-              <a:ext uri="{FF2B5EF4-FFF2-40B4-BE49-F238E27FC236}">
-                <a16:creationId xmlns:a16="http://schemas.microsoft.com/office/drawing/2014/main" id="{9E59B9FD-F5A6-3AE8-E95A-3452B4B7BEEB}"/>
-              </a:ext>
-            </a:extLst>
-          </p:cNvPr>
-          <p:cNvSpPr txBox="1"/>
-          <p:nvPr/>
+          <p:cNvPr id="3" name="Text Placeholder 2">
+            <a:extLst>
+              <a:ext uri="{FF2B5EF4-FFF2-40B4-BE49-F238E27FC236}">
+                <a16:creationId xmlns:a16="http://schemas.microsoft.com/office/drawing/2014/main" id="{24211640-C3CF-59AE-6A31-08637E243D68}"/>
+              </a:ext>
+            </a:extLst>
+          </p:cNvPr>
+          <p:cNvSpPr>
+            <a:spLocks noGrp="1"/>
+          </p:cNvSpPr>
+          <p:nvPr>
+            <p:ph type="body" idx="1"/>
+          </p:nvPr>
         </p:nvSpPr>
         <p:spPr>
           <a:xfrm>
-            <a:off x="982131" y="2470834"/>
-            <a:ext cx="10437709" cy="954107"/>
+            <a:off x="838200" y="4066234"/>
+            <a:ext cx="10515600" cy="570313"/>
           </a:xfrm>
-          <a:prstGeom prst="rect">
-            <a:avLst/>
-          </a:prstGeom>
-          <a:noFill/>
         </p:spPr>
         <p:txBody>
-          <a:bodyPr wrap="square">
-            <a:spAutoFit/>
-          </a:bodyPr>
-          <a:lstStyle/>
-          <a:p>
-            <a:pPr algn="just"/>
-            <a:r>
-              <a:rPr lang="en-US" sz="2800" dirty="0"/>
-              <a:t>Aim: 	Stage V aimed at developing a simple interactive 	dashboard based on the analysis done so far.</a:t>
-            </a:r>
+          <a:bodyPr/>
+          <a:lstStyle/>
+          <a:p>
+            <a:pPr algn="ctr"/>
+            <a:r>
+              <a:rPr lang="en-US" sz="2400" dirty="0"/>
+              <a:t>Interactive dashboard based on current analysis</a:t>
+            </a:r>
+          </a:p>
+          <a:p>
+            <a:endParaRPr lang="en-US" dirty="0"/>
           </a:p>
         </p:txBody>
       </p:sp>
@@ -7680,25 +8437,21 @@
         </p:nvSpPr>
         <p:spPr>
           <a:xfrm>
-            <a:off x="838200" y="2357438"/>
-            <a:ext cx="10515600" cy="953284"/>
+            <a:off x="838200" y="2337713"/>
+            <a:ext cx="10515600" cy="1750863"/>
           </a:xfrm>
         </p:spPr>
         <p:txBody>
           <a:bodyPr>
-            <a:normAutofit fontScale="90000"/>
+            <a:normAutofit/>
           </a:bodyPr>
           <a:lstStyle/>
           <a:p>
             <a:pPr algn="ctr"/>
             <a:r>
               <a:rPr lang="en-US" dirty="0"/>
-              <a:t>Stage 1: Data and Project Understanding</a:t>
-            </a:r>
-            <a:br>
-              <a:rPr lang="en-US" b="1" dirty="0"/>
-            </a:br>
-            <a:endParaRPr lang="en-US" dirty="0"/>
+              <a:t>Stage 1: Data &amp; Project Understanding</a:t>
+            </a:r>
           </a:p>
         </p:txBody>
       </p:sp>
@@ -7720,7 +8473,7 @@
         </p:nvSpPr>
         <p:spPr>
           <a:xfrm>
-            <a:off x="838200" y="4205008"/>
+            <a:off x="838200" y="4264176"/>
             <a:ext cx="10515600" cy="568829"/>
           </a:xfrm>
         </p:spPr>
@@ -7732,42 +8485,6 @@
             <a:r>
               <a:rPr lang="en-US" dirty="0"/>
               <a:t>Variable dictionaries, set up and merge datasets</a:t>
-            </a:r>
-          </a:p>
-        </p:txBody>
-      </p:sp>
-      <p:sp>
-        <p:nvSpPr>
-          <p:cNvPr id="5" name="TextBox 4">
-            <a:extLst>
-              <a:ext uri="{FF2B5EF4-FFF2-40B4-BE49-F238E27FC236}">
-                <a16:creationId xmlns:a16="http://schemas.microsoft.com/office/drawing/2014/main" id="{AF2344C9-DADA-C46A-A4E3-29EBF8598794}"/>
-              </a:ext>
-            </a:extLst>
-          </p:cNvPr>
-          <p:cNvSpPr txBox="1"/>
-          <p:nvPr/>
-        </p:nvSpPr>
-        <p:spPr>
-          <a:xfrm>
-            <a:off x="1551094" y="2951535"/>
-            <a:ext cx="9482666" cy="954107"/>
-          </a:xfrm>
-          <a:prstGeom prst="rect">
-            <a:avLst/>
-          </a:prstGeom>
-          <a:noFill/>
-        </p:spPr>
-        <p:txBody>
-          <a:bodyPr wrap="square">
-            <a:spAutoFit/>
-          </a:bodyPr>
-          <a:lstStyle/>
-          <a:p>
-            <a:pPr algn="just"/>
-            <a:r>
-              <a:rPr lang="en-US" sz="2800" dirty="0"/>
-              <a:t>Aim: The goal was to get acquainted with the different 	datasets that would be used in our analysis.</a:t>
             </a:r>
           </a:p>
         </p:txBody>
@@ -7833,10 +8550,10 @@
       </p:grpSpPr>
       <p:sp>
         <p:nvSpPr>
-          <p:cNvPr id="2" name="Title 1">
-            <a:extLst>
-              <a:ext uri="{FF2B5EF4-FFF2-40B4-BE49-F238E27FC236}">
-                <a16:creationId xmlns:a16="http://schemas.microsoft.com/office/drawing/2014/main" id="{8948E6F6-71B7-E040-7E49-9DEA73B73CF8}"/>
+          <p:cNvPr id="5" name="Title 4">
+            <a:extLst>
+              <a:ext uri="{FF2B5EF4-FFF2-40B4-BE49-F238E27FC236}">
+                <a16:creationId xmlns:a16="http://schemas.microsoft.com/office/drawing/2014/main" id="{4DC795EF-4395-F464-77CE-2BD2715DCA18}"/>
               </a:ext>
             </a:extLst>
           </p:cNvPr>
@@ -7847,101 +8564,90 @@
             <p:ph type="title"/>
           </p:nvPr>
         </p:nvSpPr>
-        <p:spPr>
-          <a:xfrm>
-            <a:off x="695960" y="1453087"/>
-            <a:ext cx="10515600" cy="894116"/>
-          </a:xfrm>
-        </p:spPr>
-        <p:txBody>
-          <a:bodyPr>
-            <a:noAutofit/>
-          </a:bodyPr>
-          <a:lstStyle/>
-          <a:p>
-            <a:pPr algn="ctr"/>
+        <p:spPr/>
+        <p:txBody>
+          <a:bodyPr/>
+          <a:lstStyle/>
+          <a:p>
             <a:r>
               <a:rPr lang="en-US" dirty="0"/>
-              <a:t>Stage 2: Data Modeling</a:t>
-            </a:r>
-          </a:p>
-        </p:txBody>
-      </p:sp>
-      <p:sp>
-        <p:nvSpPr>
-          <p:cNvPr id="3" name="Content Placeholder 2">
-            <a:extLst>
-              <a:ext uri="{FF2B5EF4-FFF2-40B4-BE49-F238E27FC236}">
-                <a16:creationId xmlns:a16="http://schemas.microsoft.com/office/drawing/2014/main" id="{CCCBD3F5-8831-EF9E-823E-0EC0933ACFF1}"/>
-              </a:ext>
-            </a:extLst>
-          </p:cNvPr>
-          <p:cNvSpPr>
-            <a:spLocks noGrp="1"/>
-          </p:cNvSpPr>
-          <p:nvPr>
-            <p:ph type="body" idx="1"/>
-          </p:nvPr>
-        </p:nvSpPr>
-        <p:spPr>
-          <a:xfrm>
-            <a:off x="838200" y="4067718"/>
-            <a:ext cx="10515600" cy="472010"/>
-          </a:xfrm>
-        </p:spPr>
-        <p:txBody>
-          <a:bodyPr/>
-          <a:lstStyle/>
-          <a:p>
-            <a:pPr algn="ctr"/>
+              <a:t>Enrichment data</a:t>
+            </a:r>
+          </a:p>
+        </p:txBody>
+      </p:sp>
+      <p:sp>
+        <p:nvSpPr>
+          <p:cNvPr id="6" name="Content Placeholder 5">
+            <a:extLst>
+              <a:ext uri="{FF2B5EF4-FFF2-40B4-BE49-F238E27FC236}">
+                <a16:creationId xmlns:a16="http://schemas.microsoft.com/office/drawing/2014/main" id="{8B522ED7-7E31-26BF-CCDB-D7D5A7150758}"/>
+              </a:ext>
+            </a:extLst>
+          </p:cNvPr>
+          <p:cNvSpPr>
+            <a:spLocks noGrp="1"/>
+          </p:cNvSpPr>
+          <p:nvPr>
+            <p:ph idx="1"/>
+          </p:nvPr>
+        </p:nvSpPr>
+        <p:spPr/>
+        <p:txBody>
+          <a:bodyPr/>
+          <a:lstStyle/>
+          <a:p>
+            <a:r>
+              <a:rPr lang="en-US" b="1" dirty="0"/>
+              <a:t> Presidential</a:t>
+            </a:r>
             <a:r>
               <a:rPr lang="en-US" dirty="0"/>
-              <a:t>Weekly statistics &amp; trends</a:t>
-            </a:r>
-          </a:p>
-        </p:txBody>
-      </p:sp>
-      <p:sp>
-        <p:nvSpPr>
-          <p:cNvPr id="5" name="TextBox 4">
-            <a:extLst>
-              <a:ext uri="{FF2B5EF4-FFF2-40B4-BE49-F238E27FC236}">
-                <a16:creationId xmlns:a16="http://schemas.microsoft.com/office/drawing/2014/main" id="{1D6581FC-2738-38CA-FC46-47CA4C120241}"/>
-              </a:ext>
-            </a:extLst>
-          </p:cNvPr>
-          <p:cNvSpPr txBox="1"/>
-          <p:nvPr/>
-        </p:nvSpPr>
-        <p:spPr>
-          <a:xfrm>
-            <a:off x="1747518" y="2602672"/>
-            <a:ext cx="9055949" cy="954107"/>
-          </a:xfrm>
-          <a:prstGeom prst="rect">
-            <a:avLst/>
-          </a:prstGeom>
-          <a:noFill/>
-        </p:spPr>
-        <p:txBody>
-          <a:bodyPr wrap="square">
-            <a:spAutoFit/>
-          </a:bodyPr>
-          <a:lstStyle/>
-          <a:p>
-            <a:r>
-              <a:rPr lang="en-US" sz="2800" dirty="0"/>
-              <a:t>Aim: 	The goal of Stage II was to develop the data 		for modeling and comparative analysis. </a:t>
-            </a:r>
-          </a:p>
-        </p:txBody>
-      </p:sp>
-      <p:sp>
-        <p:nvSpPr>
-          <p:cNvPr id="6" name="Slide Number Placeholder 5">
-            <a:extLst>
-              <a:ext uri="{FF2B5EF4-FFF2-40B4-BE49-F238E27FC236}">
-                <a16:creationId xmlns:a16="http://schemas.microsoft.com/office/drawing/2014/main" id="{97AE4315-90C4-3688-1ABB-32FE93BE7913}"/>
+              <a:t> – Ayodeji &amp; </a:t>
+            </a:r>
+            <a:r>
+              <a:rPr lang="en-US" dirty="0" err="1"/>
+              <a:t>Neetha</a:t>
+            </a:r>
+            <a:endParaRPr lang="en-US" dirty="0"/>
+          </a:p>
+          <a:p>
+            <a:pPr marL="0" indent="0">
+              <a:buNone/>
+            </a:pPr>
+            <a:endParaRPr lang="en-US" dirty="0"/>
+          </a:p>
+          <a:p>
+            <a:r>
+              <a:rPr lang="en-US" b="1" dirty="0"/>
+              <a:t> Housing</a:t>
+            </a:r>
+            <a:r>
+              <a:rPr lang="en-US" dirty="0"/>
+              <a:t> – Kevin Hayes</a:t>
+            </a:r>
+          </a:p>
+          <a:p>
+            <a:endParaRPr lang="en-US" dirty="0"/>
+          </a:p>
+          <a:p>
+            <a:r>
+              <a:rPr lang="en-US" b="1" dirty="0"/>
+              <a:t> Employment</a:t>
+            </a:r>
+            <a:r>
+              <a:rPr lang="en-US" dirty="0"/>
+              <a:t> – Kol Herget</a:t>
+            </a:r>
+          </a:p>
+        </p:txBody>
+      </p:sp>
+      <p:sp>
+        <p:nvSpPr>
+          <p:cNvPr id="4" name="Slide Number Placeholder 3">
+            <a:extLst>
+              <a:ext uri="{FF2B5EF4-FFF2-40B4-BE49-F238E27FC236}">
+                <a16:creationId xmlns:a16="http://schemas.microsoft.com/office/drawing/2014/main" id="{FB0A8900-EB91-535B-24E6-C43C7D354E1B}"/>
               </a:ext>
             </a:extLst>
           </p:cNvPr>
@@ -7968,7 +8674,7 @@
     </p:spTree>
     <p:extLst>
       <p:ext uri="{BB962C8B-B14F-4D97-AF65-F5344CB8AC3E}">
-        <p14:creationId xmlns:p14="http://schemas.microsoft.com/office/powerpoint/2010/main" val="2643852891"/>
+        <p14:creationId xmlns:p14="http://schemas.microsoft.com/office/powerpoint/2010/main" val="1535314736"/>
       </p:ext>
     </p:extLst>
   </p:cSld>
@@ -8000,7 +8706,7 @@
           <p:cNvPr id="2" name="Title 1">
             <a:extLst>
               <a:ext uri="{FF2B5EF4-FFF2-40B4-BE49-F238E27FC236}">
-                <a16:creationId xmlns:a16="http://schemas.microsoft.com/office/drawing/2014/main" id="{BE294B4A-0F3D-665F-2B44-858A0687CC07}"/>
+                <a16:creationId xmlns:a16="http://schemas.microsoft.com/office/drawing/2014/main" id="{8948E6F6-71B7-E040-7E49-9DEA73B73CF8}"/>
               </a:ext>
             </a:extLst>
           </p:cNvPr>
@@ -8013,18 +8719,20 @@
         </p:nvSpPr>
         <p:spPr>
           <a:xfrm>
-            <a:off x="689609" y="1081876"/>
-            <a:ext cx="10515600" cy="968916"/>
+            <a:off x="838200" y="2981942"/>
+            <a:ext cx="10515600" cy="894116"/>
           </a:xfrm>
         </p:spPr>
         <p:txBody>
-          <a:bodyPr/>
+          <a:bodyPr>
+            <a:noAutofit/>
+          </a:bodyPr>
           <a:lstStyle/>
           <a:p>
             <a:pPr algn="ctr"/>
             <a:r>
               <a:rPr lang="en-US" dirty="0"/>
-              <a:t>Stage 3: Individual work</a:t>
+              <a:t>Stage 2: Data Modeling</a:t>
             </a:r>
           </a:p>
         </p:txBody>
@@ -8034,7 +8742,7 @@
           <p:cNvPr id="3" name="Content Placeholder 2">
             <a:extLst>
               <a:ext uri="{FF2B5EF4-FFF2-40B4-BE49-F238E27FC236}">
-                <a16:creationId xmlns:a16="http://schemas.microsoft.com/office/drawing/2014/main" id="{B5B712E0-DA21-49DD-C542-65D2471E9FB3}"/>
+                <a16:creationId xmlns:a16="http://schemas.microsoft.com/office/drawing/2014/main" id="{CCCBD3F5-8831-EF9E-823E-0EC0933ACFF1}"/>
               </a:ext>
             </a:extLst>
           </p:cNvPr>
@@ -8047,57 +8755,18 @@
         </p:nvSpPr>
         <p:spPr>
           <a:xfrm>
-            <a:off x="838200" y="4140967"/>
-            <a:ext cx="10515600" cy="488146"/>
+            <a:off x="838200" y="3967498"/>
+            <a:ext cx="10515600" cy="525800"/>
           </a:xfrm>
         </p:spPr>
         <p:txBody>
           <a:bodyPr/>
           <a:lstStyle/>
           <a:p>
-            <a:r>
-              <a:rPr lang="en-US" dirty="0">
-                <a:highlight>
-                  <a:srgbClr val="FFFF00"/>
-                </a:highlight>
-              </a:rPr>
-              <a:t>Each insert our own findings </a:t>
-            </a:r>
-          </a:p>
-        </p:txBody>
-      </p:sp>
-      <p:sp>
-        <p:nvSpPr>
-          <p:cNvPr id="5" name="TextBox 4">
-            <a:extLst>
-              <a:ext uri="{FF2B5EF4-FFF2-40B4-BE49-F238E27FC236}">
-                <a16:creationId xmlns:a16="http://schemas.microsoft.com/office/drawing/2014/main" id="{C1A811D0-D7E2-B9E1-D4E3-0EC605CDAA46}"/>
-              </a:ext>
-            </a:extLst>
-          </p:cNvPr>
-          <p:cNvSpPr txBox="1"/>
-          <p:nvPr/>
-        </p:nvSpPr>
-        <p:spPr>
-          <a:xfrm>
-            <a:off x="176108" y="2325081"/>
-            <a:ext cx="11873652" cy="1434119"/>
-          </a:xfrm>
-          <a:prstGeom prst="rect">
-            <a:avLst/>
-          </a:prstGeom>
-          <a:noFill/>
-        </p:spPr>
-        <p:txBody>
-          <a:bodyPr wrap="square">
-            <a:spAutoFit/>
-          </a:bodyPr>
-          <a:lstStyle/>
-          <a:p>
-            <a:pPr algn="just"/>
-            <a:r>
-              <a:rPr lang="en-US" sz="2800" dirty="0"/>
-              <a:t>Aim: The goal of Stage III was to develop distributions and formal 	hypothesis tests for the intuitions had in Stage I and II and utilize 	statistical modeling to prove/disprove them.</a:t>
+            <a:pPr algn="ctr"/>
+            <a:r>
+              <a:rPr lang="en-US" dirty="0"/>
+              <a:t>Weekly statistics &amp; trends</a:t>
             </a:r>
           </a:p>
         </p:txBody>
@@ -8107,7 +8776,7 @@
           <p:cNvPr id="6" name="Slide Number Placeholder 5">
             <a:extLst>
               <a:ext uri="{FF2B5EF4-FFF2-40B4-BE49-F238E27FC236}">
-                <a16:creationId xmlns:a16="http://schemas.microsoft.com/office/drawing/2014/main" id="{DD009CC9-0EDE-A47D-6FF2-7CC688AA8C8B}"/>
+                <a16:creationId xmlns:a16="http://schemas.microsoft.com/office/drawing/2014/main" id="{97AE4315-90C4-3688-1ABB-32FE93BE7913}"/>
               </a:ext>
             </a:extLst>
           </p:cNvPr>
@@ -8134,7 +8803,7 @@
     </p:spTree>
     <p:extLst>
       <p:ext uri="{BB962C8B-B14F-4D97-AF65-F5344CB8AC3E}">
-        <p14:creationId xmlns:p14="http://schemas.microsoft.com/office/powerpoint/2010/main" val="3782878391"/>
+        <p14:creationId xmlns:p14="http://schemas.microsoft.com/office/powerpoint/2010/main" val="2643852891"/>
       </p:ext>
     </p:extLst>
   </p:cSld>
@@ -8163,10 +8832,10 @@
       </p:grpSpPr>
       <p:sp>
         <p:nvSpPr>
-          <p:cNvPr id="2" name="Title 1">
-            <a:extLst>
-              <a:ext uri="{FF2B5EF4-FFF2-40B4-BE49-F238E27FC236}">
-                <a16:creationId xmlns:a16="http://schemas.microsoft.com/office/drawing/2014/main" id="{BDECF0B9-4322-F7B7-3373-CF5E092064B7}"/>
+          <p:cNvPr id="11" name="Title 10">
+            <a:extLst>
+              <a:ext uri="{FF2B5EF4-FFF2-40B4-BE49-F238E27FC236}">
+                <a16:creationId xmlns:a16="http://schemas.microsoft.com/office/drawing/2014/main" id="{7733F8B2-4486-05C8-374A-1A0852AA9E87}"/>
               </a:ext>
             </a:extLst>
           </p:cNvPr>
@@ -8179,29 +8848,28 @@
         </p:nvSpPr>
         <p:spPr>
           <a:xfrm>
-            <a:off x="838200" y="768350"/>
-            <a:ext cx="10515600" cy="1114742"/>
+            <a:off x="838200" y="657350"/>
+            <a:ext cx="10515600" cy="745926"/>
           </a:xfrm>
         </p:spPr>
         <p:txBody>
-          <a:bodyPr>
-            <a:normAutofit fontScale="90000"/>
-          </a:bodyPr>
-          <a:lstStyle/>
-          <a:p>
+          <a:bodyPr/>
+          <a:lstStyle/>
+          <a:p>
+            <a:pPr algn="ctr"/>
             <a:r>
               <a:rPr lang="en-US" dirty="0"/>
-              <a:t>Ayodeji Iwayemi –New York State</a:t>
-            </a:r>
-          </a:p>
-        </p:txBody>
-      </p:sp>
-      <p:sp>
-        <p:nvSpPr>
-          <p:cNvPr id="3" name="Text Placeholder 2">
-            <a:extLst>
-              <a:ext uri="{FF2B5EF4-FFF2-40B4-BE49-F238E27FC236}">
-                <a16:creationId xmlns:a16="http://schemas.microsoft.com/office/drawing/2014/main" id="{54D6294F-3149-F746-E68F-EAE14296529D}"/>
+              <a:t>Mean/median/mode trends</a:t>
+            </a:r>
+          </a:p>
+        </p:txBody>
+      </p:sp>
+      <p:sp>
+        <p:nvSpPr>
+          <p:cNvPr id="12" name="Text Placeholder 11">
+            <a:extLst>
+              <a:ext uri="{FF2B5EF4-FFF2-40B4-BE49-F238E27FC236}">
+                <a16:creationId xmlns:a16="http://schemas.microsoft.com/office/drawing/2014/main" id="{35669549-B46C-F6C3-5530-5175E6D66763}"/>
               </a:ext>
             </a:extLst>
           </p:cNvPr>
@@ -8214,15 +8882,82 @@
         </p:nvSpPr>
         <p:spPr>
           <a:xfrm>
-            <a:off x="628649" y="3058053"/>
-            <a:ext cx="10515600" cy="1500187"/>
+            <a:off x="1086534" y="1535935"/>
+            <a:ext cx="4907865" cy="454230"/>
           </a:xfrm>
         </p:spPr>
         <p:txBody>
           <a:bodyPr/>
           <a:lstStyle/>
           <a:p>
-            <a:endParaRPr lang="en-US"/>
+            <a:pPr algn="ctr"/>
+            <a:r>
+              <a:rPr lang="en-US" dirty="0"/>
+              <a:t>CASES</a:t>
+            </a:r>
+          </a:p>
+        </p:txBody>
+      </p:sp>
+      <p:pic>
+        <p:nvPicPr>
+          <p:cNvPr id="18" name="Content Placeholder 17">
+            <a:extLst>
+              <a:ext uri="{FF2B5EF4-FFF2-40B4-BE49-F238E27FC236}">
+                <a16:creationId xmlns:a16="http://schemas.microsoft.com/office/drawing/2014/main" id="{421E6816-BC44-E88F-CE5C-1AA08AD088F6}"/>
+              </a:ext>
+            </a:extLst>
+          </p:cNvPr>
+          <p:cNvPicPr>
+            <a:picLocks noGrp="1" noChangeAspect="1"/>
+          </p:cNvPicPr>
+          <p:nvPr>
+            <p:ph sz="half" idx="2"/>
+          </p:nvPr>
+        </p:nvPicPr>
+        <p:blipFill>
+          <a:blip r:embed="rId3"/>
+          <a:stretch>
+            <a:fillRect/>
+          </a:stretch>
+        </p:blipFill>
+        <p:spPr>
+          <a:xfrm>
+            <a:off x="1086534" y="2047874"/>
+            <a:ext cx="4657941" cy="3598159"/>
+          </a:xfrm>
+        </p:spPr>
+      </p:pic>
+      <p:sp>
+        <p:nvSpPr>
+          <p:cNvPr id="14" name="Text Placeholder 13">
+            <a:extLst>
+              <a:ext uri="{FF2B5EF4-FFF2-40B4-BE49-F238E27FC236}">
+                <a16:creationId xmlns:a16="http://schemas.microsoft.com/office/drawing/2014/main" id="{DBA2AEF6-6AB4-7D86-CF57-F7EF155B0BD3}"/>
+              </a:ext>
+            </a:extLst>
+          </p:cNvPr>
+          <p:cNvSpPr>
+            <a:spLocks noGrp="1"/>
+          </p:cNvSpPr>
+          <p:nvPr>
+            <p:ph type="body" sz="quarter" idx="3"/>
+          </p:nvPr>
+        </p:nvSpPr>
+        <p:spPr>
+          <a:xfrm>
+            <a:off x="6309859" y="1500692"/>
+            <a:ext cx="5045528" cy="454230"/>
+          </a:xfrm>
+        </p:spPr>
+        <p:txBody>
+          <a:bodyPr/>
+          <a:lstStyle/>
+          <a:p>
+            <a:pPr algn="ctr"/>
+            <a:r>
+              <a:rPr lang="en-US" dirty="0"/>
+              <a:t>DEATHS</a:t>
+            </a:r>
           </a:p>
         </p:txBody>
       </p:sp>
@@ -8231,7 +8966,7 @@
           <p:cNvPr id="4" name="Slide Number Placeholder 3">
             <a:extLst>
               <a:ext uri="{FF2B5EF4-FFF2-40B4-BE49-F238E27FC236}">
-                <a16:creationId xmlns:a16="http://schemas.microsoft.com/office/drawing/2014/main" id="{EFB8A8B7-ED6D-A0DF-43C4-7E0348013F56}"/>
+                <a16:creationId xmlns:a16="http://schemas.microsoft.com/office/drawing/2014/main" id="{B3733210-308B-C64F-9124-E63A3DFE5BE7}"/>
               </a:ext>
             </a:extLst>
           </p:cNvPr>
@@ -8255,10 +8990,154 @@
           </a:p>
         </p:txBody>
       </p:sp>
+      <p:pic>
+        <p:nvPicPr>
+          <p:cNvPr id="10" name="Picture 9">
+            <a:extLst>
+              <a:ext uri="{FF2B5EF4-FFF2-40B4-BE49-F238E27FC236}">
+                <a16:creationId xmlns:a16="http://schemas.microsoft.com/office/drawing/2014/main" id="{50781EF5-B959-A66B-9FDC-6253D9C790D3}"/>
+              </a:ext>
+            </a:extLst>
+          </p:cNvPr>
+          <p:cNvPicPr>
+            <a:picLocks noChangeAspect="1"/>
+          </p:cNvPicPr>
+          <p:nvPr/>
+        </p:nvPicPr>
+        <p:blipFill>
+          <a:blip r:embed="rId4"/>
+          <a:stretch>
+            <a:fillRect/>
+          </a:stretch>
+        </p:blipFill>
+        <p:spPr>
+          <a:xfrm>
+            <a:off x="6522168" y="2047875"/>
+            <a:ext cx="4483249" cy="3598159"/>
+          </a:xfrm>
+          <a:prstGeom prst="rect">
+            <a:avLst/>
+          </a:prstGeom>
+        </p:spPr>
+      </p:pic>
+      <p:sp>
+        <p:nvSpPr>
+          <p:cNvPr id="19" name="TextBox 18">
+            <a:extLst>
+              <a:ext uri="{FF2B5EF4-FFF2-40B4-BE49-F238E27FC236}">
+                <a16:creationId xmlns:a16="http://schemas.microsoft.com/office/drawing/2014/main" id="{4D23F0B5-4493-A7C7-2A9A-BD73AC613A78}"/>
+              </a:ext>
+            </a:extLst>
+          </p:cNvPr>
+          <p:cNvSpPr txBox="1"/>
+          <p:nvPr/>
+        </p:nvSpPr>
+        <p:spPr>
+          <a:xfrm>
+            <a:off x="1468418" y="5644300"/>
+            <a:ext cx="4401017" cy="646331"/>
+          </a:xfrm>
+          <a:prstGeom prst="rect">
+            <a:avLst/>
+          </a:prstGeom>
+          <a:noFill/>
+        </p:spPr>
+        <p:txBody>
+          <a:bodyPr wrap="square" rtlCol="0">
+            <a:spAutoFit/>
+          </a:bodyPr>
+          <a:lstStyle/>
+          <a:p>
+            <a:pPr algn="ctr"/>
+            <a:r>
+              <a:rPr lang="en-US" dirty="0">
+                <a:solidFill>
+                  <a:schemeClr val="tx1">
+                    <a:lumMod val="75000"/>
+                    <a:lumOff val="25000"/>
+                  </a:schemeClr>
+                </a:solidFill>
+              </a:rPr>
+              <a:t>Mean: 17844</a:t>
+            </a:r>
+          </a:p>
+          <a:p>
+            <a:pPr algn="ctr"/>
+            <a:r>
+              <a:rPr lang="en-US" dirty="0">
+                <a:solidFill>
+                  <a:schemeClr val="tx1">
+                    <a:lumMod val="75000"/>
+                    <a:lumOff val="25000"/>
+                  </a:schemeClr>
+                </a:solidFill>
+              </a:rPr>
+              <a:t>Median: 2864</a:t>
+            </a:r>
+          </a:p>
+        </p:txBody>
+      </p:sp>
+      <p:sp>
+        <p:nvSpPr>
+          <p:cNvPr id="23" name="TextBox 22">
+            <a:extLst>
+              <a:ext uri="{FF2B5EF4-FFF2-40B4-BE49-F238E27FC236}">
+                <a16:creationId xmlns:a16="http://schemas.microsoft.com/office/drawing/2014/main" id="{2180C9D6-3055-BD7C-38A5-8696333265D0}"/>
+              </a:ext>
+            </a:extLst>
+          </p:cNvPr>
+          <p:cNvSpPr txBox="1"/>
+          <p:nvPr/>
+        </p:nvSpPr>
+        <p:spPr>
+          <a:xfrm>
+            <a:off x="6411558" y="5644300"/>
+            <a:ext cx="4806166" cy="646331"/>
+          </a:xfrm>
+          <a:prstGeom prst="rect">
+            <a:avLst/>
+          </a:prstGeom>
+          <a:noFill/>
+        </p:spPr>
+        <p:txBody>
+          <a:bodyPr wrap="square" rtlCol="0">
+            <a:spAutoFit/>
+          </a:bodyPr>
+          <a:lstStyle/>
+          <a:p>
+            <a:pPr algn="ctr"/>
+            <a:r>
+              <a:rPr lang="en-US" dirty="0">
+                <a:solidFill>
+                  <a:schemeClr val="tx1">
+                    <a:lumMod val="75000"/>
+                    <a:lumOff val="25000"/>
+                  </a:schemeClr>
+                </a:solidFill>
+              </a:rPr>
+              <a:t>Mean: 472</a:t>
+            </a:r>
+          </a:p>
+          <a:p>
+            <a:pPr algn="ctr"/>
+            <a:r>
+              <a:rPr lang="en-US" dirty="0">
+                <a:solidFill>
+                  <a:schemeClr val="tx1">
+                    <a:lumMod val="75000"/>
+                    <a:lumOff val="25000"/>
+                  </a:schemeClr>
+                </a:solidFill>
+              </a:rPr>
+              <a:t>Median: 49</a:t>
+            </a:r>
+          </a:p>
+        </p:txBody>
+      </p:sp>
     </p:spTree>
     <p:extLst>
       <p:ext uri="{BB962C8B-B14F-4D97-AF65-F5344CB8AC3E}">
-        <p14:creationId xmlns:p14="http://schemas.microsoft.com/office/powerpoint/2010/main" val="3531089478"/>
+        <p14:creationId xmlns:p14="http://schemas.microsoft.com/office/powerpoint/2010/main" val="2216928431"/>
       </p:ext>
     </p:extLst>
   </p:cSld>
@@ -8287,10 +9166,101 @@
       </p:grpSpPr>
       <p:sp>
         <p:nvSpPr>
-          <p:cNvPr id="4" name="Slide Number Placeholder 3">
-            <a:extLst>
-              <a:ext uri="{FF2B5EF4-FFF2-40B4-BE49-F238E27FC236}">
-                <a16:creationId xmlns:a16="http://schemas.microsoft.com/office/drawing/2014/main" id="{CFDAFDED-B9DD-0FE4-B019-0A3E19F03CA3}"/>
+          <p:cNvPr id="2" name="Title 1">
+            <a:extLst>
+              <a:ext uri="{FF2B5EF4-FFF2-40B4-BE49-F238E27FC236}">
+                <a16:creationId xmlns:a16="http://schemas.microsoft.com/office/drawing/2014/main" id="{BE294B4A-0F3D-665F-2B44-858A0687CC07}"/>
+              </a:ext>
+            </a:extLst>
+          </p:cNvPr>
+          <p:cNvSpPr>
+            <a:spLocks noGrp="1"/>
+          </p:cNvSpPr>
+          <p:nvPr>
+            <p:ph type="title"/>
+          </p:nvPr>
+        </p:nvSpPr>
+        <p:spPr>
+          <a:xfrm>
+            <a:off x="838200" y="2944542"/>
+            <a:ext cx="10515600" cy="968916"/>
+          </a:xfrm>
+        </p:spPr>
+        <p:txBody>
+          <a:bodyPr/>
+          <a:lstStyle/>
+          <a:p>
+            <a:pPr algn="ctr"/>
+            <a:r>
+              <a:rPr lang="en-US" dirty="0"/>
+              <a:t>Stage 3: Individual work</a:t>
+            </a:r>
+          </a:p>
+        </p:txBody>
+      </p:sp>
+      <p:sp>
+        <p:nvSpPr>
+          <p:cNvPr id="3" name="Content Placeholder 2">
+            <a:extLst>
+              <a:ext uri="{FF2B5EF4-FFF2-40B4-BE49-F238E27FC236}">
+                <a16:creationId xmlns:a16="http://schemas.microsoft.com/office/drawing/2014/main" id="{B5B712E0-DA21-49DD-C542-65D2471E9FB3}"/>
+              </a:ext>
+            </a:extLst>
+          </p:cNvPr>
+          <p:cNvSpPr>
+            <a:spLocks noGrp="1"/>
+          </p:cNvSpPr>
+          <p:nvPr>
+            <p:ph type="body" idx="1"/>
+          </p:nvPr>
+        </p:nvSpPr>
+        <p:spPr>
+          <a:xfrm>
+            <a:off x="838200" y="4049526"/>
+            <a:ext cx="10515600" cy="1434119"/>
+          </a:xfrm>
+        </p:spPr>
+        <p:txBody>
+          <a:bodyPr>
+            <a:normAutofit/>
+          </a:bodyPr>
+          <a:lstStyle/>
+          <a:p>
+            <a:pPr algn="ctr"/>
+            <a:r>
+              <a:rPr lang="en-US" dirty="0"/>
+              <a:t>Using distributions across a chosen state &amp; enrichment data,</a:t>
+            </a:r>
+          </a:p>
+          <a:p>
+            <a:pPr algn="ctr">
+              <a:spcBef>
+                <a:spcPts val="0"/>
+              </a:spcBef>
+            </a:pPr>
+            <a:r>
+              <a:rPr lang="en-US" dirty="0"/>
+              <a:t> develop formal hypotheses for testing</a:t>
+            </a:r>
+          </a:p>
+          <a:p>
+            <a:r>
+              <a:rPr lang="en-US" dirty="0">
+                <a:highlight>
+                  <a:srgbClr val="FFFF00"/>
+                </a:highlight>
+              </a:rPr>
+              <a:t>Each insert our own findings</a:t>
+            </a:r>
+          </a:p>
+        </p:txBody>
+      </p:sp>
+      <p:sp>
+        <p:nvSpPr>
+          <p:cNvPr id="6" name="Slide Number Placeholder 5">
+            <a:extLst>
+              <a:ext uri="{FF2B5EF4-FFF2-40B4-BE49-F238E27FC236}">
+                <a16:creationId xmlns:a16="http://schemas.microsoft.com/office/drawing/2014/main" id="{DD009CC9-0EDE-A47D-6FF2-7CC688AA8C8B}"/>
               </a:ext>
             </a:extLst>
           </p:cNvPr>
@@ -8314,117 +9284,10 @@
           </a:p>
         </p:txBody>
       </p:sp>
-      <p:sp>
-        <p:nvSpPr>
-          <p:cNvPr id="6" name="TextBox 5">
-            <a:extLst>
-              <a:ext uri="{FF2B5EF4-FFF2-40B4-BE49-F238E27FC236}">
-                <a16:creationId xmlns:a16="http://schemas.microsoft.com/office/drawing/2014/main" id="{251C505A-D5BB-1F7A-8C44-BF6D3DA3F9A3}"/>
-              </a:ext>
-            </a:extLst>
-          </p:cNvPr>
-          <p:cNvSpPr txBox="1"/>
-          <p:nvPr/>
-        </p:nvSpPr>
-        <p:spPr>
-          <a:xfrm>
-            <a:off x="853440" y="399018"/>
-            <a:ext cx="10566400" cy="523220"/>
-          </a:xfrm>
-          <a:prstGeom prst="rect">
-            <a:avLst/>
-          </a:prstGeom>
-          <a:noFill/>
-        </p:spPr>
-        <p:txBody>
-          <a:bodyPr wrap="square">
-            <a:spAutoFit/>
-          </a:bodyPr>
-          <a:lstStyle/>
-          <a:p>
-            <a:r>
-              <a:rPr lang="en-US" sz="2800" b="1" dirty="0"/>
-              <a:t>Distribution Analysis of New York State COVID-19 Cases:</a:t>
-            </a:r>
-            <a:endParaRPr lang="en-US" sz="2800" dirty="0"/>
-          </a:p>
-        </p:txBody>
-      </p:sp>
-      <p:sp>
-        <p:nvSpPr>
-          <p:cNvPr id="8" name="TextBox 7">
-            <a:extLst>
-              <a:ext uri="{FF2B5EF4-FFF2-40B4-BE49-F238E27FC236}">
-                <a16:creationId xmlns:a16="http://schemas.microsoft.com/office/drawing/2014/main" id="{251A9900-3F0F-D7C6-AC05-460AD189F6BF}"/>
-              </a:ext>
-            </a:extLst>
-          </p:cNvPr>
-          <p:cNvSpPr txBox="1"/>
-          <p:nvPr/>
-        </p:nvSpPr>
-        <p:spPr>
-          <a:xfrm>
-            <a:off x="1467695" y="5724999"/>
-            <a:ext cx="9654117" cy="369332"/>
-          </a:xfrm>
-          <a:prstGeom prst="rect">
-            <a:avLst/>
-          </a:prstGeom>
-          <a:noFill/>
-        </p:spPr>
-        <p:txBody>
-          <a:bodyPr wrap="square">
-            <a:spAutoFit/>
-          </a:bodyPr>
-          <a:lstStyle/>
-          <a:p>
-            <a:r>
-              <a:rPr lang="en-US" b="1" dirty="0"/>
-              <a:t>Figure 1:  A graphical plot of the distribution of COVID-19 cases in New York State</a:t>
-            </a:r>
-          </a:p>
-        </p:txBody>
-      </p:sp>
-      <p:pic>
-        <p:nvPicPr>
-          <p:cNvPr id="10" name="Picture 9" descr="A graph of covid-19&#10;&#10;Description automatically generated">
-            <a:extLst>
-              <a:ext uri="{FF2B5EF4-FFF2-40B4-BE49-F238E27FC236}">
-                <a16:creationId xmlns:a16="http://schemas.microsoft.com/office/drawing/2014/main" id="{D98B2A49-E760-C259-35BF-AAF299CA4B9E}"/>
-              </a:ext>
-            </a:extLst>
-          </p:cNvPr>
-          <p:cNvPicPr>
-            <a:picLocks noChangeAspect="1"/>
-          </p:cNvPicPr>
-          <p:nvPr/>
-        </p:nvPicPr>
-        <p:blipFill>
-          <a:blip r:embed="rId2">
-            <a:extLst>
-              <a:ext uri="{28A0092B-C50C-407E-A947-70E740481C1C}">
-                <a14:useLocalDpi xmlns:a14="http://schemas.microsoft.com/office/drawing/2010/main" val="0"/>
-              </a:ext>
-            </a:extLst>
-          </a:blip>
-          <a:stretch>
-            <a:fillRect/>
-          </a:stretch>
-        </p:blipFill>
-        <p:spPr>
-          <a:xfrm>
-            <a:off x="1467695" y="1030369"/>
-            <a:ext cx="8512598" cy="4684606"/>
-          </a:xfrm>
-          <a:prstGeom prst="rect">
-            <a:avLst/>
-          </a:prstGeom>
-        </p:spPr>
-      </p:pic>
     </p:spTree>
     <p:extLst>
       <p:ext uri="{BB962C8B-B14F-4D97-AF65-F5344CB8AC3E}">
-        <p14:creationId xmlns:p14="http://schemas.microsoft.com/office/powerpoint/2010/main" val="1324991030"/>
+        <p14:creationId xmlns:p14="http://schemas.microsoft.com/office/powerpoint/2010/main" val="3782878391"/>
       </p:ext>
     </p:extLst>
   </p:cSld>
@@ -8456,7 +9319,7 @@
           <p:cNvPr id="2" name="Title 1">
             <a:extLst>
               <a:ext uri="{FF2B5EF4-FFF2-40B4-BE49-F238E27FC236}">
-                <a16:creationId xmlns:a16="http://schemas.microsoft.com/office/drawing/2014/main" id="{07F9255E-0ED3-BE14-878B-94759B28B89E}"/>
+                <a16:creationId xmlns:a16="http://schemas.microsoft.com/office/drawing/2014/main" id="{BDECF0B9-4322-F7B7-3373-CF5E092064B7}"/>
               </a:ext>
             </a:extLst>
           </p:cNvPr>
@@ -8467,12 +9330,22 @@
             <p:ph type="title"/>
           </p:nvPr>
         </p:nvSpPr>
-        <p:spPr/>
-        <p:txBody>
-          <a:bodyPr/>
-          <a:lstStyle/>
-          <a:p>
-            <a:endParaRPr lang="en-US"/>
+        <p:spPr>
+          <a:xfrm>
+            <a:off x="762896" y="239584"/>
+            <a:ext cx="10515600" cy="1114742"/>
+          </a:xfrm>
+        </p:spPr>
+        <p:txBody>
+          <a:bodyPr>
+            <a:normAutofit fontScale="90000"/>
+          </a:bodyPr>
+          <a:lstStyle/>
+          <a:p>
+            <a:r>
+              <a:rPr lang="en-US" dirty="0"/>
+              <a:t>Ayodeji Iwayemi –New York State</a:t>
+            </a:r>
           </a:p>
         </p:txBody>
       </p:sp>
@@ -8481,7 +9354,7 @@
           <p:cNvPr id="4" name="Slide Number Placeholder 3">
             <a:extLst>
               <a:ext uri="{FF2B5EF4-FFF2-40B4-BE49-F238E27FC236}">
-                <a16:creationId xmlns:a16="http://schemas.microsoft.com/office/drawing/2014/main" id="{143B1D63-EAEC-1421-0C4E-098AB4F37C08}"/>
+                <a16:creationId xmlns:a16="http://schemas.microsoft.com/office/drawing/2014/main" id="{EFB8A8B7-ED6D-A0DF-43C4-7E0348013F56}"/>
               </a:ext>
             </a:extLst>
           </p:cNvPr>
@@ -8507,10 +9380,10 @@
       </p:sp>
       <p:pic>
         <p:nvPicPr>
-          <p:cNvPr id="6" name="Picture 5" descr="A graph of a number of cases&#10;&#10;Description automatically generated">
-            <a:extLst>
-              <a:ext uri="{FF2B5EF4-FFF2-40B4-BE49-F238E27FC236}">
-                <a16:creationId xmlns:a16="http://schemas.microsoft.com/office/drawing/2014/main" id="{7AA995A1-4EAB-C069-F57C-E8F32AAA1BB4}"/>
+          <p:cNvPr id="5" name="Picture 4" descr="A graph of a number of cases&#10;&#10;Description automatically generated">
+            <a:extLst>
+              <a:ext uri="{FF2B5EF4-FFF2-40B4-BE49-F238E27FC236}">
+                <a16:creationId xmlns:a16="http://schemas.microsoft.com/office/drawing/2014/main" id="{EBDEFD7F-54A2-1834-B409-6327F28A0BB9}"/>
               </a:ext>
             </a:extLst>
           </p:cNvPr>
@@ -8520,7 +9393,7 @@
           <p:nvPr/>
         </p:nvPicPr>
         <p:blipFill>
-          <a:blip r:embed="rId2">
+          <a:blip r:embed="rId3">
             <a:extLst>
               <a:ext uri="{28A0092B-C50C-407E-A947-70E740481C1C}">
                 <a14:useLocalDpi xmlns:a14="http://schemas.microsoft.com/office/drawing/2010/main" val="0"/>
@@ -8533,8 +9406,8 @@
         </p:blipFill>
         <p:spPr>
           <a:xfrm>
-            <a:off x="162893" y="768350"/>
-            <a:ext cx="5797641" cy="4421433"/>
+            <a:off x="762896" y="1621934"/>
+            <a:ext cx="5021947" cy="3829869"/>
           </a:xfrm>
           <a:prstGeom prst="rect">
             <a:avLst/>
@@ -8543,10 +9416,10 @@
       </p:pic>
       <p:pic>
         <p:nvPicPr>
-          <p:cNvPr id="8" name="Picture 7" descr="A graph with a blue line&#10;&#10;Description automatically generated">
-            <a:extLst>
-              <a:ext uri="{FF2B5EF4-FFF2-40B4-BE49-F238E27FC236}">
-                <a16:creationId xmlns:a16="http://schemas.microsoft.com/office/drawing/2014/main" id="{1DB28503-BA41-8DDC-93F9-979298DC570D}"/>
+          <p:cNvPr id="6" name="Picture 5" descr="A graph with a blue line&#10;&#10;Description automatically generated">
+            <a:extLst>
+              <a:ext uri="{FF2B5EF4-FFF2-40B4-BE49-F238E27FC236}">
+                <a16:creationId xmlns:a16="http://schemas.microsoft.com/office/drawing/2014/main" id="{A3D411CD-A398-6247-5C4A-D785D69FD1E3}"/>
               </a:ext>
             </a:extLst>
           </p:cNvPr>
@@ -8556,7 +9429,7 @@
           <p:nvPr/>
         </p:nvPicPr>
         <p:blipFill>
-          <a:blip r:embed="rId3">
+          <a:blip r:embed="rId4">
             <a:extLst>
               <a:ext uri="{28A0092B-C50C-407E-A947-70E740481C1C}">
                 <a14:useLocalDpi xmlns:a14="http://schemas.microsoft.com/office/drawing/2010/main" val="0"/>
@@ -8569,8 +9442,8 @@
         </p:blipFill>
         <p:spPr>
           <a:xfrm>
-            <a:off x="5938219" y="819893"/>
-            <a:ext cx="5431547" cy="4142240"/>
+            <a:off x="6256549" y="1621935"/>
+            <a:ext cx="5021947" cy="3829868"/>
           </a:xfrm>
           <a:prstGeom prst="rect">
             <a:avLst/>
@@ -8579,10 +9452,10 @@
       </p:pic>
       <p:sp>
         <p:nvSpPr>
-          <p:cNvPr id="9" name="TextBox 8">
-            <a:extLst>
-              <a:ext uri="{FF2B5EF4-FFF2-40B4-BE49-F238E27FC236}">
-                <a16:creationId xmlns:a16="http://schemas.microsoft.com/office/drawing/2014/main" id="{6C5B3D07-62AF-2F23-64A6-279C1B923FBF}"/>
+          <p:cNvPr id="7" name="TextBox 6">
+            <a:extLst>
+              <a:ext uri="{FF2B5EF4-FFF2-40B4-BE49-F238E27FC236}">
+                <a16:creationId xmlns:a16="http://schemas.microsoft.com/office/drawing/2014/main" id="{CE2FE2DA-87CA-2DBF-3F7B-0AB5FC68E281}"/>
               </a:ext>
             </a:extLst>
           </p:cNvPr>
@@ -8591,8 +9464,8 @@
         </p:nvSpPr>
         <p:spPr>
           <a:xfrm>
-            <a:off x="1467695" y="5724999"/>
-            <a:ext cx="9654117" cy="369332"/>
+            <a:off x="1699683" y="5492166"/>
+            <a:ext cx="9654117" cy="276999"/>
           </a:xfrm>
           <a:prstGeom prst="rect">
             <a:avLst/>
@@ -8605,9 +9478,10 @@
           </a:bodyPr>
           <a:lstStyle/>
           <a:p>
-            <a:r>
-              <a:rPr lang="en-US" b="1" dirty="0"/>
-              <a:t>Figure 3:  Poisson Distribution of COVID-19 cases and deaths in New York State</a:t>
+            <a:pPr algn="ctr"/>
+            <a:r>
+              <a:rPr lang="en-US" sz="1200" b="1" dirty="0"/>
+              <a:t>Figure 1:  Poisson Distribution of COVID-19 cases and deaths in New York State</a:t>
             </a:r>
           </a:p>
         </p:txBody>
@@ -8615,7 +9489,7 @@
     </p:spTree>
     <p:extLst>
       <p:ext uri="{BB962C8B-B14F-4D97-AF65-F5344CB8AC3E}">
-        <p14:creationId xmlns:p14="http://schemas.microsoft.com/office/powerpoint/2010/main" val="2980789436"/>
+        <p14:creationId xmlns:p14="http://schemas.microsoft.com/office/powerpoint/2010/main" val="3531089478"/>
       </p:ext>
     </p:extLst>
   </p:cSld>
@@ -8685,8 +9559,8 @@
         </p:nvSpPr>
         <p:spPr>
           <a:xfrm>
-            <a:off x="355599" y="839900"/>
-            <a:ext cx="11270827" cy="6124754"/>
+            <a:off x="355598" y="1302497"/>
+            <a:ext cx="11270827" cy="4585871"/>
           </a:xfrm>
           <a:prstGeom prst="rect">
             <a:avLst/>
@@ -8699,49 +9573,62 @@
           </a:bodyPr>
           <a:lstStyle/>
           <a:p>
+            <a:pPr marL="342900" indent="-342900" algn="just">
+              <a:buFont typeface="Arial" panose="020B0604020202020204" pitchFamily="34" charset="0"/>
+              <a:buChar char="•"/>
+            </a:pPr>
+            <a:r>
+              <a:rPr lang="en-US" sz="2200" b="1" dirty="0"/>
+              <a:t>Hypothesis 1: </a:t>
+            </a:r>
+            <a:r>
+              <a:rPr lang="en-US" sz="2200" dirty="0"/>
+              <a:t>There is a significant correlation between the total number of votes cast in the 2020 presidential election and the number of COVID-19 cases in New York counties between 2020-06-01 and 2021-01-03.</a:t>
+            </a:r>
+          </a:p>
+          <a:p>
             <a:pPr algn="just"/>
-            <a:r>
-              <a:rPr lang="en-US" sz="2800" b="1" dirty="0"/>
-              <a:t>Hypothesis 1: I</a:t>
-            </a:r>
-            <a:r>
-              <a:rPr lang="en-US" sz="2800" dirty="0"/>
-              <a:t>s there significant correlation between the total number of votes cast in the 2020 presidential election and the number of COVID-19 cases in New York counties between 2020-06-01 and 2021-01-03?</a:t>
-            </a:r>
+            <a:endParaRPr lang="en-US" sz="2200" dirty="0"/>
           </a:p>
           <a:p>
             <a:pPr algn="just"/>
-            <a:endParaRPr lang="en-US" sz="2800" dirty="0"/>
+            <a:endParaRPr lang="en-US" sz="2200" dirty="0"/>
+          </a:p>
+          <a:p>
+            <a:pPr marL="342900" indent="-342900" algn="just">
+              <a:buFont typeface="Arial" panose="020B0604020202020204" pitchFamily="34" charset="0"/>
+              <a:buChar char="•"/>
+            </a:pPr>
+            <a:r>
+              <a:rPr lang="en-US" sz="2200" b="1" dirty="0"/>
+              <a:t>Hypothesis 2: </a:t>
+            </a:r>
+            <a:r>
+              <a:rPr lang="en-US" sz="2200" dirty="0"/>
+              <a:t>Counties where a Democratic candidate won the election led to a higher number of COVID-19 cases compared to counties where a Republican candidate won.</a:t>
+            </a:r>
           </a:p>
           <a:p>
             <a:pPr algn="just"/>
-            <a:r>
-              <a:rPr lang="en-US" sz="2800" b="1" dirty="0"/>
-              <a:t>Hypothesis 2: I</a:t>
-            </a:r>
-            <a:r>
-              <a:rPr lang="en-US" sz="2800" dirty="0"/>
-              <a:t>s there significant difference in the average number of COVID-19 cases between counties where a Democratic candidate won and counties where a Republican candidate won?</a:t>
-            </a:r>
+            <a:endParaRPr lang="en-US" sz="2200" dirty="0"/>
           </a:p>
           <a:p>
             <a:pPr algn="just"/>
-            <a:endParaRPr lang="en-US" sz="2800" dirty="0"/>
-          </a:p>
-          <a:p>
-            <a:pPr algn="just"/>
-            <a:r>
-              <a:rPr lang="en-US" sz="2800" b="1" dirty="0"/>
+            <a:endParaRPr lang="en-US" sz="2200" dirty="0"/>
+          </a:p>
+          <a:p>
+            <a:pPr marL="342900" indent="-342900" algn="just">
+              <a:buFont typeface="Arial" panose="020B0604020202020204" pitchFamily="34" charset="0"/>
+              <a:buChar char="•"/>
+            </a:pPr>
+            <a:r>
+              <a:rPr lang="en-US" sz="2200" b="1" dirty="0"/>
               <a:t>Hypothesis 3: </a:t>
             </a:r>
             <a:r>
-              <a:rPr lang="en-US" sz="2800" dirty="0"/>
-              <a:t>Does the victory of Joe Biden in the 2020 presidential election in New York has no significant influence on the increase in COVID-19 cases in the state?</a:t>
-            </a:r>
-          </a:p>
-          <a:p>
-            <a:pPr algn="just"/>
-            <a:endParaRPr lang="en-US" sz="2800" dirty="0"/>
+              <a:rPr lang="en-US" sz="2200" dirty="0"/>
+              <a:t>The victory of Joe Biden in the 2020 presidential election in New York has a significant influence on the increase in COVID-19 cases in the state.</a:t>
+            </a:r>
           </a:p>
           <a:p>
             <a:pPr algn="just" rtl="0"/>
@@ -8763,7 +9650,7 @@
         </p:nvSpPr>
         <p:spPr>
           <a:xfrm>
-            <a:off x="355599" y="208307"/>
+            <a:off x="355598" y="464915"/>
             <a:ext cx="11270827" cy="523220"/>
           </a:xfrm>
           <a:prstGeom prst="rect">
@@ -8839,7 +9726,7 @@
           <a:p>
             <a:r>
               <a:rPr lang="en-US" dirty="0"/>
-              <a:t>Employment – Kol Herget</a:t>
+              <a:t>Employment – Kol Herget (SC)</a:t>
             </a:r>
           </a:p>
         </p:txBody>
@@ -9020,8 +9907,8 @@
         </p:nvSpPr>
         <p:spPr>
           <a:xfrm>
-            <a:off x="8659906" y="4195482"/>
-            <a:ext cx="2616386" cy="1077218"/>
+            <a:off x="8374828" y="4186148"/>
+            <a:ext cx="2616386" cy="738664"/>
           </a:xfrm>
           <a:prstGeom prst="rect">
             <a:avLst/>
@@ -9035,7 +9922,7 @@
           <a:lstStyle/>
           <a:p>
             <a:r>
-              <a:rPr lang="en-US" sz="1600" dirty="0"/>
+              <a:rPr lang="en-US" sz="1400" i="1" dirty="0"/>
               <a:t>Compared normalized data from each category against normalized COVID cases data</a:t>
             </a:r>
           </a:p>

</xml_diff>

<commit_message>
Add Kevin Hayes stage 3 and 4 info
</commit_message>
<xml_diff>
--- a/ProjPresentation.pptx
+++ b/ProjPresentation.pptx
@@ -7,7 +7,7 @@
     <p:sldMasterId id="2147483672" r:id="rId3"/>
   </p:sldMasterIdLst>
   <p:notesMasterIdLst>
-    <p:notesMasterId r:id="rId18"/>
+    <p:notesMasterId r:id="rId21"/>
   </p:notesMasterIdLst>
   <p:sldIdLst>
     <p:sldId id="266" r:id="rId4"/>
@@ -19,11 +19,14 @@
     <p:sldId id="276" r:id="rId10"/>
     <p:sldId id="281" r:id="rId11"/>
     <p:sldId id="275" r:id="rId12"/>
-    <p:sldId id="270" r:id="rId13"/>
-    <p:sldId id="271" r:id="rId14"/>
-    <p:sldId id="272" r:id="rId15"/>
-    <p:sldId id="273" r:id="rId16"/>
-    <p:sldId id="274" r:id="rId17"/>
+    <p:sldId id="288" r:id="rId13"/>
+    <p:sldId id="270" r:id="rId14"/>
+    <p:sldId id="284" r:id="rId15"/>
+    <p:sldId id="285" r:id="rId16"/>
+    <p:sldId id="271" r:id="rId17"/>
+    <p:sldId id="272" r:id="rId18"/>
+    <p:sldId id="273" r:id="rId19"/>
+    <p:sldId id="274" r:id="rId20"/>
   </p:sldIdLst>
   <p:sldSz cx="12192000" cy="6858000"/>
   <p:notesSz cx="6858000" cy="9144000"/>
@@ -136,7 +139,10 @@
             <p14:sldId id="276"/>
             <p14:sldId id="281"/>
             <p14:sldId id="275"/>
+            <p14:sldId id="288"/>
             <p14:sldId id="270"/>
+            <p14:sldId id="284"/>
+            <p14:sldId id="285"/>
             <p14:sldId id="271"/>
             <p14:sldId id="272"/>
             <p14:sldId id="273"/>
@@ -257,7 +263,7 @@
           <a:p>
             <a:fld id="{18E5118F-6A56-44B4-8CD4-2559404DE2D8}" type="datetimeFigureOut">
               <a:rPr lang="en-US" smtClean="0"/>
-              <a:t>4/16/2024</a:t>
+              <a:t>4/18/2024</a:t>
             </a:fld>
             <a:endParaRPr lang="en-US"/>
           </a:p>
@@ -1280,7 +1286,7 @@
           <a:p>
             <a:fld id="{EC6F6E41-1F62-4E61-82DC-4FF03C9667B9}" type="slidenum">
               <a:rPr lang="en-US" smtClean="0"/>
-              <a:t>10</a:t>
+              <a:t>11</a:t>
             </a:fld>
             <a:endParaRPr lang="en-US"/>
           </a:p>
@@ -1387,7 +1393,7 @@
           <a:p>
             <a:fld id="{EC6F6E41-1F62-4E61-82DC-4FF03C9667B9}" type="slidenum">
               <a:rPr lang="en-US" smtClean="0"/>
-              <a:t>11</a:t>
+              <a:t>14</a:t>
             </a:fld>
             <a:endParaRPr lang="en-US"/>
           </a:p>
@@ -7888,7 +7894,7 @@
           <p:cNvPr id="2" name="Title 1">
             <a:extLst>
               <a:ext uri="{FF2B5EF4-FFF2-40B4-BE49-F238E27FC236}">
-                <a16:creationId xmlns:a16="http://schemas.microsoft.com/office/drawing/2014/main" id="{5B4A204C-CA1B-E276-A3AB-85B6A9BF2520}"/>
+                <a16:creationId xmlns:a16="http://schemas.microsoft.com/office/drawing/2014/main" id="{1266D3D0-145B-C09E-1869-AC96D4B3F0C1}"/>
               </a:ext>
             </a:extLst>
           </p:cNvPr>
@@ -7897,78 +7903,132 @@
           </p:cNvSpPr>
           <p:nvPr>
             <p:ph type="title"/>
+          </p:nvPr>
+        </p:nvSpPr>
+        <p:spPr/>
+        <p:txBody>
+          <a:bodyPr/>
+          <a:lstStyle/>
+          <a:p>
+            <a:r>
+              <a:rPr lang="en-US" dirty="0"/>
+              <a:t>Housing - Kevin Hayes</a:t>
+            </a:r>
+          </a:p>
+        </p:txBody>
+      </p:sp>
+      <p:sp>
+        <p:nvSpPr>
+          <p:cNvPr id="3" name="Content Placeholder 2">
+            <a:extLst>
+              <a:ext uri="{FF2B5EF4-FFF2-40B4-BE49-F238E27FC236}">
+                <a16:creationId xmlns:a16="http://schemas.microsoft.com/office/drawing/2014/main" id="{56F64E25-C795-B257-2E57-46F801568744}"/>
+              </a:ext>
+            </a:extLst>
+          </p:cNvPr>
+          <p:cNvSpPr>
+            <a:spLocks noGrp="1"/>
+          </p:cNvSpPr>
+          <p:nvPr>
+            <p:ph idx="1"/>
           </p:nvPr>
         </p:nvSpPr>
         <p:spPr>
           <a:xfrm>
-            <a:off x="838200" y="2949921"/>
-            <a:ext cx="10515600" cy="958158"/>
+            <a:off x="838200" y="4453591"/>
+            <a:ext cx="10515600" cy="1723372"/>
           </a:xfrm>
         </p:spPr>
         <p:txBody>
-          <a:bodyPr/>
-          <a:lstStyle/>
-          <a:p>
-            <a:pPr algn="ctr"/>
-            <a:r>
-              <a:rPr lang="en-US" dirty="0"/>
-              <a:t>Stage 4: Machine Learning</a:t>
-            </a:r>
-          </a:p>
-        </p:txBody>
-      </p:sp>
-      <p:sp>
-        <p:nvSpPr>
-          <p:cNvPr id="3" name="Content Placeholder 2">
-            <a:extLst>
-              <a:ext uri="{FF2B5EF4-FFF2-40B4-BE49-F238E27FC236}">
-                <a16:creationId xmlns:a16="http://schemas.microsoft.com/office/drawing/2014/main" id="{56B899B6-989A-2B85-C3EB-8DF90F90622A}"/>
-              </a:ext>
-            </a:extLst>
-          </p:cNvPr>
-          <p:cNvSpPr>
-            <a:spLocks noGrp="1"/>
-          </p:cNvSpPr>
-          <p:nvPr>
-            <p:ph type="body" idx="1"/>
-          </p:nvPr>
-        </p:nvSpPr>
-        <p:spPr>
-          <a:xfrm>
-            <a:off x="838200" y="4040823"/>
-            <a:ext cx="10515600" cy="1500187"/>
-          </a:xfrm>
-        </p:spPr>
-        <p:txBody>
           <a:bodyPr>
-            <a:normAutofit lnSpcReduction="10000"/>
+            <a:normAutofit fontScale="70000" lnSpcReduction="20000"/>
           </a:bodyPr>
           <a:lstStyle/>
           <a:p>
-            <a:pPr algn="ctr"/>
-            <a:r>
-              <a:rPr lang="en-US" dirty="0"/>
-              <a:t>Regression models (linear, polynomial), machine learning, predictions on COVID-19 cases/deaths</a:t>
-            </a:r>
-          </a:p>
-          <a:p>
-            <a:r>
-              <a:rPr lang="en-US" dirty="0">
+            <a:r>
+              <a:rPr lang="en-US" b="0" i="0" dirty="0">
+                <a:effectLst/>
                 <a:highlight>
-                  <a:srgbClr val="FFFF00"/>
+                  <a:srgbClr val="FFFFFF"/>
                 </a:highlight>
+                <a:latin typeface="system-ui"/>
               </a:rPr>
-              <a:t>One slide each on individual predictions and whether they were correct or not</a:t>
-            </a:r>
-          </a:p>
-        </p:txBody>
-      </p:sp>
-      <p:sp>
-        <p:nvSpPr>
-          <p:cNvPr id="6" name="Slide Number Placeholder 5">
-            <a:extLst>
-              <a:ext uri="{FF2B5EF4-FFF2-40B4-BE49-F238E27FC236}">
-                <a16:creationId xmlns:a16="http://schemas.microsoft.com/office/drawing/2014/main" id="{FC08B894-EC56-0670-B8F5-628144CBEA1A}"/>
+              <a:t>Does having a higher total population of </a:t>
+            </a:r>
+            <a:r>
+              <a:rPr lang="en-US" b="0" i="0" dirty="0" err="1">
+                <a:effectLst/>
+                <a:highlight>
+                  <a:srgbClr val="FFFFFF"/>
+                </a:highlight>
+                <a:latin typeface="system-ui"/>
+              </a:rPr>
+              <a:t>hispanic</a:t>
+            </a:r>
+            <a:r>
+              <a:rPr lang="en-US" b="0" i="0" dirty="0">
+                <a:effectLst/>
+                <a:highlight>
+                  <a:srgbClr val="FFFFFF"/>
+                </a:highlight>
+                <a:latin typeface="system-ui"/>
+              </a:rPr>
+              <a:t> or </a:t>
+            </a:r>
+            <a:r>
+              <a:rPr lang="en-US" b="0" i="0" dirty="0" err="1">
+                <a:effectLst/>
+                <a:highlight>
+                  <a:srgbClr val="FFFFFF"/>
+                </a:highlight>
+                <a:latin typeface="system-ui"/>
+              </a:rPr>
+              <a:t>latino</a:t>
+            </a:r>
+            <a:r>
+              <a:rPr lang="en-US" b="0" i="0" dirty="0">
+                <a:effectLst/>
+                <a:highlight>
+                  <a:srgbClr val="FFFFFF"/>
+                </a:highlight>
+                <a:latin typeface="system-ui"/>
+              </a:rPr>
+              <a:t> people of any race in a given state lead to more covid-19 infections for that state? (Label: DP05_0073E)</a:t>
+            </a:r>
+          </a:p>
+          <a:p>
+            <a:r>
+              <a:rPr lang="en-US" b="0" i="0" dirty="0">
+                <a:effectLst/>
+                <a:highlight>
+                  <a:srgbClr val="FFFFFF"/>
+                </a:highlight>
+                <a:latin typeface="system-ui"/>
+              </a:rPr>
+              <a:t>Does having more people of 35 to 44 years of age in a given state lead to fewer covid-19 infections for that state? (Label: DP05_0011E)</a:t>
+            </a:r>
+          </a:p>
+          <a:p>
+            <a:r>
+              <a:rPr lang="en-US" b="0" i="0" dirty="0">
+                <a:effectLst/>
+                <a:highlight>
+                  <a:srgbClr val="FFFFFF"/>
+                </a:highlight>
+                <a:latin typeface="system-ui"/>
+              </a:rPr>
+              <a:t>Does having more people aged 60 to 64 in a given state lead to more covid-19 cases for that state? (Label : DP05_0014E)</a:t>
+            </a:r>
+            <a:endParaRPr lang="en-US" dirty="0"/>
+          </a:p>
+        </p:txBody>
+      </p:sp>
+      <p:sp>
+        <p:nvSpPr>
+          <p:cNvPr id="4" name="Slide Number Placeholder 3">
+            <a:extLst>
+              <a:ext uri="{FF2B5EF4-FFF2-40B4-BE49-F238E27FC236}">
+                <a16:creationId xmlns:a16="http://schemas.microsoft.com/office/drawing/2014/main" id="{14810756-614E-B658-4A79-F41E3A7D2FFC}"/>
               </a:ext>
             </a:extLst>
           </p:cNvPr>
@@ -7992,10 +8052,104 @@
           </a:p>
         </p:txBody>
       </p:sp>
+      <p:pic>
+        <p:nvPicPr>
+          <p:cNvPr id="5" name="Picture 2">
+            <a:extLst>
+              <a:ext uri="{FF2B5EF4-FFF2-40B4-BE49-F238E27FC236}">
+                <a16:creationId xmlns:a16="http://schemas.microsoft.com/office/drawing/2014/main" id="{D7E59CE7-EF02-74DF-A6F3-C6EC91925E1C}"/>
+              </a:ext>
+            </a:extLst>
+          </p:cNvPr>
+          <p:cNvPicPr>
+            <a:picLocks noChangeAspect="1" noChangeArrowheads="1"/>
+          </p:cNvPicPr>
+          <p:nvPr/>
+        </p:nvPicPr>
+        <p:blipFill>
+          <a:blip r:embed="rId2">
+            <a:extLst>
+              <a:ext uri="{28A0092B-C50C-407E-A947-70E740481C1C}">
+                <a14:useLocalDpi xmlns:a14="http://schemas.microsoft.com/office/drawing/2010/main" val="0"/>
+              </a:ext>
+            </a:extLst>
+          </a:blip>
+          <a:srcRect/>
+          <a:stretch>
+            <a:fillRect/>
+          </a:stretch>
+        </p:blipFill>
+        <p:spPr bwMode="auto">
+          <a:xfrm>
+            <a:off x="1742769" y="1825626"/>
+            <a:ext cx="3075038" cy="2493027"/>
+          </a:xfrm>
+          <a:prstGeom prst="rect">
+            <a:avLst/>
+          </a:prstGeom>
+          <a:noFill/>
+          <a:extLst>
+            <a:ext uri="{909E8E84-426E-40DD-AFC4-6F175D3DCCD1}">
+              <a14:hiddenFill xmlns:a14="http://schemas.microsoft.com/office/drawing/2010/main">
+                <a:solidFill>
+                  <a:srgbClr val="FFFFFF"/>
+                </a:solidFill>
+              </a14:hiddenFill>
+            </a:ext>
+          </a:extLst>
+        </p:spPr>
+      </p:pic>
+      <p:pic>
+        <p:nvPicPr>
+          <p:cNvPr id="6" name="Picture 4">
+            <a:extLst>
+              <a:ext uri="{FF2B5EF4-FFF2-40B4-BE49-F238E27FC236}">
+                <a16:creationId xmlns:a16="http://schemas.microsoft.com/office/drawing/2014/main" id="{1F06D0C8-633D-4F2F-FDC1-780320C291B9}"/>
+              </a:ext>
+            </a:extLst>
+          </p:cNvPr>
+          <p:cNvPicPr>
+            <a:picLocks noChangeAspect="1" noChangeArrowheads="1"/>
+          </p:cNvPicPr>
+          <p:nvPr/>
+        </p:nvPicPr>
+        <p:blipFill>
+          <a:blip r:embed="rId3">
+            <a:extLst>
+              <a:ext uri="{28A0092B-C50C-407E-A947-70E740481C1C}">
+                <a14:useLocalDpi xmlns:a14="http://schemas.microsoft.com/office/drawing/2010/main" val="0"/>
+              </a:ext>
+            </a:extLst>
+          </a:blip>
+          <a:srcRect/>
+          <a:stretch>
+            <a:fillRect/>
+          </a:stretch>
+        </p:blipFill>
+        <p:spPr bwMode="auto">
+          <a:xfrm>
+            <a:off x="5046561" y="1825626"/>
+            <a:ext cx="3229873" cy="2498402"/>
+          </a:xfrm>
+          <a:prstGeom prst="rect">
+            <a:avLst/>
+          </a:prstGeom>
+          <a:noFill/>
+          <a:extLst>
+            <a:ext uri="{909E8E84-426E-40DD-AFC4-6F175D3DCCD1}">
+              <a14:hiddenFill xmlns:a14="http://schemas.microsoft.com/office/drawing/2010/main">
+                <a:solidFill>
+                  <a:srgbClr val="FFFFFF"/>
+                </a:solidFill>
+              </a14:hiddenFill>
+            </a:ext>
+          </a:extLst>
+        </p:spPr>
+      </p:pic>
     </p:spTree>
     <p:extLst>
       <p:ext uri="{BB962C8B-B14F-4D97-AF65-F5344CB8AC3E}">
-        <p14:creationId xmlns:p14="http://schemas.microsoft.com/office/powerpoint/2010/main" val="871898229"/>
+        <p14:creationId xmlns:p14="http://schemas.microsoft.com/office/powerpoint/2010/main" val="1244231696"/>
       </p:ext>
     </p:extLst>
   </p:cSld>
@@ -8027,7 +8181,7 @@
           <p:cNvPr id="2" name="Title 1">
             <a:extLst>
               <a:ext uri="{FF2B5EF4-FFF2-40B4-BE49-F238E27FC236}">
-                <a16:creationId xmlns:a16="http://schemas.microsoft.com/office/drawing/2014/main" id="{A8582CFB-D499-4A27-66AF-BCC0E53B5F0A}"/>
+                <a16:creationId xmlns:a16="http://schemas.microsoft.com/office/drawing/2014/main" id="{5B4A204C-CA1B-E276-A3AB-85B6A9BF2520}"/>
               </a:ext>
             </a:extLst>
           </p:cNvPr>
@@ -8040,8 +8194,8 @@
         </p:nvSpPr>
         <p:spPr>
           <a:xfrm>
-            <a:off x="838200" y="2885375"/>
-            <a:ext cx="10515600" cy="1087250"/>
+            <a:off x="838200" y="2949921"/>
+            <a:ext cx="10515600" cy="958158"/>
           </a:xfrm>
         </p:spPr>
         <p:txBody>
@@ -8051,17 +8205,17 @@
             <a:pPr algn="ctr"/>
             <a:r>
               <a:rPr lang="en-US" dirty="0"/>
-              <a:t>Stage 5: Dashboard</a:t>
-            </a:r>
-          </a:p>
-        </p:txBody>
-      </p:sp>
-      <p:sp>
-        <p:nvSpPr>
-          <p:cNvPr id="3" name="Text Placeholder 2">
-            <a:extLst>
-              <a:ext uri="{FF2B5EF4-FFF2-40B4-BE49-F238E27FC236}">
-                <a16:creationId xmlns:a16="http://schemas.microsoft.com/office/drawing/2014/main" id="{24211640-C3CF-59AE-6A31-08637E243D68}"/>
+              <a:t>Stage 4: Machine Learning</a:t>
+            </a:r>
+          </a:p>
+        </p:txBody>
+      </p:sp>
+      <p:sp>
+        <p:nvSpPr>
+          <p:cNvPr id="3" name="Content Placeholder 2">
+            <a:extLst>
+              <a:ext uri="{FF2B5EF4-FFF2-40B4-BE49-F238E27FC236}">
+                <a16:creationId xmlns:a16="http://schemas.microsoft.com/office/drawing/2014/main" id="{56B899B6-989A-2B85-C3EB-8DF90F90622A}"/>
               </a:ext>
             </a:extLst>
           </p:cNvPr>
@@ -8074,31 +8228,40 @@
         </p:nvSpPr>
         <p:spPr>
           <a:xfrm>
-            <a:off x="838200" y="4066234"/>
-            <a:ext cx="10515600" cy="570313"/>
+            <a:off x="838200" y="4040823"/>
+            <a:ext cx="10515600" cy="1500187"/>
           </a:xfrm>
         </p:spPr>
         <p:txBody>
-          <a:bodyPr/>
+          <a:bodyPr>
+            <a:normAutofit lnSpcReduction="10000"/>
+          </a:bodyPr>
           <a:lstStyle/>
           <a:p>
             <a:pPr algn="ctr"/>
             <a:r>
-              <a:rPr lang="en-US" sz="2400" dirty="0"/>
-              <a:t>Interactive dashboard based on current analysis</a:t>
-            </a:r>
-          </a:p>
-          <a:p>
-            <a:endParaRPr lang="en-US" dirty="0"/>
-          </a:p>
-        </p:txBody>
-      </p:sp>
-      <p:sp>
-        <p:nvSpPr>
-          <p:cNvPr id="5" name="Slide Number Placeholder 4">
-            <a:extLst>
-              <a:ext uri="{FF2B5EF4-FFF2-40B4-BE49-F238E27FC236}">
-                <a16:creationId xmlns:a16="http://schemas.microsoft.com/office/drawing/2014/main" id="{E52C6452-8D98-24F3-0F97-5A4F01A07796}"/>
+              <a:rPr lang="en-US" dirty="0"/>
+              <a:t>Regression models (linear, polynomial), machine learning, predictions on COVID-19 cases/deaths</a:t>
+            </a:r>
+          </a:p>
+          <a:p>
+            <a:r>
+              <a:rPr lang="en-US" dirty="0">
+                <a:highlight>
+                  <a:srgbClr val="FFFF00"/>
+                </a:highlight>
+              </a:rPr>
+              <a:t>One slide each on individual predictions and whether they were correct or not</a:t>
+            </a:r>
+          </a:p>
+        </p:txBody>
+      </p:sp>
+      <p:sp>
+        <p:nvSpPr>
+          <p:cNvPr id="6" name="Slide Number Placeholder 5">
+            <a:extLst>
+              <a:ext uri="{FF2B5EF4-FFF2-40B4-BE49-F238E27FC236}">
+                <a16:creationId xmlns:a16="http://schemas.microsoft.com/office/drawing/2014/main" id="{FC08B894-EC56-0670-B8F5-628144CBEA1A}"/>
               </a:ext>
             </a:extLst>
           </p:cNvPr>
@@ -8125,7 +8288,7 @@
     </p:spTree>
     <p:extLst>
       <p:ext uri="{BB962C8B-B14F-4D97-AF65-F5344CB8AC3E}">
-        <p14:creationId xmlns:p14="http://schemas.microsoft.com/office/powerpoint/2010/main" val="3828559414"/>
+        <p14:creationId xmlns:p14="http://schemas.microsoft.com/office/powerpoint/2010/main" val="871898229"/>
       </p:ext>
     </p:extLst>
   </p:cSld>
@@ -8152,42 +8315,65 @@
           <a:chExt cx="0" cy="0"/>
         </a:xfrm>
       </p:grpSpPr>
-      <p:pic>
-        <p:nvPicPr>
-          <p:cNvPr id="5" name="Picture 4">
-            <a:extLst>
-              <a:ext uri="{FF2B5EF4-FFF2-40B4-BE49-F238E27FC236}">
-                <a16:creationId xmlns:a16="http://schemas.microsoft.com/office/drawing/2014/main" id="{5EFB312C-62DB-102C-B00C-9797C2B96A5C}"/>
-              </a:ext>
-            </a:extLst>
-          </p:cNvPr>
-          <p:cNvPicPr>
-            <a:picLocks noChangeAspect="1"/>
-          </p:cNvPicPr>
-          <p:nvPr/>
-        </p:nvPicPr>
-        <p:blipFill>
-          <a:blip r:embed="rId2"/>
-          <a:stretch>
-            <a:fillRect/>
-          </a:stretch>
-        </p:blipFill>
-        <p:spPr>
-          <a:xfrm>
-            <a:off x="1673629" y="295101"/>
-            <a:ext cx="9315796" cy="6305204"/>
-          </a:xfrm>
-          <a:prstGeom prst="rect">
-            <a:avLst/>
-          </a:prstGeom>
-        </p:spPr>
-      </p:pic>
-      <p:sp>
-        <p:nvSpPr>
-          <p:cNvPr id="2" name="Slide Number Placeholder 1">
-            <a:extLst>
-              <a:ext uri="{FF2B5EF4-FFF2-40B4-BE49-F238E27FC236}">
-                <a16:creationId xmlns:a16="http://schemas.microsoft.com/office/drawing/2014/main" id="{5A1E8557-B88E-36CE-2F6E-0BABB6851E91}"/>
+      <p:sp>
+        <p:nvSpPr>
+          <p:cNvPr id="2" name="Title 1">
+            <a:extLst>
+              <a:ext uri="{FF2B5EF4-FFF2-40B4-BE49-F238E27FC236}">
+                <a16:creationId xmlns:a16="http://schemas.microsoft.com/office/drawing/2014/main" id="{093D9844-ED1D-75B2-5E07-773AAFDD56BB}"/>
+              </a:ext>
+            </a:extLst>
+          </p:cNvPr>
+          <p:cNvSpPr>
+            <a:spLocks noGrp="1"/>
+          </p:cNvSpPr>
+          <p:nvPr>
+            <p:ph type="title"/>
+          </p:nvPr>
+        </p:nvSpPr>
+        <p:spPr/>
+        <p:txBody>
+          <a:bodyPr/>
+          <a:lstStyle/>
+          <a:p>
+            <a:r>
+              <a:rPr lang="en-US" dirty="0"/>
+              <a:t>Kevin Hayes- Predicted Cases and Deaths</a:t>
+            </a:r>
+          </a:p>
+        </p:txBody>
+      </p:sp>
+      <p:sp>
+        <p:nvSpPr>
+          <p:cNvPr id="4" name="Text Placeholder 3">
+            <a:extLst>
+              <a:ext uri="{FF2B5EF4-FFF2-40B4-BE49-F238E27FC236}">
+                <a16:creationId xmlns:a16="http://schemas.microsoft.com/office/drawing/2014/main" id="{8287E9CC-692E-95AB-7C48-FB61BEA4DBC2}"/>
+              </a:ext>
+            </a:extLst>
+          </p:cNvPr>
+          <p:cNvSpPr>
+            <a:spLocks noGrp="1"/>
+          </p:cNvSpPr>
+          <p:nvPr>
+            <p:ph type="body" sz="half" idx="2"/>
+          </p:nvPr>
+        </p:nvSpPr>
+        <p:spPr/>
+        <p:txBody>
+          <a:bodyPr/>
+          <a:lstStyle/>
+          <a:p>
+            <a:endParaRPr lang="en-US" dirty="0"/>
+          </a:p>
+        </p:txBody>
+      </p:sp>
+      <p:sp>
+        <p:nvSpPr>
+          <p:cNvPr id="5" name="Slide Number Placeholder 4">
+            <a:extLst>
+              <a:ext uri="{FF2B5EF4-FFF2-40B4-BE49-F238E27FC236}">
+                <a16:creationId xmlns:a16="http://schemas.microsoft.com/office/drawing/2014/main" id="{40C92503-36A8-1FF0-F4B7-7D39BD62E3FF}"/>
               </a:ext>
             </a:extLst>
           </p:cNvPr>
@@ -8211,10 +8397,198 @@
           </a:p>
         </p:txBody>
       </p:sp>
+      <p:pic>
+        <p:nvPicPr>
+          <p:cNvPr id="1032" name="Picture 8">
+            <a:extLst>
+              <a:ext uri="{FF2B5EF4-FFF2-40B4-BE49-F238E27FC236}">
+                <a16:creationId xmlns:a16="http://schemas.microsoft.com/office/drawing/2014/main" id="{9EAE9CC7-0A51-B199-C935-7F095B9C14F9}"/>
+              </a:ext>
+            </a:extLst>
+          </p:cNvPr>
+          <p:cNvPicPr>
+            <a:picLocks noChangeAspect="1" noChangeArrowheads="1"/>
+          </p:cNvPicPr>
+          <p:nvPr/>
+        </p:nvPicPr>
+        <p:blipFill>
+          <a:blip r:embed="rId2">
+            <a:extLst>
+              <a:ext uri="{28A0092B-C50C-407E-A947-70E740481C1C}">
+                <a14:useLocalDpi xmlns:a14="http://schemas.microsoft.com/office/drawing/2010/main" val="0"/>
+              </a:ext>
+            </a:extLst>
+          </a:blip>
+          <a:srcRect/>
+          <a:stretch>
+            <a:fillRect/>
+          </a:stretch>
+        </p:blipFill>
+        <p:spPr bwMode="auto">
+          <a:xfrm>
+            <a:off x="8154198" y="3547602"/>
+            <a:ext cx="3441905" cy="2458504"/>
+          </a:xfrm>
+          <a:prstGeom prst="rect">
+            <a:avLst/>
+          </a:prstGeom>
+          <a:noFill/>
+          <a:extLst>
+            <a:ext uri="{909E8E84-426E-40DD-AFC4-6F175D3DCCD1}">
+              <a14:hiddenFill xmlns:a14="http://schemas.microsoft.com/office/drawing/2010/main">
+                <a:solidFill>
+                  <a:srgbClr val="FFFFFF"/>
+                </a:solidFill>
+              </a14:hiddenFill>
+            </a:ext>
+          </a:extLst>
+        </p:spPr>
+      </p:pic>
+      <p:pic>
+        <p:nvPicPr>
+          <p:cNvPr id="1034" name="Picture 10">
+            <a:extLst>
+              <a:ext uri="{FF2B5EF4-FFF2-40B4-BE49-F238E27FC236}">
+                <a16:creationId xmlns:a16="http://schemas.microsoft.com/office/drawing/2014/main" id="{9BB8FA63-B8C6-A4C8-230D-D856AAB26B34}"/>
+              </a:ext>
+            </a:extLst>
+          </p:cNvPr>
+          <p:cNvPicPr>
+            <a:picLocks noChangeAspect="1" noChangeArrowheads="1"/>
+          </p:cNvPicPr>
+          <p:nvPr/>
+        </p:nvPicPr>
+        <p:blipFill>
+          <a:blip r:embed="rId3">
+            <a:extLst>
+              <a:ext uri="{28A0092B-C50C-407E-A947-70E740481C1C}">
+                <a14:useLocalDpi xmlns:a14="http://schemas.microsoft.com/office/drawing/2010/main" val="0"/>
+              </a:ext>
+            </a:extLst>
+          </a:blip>
+          <a:srcRect/>
+          <a:stretch>
+            <a:fillRect/>
+          </a:stretch>
+        </p:blipFill>
+        <p:spPr bwMode="auto">
+          <a:xfrm>
+            <a:off x="8326079" y="1257300"/>
+            <a:ext cx="3206423" cy="2290302"/>
+          </a:xfrm>
+          <a:prstGeom prst="rect">
+            <a:avLst/>
+          </a:prstGeom>
+          <a:noFill/>
+          <a:extLst>
+            <a:ext uri="{909E8E84-426E-40DD-AFC4-6F175D3DCCD1}">
+              <a14:hiddenFill xmlns:a14="http://schemas.microsoft.com/office/drawing/2010/main">
+                <a:solidFill>
+                  <a:srgbClr val="FFFFFF"/>
+                </a:solidFill>
+              </a14:hiddenFill>
+            </a:ext>
+          </a:extLst>
+        </p:spPr>
+      </p:pic>
+      <p:pic>
+        <p:nvPicPr>
+          <p:cNvPr id="1036" name="Picture 12">
+            <a:extLst>
+              <a:ext uri="{FF2B5EF4-FFF2-40B4-BE49-F238E27FC236}">
+                <a16:creationId xmlns:a16="http://schemas.microsoft.com/office/drawing/2014/main" id="{ECF711D2-EC66-BD59-7C6E-9DA4E884665A}"/>
+              </a:ext>
+            </a:extLst>
+          </p:cNvPr>
+          <p:cNvPicPr>
+            <a:picLocks noChangeAspect="1" noChangeArrowheads="1"/>
+          </p:cNvPicPr>
+          <p:nvPr/>
+        </p:nvPicPr>
+        <p:blipFill>
+          <a:blip r:embed="rId4">
+            <a:extLst>
+              <a:ext uri="{28A0092B-C50C-407E-A947-70E740481C1C}">
+                <a14:useLocalDpi xmlns:a14="http://schemas.microsoft.com/office/drawing/2010/main" val="0"/>
+              </a:ext>
+            </a:extLst>
+          </a:blip>
+          <a:srcRect/>
+          <a:stretch>
+            <a:fillRect/>
+          </a:stretch>
+        </p:blipFill>
+        <p:spPr bwMode="auto">
+          <a:xfrm>
+            <a:off x="4996814" y="1257300"/>
+            <a:ext cx="3157384" cy="2255274"/>
+          </a:xfrm>
+          <a:prstGeom prst="rect">
+            <a:avLst/>
+          </a:prstGeom>
+          <a:noFill/>
+          <a:extLst>
+            <a:ext uri="{909E8E84-426E-40DD-AFC4-6F175D3DCCD1}">
+              <a14:hiddenFill xmlns:a14="http://schemas.microsoft.com/office/drawing/2010/main">
+                <a:solidFill>
+                  <a:srgbClr val="FFFFFF"/>
+                </a:solidFill>
+              </a14:hiddenFill>
+            </a:ext>
+          </a:extLst>
+        </p:spPr>
+      </p:pic>
+      <p:pic>
+        <p:nvPicPr>
+          <p:cNvPr id="1038" name="Picture 14">
+            <a:extLst>
+              <a:ext uri="{FF2B5EF4-FFF2-40B4-BE49-F238E27FC236}">
+                <a16:creationId xmlns:a16="http://schemas.microsoft.com/office/drawing/2014/main" id="{7D2DD959-2D27-A708-A27A-DF6BE677461B}"/>
+              </a:ext>
+            </a:extLst>
+          </p:cNvPr>
+          <p:cNvPicPr>
+            <a:picLocks noChangeAspect="1" noChangeArrowheads="1"/>
+          </p:cNvPicPr>
+          <p:nvPr/>
+        </p:nvPicPr>
+        <p:blipFill>
+          <a:blip r:embed="rId5">
+            <a:extLst>
+              <a:ext uri="{28A0092B-C50C-407E-A947-70E740481C1C}">
+                <a14:useLocalDpi xmlns:a14="http://schemas.microsoft.com/office/drawing/2010/main" val="0"/>
+              </a:ext>
+            </a:extLst>
+          </a:blip>
+          <a:srcRect/>
+          <a:stretch>
+            <a:fillRect/>
+          </a:stretch>
+        </p:blipFill>
+        <p:spPr bwMode="auto">
+          <a:xfrm>
+            <a:off x="4922889" y="3547602"/>
+            <a:ext cx="3167707" cy="2262648"/>
+          </a:xfrm>
+          <a:prstGeom prst="rect">
+            <a:avLst/>
+          </a:prstGeom>
+          <a:noFill/>
+          <a:extLst>
+            <a:ext uri="{909E8E84-426E-40DD-AFC4-6F175D3DCCD1}">
+              <a14:hiddenFill xmlns:a14="http://schemas.microsoft.com/office/drawing/2010/main">
+                <a:solidFill>
+                  <a:srgbClr val="FFFFFF"/>
+                </a:solidFill>
+              </a14:hiddenFill>
+            </a:ext>
+          </a:extLst>
+        </p:spPr>
+      </p:pic>
     </p:spTree>
     <p:extLst>
       <p:ext uri="{BB962C8B-B14F-4D97-AF65-F5344CB8AC3E}">
-        <p14:creationId xmlns:p14="http://schemas.microsoft.com/office/powerpoint/2010/main" val="1349787492"/>
+        <p14:creationId xmlns:p14="http://schemas.microsoft.com/office/powerpoint/2010/main" val="1444511084"/>
       </p:ext>
     </p:extLst>
   </p:cSld>
@@ -8241,42 +8615,188 @@
           <a:chExt cx="0" cy="0"/>
         </a:xfrm>
       </p:grpSpPr>
-      <p:pic>
-        <p:nvPicPr>
-          <p:cNvPr id="3" name="Picture 2">
-            <a:extLst>
-              <a:ext uri="{FF2B5EF4-FFF2-40B4-BE49-F238E27FC236}">
-                <a16:creationId xmlns:a16="http://schemas.microsoft.com/office/drawing/2014/main" id="{CF6E96EF-FF46-3F7F-20C5-FF12D3F4EFB4}"/>
-              </a:ext>
-            </a:extLst>
-          </p:cNvPr>
-          <p:cNvPicPr>
-            <a:picLocks noChangeAspect="1"/>
-          </p:cNvPicPr>
-          <p:nvPr/>
-        </p:nvPicPr>
-        <p:blipFill>
-          <a:blip r:embed="rId2"/>
-          <a:stretch>
-            <a:fillRect/>
-          </a:stretch>
-        </p:blipFill>
-        <p:spPr>
-          <a:xfrm>
-            <a:off x="1667155" y="292681"/>
-            <a:ext cx="9200350" cy="6290999"/>
-          </a:xfrm>
-          <a:prstGeom prst="rect">
-            <a:avLst/>
-          </a:prstGeom>
-        </p:spPr>
-      </p:pic>
-      <p:sp>
-        <p:nvSpPr>
-          <p:cNvPr id="2" name="Slide Number Placeholder 1">
-            <a:extLst>
-              <a:ext uri="{FF2B5EF4-FFF2-40B4-BE49-F238E27FC236}">
-                <a16:creationId xmlns:a16="http://schemas.microsoft.com/office/drawing/2014/main" id="{B021B3E3-3613-537B-F642-992B9FB18B2F}"/>
+      <p:sp>
+        <p:nvSpPr>
+          <p:cNvPr id="2" name="Title 1">
+            <a:extLst>
+              <a:ext uri="{FF2B5EF4-FFF2-40B4-BE49-F238E27FC236}">
+                <a16:creationId xmlns:a16="http://schemas.microsoft.com/office/drawing/2014/main" id="{D12C7965-0F1A-AEBA-9238-7DD74FBDB517}"/>
+              </a:ext>
+            </a:extLst>
+          </p:cNvPr>
+          <p:cNvSpPr>
+            <a:spLocks noGrp="1"/>
+          </p:cNvSpPr>
+          <p:nvPr>
+            <p:ph type="title"/>
+          </p:nvPr>
+        </p:nvSpPr>
+        <p:spPr/>
+        <p:txBody>
+          <a:bodyPr/>
+          <a:lstStyle/>
+          <a:p>
+            <a:r>
+              <a:rPr lang="en-US" dirty="0"/>
+              <a:t>Kevin Hayes- Hypothesis Tests</a:t>
+            </a:r>
+          </a:p>
+        </p:txBody>
+      </p:sp>
+      <p:sp>
+        <p:nvSpPr>
+          <p:cNvPr id="3" name="Content Placeholder 2">
+            <a:extLst>
+              <a:ext uri="{FF2B5EF4-FFF2-40B4-BE49-F238E27FC236}">
+                <a16:creationId xmlns:a16="http://schemas.microsoft.com/office/drawing/2014/main" id="{F53E22B7-12B3-36EA-88BD-D5A446A5E3A2}"/>
+              </a:ext>
+            </a:extLst>
+          </p:cNvPr>
+          <p:cNvSpPr>
+            <a:spLocks noGrp="1"/>
+          </p:cNvSpPr>
+          <p:nvPr>
+            <p:ph idx="1"/>
+          </p:nvPr>
+        </p:nvSpPr>
+        <p:spPr/>
+        <p:txBody>
+          <a:bodyPr/>
+          <a:lstStyle/>
+          <a:p>
+            <a:r>
+              <a:rPr lang="en-US" b="0" i="0" dirty="0">
+                <a:effectLst/>
+                <a:highlight>
+                  <a:srgbClr val="FFFFFF"/>
+                </a:highlight>
+                <a:latin typeface="system-ui"/>
+              </a:rPr>
+              <a:t>Does having a higher total population of </a:t>
+            </a:r>
+            <a:r>
+              <a:rPr lang="en-US" b="0" i="0" dirty="0" err="1">
+                <a:effectLst/>
+                <a:highlight>
+                  <a:srgbClr val="FFFFFF"/>
+                </a:highlight>
+                <a:latin typeface="system-ui"/>
+              </a:rPr>
+              <a:t>hispanic</a:t>
+            </a:r>
+            <a:r>
+              <a:rPr lang="en-US" b="0" i="0" dirty="0">
+                <a:effectLst/>
+                <a:highlight>
+                  <a:srgbClr val="FFFFFF"/>
+                </a:highlight>
+                <a:latin typeface="system-ui"/>
+              </a:rPr>
+              <a:t> or </a:t>
+            </a:r>
+            <a:r>
+              <a:rPr lang="en-US" b="0" i="0" dirty="0" err="1">
+                <a:effectLst/>
+                <a:highlight>
+                  <a:srgbClr val="FFFFFF"/>
+                </a:highlight>
+                <a:latin typeface="system-ui"/>
+              </a:rPr>
+              <a:t>latino</a:t>
+            </a:r>
+            <a:r>
+              <a:rPr lang="en-US" b="0" i="0" dirty="0">
+                <a:effectLst/>
+                <a:highlight>
+                  <a:srgbClr val="FFFFFF"/>
+                </a:highlight>
+                <a:latin typeface="system-ui"/>
+              </a:rPr>
+              <a:t> people of any race in a given state lead to more covid-19 infections for that state? (Label: DP05_0073E)</a:t>
+            </a:r>
+          </a:p>
+          <a:p>
+            <a:pPr lvl="1"/>
+            <a:r>
+              <a:rPr lang="en-US" dirty="0">
+                <a:highlight>
+                  <a:srgbClr val="FFFFFF"/>
+                </a:highlight>
+                <a:latin typeface="system-ui"/>
+              </a:rPr>
+              <a:t>Fail to reject null hypothesis. So no.</a:t>
+            </a:r>
+          </a:p>
+          <a:p>
+            <a:r>
+              <a:rPr lang="en-US" b="0" i="0" dirty="0">
+                <a:effectLst/>
+                <a:highlight>
+                  <a:srgbClr val="FFFFFF"/>
+                </a:highlight>
+                <a:latin typeface="system-ui"/>
+              </a:rPr>
+              <a:t>Does having more people of 35 to 44 years of age in a given state lead to fewer covid-19 infections for that state? (Label: DP05_0011E)</a:t>
+            </a:r>
+          </a:p>
+          <a:p>
+            <a:pPr lvl="1"/>
+            <a:r>
+              <a:rPr lang="en-US" dirty="0">
+                <a:highlight>
+                  <a:srgbClr val="FFFFFF"/>
+                </a:highlight>
+                <a:latin typeface="system-ui"/>
+              </a:rPr>
+              <a:t>Reject null hypothesis. So yes.</a:t>
+            </a:r>
+            <a:endParaRPr lang="en-US" b="0" i="0" dirty="0">
+              <a:effectLst/>
+              <a:highlight>
+                <a:srgbClr val="FFFFFF"/>
+              </a:highlight>
+              <a:latin typeface="system-ui"/>
+            </a:endParaRPr>
+          </a:p>
+          <a:p>
+            <a:r>
+              <a:rPr lang="en-US" b="0" i="0" dirty="0">
+                <a:effectLst/>
+                <a:highlight>
+                  <a:srgbClr val="FFFFFF"/>
+                </a:highlight>
+                <a:latin typeface="system-ui"/>
+              </a:rPr>
+              <a:t>Does having more people aged 60 to 64 in a given state lead to more covid-19 cases for that state? (Label : DP05_0014E)</a:t>
+            </a:r>
+          </a:p>
+          <a:p>
+            <a:pPr lvl="1"/>
+            <a:r>
+              <a:rPr lang="en-US" dirty="0">
+                <a:highlight>
+                  <a:srgbClr val="FFFFFF"/>
+                </a:highlight>
+                <a:latin typeface="system-ui"/>
+              </a:rPr>
+              <a:t>Reject null hypothesis. So yes.</a:t>
+            </a:r>
+            <a:endParaRPr lang="en-US" b="0" i="0" dirty="0">
+              <a:effectLst/>
+              <a:highlight>
+                <a:srgbClr val="FFFFFF"/>
+              </a:highlight>
+              <a:latin typeface="system-ui"/>
+            </a:endParaRPr>
+          </a:p>
+        </p:txBody>
+      </p:sp>
+      <p:sp>
+        <p:nvSpPr>
+          <p:cNvPr id="4" name="Slide Number Placeholder 3">
+            <a:extLst>
+              <a:ext uri="{FF2B5EF4-FFF2-40B4-BE49-F238E27FC236}">
+                <a16:creationId xmlns:a16="http://schemas.microsoft.com/office/drawing/2014/main" id="{6282CF4F-CBB0-C14E-002E-125B52A994D7}"/>
               </a:ext>
             </a:extLst>
           </p:cNvPr>
@@ -8303,7 +8823,7 @@
     </p:spTree>
     <p:extLst>
       <p:ext uri="{BB962C8B-B14F-4D97-AF65-F5344CB8AC3E}">
-        <p14:creationId xmlns:p14="http://schemas.microsoft.com/office/powerpoint/2010/main" val="431513734"/>
+        <p14:creationId xmlns:p14="http://schemas.microsoft.com/office/powerpoint/2010/main" val="3863562835"/>
       </p:ext>
     </p:extLst>
   </p:cSld>
@@ -8330,6 +8850,314 @@
           <a:chExt cx="0" cy="0"/>
         </a:xfrm>
       </p:grpSpPr>
+      <p:sp>
+        <p:nvSpPr>
+          <p:cNvPr id="2" name="Title 1">
+            <a:extLst>
+              <a:ext uri="{FF2B5EF4-FFF2-40B4-BE49-F238E27FC236}">
+                <a16:creationId xmlns:a16="http://schemas.microsoft.com/office/drawing/2014/main" id="{A8582CFB-D499-4A27-66AF-BCC0E53B5F0A}"/>
+              </a:ext>
+            </a:extLst>
+          </p:cNvPr>
+          <p:cNvSpPr>
+            <a:spLocks noGrp="1"/>
+          </p:cNvSpPr>
+          <p:nvPr>
+            <p:ph type="title"/>
+          </p:nvPr>
+        </p:nvSpPr>
+        <p:spPr>
+          <a:xfrm>
+            <a:off x="838200" y="2885375"/>
+            <a:ext cx="10515600" cy="1087250"/>
+          </a:xfrm>
+        </p:spPr>
+        <p:txBody>
+          <a:bodyPr/>
+          <a:lstStyle/>
+          <a:p>
+            <a:pPr algn="ctr"/>
+            <a:r>
+              <a:rPr lang="en-US" dirty="0"/>
+              <a:t>Stage 5: Dashboard</a:t>
+            </a:r>
+          </a:p>
+        </p:txBody>
+      </p:sp>
+      <p:sp>
+        <p:nvSpPr>
+          <p:cNvPr id="3" name="Text Placeholder 2">
+            <a:extLst>
+              <a:ext uri="{FF2B5EF4-FFF2-40B4-BE49-F238E27FC236}">
+                <a16:creationId xmlns:a16="http://schemas.microsoft.com/office/drawing/2014/main" id="{24211640-C3CF-59AE-6A31-08637E243D68}"/>
+              </a:ext>
+            </a:extLst>
+          </p:cNvPr>
+          <p:cNvSpPr>
+            <a:spLocks noGrp="1"/>
+          </p:cNvSpPr>
+          <p:nvPr>
+            <p:ph type="body" idx="1"/>
+          </p:nvPr>
+        </p:nvSpPr>
+        <p:spPr>
+          <a:xfrm>
+            <a:off x="838200" y="4066234"/>
+            <a:ext cx="10515600" cy="570313"/>
+          </a:xfrm>
+        </p:spPr>
+        <p:txBody>
+          <a:bodyPr/>
+          <a:lstStyle/>
+          <a:p>
+            <a:pPr algn="ctr"/>
+            <a:r>
+              <a:rPr lang="en-US" sz="2400" dirty="0"/>
+              <a:t>Interactive dashboard based on current analysis</a:t>
+            </a:r>
+          </a:p>
+          <a:p>
+            <a:endParaRPr lang="en-US" dirty="0"/>
+          </a:p>
+        </p:txBody>
+      </p:sp>
+      <p:sp>
+        <p:nvSpPr>
+          <p:cNvPr id="5" name="Slide Number Placeholder 4">
+            <a:extLst>
+              <a:ext uri="{FF2B5EF4-FFF2-40B4-BE49-F238E27FC236}">
+                <a16:creationId xmlns:a16="http://schemas.microsoft.com/office/drawing/2014/main" id="{E52C6452-8D98-24F3-0F97-5A4F01A07796}"/>
+              </a:ext>
+            </a:extLst>
+          </p:cNvPr>
+          <p:cNvSpPr>
+            <a:spLocks noGrp="1"/>
+          </p:cNvSpPr>
+          <p:nvPr>
+            <p:ph type="sldNum" sz="quarter" idx="12"/>
+          </p:nvPr>
+        </p:nvSpPr>
+        <p:spPr/>
+        <p:txBody>
+          <a:bodyPr/>
+          <a:lstStyle/>
+          <a:p>
+            <a:fld id="{BD0DFC8E-D006-4B55-BBF2-7AB50F8F017C}" type="slidenum">
+              <a:rPr lang="en-US" smtClean="0"/>
+              <a:t>14</a:t>
+            </a:fld>
+            <a:endParaRPr lang="en-US"/>
+          </a:p>
+        </p:txBody>
+      </p:sp>
+    </p:spTree>
+    <p:extLst>
+      <p:ext uri="{BB962C8B-B14F-4D97-AF65-F5344CB8AC3E}">
+        <p14:creationId xmlns:p14="http://schemas.microsoft.com/office/powerpoint/2010/main" val="3828559414"/>
+      </p:ext>
+    </p:extLst>
+  </p:cSld>
+  <p:clrMapOvr>
+    <a:masterClrMapping/>
+  </p:clrMapOvr>
+</p:sld>
+</file>
+
+<file path=ppt/slides/slide15.xml><?xml version="1.0" encoding="utf-8"?>
+<p:sld xmlns:a="http://schemas.openxmlformats.org/drawingml/2006/main" xmlns:r="http://schemas.openxmlformats.org/officeDocument/2006/relationships" xmlns:p="http://schemas.openxmlformats.org/presentationml/2006/main">
+  <p:cSld>
+    <p:spTree>
+      <p:nvGrpSpPr>
+        <p:cNvPr id="1" name=""/>
+        <p:cNvGrpSpPr/>
+        <p:nvPr/>
+      </p:nvGrpSpPr>
+      <p:grpSpPr>
+        <a:xfrm>
+          <a:off x="0" y="0"/>
+          <a:ext cx="0" cy="0"/>
+          <a:chOff x="0" y="0"/>
+          <a:chExt cx="0" cy="0"/>
+        </a:xfrm>
+      </p:grpSpPr>
+      <p:pic>
+        <p:nvPicPr>
+          <p:cNvPr id="5" name="Picture 4">
+            <a:extLst>
+              <a:ext uri="{FF2B5EF4-FFF2-40B4-BE49-F238E27FC236}">
+                <a16:creationId xmlns:a16="http://schemas.microsoft.com/office/drawing/2014/main" id="{5EFB312C-62DB-102C-B00C-9797C2B96A5C}"/>
+              </a:ext>
+            </a:extLst>
+          </p:cNvPr>
+          <p:cNvPicPr>
+            <a:picLocks noChangeAspect="1"/>
+          </p:cNvPicPr>
+          <p:nvPr/>
+        </p:nvPicPr>
+        <p:blipFill>
+          <a:blip r:embed="rId2"/>
+          <a:stretch>
+            <a:fillRect/>
+          </a:stretch>
+        </p:blipFill>
+        <p:spPr>
+          <a:xfrm>
+            <a:off x="1673629" y="295101"/>
+            <a:ext cx="9315796" cy="6305204"/>
+          </a:xfrm>
+          <a:prstGeom prst="rect">
+            <a:avLst/>
+          </a:prstGeom>
+        </p:spPr>
+      </p:pic>
+      <p:sp>
+        <p:nvSpPr>
+          <p:cNvPr id="2" name="Slide Number Placeholder 1">
+            <a:extLst>
+              <a:ext uri="{FF2B5EF4-FFF2-40B4-BE49-F238E27FC236}">
+                <a16:creationId xmlns:a16="http://schemas.microsoft.com/office/drawing/2014/main" id="{5A1E8557-B88E-36CE-2F6E-0BABB6851E91}"/>
+              </a:ext>
+            </a:extLst>
+          </p:cNvPr>
+          <p:cNvSpPr>
+            <a:spLocks noGrp="1"/>
+          </p:cNvSpPr>
+          <p:nvPr>
+            <p:ph type="sldNum" sz="quarter" idx="12"/>
+          </p:nvPr>
+        </p:nvSpPr>
+        <p:spPr/>
+        <p:txBody>
+          <a:bodyPr/>
+          <a:lstStyle/>
+          <a:p>
+            <a:fld id="{BD0DFC8E-D006-4B55-BBF2-7AB50F8F017C}" type="slidenum">
+              <a:rPr lang="en-US" smtClean="0"/>
+              <a:t>15</a:t>
+            </a:fld>
+            <a:endParaRPr lang="en-US"/>
+          </a:p>
+        </p:txBody>
+      </p:sp>
+    </p:spTree>
+    <p:extLst>
+      <p:ext uri="{BB962C8B-B14F-4D97-AF65-F5344CB8AC3E}">
+        <p14:creationId xmlns:p14="http://schemas.microsoft.com/office/powerpoint/2010/main" val="1349787492"/>
+      </p:ext>
+    </p:extLst>
+  </p:cSld>
+  <p:clrMapOvr>
+    <a:masterClrMapping/>
+  </p:clrMapOvr>
+</p:sld>
+</file>
+
+<file path=ppt/slides/slide16.xml><?xml version="1.0" encoding="utf-8"?>
+<p:sld xmlns:a="http://schemas.openxmlformats.org/drawingml/2006/main" xmlns:r="http://schemas.openxmlformats.org/officeDocument/2006/relationships" xmlns:p="http://schemas.openxmlformats.org/presentationml/2006/main">
+  <p:cSld>
+    <p:spTree>
+      <p:nvGrpSpPr>
+        <p:cNvPr id="1" name=""/>
+        <p:cNvGrpSpPr/>
+        <p:nvPr/>
+      </p:nvGrpSpPr>
+      <p:grpSpPr>
+        <a:xfrm>
+          <a:off x="0" y="0"/>
+          <a:ext cx="0" cy="0"/>
+          <a:chOff x="0" y="0"/>
+          <a:chExt cx="0" cy="0"/>
+        </a:xfrm>
+      </p:grpSpPr>
+      <p:pic>
+        <p:nvPicPr>
+          <p:cNvPr id="3" name="Picture 2">
+            <a:extLst>
+              <a:ext uri="{FF2B5EF4-FFF2-40B4-BE49-F238E27FC236}">
+                <a16:creationId xmlns:a16="http://schemas.microsoft.com/office/drawing/2014/main" id="{CF6E96EF-FF46-3F7F-20C5-FF12D3F4EFB4}"/>
+              </a:ext>
+            </a:extLst>
+          </p:cNvPr>
+          <p:cNvPicPr>
+            <a:picLocks noChangeAspect="1"/>
+          </p:cNvPicPr>
+          <p:nvPr/>
+        </p:nvPicPr>
+        <p:blipFill>
+          <a:blip r:embed="rId2"/>
+          <a:stretch>
+            <a:fillRect/>
+          </a:stretch>
+        </p:blipFill>
+        <p:spPr>
+          <a:xfrm>
+            <a:off x="1667155" y="292681"/>
+            <a:ext cx="9200350" cy="6290999"/>
+          </a:xfrm>
+          <a:prstGeom prst="rect">
+            <a:avLst/>
+          </a:prstGeom>
+        </p:spPr>
+      </p:pic>
+      <p:sp>
+        <p:nvSpPr>
+          <p:cNvPr id="2" name="Slide Number Placeholder 1">
+            <a:extLst>
+              <a:ext uri="{FF2B5EF4-FFF2-40B4-BE49-F238E27FC236}">
+                <a16:creationId xmlns:a16="http://schemas.microsoft.com/office/drawing/2014/main" id="{B021B3E3-3613-537B-F642-992B9FB18B2F}"/>
+              </a:ext>
+            </a:extLst>
+          </p:cNvPr>
+          <p:cNvSpPr>
+            <a:spLocks noGrp="1"/>
+          </p:cNvSpPr>
+          <p:nvPr>
+            <p:ph type="sldNum" sz="quarter" idx="12"/>
+          </p:nvPr>
+        </p:nvSpPr>
+        <p:spPr/>
+        <p:txBody>
+          <a:bodyPr/>
+          <a:lstStyle/>
+          <a:p>
+            <a:fld id="{BD0DFC8E-D006-4B55-BBF2-7AB50F8F017C}" type="slidenum">
+              <a:rPr lang="en-US" smtClean="0"/>
+              <a:t>16</a:t>
+            </a:fld>
+            <a:endParaRPr lang="en-US"/>
+          </a:p>
+        </p:txBody>
+      </p:sp>
+    </p:spTree>
+    <p:extLst>
+      <p:ext uri="{BB962C8B-B14F-4D97-AF65-F5344CB8AC3E}">
+        <p14:creationId xmlns:p14="http://schemas.microsoft.com/office/powerpoint/2010/main" val="431513734"/>
+      </p:ext>
+    </p:extLst>
+  </p:cSld>
+  <p:clrMapOvr>
+    <a:masterClrMapping/>
+  </p:clrMapOvr>
+</p:sld>
+</file>
+
+<file path=ppt/slides/slide17.xml><?xml version="1.0" encoding="utf-8"?>
+<p:sld xmlns:a="http://schemas.openxmlformats.org/drawingml/2006/main" xmlns:r="http://schemas.openxmlformats.org/officeDocument/2006/relationships" xmlns:p="http://schemas.openxmlformats.org/presentationml/2006/main">
+  <p:cSld>
+    <p:spTree>
+      <p:nvGrpSpPr>
+        <p:cNvPr id="1" name=""/>
+        <p:cNvGrpSpPr/>
+        <p:nvPr/>
+      </p:nvGrpSpPr>
+      <p:grpSpPr>
+        <a:xfrm>
+          <a:off x="0" y="0"/>
+          <a:ext cx="0" cy="0"/>
+          <a:chOff x="0" y="0"/>
+          <a:chExt cx="0" cy="0"/>
+        </a:xfrm>
+      </p:grpSpPr>
       <p:pic>
         <p:nvPicPr>
           <p:cNvPr id="3" name="Picture 2">
@@ -8383,7 +9211,7 @@
           <a:p>
             <a:fld id="{BD0DFC8E-D006-4B55-BBF2-7AB50F8F017C}" type="slidenum">
               <a:rPr lang="en-US" smtClean="0"/>
-              <a:t>14</a:t>
+              <a:t>17</a:t>
             </a:fld>
             <a:endParaRPr lang="en-US"/>
           </a:p>

</xml_diff>

<commit_message>
stage 4 employment hypothesis tests inserted in presentation PPT
</commit_message>
<xml_diff>
--- a/ProjPresentation.pptx
+++ b/ProjPresentation.pptx
@@ -7,7 +7,7 @@
     <p:sldMasterId id="2147483672" r:id="rId3"/>
   </p:sldMasterIdLst>
   <p:notesMasterIdLst>
-    <p:notesMasterId r:id="rId24"/>
+    <p:notesMasterId r:id="rId25"/>
   </p:notesMasterIdLst>
   <p:sldIdLst>
     <p:sldId id="266" r:id="rId4"/>
@@ -23,13 +23,14 @@
     <p:sldId id="289" r:id="rId14"/>
     <p:sldId id="290" r:id="rId15"/>
     <p:sldId id="270" r:id="rId16"/>
-    <p:sldId id="284" r:id="rId17"/>
-    <p:sldId id="285" r:id="rId18"/>
-    <p:sldId id="291" r:id="rId19"/>
-    <p:sldId id="271" r:id="rId20"/>
-    <p:sldId id="272" r:id="rId21"/>
-    <p:sldId id="273" r:id="rId22"/>
-    <p:sldId id="274" r:id="rId23"/>
+    <p:sldId id="292" r:id="rId17"/>
+    <p:sldId id="284" r:id="rId18"/>
+    <p:sldId id="285" r:id="rId19"/>
+    <p:sldId id="291" r:id="rId20"/>
+    <p:sldId id="271" r:id="rId21"/>
+    <p:sldId id="272" r:id="rId22"/>
+    <p:sldId id="273" r:id="rId23"/>
+    <p:sldId id="274" r:id="rId24"/>
   </p:sldIdLst>
   <p:sldSz cx="12192000" cy="6858000"/>
   <p:notesSz cx="6858000" cy="9144000"/>
@@ -146,6 +147,7 @@
             <p14:sldId id="289"/>
             <p14:sldId id="290"/>
             <p14:sldId id="270"/>
+            <p14:sldId id="292"/>
             <p14:sldId id="284"/>
             <p14:sldId id="285"/>
             <p14:sldId id="291"/>
@@ -269,7 +271,7 @@
           <a:p>
             <a:fld id="{18E5118F-6A56-44B4-8CD4-2559404DE2D8}" type="datetimeFigureOut">
               <a:rPr lang="en-US" smtClean="0"/>
-              <a:t>4/19/2024</a:t>
+              <a:t>4/20/2024</a:t>
             </a:fld>
             <a:endParaRPr lang="en-US"/>
           </a:p>
@@ -731,7 +733,7 @@
           <a:p>
             <a:fld id="{EC6F6E41-1F62-4E61-82DC-4FF03C9667B9}" type="slidenum">
               <a:rPr lang="en-US" smtClean="0"/>
-              <a:t>17</a:t>
+              <a:t>18</a:t>
             </a:fld>
             <a:endParaRPr lang="en-US"/>
           </a:p>
@@ -8540,10 +8542,15 @@
             <p:ph idx="1"/>
           </p:nvPr>
         </p:nvSpPr>
-        <p:spPr/>
+        <p:spPr>
+          <a:xfrm>
+            <a:off x="838200" y="1516828"/>
+            <a:ext cx="10515600" cy="4660135"/>
+          </a:xfrm>
+        </p:spPr>
         <p:txBody>
           <a:bodyPr>
-            <a:normAutofit fontScale="85000" lnSpcReduction="20000"/>
+            <a:normAutofit fontScale="92500" lnSpcReduction="20000"/>
           </a:bodyPr>
           <a:lstStyle/>
           <a:p>
@@ -8859,10 +8866,10 @@
       </p:grpSpPr>
       <p:sp>
         <p:nvSpPr>
-          <p:cNvPr id="2" name="Title 1">
-            <a:extLst>
-              <a:ext uri="{FF2B5EF4-FFF2-40B4-BE49-F238E27FC236}">
-                <a16:creationId xmlns:a16="http://schemas.microsoft.com/office/drawing/2014/main" id="{093D9844-ED1D-75B2-5E07-773AAFDD56BB}"/>
+          <p:cNvPr id="5" name="Title 4">
+            <a:extLst>
+              <a:ext uri="{FF2B5EF4-FFF2-40B4-BE49-F238E27FC236}">
+                <a16:creationId xmlns:a16="http://schemas.microsoft.com/office/drawing/2014/main" id="{7BA436C9-66CC-D73C-D092-0E384042C960}"/>
               </a:ext>
             </a:extLst>
           </p:cNvPr>
@@ -8880,42 +8887,92 @@
           <a:p>
             <a:r>
               <a:rPr lang="en-US" dirty="0"/>
-              <a:t>Kevin Hayes- Predicted Cases and Deaths</a:t>
-            </a:r>
-          </a:p>
-        </p:txBody>
-      </p:sp>
-      <p:sp>
-        <p:nvSpPr>
-          <p:cNvPr id="4" name="Text Placeholder 3">
-            <a:extLst>
-              <a:ext uri="{FF2B5EF4-FFF2-40B4-BE49-F238E27FC236}">
-                <a16:creationId xmlns:a16="http://schemas.microsoft.com/office/drawing/2014/main" id="{8287E9CC-692E-95AB-7C48-FB61BEA4DBC2}"/>
-              </a:ext>
-            </a:extLst>
-          </p:cNvPr>
-          <p:cNvSpPr>
-            <a:spLocks noGrp="1"/>
-          </p:cNvSpPr>
-          <p:nvPr>
-            <p:ph type="body" sz="half" idx="2"/>
+              <a:t>Employment – Kol Herget (SC)</a:t>
+            </a:r>
+          </a:p>
+        </p:txBody>
+      </p:sp>
+      <p:sp>
+        <p:nvSpPr>
+          <p:cNvPr id="6" name="Content Placeholder 5">
+            <a:extLst>
+              <a:ext uri="{FF2B5EF4-FFF2-40B4-BE49-F238E27FC236}">
+                <a16:creationId xmlns:a16="http://schemas.microsoft.com/office/drawing/2014/main" id="{FCC221B4-90E9-FC58-97CC-876A17ED6599}"/>
+              </a:ext>
+            </a:extLst>
+          </p:cNvPr>
+          <p:cNvSpPr>
+            <a:spLocks noGrp="1"/>
+          </p:cNvSpPr>
+          <p:nvPr>
+            <p:ph idx="1"/>
           </p:nvPr>
         </p:nvSpPr>
         <p:spPr/>
         <p:txBody>
-          <a:bodyPr/>
-          <a:lstStyle/>
-          <a:p>
+          <a:bodyPr>
+            <a:normAutofit/>
+          </a:bodyPr>
+          <a:lstStyle/>
+          <a:p>
+            <a:r>
+              <a:rPr lang="en-US" dirty="0"/>
+              <a:t>Null hypothesis: there is no correlation between employee level and COVID-19 cases in SC</a:t>
+            </a:r>
+          </a:p>
+          <a:p>
+            <a:pPr lvl="1"/>
+            <a:r>
+              <a:rPr lang="en-US" dirty="0"/>
+              <a:t>Null rejected; alternative accepted (significantly positive correlation)</a:t>
+            </a:r>
+          </a:p>
+          <a:p>
+            <a:r>
+              <a:rPr lang="en-US" dirty="0"/>
+              <a:t>Null hypothesis: there is no correlation between taxable annual wage and COVID-19 cases in SC</a:t>
+            </a:r>
+          </a:p>
+          <a:p>
+            <a:pPr lvl="1"/>
+            <a:r>
+              <a:rPr lang="en-US" dirty="0"/>
+              <a:t>Null rejected; alternative accepted (significantly positive correlation)</a:t>
+            </a:r>
+          </a:p>
+          <a:p>
+            <a:r>
+              <a:rPr lang="en-US" dirty="0"/>
+              <a:t>Null hypothesis: there is no correlation between establishment count and COVID-19 cases in SC</a:t>
+            </a:r>
+          </a:p>
+          <a:p>
+            <a:pPr lvl="1"/>
+            <a:r>
+              <a:rPr lang="en-US" dirty="0"/>
+              <a:t>Null rejected; alternative </a:t>
+            </a:r>
+            <a:r>
+              <a:rPr lang="en-US"/>
+              <a:t>accepted (significantly positive </a:t>
+            </a:r>
+            <a:r>
+              <a:rPr lang="en-US" dirty="0"/>
+              <a:t>correlation)</a:t>
+            </a:r>
+          </a:p>
+          <a:p>
+            <a:pPr lvl="1"/>
             <a:endParaRPr lang="en-US" dirty="0"/>
           </a:p>
         </p:txBody>
       </p:sp>
       <p:sp>
         <p:nvSpPr>
-          <p:cNvPr id="5" name="Slide Number Placeholder 4">
-            <a:extLst>
-              <a:ext uri="{FF2B5EF4-FFF2-40B4-BE49-F238E27FC236}">
-                <a16:creationId xmlns:a16="http://schemas.microsoft.com/office/drawing/2014/main" id="{40C92503-36A8-1FF0-F4B7-7D39BD62E3FF}"/>
+          <p:cNvPr id="4" name="Slide Number Placeholder 3">
+            <a:extLst>
+              <a:ext uri="{FF2B5EF4-FFF2-40B4-BE49-F238E27FC236}">
+                <a16:creationId xmlns:a16="http://schemas.microsoft.com/office/drawing/2014/main" id="{06358DE5-BCF0-9913-04E1-EA417320AD0A}"/>
               </a:ext>
             </a:extLst>
           </p:cNvPr>
@@ -8934,6 +8991,118 @@
             <a:fld id="{BD0DFC8E-D006-4B55-BBF2-7AB50F8F017C}" type="slidenum">
               <a:rPr lang="en-US" smtClean="0"/>
               <a:t>14</a:t>
+            </a:fld>
+            <a:endParaRPr lang="en-US"/>
+          </a:p>
+        </p:txBody>
+      </p:sp>
+    </p:spTree>
+    <p:extLst>
+      <p:ext uri="{BB962C8B-B14F-4D97-AF65-F5344CB8AC3E}">
+        <p14:creationId xmlns:p14="http://schemas.microsoft.com/office/powerpoint/2010/main" val="642393437"/>
+      </p:ext>
+    </p:extLst>
+  </p:cSld>
+  <p:clrMapOvr>
+    <a:masterClrMapping/>
+  </p:clrMapOvr>
+</p:sld>
+</file>
+
+<file path=ppt/slides/slide15.xml><?xml version="1.0" encoding="utf-8"?>
+<p:sld xmlns:a="http://schemas.openxmlformats.org/drawingml/2006/main" xmlns:r="http://schemas.openxmlformats.org/officeDocument/2006/relationships" xmlns:p="http://schemas.openxmlformats.org/presentationml/2006/main">
+  <p:cSld>
+    <p:spTree>
+      <p:nvGrpSpPr>
+        <p:cNvPr id="1" name=""/>
+        <p:cNvGrpSpPr/>
+        <p:nvPr/>
+      </p:nvGrpSpPr>
+      <p:grpSpPr>
+        <a:xfrm>
+          <a:off x="0" y="0"/>
+          <a:ext cx="0" cy="0"/>
+          <a:chOff x="0" y="0"/>
+          <a:chExt cx="0" cy="0"/>
+        </a:xfrm>
+      </p:grpSpPr>
+      <p:sp>
+        <p:nvSpPr>
+          <p:cNvPr id="2" name="Title 1">
+            <a:extLst>
+              <a:ext uri="{FF2B5EF4-FFF2-40B4-BE49-F238E27FC236}">
+                <a16:creationId xmlns:a16="http://schemas.microsoft.com/office/drawing/2014/main" id="{093D9844-ED1D-75B2-5E07-773AAFDD56BB}"/>
+              </a:ext>
+            </a:extLst>
+          </p:cNvPr>
+          <p:cNvSpPr>
+            <a:spLocks noGrp="1"/>
+          </p:cNvSpPr>
+          <p:nvPr>
+            <p:ph type="title"/>
+          </p:nvPr>
+        </p:nvSpPr>
+        <p:spPr/>
+        <p:txBody>
+          <a:bodyPr/>
+          <a:lstStyle/>
+          <a:p>
+            <a:r>
+              <a:rPr lang="en-US" dirty="0"/>
+              <a:t>Kevin Hayes- Predicted Cases and Deaths</a:t>
+            </a:r>
+          </a:p>
+        </p:txBody>
+      </p:sp>
+      <p:sp>
+        <p:nvSpPr>
+          <p:cNvPr id="4" name="Text Placeholder 3">
+            <a:extLst>
+              <a:ext uri="{FF2B5EF4-FFF2-40B4-BE49-F238E27FC236}">
+                <a16:creationId xmlns:a16="http://schemas.microsoft.com/office/drawing/2014/main" id="{8287E9CC-692E-95AB-7C48-FB61BEA4DBC2}"/>
+              </a:ext>
+            </a:extLst>
+          </p:cNvPr>
+          <p:cNvSpPr>
+            <a:spLocks noGrp="1"/>
+          </p:cNvSpPr>
+          <p:nvPr>
+            <p:ph type="body" sz="half" idx="2"/>
+          </p:nvPr>
+        </p:nvSpPr>
+        <p:spPr/>
+        <p:txBody>
+          <a:bodyPr/>
+          <a:lstStyle/>
+          <a:p>
+            <a:endParaRPr lang="en-US" dirty="0"/>
+          </a:p>
+        </p:txBody>
+      </p:sp>
+      <p:sp>
+        <p:nvSpPr>
+          <p:cNvPr id="5" name="Slide Number Placeholder 4">
+            <a:extLst>
+              <a:ext uri="{FF2B5EF4-FFF2-40B4-BE49-F238E27FC236}">
+                <a16:creationId xmlns:a16="http://schemas.microsoft.com/office/drawing/2014/main" id="{40C92503-36A8-1FF0-F4B7-7D39BD62E3FF}"/>
+              </a:ext>
+            </a:extLst>
+          </p:cNvPr>
+          <p:cNvSpPr>
+            <a:spLocks noGrp="1"/>
+          </p:cNvSpPr>
+          <p:nvPr>
+            <p:ph type="sldNum" sz="quarter" idx="12"/>
+          </p:nvPr>
+        </p:nvSpPr>
+        <p:spPr/>
+        <p:txBody>
+          <a:bodyPr/>
+          <a:lstStyle/>
+          <a:p>
+            <a:fld id="{BD0DFC8E-D006-4B55-BBF2-7AB50F8F017C}" type="slidenum">
+              <a:rPr lang="en-US" smtClean="0"/>
+              <a:t>15</a:t>
             </a:fld>
             <a:endParaRPr lang="en-US"/>
           </a:p>
@@ -9140,241 +9309,6 @@
 </p:sld>
 </file>
 
-<file path=ppt/slides/slide15.xml><?xml version="1.0" encoding="utf-8"?>
-<p:sld xmlns:a="http://schemas.openxmlformats.org/drawingml/2006/main" xmlns:r="http://schemas.openxmlformats.org/officeDocument/2006/relationships" xmlns:p="http://schemas.openxmlformats.org/presentationml/2006/main">
-  <p:cSld>
-    <p:spTree>
-      <p:nvGrpSpPr>
-        <p:cNvPr id="1" name=""/>
-        <p:cNvGrpSpPr/>
-        <p:nvPr/>
-      </p:nvGrpSpPr>
-      <p:grpSpPr>
-        <a:xfrm>
-          <a:off x="0" y="0"/>
-          <a:ext cx="0" cy="0"/>
-          <a:chOff x="0" y="0"/>
-          <a:chExt cx="0" cy="0"/>
-        </a:xfrm>
-      </p:grpSpPr>
-      <p:sp>
-        <p:nvSpPr>
-          <p:cNvPr id="2" name="Title 1">
-            <a:extLst>
-              <a:ext uri="{FF2B5EF4-FFF2-40B4-BE49-F238E27FC236}">
-                <a16:creationId xmlns:a16="http://schemas.microsoft.com/office/drawing/2014/main" id="{D12C7965-0F1A-AEBA-9238-7DD74FBDB517}"/>
-              </a:ext>
-            </a:extLst>
-          </p:cNvPr>
-          <p:cNvSpPr>
-            <a:spLocks noGrp="1"/>
-          </p:cNvSpPr>
-          <p:nvPr>
-            <p:ph type="title"/>
-          </p:nvPr>
-        </p:nvSpPr>
-        <p:spPr/>
-        <p:txBody>
-          <a:bodyPr/>
-          <a:lstStyle/>
-          <a:p>
-            <a:r>
-              <a:rPr lang="en-US" dirty="0"/>
-              <a:t>Kevin Hayes- Hypothesis Tests</a:t>
-            </a:r>
-          </a:p>
-        </p:txBody>
-      </p:sp>
-      <p:sp>
-        <p:nvSpPr>
-          <p:cNvPr id="3" name="Content Placeholder 2">
-            <a:extLst>
-              <a:ext uri="{FF2B5EF4-FFF2-40B4-BE49-F238E27FC236}">
-                <a16:creationId xmlns:a16="http://schemas.microsoft.com/office/drawing/2014/main" id="{F53E22B7-12B3-36EA-88BD-D5A446A5E3A2}"/>
-              </a:ext>
-            </a:extLst>
-          </p:cNvPr>
-          <p:cNvSpPr>
-            <a:spLocks noGrp="1"/>
-          </p:cNvSpPr>
-          <p:nvPr>
-            <p:ph idx="1"/>
-          </p:nvPr>
-        </p:nvSpPr>
-        <p:spPr/>
-        <p:txBody>
-          <a:bodyPr/>
-          <a:lstStyle/>
-          <a:p>
-            <a:r>
-              <a:rPr lang="en-US" b="0" i="0" dirty="0">
-                <a:effectLst/>
-                <a:highlight>
-                  <a:srgbClr val="FFFFFF"/>
-                </a:highlight>
-                <a:latin typeface="system-ui"/>
-              </a:rPr>
-              <a:t>Does having a higher total population of </a:t>
-            </a:r>
-            <a:r>
-              <a:rPr lang="en-US" b="0" i="0" dirty="0" err="1">
-                <a:effectLst/>
-                <a:highlight>
-                  <a:srgbClr val="FFFFFF"/>
-                </a:highlight>
-                <a:latin typeface="system-ui"/>
-              </a:rPr>
-              <a:t>hispanic</a:t>
-            </a:r>
-            <a:r>
-              <a:rPr lang="en-US" b="0" i="0" dirty="0">
-                <a:effectLst/>
-                <a:highlight>
-                  <a:srgbClr val="FFFFFF"/>
-                </a:highlight>
-                <a:latin typeface="system-ui"/>
-              </a:rPr>
-              <a:t> or </a:t>
-            </a:r>
-            <a:r>
-              <a:rPr lang="en-US" b="0" i="0" dirty="0" err="1">
-                <a:effectLst/>
-                <a:highlight>
-                  <a:srgbClr val="FFFFFF"/>
-                </a:highlight>
-                <a:latin typeface="system-ui"/>
-              </a:rPr>
-              <a:t>latino</a:t>
-            </a:r>
-            <a:r>
-              <a:rPr lang="en-US" b="0" i="0" dirty="0">
-                <a:effectLst/>
-                <a:highlight>
-                  <a:srgbClr val="FFFFFF"/>
-                </a:highlight>
-                <a:latin typeface="system-ui"/>
-              </a:rPr>
-              <a:t> people of any race in a given state lead to more covid-19 infections for that state? (Label: DP05_0073E)</a:t>
-            </a:r>
-          </a:p>
-          <a:p>
-            <a:pPr lvl="1"/>
-            <a:r>
-              <a:rPr lang="en-US" dirty="0">
-                <a:highlight>
-                  <a:srgbClr val="FFFFFF"/>
-                </a:highlight>
-                <a:latin typeface="system-ui"/>
-              </a:rPr>
-              <a:t>Fail to reject null hypothesis. So no.</a:t>
-            </a:r>
-          </a:p>
-          <a:p>
-            <a:r>
-              <a:rPr lang="en-US" b="0" i="0" dirty="0">
-                <a:effectLst/>
-                <a:highlight>
-                  <a:srgbClr val="FFFFFF"/>
-                </a:highlight>
-                <a:latin typeface="system-ui"/>
-              </a:rPr>
-              <a:t>Does having more people of 35 to 44 years of age in a given state lead to fewer covid-19 infections for that state? (Label: DP05_0011E)</a:t>
-            </a:r>
-          </a:p>
-          <a:p>
-            <a:pPr lvl="1"/>
-            <a:r>
-              <a:rPr lang="en-US" dirty="0">
-                <a:highlight>
-                  <a:srgbClr val="FFFFFF"/>
-                </a:highlight>
-                <a:latin typeface="system-ui"/>
-              </a:rPr>
-              <a:t>Reject null hypothesis. So yes.</a:t>
-            </a:r>
-            <a:endParaRPr lang="en-US" b="0" i="0" dirty="0">
-              <a:effectLst/>
-              <a:highlight>
-                <a:srgbClr val="FFFFFF"/>
-              </a:highlight>
-              <a:latin typeface="system-ui"/>
-            </a:endParaRPr>
-          </a:p>
-          <a:p>
-            <a:r>
-              <a:rPr lang="en-US" b="0" i="0" dirty="0">
-                <a:effectLst/>
-                <a:highlight>
-                  <a:srgbClr val="FFFFFF"/>
-                </a:highlight>
-                <a:latin typeface="system-ui"/>
-              </a:rPr>
-              <a:t>Does having more people aged 60 to 64 in a given state lead to more covid-19 cases for that state? (Label : DP05_0014E)</a:t>
-            </a:r>
-          </a:p>
-          <a:p>
-            <a:pPr lvl="1"/>
-            <a:r>
-              <a:rPr lang="en-US" dirty="0">
-                <a:highlight>
-                  <a:srgbClr val="FFFFFF"/>
-                </a:highlight>
-                <a:latin typeface="system-ui"/>
-              </a:rPr>
-              <a:t>Reject null hypothesis. So yes.</a:t>
-            </a:r>
-            <a:endParaRPr lang="en-US" b="0" i="0" dirty="0">
-              <a:effectLst/>
-              <a:highlight>
-                <a:srgbClr val="FFFFFF"/>
-              </a:highlight>
-              <a:latin typeface="system-ui"/>
-            </a:endParaRPr>
-          </a:p>
-        </p:txBody>
-      </p:sp>
-      <p:sp>
-        <p:nvSpPr>
-          <p:cNvPr id="4" name="Slide Number Placeholder 3">
-            <a:extLst>
-              <a:ext uri="{FF2B5EF4-FFF2-40B4-BE49-F238E27FC236}">
-                <a16:creationId xmlns:a16="http://schemas.microsoft.com/office/drawing/2014/main" id="{6282CF4F-CBB0-C14E-002E-125B52A994D7}"/>
-              </a:ext>
-            </a:extLst>
-          </p:cNvPr>
-          <p:cNvSpPr>
-            <a:spLocks noGrp="1"/>
-          </p:cNvSpPr>
-          <p:nvPr>
-            <p:ph type="sldNum" sz="quarter" idx="12"/>
-          </p:nvPr>
-        </p:nvSpPr>
-        <p:spPr/>
-        <p:txBody>
-          <a:bodyPr/>
-          <a:lstStyle/>
-          <a:p>
-            <a:fld id="{BD0DFC8E-D006-4B55-BBF2-7AB50F8F017C}" type="slidenum">
-              <a:rPr lang="en-US" smtClean="0"/>
-              <a:t>15</a:t>
-            </a:fld>
-            <a:endParaRPr lang="en-US"/>
-          </a:p>
-        </p:txBody>
-      </p:sp>
-    </p:spTree>
-    <p:extLst>
-      <p:ext uri="{BB962C8B-B14F-4D97-AF65-F5344CB8AC3E}">
-        <p14:creationId xmlns:p14="http://schemas.microsoft.com/office/powerpoint/2010/main" val="3863562835"/>
-      </p:ext>
-    </p:extLst>
-  </p:cSld>
-  <p:clrMapOvr>
-    <a:masterClrMapping/>
-  </p:clrMapOvr>
-</p:sld>
-</file>
-
 <file path=ppt/slides/slide16.xml><?xml version="1.0" encoding="utf-8"?>
 <p:sld xmlns:a="http://schemas.openxmlformats.org/drawingml/2006/main" xmlns:r="http://schemas.openxmlformats.org/officeDocument/2006/relationships" xmlns:p="http://schemas.openxmlformats.org/presentationml/2006/main">
   <p:cSld>
@@ -9397,7 +9331,7 @@
           <p:cNvPr id="2" name="Title 1">
             <a:extLst>
               <a:ext uri="{FF2B5EF4-FFF2-40B4-BE49-F238E27FC236}">
-                <a16:creationId xmlns:a16="http://schemas.microsoft.com/office/drawing/2014/main" id="{6221F52D-B146-E28D-6434-32AC8FB3861D}"/>
+                <a16:creationId xmlns:a16="http://schemas.microsoft.com/office/drawing/2014/main" id="{D12C7965-0F1A-AEBA-9238-7DD74FBDB517}"/>
               </a:ext>
             </a:extLst>
           </p:cNvPr>
@@ -9415,7 +9349,7 @@
           <a:p>
             <a:r>
               <a:rPr lang="en-US" dirty="0"/>
-              <a:t>Hypothesis test – Neetha Ravva</a:t>
+              <a:t>Kevin Hayes- Hypothesis Tests</a:t>
             </a:r>
           </a:p>
         </p:txBody>
@@ -9425,7 +9359,7 @@
           <p:cNvPr id="3" name="Content Placeholder 2">
             <a:extLst>
               <a:ext uri="{FF2B5EF4-FFF2-40B4-BE49-F238E27FC236}">
-                <a16:creationId xmlns:a16="http://schemas.microsoft.com/office/drawing/2014/main" id="{BD9EF911-40F8-7B2E-277C-B05AC18DA857}"/>
+                <a16:creationId xmlns:a16="http://schemas.microsoft.com/office/drawing/2014/main" id="{F53E22B7-12B3-36EA-88BD-D5A446A5E3A2}"/>
               </a:ext>
             </a:extLst>
           </p:cNvPr>
@@ -9442,148 +9376,130 @@
           <a:lstStyle/>
           <a:p>
             <a:r>
-              <a:rPr lang="en-US" sz="1800" b="0" i="0" dirty="0">
-                <a:solidFill>
-                  <a:srgbClr val="212121"/>
-                </a:solidFill>
+              <a:rPr lang="en-US" b="0" i="0" dirty="0">
                 <a:effectLst/>
-                <a:latin typeface="+mn-lt"/>
+                <a:highlight>
+                  <a:srgbClr val="FFFFFF"/>
+                </a:highlight>
+                <a:latin typeface="system-ui"/>
               </a:rPr>
-              <a:t>There is no significant correlation between the political party of the winning candidate in a state and the total number of COVID-19 cases reported in that state.</a:t>
-            </a:r>
-          </a:p>
-          <a:p>
-            <a:pPr marL="0" indent="0">
-              <a:buNone/>
-            </a:pPr>
-            <a:r>
-              <a:rPr lang="en-US" sz="1800" b="0" i="0" dirty="0">
-                <a:solidFill>
-                  <a:srgbClr val="212121"/>
-                </a:solidFill>
+              <a:t>Does having a higher total population of </a:t>
+            </a:r>
+            <a:r>
+              <a:rPr lang="en-US" b="0" i="0" dirty="0" err="1">
                 <a:effectLst/>
-                <a:latin typeface="+mn-lt"/>
+                <a:highlight>
+                  <a:srgbClr val="FFFFFF"/>
+                </a:highlight>
+                <a:latin typeface="system-ui"/>
               </a:rPr>
-              <a:t>	Reject null hypothesis – so yes.</a:t>
-            </a:r>
-          </a:p>
-          <a:p>
-            <a:r>
-              <a:rPr lang="en-US" sz="1800" b="0" i="0" dirty="0">
-                <a:solidFill>
-                  <a:srgbClr val="212121"/>
-                </a:solidFill>
+              <a:t>hispanic</a:t>
+            </a:r>
+            <a:r>
+              <a:rPr lang="en-US" b="0" i="0" dirty="0">
                 <a:effectLst/>
-                <a:latin typeface="+mn-lt"/>
+                <a:highlight>
+                  <a:srgbClr val="FFFFFF"/>
+                </a:highlight>
+                <a:latin typeface="system-ui"/>
               </a:rPr>
-              <a:t>There is no significant relationship between voter turnout in a state and the total number of COVID-19 cases reported in that state.</a:t>
-            </a:r>
-            <a:endParaRPr lang="en-US" sz="1800" dirty="0">
-              <a:solidFill>
-                <a:srgbClr val="212121"/>
-              </a:solidFill>
-              <a:latin typeface="+mn-lt"/>
+              <a:t> or </a:t>
+            </a:r>
+            <a:r>
+              <a:rPr lang="en-US" b="0" i="0" dirty="0" err="1">
+                <a:effectLst/>
+                <a:highlight>
+                  <a:srgbClr val="FFFFFF"/>
+                </a:highlight>
+                <a:latin typeface="system-ui"/>
+              </a:rPr>
+              <a:t>latino</a:t>
+            </a:r>
+            <a:r>
+              <a:rPr lang="en-US" b="0" i="0" dirty="0">
+                <a:effectLst/>
+                <a:highlight>
+                  <a:srgbClr val="FFFFFF"/>
+                </a:highlight>
+                <a:latin typeface="system-ui"/>
+              </a:rPr>
+              <a:t> people of any race in a given state lead to more covid-19 infections for that state? (Label: DP05_0073E)</a:t>
+            </a:r>
+          </a:p>
+          <a:p>
+            <a:pPr lvl="1"/>
+            <a:r>
+              <a:rPr lang="en-US" dirty="0">
+                <a:highlight>
+                  <a:srgbClr val="FFFFFF"/>
+                </a:highlight>
+                <a:latin typeface="system-ui"/>
+              </a:rPr>
+              <a:t>Fail to reject null hypothesis. So no.</a:t>
+            </a:r>
+          </a:p>
+          <a:p>
+            <a:r>
+              <a:rPr lang="en-US" b="0" i="0" dirty="0">
+                <a:effectLst/>
+                <a:highlight>
+                  <a:srgbClr val="FFFFFF"/>
+                </a:highlight>
+                <a:latin typeface="system-ui"/>
+              </a:rPr>
+              <a:t>Does having more people of 35 to 44 years of age in a given state lead to fewer covid-19 infections for that state? (Label: DP05_0011E)</a:t>
+            </a:r>
+          </a:p>
+          <a:p>
+            <a:pPr lvl="1"/>
+            <a:r>
+              <a:rPr lang="en-US" dirty="0">
+                <a:highlight>
+                  <a:srgbClr val="FFFFFF"/>
+                </a:highlight>
+                <a:latin typeface="system-ui"/>
+              </a:rPr>
+              <a:t>Reject null hypothesis. So yes.</a:t>
+            </a:r>
+            <a:endParaRPr lang="en-US" b="0" i="0" dirty="0">
+              <a:effectLst/>
+              <a:highlight>
+                <a:srgbClr val="FFFFFF"/>
+              </a:highlight>
+              <a:latin typeface="system-ui"/>
             </a:endParaRPr>
           </a:p>
           <a:p>
-            <a:pPr marL="0" indent="0">
-              <a:buNone/>
-            </a:pPr>
-            <a:r>
-              <a:rPr lang="en-US" sz="1800" b="0" i="0" dirty="0">
-                <a:solidFill>
-                  <a:srgbClr val="212121"/>
-                </a:solidFill>
+            <a:r>
+              <a:rPr lang="en-US" b="0" i="0" dirty="0">
                 <a:effectLst/>
-                <a:latin typeface="+mn-lt"/>
+                <a:highlight>
+                  <a:srgbClr val="FFFFFF"/>
+                </a:highlight>
+                <a:latin typeface="system-ui"/>
               </a:rPr>
-              <a:t>	Reject null hypothesis – so yes.</a:t>
-            </a:r>
-          </a:p>
-          <a:p>
-            <a:r>
-              <a:rPr lang="en-US" sz="1800" dirty="0">
-                <a:solidFill>
-                  <a:srgbClr val="212121"/>
-                </a:solidFill>
-                <a:latin typeface="+mn-lt"/>
+              <a:t>Does having more people aged 60 to 64 in a given state lead to more covid-19 cases for that state? (Label : DP05_0014E)</a:t>
+            </a:r>
+          </a:p>
+          <a:p>
+            <a:pPr lvl="1"/>
+            <a:r>
+              <a:rPr lang="en-US" dirty="0">
+                <a:highlight>
+                  <a:srgbClr val="FFFFFF"/>
+                </a:highlight>
+                <a:latin typeface="system-ui"/>
               </a:rPr>
-              <a:t> </a:t>
-            </a:r>
-            <a:r>
-              <a:rPr lang="en-US" sz="1800" b="0" i="0" dirty="0">
-                <a:solidFill>
-                  <a:srgbClr val="212121"/>
-                </a:solidFill>
-                <a:effectLst/>
-                <a:latin typeface="+mn-lt"/>
-              </a:rPr>
-              <a:t>There is no significant correlation between the population size of a state and the total number of COVID-19 cases reported in that state.</a:t>
-            </a:r>
-          </a:p>
-          <a:p>
-            <a:pPr marL="0" indent="0">
-              <a:buNone/>
-            </a:pPr>
-            <a:r>
-              <a:rPr lang="en-US" sz="1800" b="0" i="0" dirty="0">
-                <a:solidFill>
-                  <a:srgbClr val="212121"/>
-                </a:solidFill>
-                <a:effectLst/>
-                <a:latin typeface="+mn-lt"/>
-              </a:rPr>
-              <a:t>	Fail to reject null hypothesis – so no.</a:t>
-            </a:r>
-          </a:p>
-          <a:p>
-            <a:pPr marL="0" indent="0">
-              <a:buNone/>
-            </a:pPr>
-            <a:endParaRPr lang="en-US" sz="1800" b="0" i="0" dirty="0">
-              <a:solidFill>
-                <a:srgbClr val="212121"/>
-              </a:solidFill>
+              <a:t>Reject null hypothesis. So yes.</a:t>
+            </a:r>
+            <a:endParaRPr lang="en-US" b="0" i="0" dirty="0">
               <a:effectLst/>
-              <a:latin typeface="+mn-lt"/>
+              <a:highlight>
+                <a:srgbClr val="FFFFFF"/>
+              </a:highlight>
+              <a:latin typeface="system-ui"/>
             </a:endParaRPr>
           </a:p>
-          <a:p>
-            <a:pPr marL="0" indent="0">
-              <a:buNone/>
-            </a:pPr>
-            <a:endParaRPr lang="en-US" sz="1800" b="0" i="0" dirty="0">
-              <a:solidFill>
-                <a:srgbClr val="212121"/>
-              </a:solidFill>
-              <a:effectLst/>
-              <a:latin typeface="+mn-lt"/>
-            </a:endParaRPr>
-          </a:p>
-          <a:p>
-            <a:pPr marL="0" indent="0">
-              <a:buNone/>
-            </a:pPr>
-            <a:endParaRPr lang="en-US" sz="1800" b="0" i="0" dirty="0">
-              <a:solidFill>
-                <a:srgbClr val="212121"/>
-              </a:solidFill>
-              <a:effectLst/>
-              <a:latin typeface="+mn-lt"/>
-            </a:endParaRPr>
-          </a:p>
-          <a:p>
-            <a:endParaRPr lang="en-US" sz="1800" b="0" i="0" dirty="0">
-              <a:solidFill>
-                <a:srgbClr val="212121"/>
-              </a:solidFill>
-              <a:effectLst/>
-              <a:latin typeface="+mn-lt"/>
-            </a:endParaRPr>
-          </a:p>
-          <a:p>
-            <a:endParaRPr lang="en-US" dirty="0"/>
-          </a:p>
         </p:txBody>
       </p:sp>
       <p:sp>
@@ -9591,7 +9507,7 @@
           <p:cNvPr id="4" name="Slide Number Placeholder 3">
             <a:extLst>
               <a:ext uri="{FF2B5EF4-FFF2-40B4-BE49-F238E27FC236}">
-                <a16:creationId xmlns:a16="http://schemas.microsoft.com/office/drawing/2014/main" id="{5A442099-1CA4-40F5-7D40-6EDEE0B48830}"/>
+                <a16:creationId xmlns:a16="http://schemas.microsoft.com/office/drawing/2014/main" id="{6282CF4F-CBB0-C14E-002E-125B52A994D7}"/>
               </a:ext>
             </a:extLst>
           </p:cNvPr>
@@ -9618,7 +9534,7 @@
     </p:spTree>
     <p:extLst>
       <p:ext uri="{BB962C8B-B14F-4D97-AF65-F5344CB8AC3E}">
-        <p14:creationId xmlns:p14="http://schemas.microsoft.com/office/powerpoint/2010/main" val="3345486609"/>
+        <p14:creationId xmlns:p14="http://schemas.microsoft.com/office/powerpoint/2010/main" val="3863562835"/>
       </p:ext>
     </p:extLst>
   </p:cSld>
@@ -9650,7 +9566,7 @@
           <p:cNvPr id="2" name="Title 1">
             <a:extLst>
               <a:ext uri="{FF2B5EF4-FFF2-40B4-BE49-F238E27FC236}">
-                <a16:creationId xmlns:a16="http://schemas.microsoft.com/office/drawing/2014/main" id="{A8582CFB-D499-4A27-66AF-BCC0E53B5F0A}"/>
+                <a16:creationId xmlns:a16="http://schemas.microsoft.com/office/drawing/2014/main" id="{6221F52D-B146-E28D-6434-32AC8FB3861D}"/>
               </a:ext>
             </a:extLst>
           </p:cNvPr>
@@ -9661,55 +9577,178 @@
             <p:ph type="title"/>
           </p:nvPr>
         </p:nvSpPr>
-        <p:spPr>
-          <a:xfrm>
-            <a:off x="838200" y="2885375"/>
-            <a:ext cx="10515600" cy="1087250"/>
-          </a:xfrm>
-        </p:spPr>
-        <p:txBody>
-          <a:bodyPr/>
-          <a:lstStyle/>
-          <a:p>
-            <a:pPr algn="ctr"/>
+        <p:spPr/>
+        <p:txBody>
+          <a:bodyPr/>
+          <a:lstStyle/>
+          <a:p>
             <a:r>
               <a:rPr lang="en-US" dirty="0"/>
-              <a:t>Stage 5: Dashboard</a:t>
-            </a:r>
-          </a:p>
-        </p:txBody>
-      </p:sp>
-      <p:sp>
-        <p:nvSpPr>
-          <p:cNvPr id="3" name="Text Placeholder 2">
-            <a:extLst>
-              <a:ext uri="{FF2B5EF4-FFF2-40B4-BE49-F238E27FC236}">
-                <a16:creationId xmlns:a16="http://schemas.microsoft.com/office/drawing/2014/main" id="{24211640-C3CF-59AE-6A31-08637E243D68}"/>
-              </a:ext>
-            </a:extLst>
-          </p:cNvPr>
-          <p:cNvSpPr>
-            <a:spLocks noGrp="1"/>
-          </p:cNvSpPr>
-          <p:nvPr>
-            <p:ph type="body" idx="1"/>
-          </p:nvPr>
-        </p:nvSpPr>
-        <p:spPr>
-          <a:xfrm>
-            <a:off x="838200" y="4066234"/>
-            <a:ext cx="10515600" cy="570313"/>
-          </a:xfrm>
-        </p:spPr>
-        <p:txBody>
-          <a:bodyPr/>
-          <a:lstStyle/>
-          <a:p>
-            <a:pPr algn="ctr"/>
-            <a:r>
-              <a:rPr lang="en-US" sz="2400" dirty="0"/>
-              <a:t>Interactive dashboard based on current analysis</a:t>
-            </a:r>
+              <a:t>Hypothesis test – Neetha Ravva</a:t>
+            </a:r>
+          </a:p>
+        </p:txBody>
+      </p:sp>
+      <p:sp>
+        <p:nvSpPr>
+          <p:cNvPr id="3" name="Content Placeholder 2">
+            <a:extLst>
+              <a:ext uri="{FF2B5EF4-FFF2-40B4-BE49-F238E27FC236}">
+                <a16:creationId xmlns:a16="http://schemas.microsoft.com/office/drawing/2014/main" id="{BD9EF911-40F8-7B2E-277C-B05AC18DA857}"/>
+              </a:ext>
+            </a:extLst>
+          </p:cNvPr>
+          <p:cNvSpPr>
+            <a:spLocks noGrp="1"/>
+          </p:cNvSpPr>
+          <p:nvPr>
+            <p:ph idx="1"/>
+          </p:nvPr>
+        </p:nvSpPr>
+        <p:spPr/>
+        <p:txBody>
+          <a:bodyPr/>
+          <a:lstStyle/>
+          <a:p>
+            <a:r>
+              <a:rPr lang="en-US" sz="1800" b="0" i="0" dirty="0">
+                <a:solidFill>
+                  <a:srgbClr val="212121"/>
+                </a:solidFill>
+                <a:effectLst/>
+                <a:latin typeface="+mn-lt"/>
+              </a:rPr>
+              <a:t>There is no significant correlation between the political party of the winning candidate in a state and the total number of COVID-19 cases reported in that state.</a:t>
+            </a:r>
+          </a:p>
+          <a:p>
+            <a:pPr marL="0" indent="0">
+              <a:buNone/>
+            </a:pPr>
+            <a:r>
+              <a:rPr lang="en-US" sz="1800" b="0" i="0" dirty="0">
+                <a:solidFill>
+                  <a:srgbClr val="212121"/>
+                </a:solidFill>
+                <a:effectLst/>
+                <a:latin typeface="+mn-lt"/>
+              </a:rPr>
+              <a:t>	Reject null hypothesis – so yes.</a:t>
+            </a:r>
+          </a:p>
+          <a:p>
+            <a:r>
+              <a:rPr lang="en-US" sz="1800" b="0" i="0" dirty="0">
+                <a:solidFill>
+                  <a:srgbClr val="212121"/>
+                </a:solidFill>
+                <a:effectLst/>
+                <a:latin typeface="+mn-lt"/>
+              </a:rPr>
+              <a:t>There is no significant relationship between voter turnout in a state and the total number of COVID-19 cases reported in that state.</a:t>
+            </a:r>
+            <a:endParaRPr lang="en-US" sz="1800" dirty="0">
+              <a:solidFill>
+                <a:srgbClr val="212121"/>
+              </a:solidFill>
+              <a:latin typeface="+mn-lt"/>
+            </a:endParaRPr>
+          </a:p>
+          <a:p>
+            <a:pPr marL="0" indent="0">
+              <a:buNone/>
+            </a:pPr>
+            <a:r>
+              <a:rPr lang="en-US" sz="1800" b="0" i="0" dirty="0">
+                <a:solidFill>
+                  <a:srgbClr val="212121"/>
+                </a:solidFill>
+                <a:effectLst/>
+                <a:latin typeface="+mn-lt"/>
+              </a:rPr>
+              <a:t>	Reject null hypothesis – so yes.</a:t>
+            </a:r>
+          </a:p>
+          <a:p>
+            <a:r>
+              <a:rPr lang="en-US" sz="1800" dirty="0">
+                <a:solidFill>
+                  <a:srgbClr val="212121"/>
+                </a:solidFill>
+                <a:latin typeface="+mn-lt"/>
+              </a:rPr>
+              <a:t> </a:t>
+            </a:r>
+            <a:r>
+              <a:rPr lang="en-US" sz="1800" b="0" i="0" dirty="0">
+                <a:solidFill>
+                  <a:srgbClr val="212121"/>
+                </a:solidFill>
+                <a:effectLst/>
+                <a:latin typeface="+mn-lt"/>
+              </a:rPr>
+              <a:t>There is no significant correlation between the population size of a state and the total number of COVID-19 cases reported in that state.</a:t>
+            </a:r>
+          </a:p>
+          <a:p>
+            <a:pPr marL="0" indent="0">
+              <a:buNone/>
+            </a:pPr>
+            <a:r>
+              <a:rPr lang="en-US" sz="1800" b="0" i="0" dirty="0">
+                <a:solidFill>
+                  <a:srgbClr val="212121"/>
+                </a:solidFill>
+                <a:effectLst/>
+                <a:latin typeface="+mn-lt"/>
+              </a:rPr>
+              <a:t>	Fail to reject null hypothesis – so no.</a:t>
+            </a:r>
+          </a:p>
+          <a:p>
+            <a:pPr marL="0" indent="0">
+              <a:buNone/>
+            </a:pPr>
+            <a:endParaRPr lang="en-US" sz="1800" b="0" i="0" dirty="0">
+              <a:solidFill>
+                <a:srgbClr val="212121"/>
+              </a:solidFill>
+              <a:effectLst/>
+              <a:latin typeface="+mn-lt"/>
+            </a:endParaRPr>
+          </a:p>
+          <a:p>
+            <a:pPr marL="0" indent="0">
+              <a:buNone/>
+            </a:pPr>
+            <a:endParaRPr lang="en-US" sz="1800" b="0" i="0" dirty="0">
+              <a:solidFill>
+                <a:srgbClr val="212121"/>
+              </a:solidFill>
+              <a:effectLst/>
+              <a:latin typeface="+mn-lt"/>
+            </a:endParaRPr>
+          </a:p>
+          <a:p>
+            <a:pPr marL="0" indent="0">
+              <a:buNone/>
+            </a:pPr>
+            <a:endParaRPr lang="en-US" sz="1800" b="0" i="0" dirty="0">
+              <a:solidFill>
+                <a:srgbClr val="212121"/>
+              </a:solidFill>
+              <a:effectLst/>
+              <a:latin typeface="+mn-lt"/>
+            </a:endParaRPr>
+          </a:p>
+          <a:p>
+            <a:endParaRPr lang="en-US" sz="1800" b="0" i="0" dirty="0">
+              <a:solidFill>
+                <a:srgbClr val="212121"/>
+              </a:solidFill>
+              <a:effectLst/>
+              <a:latin typeface="+mn-lt"/>
+            </a:endParaRPr>
           </a:p>
           <a:p>
             <a:endParaRPr lang="en-US" dirty="0"/>
@@ -9718,10 +9757,10 @@
       </p:sp>
       <p:sp>
         <p:nvSpPr>
-          <p:cNvPr id="5" name="Slide Number Placeholder 4">
-            <a:extLst>
-              <a:ext uri="{FF2B5EF4-FFF2-40B4-BE49-F238E27FC236}">
-                <a16:creationId xmlns:a16="http://schemas.microsoft.com/office/drawing/2014/main" id="{E52C6452-8D98-24F3-0F97-5A4F01A07796}"/>
+          <p:cNvPr id="4" name="Slide Number Placeholder 3">
+            <a:extLst>
+              <a:ext uri="{FF2B5EF4-FFF2-40B4-BE49-F238E27FC236}">
+                <a16:creationId xmlns:a16="http://schemas.microsoft.com/office/drawing/2014/main" id="{5A442099-1CA4-40F5-7D40-6EDEE0B48830}"/>
               </a:ext>
             </a:extLst>
           </p:cNvPr>
@@ -9748,7 +9787,7 @@
     </p:spTree>
     <p:extLst>
       <p:ext uri="{BB962C8B-B14F-4D97-AF65-F5344CB8AC3E}">
-        <p14:creationId xmlns:p14="http://schemas.microsoft.com/office/powerpoint/2010/main" val="3828559414"/>
+        <p14:creationId xmlns:p14="http://schemas.microsoft.com/office/powerpoint/2010/main" val="3345486609"/>
       </p:ext>
     </p:extLst>
   </p:cSld>
@@ -9775,42 +9814,83 @@
           <a:chExt cx="0" cy="0"/>
         </a:xfrm>
       </p:grpSpPr>
-      <p:pic>
-        <p:nvPicPr>
-          <p:cNvPr id="5" name="Picture 4">
-            <a:extLst>
-              <a:ext uri="{FF2B5EF4-FFF2-40B4-BE49-F238E27FC236}">
-                <a16:creationId xmlns:a16="http://schemas.microsoft.com/office/drawing/2014/main" id="{5EFB312C-62DB-102C-B00C-9797C2B96A5C}"/>
-              </a:ext>
-            </a:extLst>
-          </p:cNvPr>
-          <p:cNvPicPr>
-            <a:picLocks noChangeAspect="1"/>
-          </p:cNvPicPr>
-          <p:nvPr/>
-        </p:nvPicPr>
-        <p:blipFill>
-          <a:blip r:embed="rId2"/>
-          <a:stretch>
-            <a:fillRect/>
-          </a:stretch>
-        </p:blipFill>
+      <p:sp>
+        <p:nvSpPr>
+          <p:cNvPr id="2" name="Title 1">
+            <a:extLst>
+              <a:ext uri="{FF2B5EF4-FFF2-40B4-BE49-F238E27FC236}">
+                <a16:creationId xmlns:a16="http://schemas.microsoft.com/office/drawing/2014/main" id="{A8582CFB-D499-4A27-66AF-BCC0E53B5F0A}"/>
+              </a:ext>
+            </a:extLst>
+          </p:cNvPr>
+          <p:cNvSpPr>
+            <a:spLocks noGrp="1"/>
+          </p:cNvSpPr>
+          <p:nvPr>
+            <p:ph type="title"/>
+          </p:nvPr>
+        </p:nvSpPr>
         <p:spPr>
           <a:xfrm>
-            <a:off x="1673629" y="295101"/>
-            <a:ext cx="9315796" cy="6305204"/>
+            <a:off x="838200" y="2885375"/>
+            <a:ext cx="10515600" cy="1087250"/>
           </a:xfrm>
-          <a:prstGeom prst="rect">
-            <a:avLst/>
-          </a:prstGeom>
         </p:spPr>
-      </p:pic>
-      <p:sp>
-        <p:nvSpPr>
-          <p:cNvPr id="2" name="Slide Number Placeholder 1">
-            <a:extLst>
-              <a:ext uri="{FF2B5EF4-FFF2-40B4-BE49-F238E27FC236}">
-                <a16:creationId xmlns:a16="http://schemas.microsoft.com/office/drawing/2014/main" id="{5A1E8557-B88E-36CE-2F6E-0BABB6851E91}"/>
+        <p:txBody>
+          <a:bodyPr/>
+          <a:lstStyle/>
+          <a:p>
+            <a:pPr algn="ctr"/>
+            <a:r>
+              <a:rPr lang="en-US" dirty="0"/>
+              <a:t>Stage 5: Dashboard</a:t>
+            </a:r>
+          </a:p>
+        </p:txBody>
+      </p:sp>
+      <p:sp>
+        <p:nvSpPr>
+          <p:cNvPr id="3" name="Text Placeholder 2">
+            <a:extLst>
+              <a:ext uri="{FF2B5EF4-FFF2-40B4-BE49-F238E27FC236}">
+                <a16:creationId xmlns:a16="http://schemas.microsoft.com/office/drawing/2014/main" id="{24211640-C3CF-59AE-6A31-08637E243D68}"/>
+              </a:ext>
+            </a:extLst>
+          </p:cNvPr>
+          <p:cNvSpPr>
+            <a:spLocks noGrp="1"/>
+          </p:cNvSpPr>
+          <p:nvPr>
+            <p:ph type="body" idx="1"/>
+          </p:nvPr>
+        </p:nvSpPr>
+        <p:spPr>
+          <a:xfrm>
+            <a:off x="838200" y="4066234"/>
+            <a:ext cx="10515600" cy="570313"/>
+          </a:xfrm>
+        </p:spPr>
+        <p:txBody>
+          <a:bodyPr/>
+          <a:lstStyle/>
+          <a:p>
+            <a:pPr algn="ctr"/>
+            <a:r>
+              <a:rPr lang="en-US" sz="2400" dirty="0"/>
+              <a:t>Interactive dashboard based on current analysis</a:t>
+            </a:r>
+          </a:p>
+          <a:p>
+            <a:endParaRPr lang="en-US" dirty="0"/>
+          </a:p>
+        </p:txBody>
+      </p:sp>
+      <p:sp>
+        <p:nvSpPr>
+          <p:cNvPr id="5" name="Slide Number Placeholder 4">
+            <a:extLst>
+              <a:ext uri="{FF2B5EF4-FFF2-40B4-BE49-F238E27FC236}">
+                <a16:creationId xmlns:a16="http://schemas.microsoft.com/office/drawing/2014/main" id="{E52C6452-8D98-24F3-0F97-5A4F01A07796}"/>
               </a:ext>
             </a:extLst>
           </p:cNvPr>
@@ -9837,7 +9917,7 @@
     </p:spTree>
     <p:extLst>
       <p:ext uri="{BB962C8B-B14F-4D97-AF65-F5344CB8AC3E}">
-        <p14:creationId xmlns:p14="http://schemas.microsoft.com/office/powerpoint/2010/main" val="1349787492"/>
+        <p14:creationId xmlns:p14="http://schemas.microsoft.com/office/powerpoint/2010/main" val="3828559414"/>
       </p:ext>
     </p:extLst>
   </p:cSld>
@@ -9866,10 +9946,10 @@
       </p:grpSpPr>
       <p:pic>
         <p:nvPicPr>
-          <p:cNvPr id="3" name="Picture 2">
-            <a:extLst>
-              <a:ext uri="{FF2B5EF4-FFF2-40B4-BE49-F238E27FC236}">
-                <a16:creationId xmlns:a16="http://schemas.microsoft.com/office/drawing/2014/main" id="{CF6E96EF-FF46-3F7F-20C5-FF12D3F4EFB4}"/>
+          <p:cNvPr id="5" name="Picture 4">
+            <a:extLst>
+              <a:ext uri="{FF2B5EF4-FFF2-40B4-BE49-F238E27FC236}">
+                <a16:creationId xmlns:a16="http://schemas.microsoft.com/office/drawing/2014/main" id="{5EFB312C-62DB-102C-B00C-9797C2B96A5C}"/>
               </a:ext>
             </a:extLst>
           </p:cNvPr>
@@ -9886,8 +9966,8 @@
         </p:blipFill>
         <p:spPr>
           <a:xfrm>
-            <a:off x="1667155" y="292681"/>
-            <a:ext cx="9200350" cy="6290999"/>
+            <a:off x="1673629" y="295101"/>
+            <a:ext cx="9315796" cy="6305204"/>
           </a:xfrm>
           <a:prstGeom prst="rect">
             <a:avLst/>
@@ -9899,7 +9979,7 @@
           <p:cNvPr id="2" name="Slide Number Placeholder 1">
             <a:extLst>
               <a:ext uri="{FF2B5EF4-FFF2-40B4-BE49-F238E27FC236}">
-                <a16:creationId xmlns:a16="http://schemas.microsoft.com/office/drawing/2014/main" id="{B021B3E3-3613-537B-F642-992B9FB18B2F}"/>
+                <a16:creationId xmlns:a16="http://schemas.microsoft.com/office/drawing/2014/main" id="{5A1E8557-B88E-36CE-2F6E-0BABB6851E91}"/>
               </a:ext>
             </a:extLst>
           </p:cNvPr>
@@ -9926,7 +10006,7 @@
     </p:spTree>
     <p:extLst>
       <p:ext uri="{BB962C8B-B14F-4D97-AF65-F5344CB8AC3E}">
-        <p14:creationId xmlns:p14="http://schemas.microsoft.com/office/powerpoint/2010/main" val="431513734"/>
+        <p14:creationId xmlns:p14="http://schemas.microsoft.com/office/powerpoint/2010/main" val="1349787492"/>
       </p:ext>
     </p:extLst>
   </p:cSld>
@@ -10087,6 +10167,95 @@
           <p:cNvPr id="3" name="Picture 2">
             <a:extLst>
               <a:ext uri="{FF2B5EF4-FFF2-40B4-BE49-F238E27FC236}">
+                <a16:creationId xmlns:a16="http://schemas.microsoft.com/office/drawing/2014/main" id="{CF6E96EF-FF46-3F7F-20C5-FF12D3F4EFB4}"/>
+              </a:ext>
+            </a:extLst>
+          </p:cNvPr>
+          <p:cNvPicPr>
+            <a:picLocks noChangeAspect="1"/>
+          </p:cNvPicPr>
+          <p:nvPr/>
+        </p:nvPicPr>
+        <p:blipFill>
+          <a:blip r:embed="rId2"/>
+          <a:stretch>
+            <a:fillRect/>
+          </a:stretch>
+        </p:blipFill>
+        <p:spPr>
+          <a:xfrm>
+            <a:off x="1667155" y="292681"/>
+            <a:ext cx="9200350" cy="6290999"/>
+          </a:xfrm>
+          <a:prstGeom prst="rect">
+            <a:avLst/>
+          </a:prstGeom>
+        </p:spPr>
+      </p:pic>
+      <p:sp>
+        <p:nvSpPr>
+          <p:cNvPr id="2" name="Slide Number Placeholder 1">
+            <a:extLst>
+              <a:ext uri="{FF2B5EF4-FFF2-40B4-BE49-F238E27FC236}">
+                <a16:creationId xmlns:a16="http://schemas.microsoft.com/office/drawing/2014/main" id="{B021B3E3-3613-537B-F642-992B9FB18B2F}"/>
+              </a:ext>
+            </a:extLst>
+          </p:cNvPr>
+          <p:cNvSpPr>
+            <a:spLocks noGrp="1"/>
+          </p:cNvSpPr>
+          <p:nvPr>
+            <p:ph type="sldNum" sz="quarter" idx="12"/>
+          </p:nvPr>
+        </p:nvSpPr>
+        <p:spPr/>
+        <p:txBody>
+          <a:bodyPr/>
+          <a:lstStyle/>
+          <a:p>
+            <a:fld id="{BD0DFC8E-D006-4B55-BBF2-7AB50F8F017C}" type="slidenum">
+              <a:rPr lang="en-US" smtClean="0"/>
+              <a:t>20</a:t>
+            </a:fld>
+            <a:endParaRPr lang="en-US"/>
+          </a:p>
+        </p:txBody>
+      </p:sp>
+    </p:spTree>
+    <p:extLst>
+      <p:ext uri="{BB962C8B-B14F-4D97-AF65-F5344CB8AC3E}">
+        <p14:creationId xmlns:p14="http://schemas.microsoft.com/office/powerpoint/2010/main" val="431513734"/>
+      </p:ext>
+    </p:extLst>
+  </p:cSld>
+  <p:clrMapOvr>
+    <a:masterClrMapping/>
+  </p:clrMapOvr>
+</p:sld>
+</file>
+
+<file path=ppt/slides/slide21.xml><?xml version="1.0" encoding="utf-8"?>
+<p:sld xmlns:a="http://schemas.openxmlformats.org/drawingml/2006/main" xmlns:r="http://schemas.openxmlformats.org/officeDocument/2006/relationships" xmlns:p="http://schemas.openxmlformats.org/presentationml/2006/main">
+  <p:cSld>
+    <p:spTree>
+      <p:nvGrpSpPr>
+        <p:cNvPr id="1" name=""/>
+        <p:cNvGrpSpPr/>
+        <p:nvPr/>
+      </p:nvGrpSpPr>
+      <p:grpSpPr>
+        <a:xfrm>
+          <a:off x="0" y="0"/>
+          <a:ext cx="0" cy="0"/>
+          <a:chOff x="0" y="0"/>
+          <a:chExt cx="0" cy="0"/>
+        </a:xfrm>
+      </p:grpSpPr>
+      <p:pic>
+        <p:nvPicPr>
+          <p:cNvPr id="3" name="Picture 2">
+            <a:extLst>
+              <a:ext uri="{FF2B5EF4-FFF2-40B4-BE49-F238E27FC236}">
                 <a16:creationId xmlns:a16="http://schemas.microsoft.com/office/drawing/2014/main" id="{99222D59-3A7D-6256-FE6A-2C73012C9B90}"/>
               </a:ext>
             </a:extLst>
@@ -10135,7 +10304,7 @@
           <a:p>
             <a:fld id="{BD0DFC8E-D006-4B55-BBF2-7AB50F8F017C}" type="slidenum">
               <a:rPr lang="en-US" smtClean="0"/>
-              <a:t>20</a:t>
+              <a:t>21</a:t>
             </a:fld>
             <a:endParaRPr lang="en-US"/>
           </a:p>

</xml_diff>

<commit_message>
design tweaks in PPT
</commit_message>
<xml_diff>
--- a/ProjPresentation.pptx
+++ b/ProjPresentation.pptx
@@ -7,7 +7,7 @@
     <p:sldMasterId id="2147483672" r:id="rId3"/>
   </p:sldMasterIdLst>
   <p:notesMasterIdLst>
-    <p:notesMasterId r:id="rId25"/>
+    <p:notesMasterId r:id="rId24"/>
   </p:notesMasterIdLst>
   <p:sldIdLst>
     <p:sldId id="266" r:id="rId4"/>
@@ -16,21 +16,20 @@
     <p:sldId id="268" r:id="rId7"/>
     <p:sldId id="282" r:id="rId8"/>
     <p:sldId id="269" r:id="rId9"/>
-    <p:sldId id="276" r:id="rId10"/>
-    <p:sldId id="281" r:id="rId11"/>
-    <p:sldId id="275" r:id="rId12"/>
-    <p:sldId id="288" r:id="rId13"/>
-    <p:sldId id="289" r:id="rId14"/>
-    <p:sldId id="290" r:id="rId15"/>
-    <p:sldId id="270" r:id="rId16"/>
-    <p:sldId id="292" r:id="rId17"/>
-    <p:sldId id="284" r:id="rId18"/>
-    <p:sldId id="285" r:id="rId19"/>
-    <p:sldId id="291" r:id="rId20"/>
-    <p:sldId id="271" r:id="rId21"/>
-    <p:sldId id="272" r:id="rId22"/>
-    <p:sldId id="273" r:id="rId23"/>
-    <p:sldId id="274" r:id="rId24"/>
+    <p:sldId id="281" r:id="rId10"/>
+    <p:sldId id="275" r:id="rId11"/>
+    <p:sldId id="288" r:id="rId12"/>
+    <p:sldId id="289" r:id="rId13"/>
+    <p:sldId id="290" r:id="rId14"/>
+    <p:sldId id="270" r:id="rId15"/>
+    <p:sldId id="292" r:id="rId16"/>
+    <p:sldId id="284" r:id="rId17"/>
+    <p:sldId id="285" r:id="rId18"/>
+    <p:sldId id="291" r:id="rId19"/>
+    <p:sldId id="271" r:id="rId20"/>
+    <p:sldId id="272" r:id="rId21"/>
+    <p:sldId id="273" r:id="rId22"/>
+    <p:sldId id="274" r:id="rId23"/>
   </p:sldIdLst>
   <p:sldSz cx="12192000" cy="6858000"/>
   <p:notesSz cx="6858000" cy="9144000"/>
@@ -140,7 +139,6 @@
             <p14:sldId id="268"/>
             <p14:sldId id="282"/>
             <p14:sldId id="269"/>
-            <p14:sldId id="276"/>
             <p14:sldId id="281"/>
             <p14:sldId id="275"/>
             <p14:sldId id="288"/>
@@ -271,7 +269,7 @@
           <a:p>
             <a:fld id="{18E5118F-6A56-44B4-8CD4-2559404DE2D8}" type="datetimeFigureOut">
               <a:rPr lang="en-US" smtClean="0"/>
-              <a:t>4/20/2024</a:t>
+              <a:t>4/21/2024</a:t>
             </a:fld>
             <a:endParaRPr lang="en-US"/>
           </a:p>
@@ -645,113 +643,6 @@
 </p:notes>
 </file>
 
-<file path=ppt/notesSlides/notesSlide10.xml><?xml version="1.0" encoding="utf-8"?>
-<p:notes xmlns:a="http://schemas.openxmlformats.org/drawingml/2006/main" xmlns:r="http://schemas.openxmlformats.org/officeDocument/2006/relationships" xmlns:p="http://schemas.openxmlformats.org/presentationml/2006/main">
-  <p:cSld>
-    <p:spTree>
-      <p:nvGrpSpPr>
-        <p:cNvPr id="1" name=""/>
-        <p:cNvGrpSpPr/>
-        <p:nvPr/>
-      </p:nvGrpSpPr>
-      <p:grpSpPr>
-        <a:xfrm>
-          <a:off x="0" y="0"/>
-          <a:ext cx="0" cy="0"/>
-          <a:chOff x="0" y="0"/>
-          <a:chExt cx="0" cy="0"/>
-        </a:xfrm>
-      </p:grpSpPr>
-      <p:sp>
-        <p:nvSpPr>
-          <p:cNvPr id="2" name="Slide Image Placeholder 1"/>
-          <p:cNvSpPr>
-            <a:spLocks noGrp="1" noRot="1" noChangeAspect="1"/>
-          </p:cNvSpPr>
-          <p:nvPr>
-            <p:ph type="sldImg"/>
-          </p:nvPr>
-        </p:nvSpPr>
-        <p:spPr/>
-      </p:sp>
-      <p:sp>
-        <p:nvSpPr>
-          <p:cNvPr id="3" name="Notes Placeholder 2"/>
-          <p:cNvSpPr>
-            <a:spLocks noGrp="1"/>
-          </p:cNvSpPr>
-          <p:nvPr>
-            <p:ph type="body" idx="1"/>
-          </p:nvPr>
-        </p:nvSpPr>
-        <p:spPr/>
-        <p:txBody>
-          <a:bodyPr/>
-          <a:lstStyle/>
-          <a:p>
-            <a:pPr marL="0" marR="0" lvl="0" indent="0" algn="l" defTabSz="914400" rtl="0" eaLnBrk="1" fontAlgn="auto" latinLnBrk="0" hangingPunct="1">
-              <a:lnSpc>
-                <a:spcPct val="100000"/>
-              </a:lnSpc>
-              <a:spcBef>
-                <a:spcPts val="0"/>
-              </a:spcBef>
-              <a:spcAft>
-                <a:spcPts val="0"/>
-              </a:spcAft>
-              <a:buClrTx/>
-              <a:buSzTx/>
-              <a:buFontTx/>
-              <a:buNone/>
-              <a:tabLst/>
-              <a:defRPr/>
-            </a:pPr>
-            <a:r>
-              <a:rPr lang="en-US" sz="1200" dirty="0"/>
-              <a:t>Aim: Stage V aimed at developing a simple interactive dashboard based on the analysis done so far.</a:t>
-            </a:r>
-          </a:p>
-          <a:p>
-            <a:endParaRPr lang="en-US" dirty="0"/>
-          </a:p>
-        </p:txBody>
-      </p:sp>
-      <p:sp>
-        <p:nvSpPr>
-          <p:cNvPr id="4" name="Slide Number Placeholder 3"/>
-          <p:cNvSpPr>
-            <a:spLocks noGrp="1"/>
-          </p:cNvSpPr>
-          <p:nvPr>
-            <p:ph type="sldNum" sz="quarter" idx="5"/>
-          </p:nvPr>
-        </p:nvSpPr>
-        <p:spPr/>
-        <p:txBody>
-          <a:bodyPr/>
-          <a:lstStyle/>
-          <a:p>
-            <a:fld id="{EC6F6E41-1F62-4E61-82DC-4FF03C9667B9}" type="slidenum">
-              <a:rPr lang="en-US" smtClean="0"/>
-              <a:t>18</a:t>
-            </a:fld>
-            <a:endParaRPr lang="en-US"/>
-          </a:p>
-        </p:txBody>
-      </p:sp>
-    </p:spTree>
-    <p:extLst>
-      <p:ext uri="{BB962C8B-B14F-4D97-AF65-F5344CB8AC3E}">
-        <p14:creationId xmlns:p14="http://schemas.microsoft.com/office/powerpoint/2010/main" val="3451712410"/>
-      </p:ext>
-    </p:extLst>
-  </p:cSld>
-  <p:clrMapOvr>
-    <a:masterClrMapping/>
-  </p:clrMapOvr>
-</p:notes>
-</file>
-
 <file path=ppt/notesSlides/notesSlide2.xml><?xml version="1.0" encoding="utf-8"?>
 <p:notes xmlns:a="http://schemas.openxmlformats.org/drawingml/2006/main" xmlns:r="http://schemas.openxmlformats.org/officeDocument/2006/relationships" xmlns:p="http://schemas.openxmlformats.org/presentationml/2006/main">
   <p:cSld>
@@ -1127,7 +1018,7 @@
     </p:spTree>
     <p:extLst>
       <p:ext uri="{BB962C8B-B14F-4D97-AF65-F5344CB8AC3E}">
-        <p14:creationId xmlns:p14="http://schemas.microsoft.com/office/powerpoint/2010/main" val="2035426889"/>
+        <p14:creationId xmlns:p14="http://schemas.microsoft.com/office/powerpoint/2010/main" val="3294284303"/>
       </p:ext>
     </p:extLst>
   </p:cSld>
@@ -1211,7 +1102,7 @@
     </p:spTree>
     <p:extLst>
       <p:ext uri="{BB962C8B-B14F-4D97-AF65-F5344CB8AC3E}">
-        <p14:creationId xmlns:p14="http://schemas.microsoft.com/office/powerpoint/2010/main" val="3294284303"/>
+        <p14:creationId xmlns:p14="http://schemas.microsoft.com/office/powerpoint/2010/main" val="3900447505"/>
       </p:ext>
     </p:extLst>
   </p:cSld>
@@ -1286,7 +1177,7 @@
           <a:p>
             <a:fld id="{EC6F6E41-1F62-4E61-82DC-4FF03C9667B9}" type="slidenum">
               <a:rPr lang="en-US" smtClean="0"/>
-              <a:t>9</a:t>
+              <a:t>11</a:t>
             </a:fld>
             <a:endParaRPr lang="en-US"/>
           </a:p>
@@ -1295,7 +1186,7 @@
     </p:spTree>
     <p:extLst>
       <p:ext uri="{BB962C8B-B14F-4D97-AF65-F5344CB8AC3E}">
-        <p14:creationId xmlns:p14="http://schemas.microsoft.com/office/powerpoint/2010/main" val="3900447505"/>
+        <p14:creationId xmlns:p14="http://schemas.microsoft.com/office/powerpoint/2010/main" val="379766082"/>
       </p:ext>
     </p:extLst>
   </p:cSld>
@@ -1349,6 +1240,37 @@
           <a:bodyPr/>
           <a:lstStyle/>
           <a:p>
+            <a:pPr marL="0" marR="0" lvl="0" indent="0" algn="l" defTabSz="914400" rtl="0" eaLnBrk="1" fontAlgn="auto" latinLnBrk="0" hangingPunct="1">
+              <a:lnSpc>
+                <a:spcPct val="100000"/>
+              </a:lnSpc>
+              <a:spcBef>
+                <a:spcPts val="0"/>
+              </a:spcBef>
+              <a:spcAft>
+                <a:spcPts val="0"/>
+              </a:spcAft>
+              <a:buClrTx/>
+              <a:buSzTx/>
+              <a:buFontTx/>
+              <a:buNone/>
+              <a:tabLst/>
+              <a:defRPr/>
+            </a:pPr>
+            <a:r>
+              <a:rPr lang="en-US" sz="1200" dirty="0"/>
+              <a:t>Aim: The goal of Stage IV was to </a:t>
+            </a:r>
+            <a:r>
+              <a:rPr lang="en-US" sz="1200" dirty="0" err="1"/>
+              <a:t>utlize</a:t>
+            </a:r>
+            <a:r>
+              <a:rPr lang="en-US" sz="1200" dirty="0"/>
+              <a:t> machine learning and statistical models to predict the trend of COVID-19 cases / deaths.</a:t>
+            </a:r>
+          </a:p>
+          <a:p>
             <a:endParaRPr lang="en-US" dirty="0"/>
           </a:p>
         </p:txBody>
@@ -1379,7 +1301,7 @@
     </p:spTree>
     <p:extLst>
       <p:ext uri="{BB962C8B-B14F-4D97-AF65-F5344CB8AC3E}">
-        <p14:creationId xmlns:p14="http://schemas.microsoft.com/office/powerpoint/2010/main" val="379766082"/>
+        <p14:creationId xmlns:p14="http://schemas.microsoft.com/office/powerpoint/2010/main" val="3195875454"/>
       </p:ext>
     </p:extLst>
   </p:cSld>
@@ -1452,15 +1374,7 @@
             </a:pPr>
             <a:r>
               <a:rPr lang="en-US" sz="1200" dirty="0"/>
-              <a:t>Aim: The goal of Stage IV was to </a:t>
-            </a:r>
-            <a:r>
-              <a:rPr lang="en-US" sz="1200" dirty="0" err="1"/>
-              <a:t>utlize</a:t>
-            </a:r>
-            <a:r>
-              <a:rPr lang="en-US" sz="1200" dirty="0"/>
-              <a:t> machine learning and statistical models to predict the trend of COVID-19 cases / deaths.</a:t>
+              <a:t>Aim: Stage V aimed at developing a simple interactive dashboard based on the analysis done so far.</a:t>
             </a:r>
           </a:p>
           <a:p>
@@ -1485,7 +1399,7 @@
           <a:p>
             <a:fld id="{EC6F6E41-1F62-4E61-82DC-4FF03C9667B9}" type="slidenum">
               <a:rPr lang="en-US" smtClean="0"/>
-              <a:t>13</a:t>
+              <a:t>17</a:t>
             </a:fld>
             <a:endParaRPr lang="en-US"/>
           </a:p>
@@ -1494,7 +1408,7 @@
     </p:spTree>
     <p:extLst>
       <p:ext uri="{BB962C8B-B14F-4D97-AF65-F5344CB8AC3E}">
-        <p14:creationId xmlns:p14="http://schemas.microsoft.com/office/powerpoint/2010/main" val="3195875454"/>
+        <p14:creationId xmlns:p14="http://schemas.microsoft.com/office/powerpoint/2010/main" val="3451712410"/>
       </p:ext>
     </p:extLst>
   </p:cSld>
@@ -7986,7 +7900,7 @@
           <p:cNvPr id="2" name="Title 1">
             <a:extLst>
               <a:ext uri="{FF2B5EF4-FFF2-40B4-BE49-F238E27FC236}">
-                <a16:creationId xmlns:a16="http://schemas.microsoft.com/office/drawing/2014/main" id="{1266D3D0-145B-C09E-1869-AC96D4B3F0C1}"/>
+                <a16:creationId xmlns:a16="http://schemas.microsoft.com/office/drawing/2014/main" id="{691F7F71-9C50-5CE8-1E0A-137DA1B5A270}"/>
               </a:ext>
             </a:extLst>
           </p:cNvPr>
@@ -8004,114 +7918,8 @@
           <a:p>
             <a:r>
               <a:rPr lang="en-US" dirty="0"/>
-              <a:t>Housing - Kevin Hayes</a:t>
-            </a:r>
-          </a:p>
-        </p:txBody>
-      </p:sp>
-      <p:sp>
-        <p:nvSpPr>
-          <p:cNvPr id="3" name="Content Placeholder 2">
-            <a:extLst>
-              <a:ext uri="{FF2B5EF4-FFF2-40B4-BE49-F238E27FC236}">
-                <a16:creationId xmlns:a16="http://schemas.microsoft.com/office/drawing/2014/main" id="{56F64E25-C795-B257-2E57-46F801568744}"/>
-              </a:ext>
-            </a:extLst>
-          </p:cNvPr>
-          <p:cNvSpPr>
-            <a:spLocks noGrp="1"/>
-          </p:cNvSpPr>
-          <p:nvPr>
-            <p:ph idx="1"/>
-          </p:nvPr>
-        </p:nvSpPr>
-        <p:spPr>
-          <a:xfrm>
-            <a:off x="838200" y="4453591"/>
-            <a:ext cx="10515600" cy="1723372"/>
-          </a:xfrm>
-        </p:spPr>
-        <p:txBody>
-          <a:bodyPr>
-            <a:normAutofit fontScale="70000" lnSpcReduction="20000"/>
-          </a:bodyPr>
-          <a:lstStyle/>
-          <a:p>
-            <a:r>
-              <a:rPr lang="en-US" b="0" i="0" dirty="0">
-                <a:effectLst/>
-                <a:highlight>
-                  <a:srgbClr val="FFFFFF"/>
-                </a:highlight>
-                <a:latin typeface="system-ui"/>
-              </a:rPr>
-              <a:t>Does having a higher total population of </a:t>
-            </a:r>
-            <a:r>
-              <a:rPr lang="en-US" b="0" i="0" dirty="0" err="1">
-                <a:effectLst/>
-                <a:highlight>
-                  <a:srgbClr val="FFFFFF"/>
-                </a:highlight>
-                <a:latin typeface="system-ui"/>
-              </a:rPr>
-              <a:t>hispanic</a:t>
-            </a:r>
-            <a:r>
-              <a:rPr lang="en-US" b="0" i="0" dirty="0">
-                <a:effectLst/>
-                <a:highlight>
-                  <a:srgbClr val="FFFFFF"/>
-                </a:highlight>
-                <a:latin typeface="system-ui"/>
-              </a:rPr>
-              <a:t> or </a:t>
-            </a:r>
-            <a:r>
-              <a:rPr lang="en-US" b="0" i="0" dirty="0" err="1">
-                <a:effectLst/>
-                <a:highlight>
-                  <a:srgbClr val="FFFFFF"/>
-                </a:highlight>
-                <a:latin typeface="system-ui"/>
-              </a:rPr>
-              <a:t>latino</a:t>
-            </a:r>
-            <a:r>
-              <a:rPr lang="en-US" b="0" i="0" dirty="0">
-                <a:effectLst/>
-                <a:highlight>
-                  <a:srgbClr val="FFFFFF"/>
-                </a:highlight>
-                <a:latin typeface="system-ui"/>
-              </a:rPr>
-              <a:t> people of any race in a given state lead to more covid-19 infections for that state? (Label: DP05_0073E)</a:t>
-            </a:r>
-          </a:p>
-          <a:p>
-            <a:r>
-              <a:rPr lang="en-US" b="0" i="0" dirty="0">
-                <a:effectLst/>
-                <a:highlight>
-                  <a:srgbClr val="FFFFFF"/>
-                </a:highlight>
-                <a:latin typeface="system-ui"/>
-              </a:rPr>
-              <a:t>Does having more people of 35 to 44 years of age in a given state lead to fewer covid-19 infections for that state? (Label: DP05_0011E)</a:t>
-            </a:r>
-          </a:p>
-          <a:p>
-            <a:r>
-              <a:rPr lang="en-US" b="0" i="0" dirty="0">
-                <a:effectLst/>
-                <a:highlight>
-                  <a:srgbClr val="FFFFFF"/>
-                </a:highlight>
-                <a:latin typeface="system-ui"/>
-              </a:rPr>
-              <a:t>Does having more people aged 60 to 64 in a given state lead to more covid-19 cases for that state? (Label : DP05_0014E)</a:t>
-            </a:r>
-            <a:endParaRPr lang="en-US" dirty="0"/>
+              <a:t>Presidential – Neetha Ravva</a:t>
+            </a:r>
           </a:p>
         </p:txBody>
       </p:sp>
@@ -8120,7 +7928,7 @@
           <p:cNvPr id="4" name="Slide Number Placeholder 3">
             <a:extLst>
               <a:ext uri="{FF2B5EF4-FFF2-40B4-BE49-F238E27FC236}">
-                <a16:creationId xmlns:a16="http://schemas.microsoft.com/office/drawing/2014/main" id="{14810756-614E-B658-4A79-F41E3A7D2FFC}"/>
+                <a16:creationId xmlns:a16="http://schemas.microsoft.com/office/drawing/2014/main" id="{A3D34BE9-B2E4-7087-1E93-3C2B9595A316}"/>
               </a:ext>
             </a:extLst>
           </p:cNvPr>
@@ -8139,187 +7947,6 @@
             <a:fld id="{BD0DFC8E-D006-4B55-BBF2-7AB50F8F017C}" type="slidenum">
               <a:rPr lang="en-US" smtClean="0"/>
               <a:t>10</a:t>
-            </a:fld>
-            <a:endParaRPr lang="en-US"/>
-          </a:p>
-        </p:txBody>
-      </p:sp>
-      <p:pic>
-        <p:nvPicPr>
-          <p:cNvPr id="5" name="Picture 2">
-            <a:extLst>
-              <a:ext uri="{FF2B5EF4-FFF2-40B4-BE49-F238E27FC236}">
-                <a16:creationId xmlns:a16="http://schemas.microsoft.com/office/drawing/2014/main" id="{D7E59CE7-EF02-74DF-A6F3-C6EC91925E1C}"/>
-              </a:ext>
-            </a:extLst>
-          </p:cNvPr>
-          <p:cNvPicPr>
-            <a:picLocks noChangeAspect="1" noChangeArrowheads="1"/>
-          </p:cNvPicPr>
-          <p:nvPr/>
-        </p:nvPicPr>
-        <p:blipFill>
-          <a:blip r:embed="rId2">
-            <a:extLst>
-              <a:ext uri="{28A0092B-C50C-407E-A947-70E740481C1C}">
-                <a14:useLocalDpi xmlns:a14="http://schemas.microsoft.com/office/drawing/2010/main" val="0"/>
-              </a:ext>
-            </a:extLst>
-          </a:blip>
-          <a:srcRect/>
-          <a:stretch>
-            <a:fillRect/>
-          </a:stretch>
-        </p:blipFill>
-        <p:spPr bwMode="auto">
-          <a:xfrm>
-            <a:off x="1742769" y="1825626"/>
-            <a:ext cx="3075038" cy="2493027"/>
-          </a:xfrm>
-          <a:prstGeom prst="rect">
-            <a:avLst/>
-          </a:prstGeom>
-          <a:noFill/>
-          <a:extLst>
-            <a:ext uri="{909E8E84-426E-40DD-AFC4-6F175D3DCCD1}">
-              <a14:hiddenFill xmlns:a14="http://schemas.microsoft.com/office/drawing/2010/main">
-                <a:solidFill>
-                  <a:srgbClr val="FFFFFF"/>
-                </a:solidFill>
-              </a14:hiddenFill>
-            </a:ext>
-          </a:extLst>
-        </p:spPr>
-      </p:pic>
-      <p:pic>
-        <p:nvPicPr>
-          <p:cNvPr id="6" name="Picture 4">
-            <a:extLst>
-              <a:ext uri="{FF2B5EF4-FFF2-40B4-BE49-F238E27FC236}">
-                <a16:creationId xmlns:a16="http://schemas.microsoft.com/office/drawing/2014/main" id="{1F06D0C8-633D-4F2F-FDC1-780320C291B9}"/>
-              </a:ext>
-            </a:extLst>
-          </p:cNvPr>
-          <p:cNvPicPr>
-            <a:picLocks noChangeAspect="1" noChangeArrowheads="1"/>
-          </p:cNvPicPr>
-          <p:nvPr/>
-        </p:nvPicPr>
-        <p:blipFill>
-          <a:blip r:embed="rId3">
-            <a:extLst>
-              <a:ext uri="{28A0092B-C50C-407E-A947-70E740481C1C}">
-                <a14:useLocalDpi xmlns:a14="http://schemas.microsoft.com/office/drawing/2010/main" val="0"/>
-              </a:ext>
-            </a:extLst>
-          </a:blip>
-          <a:srcRect/>
-          <a:stretch>
-            <a:fillRect/>
-          </a:stretch>
-        </p:blipFill>
-        <p:spPr bwMode="auto">
-          <a:xfrm>
-            <a:off x="5046561" y="1825626"/>
-            <a:ext cx="3229873" cy="2498402"/>
-          </a:xfrm>
-          <a:prstGeom prst="rect">
-            <a:avLst/>
-          </a:prstGeom>
-          <a:noFill/>
-          <a:extLst>
-            <a:ext uri="{909E8E84-426E-40DD-AFC4-6F175D3DCCD1}">
-              <a14:hiddenFill xmlns:a14="http://schemas.microsoft.com/office/drawing/2010/main">
-                <a:solidFill>
-                  <a:srgbClr val="FFFFFF"/>
-                </a:solidFill>
-              </a14:hiddenFill>
-            </a:ext>
-          </a:extLst>
-        </p:spPr>
-      </p:pic>
-    </p:spTree>
-    <p:extLst>
-      <p:ext uri="{BB962C8B-B14F-4D97-AF65-F5344CB8AC3E}">
-        <p14:creationId xmlns:p14="http://schemas.microsoft.com/office/powerpoint/2010/main" val="1244231696"/>
-      </p:ext>
-    </p:extLst>
-  </p:cSld>
-  <p:clrMapOvr>
-    <a:masterClrMapping/>
-  </p:clrMapOvr>
-</p:sld>
-</file>
-
-<file path=ppt/slides/slide11.xml><?xml version="1.0" encoding="utf-8"?>
-<p:sld xmlns:a="http://schemas.openxmlformats.org/drawingml/2006/main" xmlns:r="http://schemas.openxmlformats.org/officeDocument/2006/relationships" xmlns:p="http://schemas.openxmlformats.org/presentationml/2006/main">
-  <p:cSld>
-    <p:spTree>
-      <p:nvGrpSpPr>
-        <p:cNvPr id="1" name=""/>
-        <p:cNvGrpSpPr/>
-        <p:nvPr/>
-      </p:nvGrpSpPr>
-      <p:grpSpPr>
-        <a:xfrm>
-          <a:off x="0" y="0"/>
-          <a:ext cx="0" cy="0"/>
-          <a:chOff x="0" y="0"/>
-          <a:chExt cx="0" cy="0"/>
-        </a:xfrm>
-      </p:grpSpPr>
-      <p:sp>
-        <p:nvSpPr>
-          <p:cNvPr id="2" name="Title 1">
-            <a:extLst>
-              <a:ext uri="{FF2B5EF4-FFF2-40B4-BE49-F238E27FC236}">
-                <a16:creationId xmlns:a16="http://schemas.microsoft.com/office/drawing/2014/main" id="{691F7F71-9C50-5CE8-1E0A-137DA1B5A270}"/>
-              </a:ext>
-            </a:extLst>
-          </p:cNvPr>
-          <p:cNvSpPr>
-            <a:spLocks noGrp="1"/>
-          </p:cNvSpPr>
-          <p:nvPr>
-            <p:ph type="title"/>
-          </p:nvPr>
-        </p:nvSpPr>
-        <p:spPr/>
-        <p:txBody>
-          <a:bodyPr/>
-          <a:lstStyle/>
-          <a:p>
-            <a:r>
-              <a:rPr lang="en-US" dirty="0"/>
-              <a:t>Presidential – Neetha Ravva</a:t>
-            </a:r>
-          </a:p>
-        </p:txBody>
-      </p:sp>
-      <p:sp>
-        <p:nvSpPr>
-          <p:cNvPr id="4" name="Slide Number Placeholder 3">
-            <a:extLst>
-              <a:ext uri="{FF2B5EF4-FFF2-40B4-BE49-F238E27FC236}">
-                <a16:creationId xmlns:a16="http://schemas.microsoft.com/office/drawing/2014/main" id="{A3D34BE9-B2E4-7087-1E93-3C2B9595A316}"/>
-              </a:ext>
-            </a:extLst>
-          </p:cNvPr>
-          <p:cNvSpPr>
-            <a:spLocks noGrp="1"/>
-          </p:cNvSpPr>
-          <p:nvPr>
-            <p:ph type="sldNum" sz="quarter" idx="12"/>
-          </p:nvPr>
-        </p:nvSpPr>
-        <p:spPr/>
-        <p:txBody>
-          <a:bodyPr/>
-          <a:lstStyle/>
-          <a:p>
-            <a:fld id="{BD0DFC8E-D006-4B55-BBF2-7AB50F8F017C}" type="slidenum">
-              <a:rPr lang="en-US" smtClean="0"/>
-              <a:t>11</a:t>
             </a:fld>
             <a:endParaRPr lang="en-US"/>
           </a:p>
@@ -8481,6 +8108,273 @@
 </p:sld>
 </file>
 
+<file path=ppt/slides/slide11.xml><?xml version="1.0" encoding="utf-8"?>
+<p:sld xmlns:a="http://schemas.openxmlformats.org/drawingml/2006/main" xmlns:r="http://schemas.openxmlformats.org/officeDocument/2006/relationships" xmlns:p="http://schemas.openxmlformats.org/presentationml/2006/main">
+  <p:cSld>
+    <p:spTree>
+      <p:nvGrpSpPr>
+        <p:cNvPr id="1" name=""/>
+        <p:cNvGrpSpPr/>
+        <p:nvPr/>
+      </p:nvGrpSpPr>
+      <p:grpSpPr>
+        <a:xfrm>
+          <a:off x="0" y="0"/>
+          <a:ext cx="0" cy="0"/>
+          <a:chOff x="0" y="0"/>
+          <a:chExt cx="0" cy="0"/>
+        </a:xfrm>
+      </p:grpSpPr>
+      <p:sp>
+        <p:nvSpPr>
+          <p:cNvPr id="2" name="Title 1">
+            <a:extLst>
+              <a:ext uri="{FF2B5EF4-FFF2-40B4-BE49-F238E27FC236}">
+                <a16:creationId xmlns:a16="http://schemas.microsoft.com/office/drawing/2014/main" id="{D29B31B8-3B08-955E-ABDE-D7BA45C439D7}"/>
+              </a:ext>
+            </a:extLst>
+          </p:cNvPr>
+          <p:cNvSpPr>
+            <a:spLocks noGrp="1"/>
+          </p:cNvSpPr>
+          <p:nvPr>
+            <p:ph type="title"/>
+          </p:nvPr>
+        </p:nvSpPr>
+        <p:spPr/>
+        <p:txBody>
+          <a:bodyPr/>
+          <a:lstStyle/>
+          <a:p>
+            <a:r>
+              <a:rPr lang="en-US" dirty="0"/>
+              <a:t>Hypothesis</a:t>
+            </a:r>
+          </a:p>
+        </p:txBody>
+      </p:sp>
+      <p:sp>
+        <p:nvSpPr>
+          <p:cNvPr id="3" name="Content Placeholder 2">
+            <a:extLst>
+              <a:ext uri="{FF2B5EF4-FFF2-40B4-BE49-F238E27FC236}">
+                <a16:creationId xmlns:a16="http://schemas.microsoft.com/office/drawing/2014/main" id="{D0983B0A-1A58-76AD-78A3-77E268FBF7F9}"/>
+              </a:ext>
+            </a:extLst>
+          </p:cNvPr>
+          <p:cNvSpPr>
+            <a:spLocks noGrp="1"/>
+          </p:cNvSpPr>
+          <p:nvPr>
+            <p:ph idx="1"/>
+          </p:nvPr>
+        </p:nvSpPr>
+        <p:spPr>
+          <a:xfrm>
+            <a:off x="838200" y="1690688"/>
+            <a:ext cx="10515600" cy="4486275"/>
+          </a:xfrm>
+        </p:spPr>
+        <p:txBody>
+          <a:bodyPr>
+            <a:normAutofit/>
+          </a:bodyPr>
+          <a:lstStyle/>
+          <a:p>
+            <a:pPr algn="l"/>
+            <a:r>
+              <a:rPr lang="en-US" sz="2400" b="1" i="0" dirty="0">
+                <a:solidFill>
+                  <a:srgbClr val="212121"/>
+                </a:solidFill>
+                <a:effectLst/>
+                <a:latin typeface="+mn-lt"/>
+              </a:rPr>
+              <a:t>Hypothesis</a:t>
+            </a:r>
+            <a:r>
+              <a:rPr lang="en-US" sz="2300" b="1" i="0" dirty="0">
+                <a:solidFill>
+                  <a:srgbClr val="212121"/>
+                </a:solidFill>
+                <a:effectLst/>
+                <a:latin typeface="+mn-lt"/>
+              </a:rPr>
+              <a:t> 1: Political Party Affiliation and COVID-19 Case Counts</a:t>
+            </a:r>
+            <a:r>
+              <a:rPr lang="en-US" sz="2300" b="0" i="0" dirty="0">
+                <a:solidFill>
+                  <a:srgbClr val="212121"/>
+                </a:solidFill>
+                <a:effectLst/>
+                <a:latin typeface="+mn-lt"/>
+              </a:rPr>
+              <a:t> </a:t>
+            </a:r>
+          </a:p>
+          <a:p>
+            <a:pPr lvl="1"/>
+            <a:r>
+              <a:rPr lang="en-US" sz="2200" b="0" i="0" dirty="0">
+                <a:solidFill>
+                  <a:srgbClr val="212121"/>
+                </a:solidFill>
+                <a:effectLst/>
+                <a:latin typeface="+mn-lt"/>
+              </a:rPr>
+              <a:t>There is a significant correlation between the political party of the winning candidate in a state and the total number of COVID-19 cases reported in that state.</a:t>
+            </a:r>
+          </a:p>
+          <a:p>
+            <a:pPr lvl="1"/>
+            <a:endParaRPr lang="en-US" sz="1200" b="0" i="0" dirty="0">
+              <a:solidFill>
+                <a:srgbClr val="212121"/>
+              </a:solidFill>
+              <a:effectLst/>
+              <a:latin typeface="+mn-lt"/>
+            </a:endParaRPr>
+          </a:p>
+          <a:p>
+            <a:pPr algn="l"/>
+            <a:r>
+              <a:rPr lang="en-US" sz="2400" b="1" i="0" dirty="0">
+                <a:solidFill>
+                  <a:srgbClr val="212121"/>
+                </a:solidFill>
+                <a:effectLst/>
+                <a:latin typeface="+mn-lt"/>
+              </a:rPr>
+              <a:t>Hypothesis</a:t>
+            </a:r>
+            <a:r>
+              <a:rPr lang="en-US" sz="2300" b="1" i="0" dirty="0">
+                <a:solidFill>
+                  <a:srgbClr val="212121"/>
+                </a:solidFill>
+                <a:effectLst/>
+                <a:latin typeface="+mn-lt"/>
+              </a:rPr>
+              <a:t> 2: Voter Turnout and COVID-19 Case Counts</a:t>
+            </a:r>
+            <a:r>
+              <a:rPr lang="en-US" sz="2300" b="0" i="0" dirty="0">
+                <a:solidFill>
+                  <a:srgbClr val="212121"/>
+                </a:solidFill>
+                <a:effectLst/>
+                <a:latin typeface="+mn-lt"/>
+              </a:rPr>
+              <a:t> </a:t>
+            </a:r>
+          </a:p>
+          <a:p>
+            <a:pPr lvl="1"/>
+            <a:r>
+              <a:rPr lang="en-US" sz="2200" b="0" i="0" dirty="0">
+                <a:solidFill>
+                  <a:srgbClr val="212121"/>
+                </a:solidFill>
+                <a:effectLst/>
+                <a:latin typeface="+mn-lt"/>
+              </a:rPr>
+              <a:t>There is a significant relationship between voter turnout in a state and the total number of COVID-19 cases reported in that state.</a:t>
+            </a:r>
+          </a:p>
+          <a:p>
+            <a:pPr lvl="1"/>
+            <a:endParaRPr lang="en-US" sz="1200" b="0" i="0" dirty="0">
+              <a:solidFill>
+                <a:srgbClr val="212121"/>
+              </a:solidFill>
+              <a:effectLst/>
+              <a:latin typeface="+mn-lt"/>
+            </a:endParaRPr>
+          </a:p>
+          <a:p>
+            <a:pPr algn="l"/>
+            <a:r>
+              <a:rPr lang="en-US" sz="2300" b="1" i="0" dirty="0">
+                <a:solidFill>
+                  <a:srgbClr val="212121"/>
+                </a:solidFill>
+                <a:effectLst/>
+                <a:latin typeface="+mn-lt"/>
+              </a:rPr>
+              <a:t>Hypothesis 3: Population Size and COVID-19 Case Counts</a:t>
+            </a:r>
+            <a:r>
+              <a:rPr lang="en-US" sz="2300" b="0" i="0" dirty="0">
+                <a:solidFill>
+                  <a:srgbClr val="212121"/>
+                </a:solidFill>
+                <a:effectLst/>
+                <a:latin typeface="+mn-lt"/>
+              </a:rPr>
+              <a:t> </a:t>
+            </a:r>
+          </a:p>
+          <a:p>
+            <a:pPr lvl="1"/>
+            <a:r>
+              <a:rPr lang="en-US" sz="2200" b="0" i="0" dirty="0">
+                <a:solidFill>
+                  <a:srgbClr val="212121"/>
+                </a:solidFill>
+                <a:effectLst/>
+                <a:latin typeface="+mn-lt"/>
+              </a:rPr>
+              <a:t>There is a significant correlation between the population size of a state and the total number of COVID-19 cases reported in that state.</a:t>
+            </a:r>
+          </a:p>
+          <a:p>
+            <a:endParaRPr lang="en-US" dirty="0"/>
+          </a:p>
+        </p:txBody>
+      </p:sp>
+      <p:sp>
+        <p:nvSpPr>
+          <p:cNvPr id="4" name="Slide Number Placeholder 3">
+            <a:extLst>
+              <a:ext uri="{FF2B5EF4-FFF2-40B4-BE49-F238E27FC236}">
+                <a16:creationId xmlns:a16="http://schemas.microsoft.com/office/drawing/2014/main" id="{39D51366-FCF2-2141-302D-90F62FCEBB46}"/>
+              </a:ext>
+            </a:extLst>
+          </p:cNvPr>
+          <p:cNvSpPr>
+            <a:spLocks noGrp="1"/>
+          </p:cNvSpPr>
+          <p:nvPr>
+            <p:ph type="sldNum" sz="quarter" idx="12"/>
+          </p:nvPr>
+        </p:nvSpPr>
+        <p:spPr/>
+        <p:txBody>
+          <a:bodyPr/>
+          <a:lstStyle/>
+          <a:p>
+            <a:fld id="{BD0DFC8E-D006-4B55-BBF2-7AB50F8F017C}" type="slidenum">
+              <a:rPr lang="en-US" smtClean="0"/>
+              <a:t>11</a:t>
+            </a:fld>
+            <a:endParaRPr lang="en-US" dirty="0"/>
+          </a:p>
+        </p:txBody>
+      </p:sp>
+    </p:spTree>
+    <p:extLst>
+      <p:ext uri="{BB962C8B-B14F-4D97-AF65-F5344CB8AC3E}">
+        <p14:creationId xmlns:p14="http://schemas.microsoft.com/office/powerpoint/2010/main" val="1972063367"/>
+      </p:ext>
+    </p:extLst>
+  </p:cSld>
+  <p:clrMapOvr>
+    <a:masterClrMapping/>
+  </p:clrMapOvr>
+</p:sld>
+</file>
+
 <file path=ppt/slides/slide12.xml><?xml version="1.0" encoding="utf-8"?>
 <p:sld xmlns:a="http://schemas.openxmlformats.org/drawingml/2006/main" xmlns:r="http://schemas.openxmlformats.org/officeDocument/2006/relationships" xmlns:p="http://schemas.openxmlformats.org/presentationml/2006/main">
   <p:cSld>
@@ -8503,7 +8397,7 @@
           <p:cNvPr id="2" name="Title 1">
             <a:extLst>
               <a:ext uri="{FF2B5EF4-FFF2-40B4-BE49-F238E27FC236}">
-                <a16:creationId xmlns:a16="http://schemas.microsoft.com/office/drawing/2014/main" id="{D29B31B8-3B08-955E-ABDE-D7BA45C439D7}"/>
+                <a16:creationId xmlns:a16="http://schemas.microsoft.com/office/drawing/2014/main" id="{5B4A204C-CA1B-E276-A3AB-85B6A9BF2520}"/>
               </a:ext>
             </a:extLst>
           </p:cNvPr>
@@ -8512,166 +8406,78 @@
           </p:cNvSpPr>
           <p:nvPr>
             <p:ph type="title"/>
-          </p:nvPr>
-        </p:nvSpPr>
-        <p:spPr/>
-        <p:txBody>
-          <a:bodyPr/>
-          <a:lstStyle/>
-          <a:p>
-            <a:r>
-              <a:rPr lang="en-US" dirty="0"/>
-              <a:t>Hypothesis</a:t>
-            </a:r>
-          </a:p>
-        </p:txBody>
-      </p:sp>
-      <p:sp>
-        <p:nvSpPr>
-          <p:cNvPr id="3" name="Content Placeholder 2">
-            <a:extLst>
-              <a:ext uri="{FF2B5EF4-FFF2-40B4-BE49-F238E27FC236}">
-                <a16:creationId xmlns:a16="http://schemas.microsoft.com/office/drawing/2014/main" id="{D0983B0A-1A58-76AD-78A3-77E268FBF7F9}"/>
-              </a:ext>
-            </a:extLst>
-          </p:cNvPr>
-          <p:cNvSpPr>
-            <a:spLocks noGrp="1"/>
-          </p:cNvSpPr>
-          <p:nvPr>
-            <p:ph idx="1"/>
           </p:nvPr>
         </p:nvSpPr>
         <p:spPr>
           <a:xfrm>
-            <a:off x="838200" y="1516828"/>
-            <a:ext cx="10515600" cy="4660135"/>
+            <a:off x="838200" y="2949921"/>
+            <a:ext cx="10515600" cy="958158"/>
           </a:xfrm>
         </p:spPr>
         <p:txBody>
+          <a:bodyPr/>
+          <a:lstStyle/>
+          <a:p>
+            <a:pPr algn="ctr"/>
+            <a:r>
+              <a:rPr lang="en-US" dirty="0"/>
+              <a:t>Stage 4: Machine Learning</a:t>
+            </a:r>
+          </a:p>
+        </p:txBody>
+      </p:sp>
+      <p:sp>
+        <p:nvSpPr>
+          <p:cNvPr id="3" name="Content Placeholder 2">
+            <a:extLst>
+              <a:ext uri="{FF2B5EF4-FFF2-40B4-BE49-F238E27FC236}">
+                <a16:creationId xmlns:a16="http://schemas.microsoft.com/office/drawing/2014/main" id="{56B899B6-989A-2B85-C3EB-8DF90F90622A}"/>
+              </a:ext>
+            </a:extLst>
+          </p:cNvPr>
+          <p:cNvSpPr>
+            <a:spLocks noGrp="1"/>
+          </p:cNvSpPr>
+          <p:nvPr>
+            <p:ph type="body" idx="1"/>
+          </p:nvPr>
+        </p:nvSpPr>
+        <p:spPr>
+          <a:xfrm>
+            <a:off x="838200" y="4040823"/>
+            <a:ext cx="10515600" cy="1500187"/>
+          </a:xfrm>
+        </p:spPr>
+        <p:txBody>
           <a:bodyPr>
-            <a:normAutofit fontScale="92500" lnSpcReduction="20000"/>
+            <a:normAutofit lnSpcReduction="10000"/>
           </a:bodyPr>
           <a:lstStyle/>
           <a:p>
-            <a:pPr algn="l"/>
-            <a:r>
-              <a:rPr lang="en-US" sz="2300" b="1" i="0" dirty="0">
-                <a:solidFill>
-                  <a:srgbClr val="212121"/>
-                </a:solidFill>
-                <a:effectLst/>
-                <a:latin typeface="+mn-lt"/>
+            <a:pPr algn="ctr"/>
+            <a:r>
+              <a:rPr lang="en-US" dirty="0"/>
+              <a:t>Regression models (linear, polynomial), machine learning, predictions on COVID-19 cases/deaths</a:t>
+            </a:r>
+          </a:p>
+          <a:p>
+            <a:r>
+              <a:rPr lang="en-US" dirty="0">
+                <a:highlight>
+                  <a:srgbClr val="FFFF00"/>
+                </a:highlight>
               </a:rPr>
-              <a:t>Hypothesis 1: Political Party Affiliation and COVID-19 Case Counts</a:t>
-            </a:r>
-            <a:r>
-              <a:rPr lang="en-US" sz="2300" b="0" i="0" dirty="0">
-                <a:solidFill>
-                  <a:srgbClr val="212121"/>
-                </a:solidFill>
-                <a:effectLst/>
-                <a:latin typeface="+mn-lt"/>
-              </a:rPr>
-              <a:t> Null Hypothesis (H0): There is no significant correlation between the political party of the winning candidate in a state and the total number of COVID-19 cases reported in that state.</a:t>
-            </a:r>
-          </a:p>
-          <a:p>
-            <a:pPr algn="l"/>
-            <a:r>
-              <a:rPr lang="en-US" sz="2300" b="0" i="0" dirty="0">
-                <a:solidFill>
-                  <a:srgbClr val="212121"/>
-                </a:solidFill>
-                <a:effectLst/>
-                <a:latin typeface="+mn-lt"/>
-              </a:rPr>
-              <a:t>Alternative Hypothesis (H1): There is a significant correlation between the political party of the winning candidate in a state and the total number of COVID-19 cases reported in that state.</a:t>
-            </a:r>
-          </a:p>
-          <a:p>
-            <a:pPr algn="l"/>
-            <a:r>
-              <a:rPr lang="en-US" sz="2300" b="1" i="0" dirty="0">
-                <a:solidFill>
-                  <a:srgbClr val="212121"/>
-                </a:solidFill>
-                <a:effectLst/>
-                <a:latin typeface="+mn-lt"/>
-              </a:rPr>
-              <a:t>Hypothesis 2: Voter Turnout and COVID-19 Case Counts</a:t>
-            </a:r>
-            <a:r>
-              <a:rPr lang="en-US" sz="2300" b="0" i="0" dirty="0">
-                <a:solidFill>
-                  <a:srgbClr val="212121"/>
-                </a:solidFill>
-                <a:effectLst/>
-                <a:latin typeface="+mn-lt"/>
-              </a:rPr>
-              <a:t> Null Hypothesis (H0): There is no significant relationship between voter turnout in a state and the total number of COVID-19 cases reported in that state.</a:t>
-            </a:r>
-          </a:p>
-          <a:p>
-            <a:pPr algn="l"/>
-            <a:r>
-              <a:rPr lang="en-US" sz="2300" b="0" i="0" dirty="0">
-                <a:solidFill>
-                  <a:srgbClr val="212121"/>
-                </a:solidFill>
-                <a:effectLst/>
-                <a:latin typeface="+mn-lt"/>
-              </a:rPr>
-              <a:t>Alternative Hypothesis (H1): There is a significant relationship between voter turnout in a state and the total number of COVID-19 cases reported in that state.</a:t>
-            </a:r>
-          </a:p>
-          <a:p>
-            <a:pPr algn="l"/>
-            <a:r>
-              <a:rPr lang="en-US" sz="2300" b="1" i="0" dirty="0">
-                <a:solidFill>
-                  <a:srgbClr val="212121"/>
-                </a:solidFill>
-                <a:effectLst/>
-                <a:latin typeface="+mn-lt"/>
-              </a:rPr>
-              <a:t>Hypothesis 3: Population Size and COVID-19 Case Counts</a:t>
-            </a:r>
-            <a:r>
-              <a:rPr lang="en-US" sz="2300" b="0" i="0" dirty="0">
-                <a:solidFill>
-                  <a:srgbClr val="212121"/>
-                </a:solidFill>
-                <a:effectLst/>
-                <a:latin typeface="+mn-lt"/>
-              </a:rPr>
-              <a:t> Null Hypothesis (H0): There is no significant correlation between the population size of a state and the total number of COVID-19 cases reported in that state.</a:t>
-            </a:r>
-          </a:p>
-          <a:p>
-            <a:pPr algn="l"/>
-            <a:r>
-              <a:rPr lang="en-US" sz="2300" b="0" i="0" dirty="0">
-                <a:solidFill>
-                  <a:srgbClr val="212121"/>
-                </a:solidFill>
-                <a:effectLst/>
-                <a:latin typeface="+mn-lt"/>
-              </a:rPr>
-              <a:t>Alternative Hypothesis (H1): There is a significant correlation between the population size of a state and the total number of COVID-19 cases reported in that state.</a:t>
-            </a:r>
-          </a:p>
-          <a:p>
-            <a:endParaRPr lang="en-US" dirty="0"/>
-          </a:p>
-        </p:txBody>
-      </p:sp>
-      <p:sp>
-        <p:nvSpPr>
-          <p:cNvPr id="4" name="Slide Number Placeholder 3">
-            <a:extLst>
-              <a:ext uri="{FF2B5EF4-FFF2-40B4-BE49-F238E27FC236}">
-                <a16:creationId xmlns:a16="http://schemas.microsoft.com/office/drawing/2014/main" id="{39D51366-FCF2-2141-302D-90F62FCEBB46}"/>
+              <a:t>One slide each on individual predictions and whether they were correct or not</a:t>
+            </a:r>
+          </a:p>
+        </p:txBody>
+      </p:sp>
+      <p:sp>
+        <p:nvSpPr>
+          <p:cNvPr id="6" name="Slide Number Placeholder 5">
+            <a:extLst>
+              <a:ext uri="{FF2B5EF4-FFF2-40B4-BE49-F238E27FC236}">
+                <a16:creationId xmlns:a16="http://schemas.microsoft.com/office/drawing/2014/main" id="{FC08B894-EC56-0670-B8F5-628144CBEA1A}"/>
               </a:ext>
             </a:extLst>
           </p:cNvPr>
@@ -8691,14 +8497,14 @@
               <a:rPr lang="en-US" smtClean="0"/>
               <a:t>12</a:t>
             </a:fld>
-            <a:endParaRPr lang="en-US" dirty="0"/>
+            <a:endParaRPr lang="en-US"/>
           </a:p>
         </p:txBody>
       </p:sp>
     </p:spTree>
     <p:extLst>
       <p:ext uri="{BB962C8B-B14F-4D97-AF65-F5344CB8AC3E}">
-        <p14:creationId xmlns:p14="http://schemas.microsoft.com/office/powerpoint/2010/main" val="1972063367"/>
+        <p14:creationId xmlns:p14="http://schemas.microsoft.com/office/powerpoint/2010/main" val="871898229"/>
       </p:ext>
     </p:extLst>
   </p:cSld>
@@ -8727,10 +8533,10 @@
       </p:grpSpPr>
       <p:sp>
         <p:nvSpPr>
-          <p:cNvPr id="2" name="Title 1">
-            <a:extLst>
-              <a:ext uri="{FF2B5EF4-FFF2-40B4-BE49-F238E27FC236}">
-                <a16:creationId xmlns:a16="http://schemas.microsoft.com/office/drawing/2014/main" id="{5B4A204C-CA1B-E276-A3AB-85B6A9BF2520}"/>
+          <p:cNvPr id="5" name="Title 4">
+            <a:extLst>
+              <a:ext uri="{FF2B5EF4-FFF2-40B4-BE49-F238E27FC236}">
+                <a16:creationId xmlns:a16="http://schemas.microsoft.com/office/drawing/2014/main" id="{7BA436C9-66CC-D73C-D092-0E384042C960}"/>
               </a:ext>
             </a:extLst>
           </p:cNvPr>
@@ -8739,78 +8545,205 @@
           </p:cNvSpPr>
           <p:nvPr>
             <p:ph type="title"/>
+          </p:nvPr>
+        </p:nvSpPr>
+        <p:spPr/>
+        <p:txBody>
+          <a:bodyPr/>
+          <a:lstStyle/>
+          <a:p>
+            <a:r>
+              <a:rPr lang="en-US" dirty="0"/>
+              <a:t>Employment – Kol Herget (SC)</a:t>
+            </a:r>
+          </a:p>
+        </p:txBody>
+      </p:sp>
+      <p:sp>
+        <p:nvSpPr>
+          <p:cNvPr id="6" name="Content Placeholder 5">
+            <a:extLst>
+              <a:ext uri="{FF2B5EF4-FFF2-40B4-BE49-F238E27FC236}">
+                <a16:creationId xmlns:a16="http://schemas.microsoft.com/office/drawing/2014/main" id="{FCC221B4-90E9-FC58-97CC-876A17ED6599}"/>
+              </a:ext>
+            </a:extLst>
+          </p:cNvPr>
+          <p:cNvSpPr>
+            <a:spLocks noGrp="1"/>
+          </p:cNvSpPr>
+          <p:nvPr>
+            <p:ph idx="1"/>
           </p:nvPr>
         </p:nvSpPr>
         <p:spPr>
           <a:xfrm>
-            <a:off x="838200" y="2949921"/>
-            <a:ext cx="10515600" cy="958158"/>
+            <a:off x="838200" y="1690688"/>
+            <a:ext cx="10515600" cy="4351338"/>
           </a:xfrm>
         </p:spPr>
         <p:txBody>
-          <a:bodyPr/>
-          <a:lstStyle/>
-          <a:p>
-            <a:pPr algn="ctr"/>
+          <a:bodyPr>
+            <a:normAutofit/>
+          </a:bodyPr>
+          <a:lstStyle/>
+          <a:p>
+            <a:r>
+              <a:rPr lang="en-US" sz="2400" dirty="0"/>
+              <a:t>Null hypothesis: </a:t>
+            </a:r>
             <a:r>
               <a:rPr lang="en-US" dirty="0"/>
-              <a:t>Stage 4: Machine Learning</a:t>
-            </a:r>
-          </a:p>
-        </p:txBody>
-      </p:sp>
-      <p:sp>
-        <p:nvSpPr>
-          <p:cNvPr id="3" name="Content Placeholder 2">
-            <a:extLst>
-              <a:ext uri="{FF2B5EF4-FFF2-40B4-BE49-F238E27FC236}">
-                <a16:creationId xmlns:a16="http://schemas.microsoft.com/office/drawing/2014/main" id="{56B899B6-989A-2B85-C3EB-8DF90F90622A}"/>
-              </a:ext>
-            </a:extLst>
-          </p:cNvPr>
-          <p:cNvSpPr>
-            <a:spLocks noGrp="1"/>
-          </p:cNvSpPr>
-          <p:nvPr>
-            <p:ph type="body" idx="1"/>
-          </p:nvPr>
-        </p:nvSpPr>
-        <p:spPr>
-          <a:xfrm>
-            <a:off x="838200" y="4040823"/>
-            <a:ext cx="10515600" cy="1500187"/>
-          </a:xfrm>
-        </p:spPr>
-        <p:txBody>
-          <a:bodyPr>
-            <a:normAutofit lnSpcReduction="10000"/>
-          </a:bodyPr>
-          <a:lstStyle/>
-          <a:p>
-            <a:pPr algn="ctr"/>
+              <a:t>there is no correlation between </a:t>
+            </a:r>
+            <a:r>
+              <a:rPr lang="en-US" b="1" dirty="0">
+                <a:solidFill>
+                  <a:schemeClr val="tx2">
+                    <a:lumMod val="75000"/>
+                    <a:lumOff val="25000"/>
+                  </a:schemeClr>
+                </a:solidFill>
+              </a:rPr>
+              <a:t>employee level </a:t>
+            </a:r>
             <a:r>
               <a:rPr lang="en-US" dirty="0"/>
-              <a:t>Regression models (linear, polynomial), machine learning, predictions on COVID-19 cases/deaths</a:t>
-            </a:r>
-          </a:p>
-          <a:p>
-            <a:r>
-              <a:rPr lang="en-US" dirty="0">
-                <a:highlight>
-                  <a:srgbClr val="FFFF00"/>
-                </a:highlight>
+              <a:t>and COVID-19 cases in SC</a:t>
+            </a:r>
+          </a:p>
+          <a:p>
+            <a:pPr lvl="1"/>
+            <a:r>
+              <a:rPr lang="en-US" i="1" dirty="0"/>
+              <a:t>Null rejected; alternative accepted (</a:t>
+            </a:r>
+            <a:r>
+              <a:rPr lang="en-US" i="1" dirty="0">
+                <a:solidFill>
+                  <a:schemeClr val="accent1">
+                    <a:lumMod val="75000"/>
+                  </a:schemeClr>
+                </a:solidFill>
               </a:rPr>
-              <a:t>One slide each on individual predictions and whether they were correct or not</a:t>
-            </a:r>
-          </a:p>
-        </p:txBody>
-      </p:sp>
-      <p:sp>
-        <p:nvSpPr>
-          <p:cNvPr id="6" name="Slide Number Placeholder 5">
-            <a:extLst>
-              <a:ext uri="{FF2B5EF4-FFF2-40B4-BE49-F238E27FC236}">
-                <a16:creationId xmlns:a16="http://schemas.microsoft.com/office/drawing/2014/main" id="{FC08B894-EC56-0670-B8F5-628144CBEA1A}"/>
+              <a:t>significantly positive correlation</a:t>
+            </a:r>
+            <a:r>
+              <a:rPr lang="en-US" i="1" dirty="0"/>
+              <a:t>)</a:t>
+            </a:r>
+          </a:p>
+          <a:p>
+            <a:pPr lvl="1"/>
+            <a:endParaRPr lang="en-US" sz="1000" i="1" dirty="0"/>
+          </a:p>
+          <a:p>
+            <a:r>
+              <a:rPr lang="en-US" sz="2400" dirty="0"/>
+              <a:t>Null hypothesis: </a:t>
+            </a:r>
+            <a:r>
+              <a:rPr lang="en-US" dirty="0"/>
+              <a:t>there is no correlation between </a:t>
+            </a:r>
+            <a:r>
+              <a:rPr lang="en-US" b="1" dirty="0">
+                <a:solidFill>
+                  <a:schemeClr val="tx2">
+                    <a:lumMod val="75000"/>
+                    <a:lumOff val="25000"/>
+                  </a:schemeClr>
+                </a:solidFill>
+              </a:rPr>
+              <a:t>taxable annual wage</a:t>
+            </a:r>
+            <a:r>
+              <a:rPr lang="en-US" dirty="0"/>
+              <a:t> and COVID-19 cases in SC</a:t>
+            </a:r>
+          </a:p>
+          <a:p>
+            <a:pPr lvl="1"/>
+            <a:r>
+              <a:rPr lang="en-US" i="1" dirty="0"/>
+              <a:t>Null rejected; alternative accepted (</a:t>
+            </a:r>
+            <a:r>
+              <a:rPr lang="en-US" i="1" dirty="0">
+                <a:solidFill>
+                  <a:schemeClr val="accent1">
+                    <a:lumMod val="75000"/>
+                  </a:schemeClr>
+                </a:solidFill>
+              </a:rPr>
+              <a:t>significantly positive correlation</a:t>
+            </a:r>
+            <a:r>
+              <a:rPr lang="en-US" i="1" dirty="0"/>
+              <a:t>)</a:t>
+            </a:r>
+          </a:p>
+          <a:p>
+            <a:pPr lvl="1"/>
+            <a:endParaRPr lang="en-US" sz="1000" i="1" dirty="0"/>
+          </a:p>
+          <a:p>
+            <a:r>
+              <a:rPr lang="en-US" sz="2400" dirty="0"/>
+              <a:t>Null hypothesis: </a:t>
+            </a:r>
+            <a:r>
+              <a:rPr lang="en-US" dirty="0"/>
+              <a:t>there is no correlation between </a:t>
+            </a:r>
+            <a:r>
+              <a:rPr lang="en-US" b="1" dirty="0">
+                <a:solidFill>
+                  <a:schemeClr val="tx2">
+                    <a:lumMod val="75000"/>
+                    <a:lumOff val="25000"/>
+                  </a:schemeClr>
+                </a:solidFill>
+              </a:rPr>
+              <a:t>establishment count</a:t>
+            </a:r>
+            <a:r>
+              <a:rPr lang="en-US" dirty="0"/>
+              <a:t> and COVID-19 cases in SC</a:t>
+            </a:r>
+          </a:p>
+          <a:p>
+            <a:pPr lvl="1"/>
+            <a:r>
+              <a:rPr lang="en-US" i="1" dirty="0"/>
+              <a:t>Null rejected; alternative accepted (</a:t>
+            </a:r>
+            <a:r>
+              <a:rPr lang="en-US" i="1" dirty="0">
+                <a:solidFill>
+                  <a:schemeClr val="accent1">
+                    <a:lumMod val="75000"/>
+                  </a:schemeClr>
+                </a:solidFill>
+              </a:rPr>
+              <a:t>significantly positive correlation</a:t>
+            </a:r>
+            <a:r>
+              <a:rPr lang="en-US" i="1" dirty="0"/>
+              <a:t>)</a:t>
+            </a:r>
+          </a:p>
+          <a:p>
+            <a:pPr lvl="1"/>
+            <a:endParaRPr lang="en-US" dirty="0"/>
+          </a:p>
+        </p:txBody>
+      </p:sp>
+      <p:sp>
+        <p:nvSpPr>
+          <p:cNvPr id="4" name="Slide Number Placeholder 3">
+            <a:extLst>
+              <a:ext uri="{FF2B5EF4-FFF2-40B4-BE49-F238E27FC236}">
+                <a16:creationId xmlns:a16="http://schemas.microsoft.com/office/drawing/2014/main" id="{06358DE5-BCF0-9913-04E1-EA417320AD0A}"/>
               </a:ext>
             </a:extLst>
           </p:cNvPr>
@@ -8837,7 +8770,7 @@
     </p:spTree>
     <p:extLst>
       <p:ext uri="{BB962C8B-B14F-4D97-AF65-F5344CB8AC3E}">
-        <p14:creationId xmlns:p14="http://schemas.microsoft.com/office/powerpoint/2010/main" val="871898229"/>
+        <p14:creationId xmlns:p14="http://schemas.microsoft.com/office/powerpoint/2010/main" val="642393437"/>
       </p:ext>
     </p:extLst>
   </p:cSld>
@@ -8866,10 +8799,10 @@
       </p:grpSpPr>
       <p:sp>
         <p:nvSpPr>
-          <p:cNvPr id="5" name="Title 4">
-            <a:extLst>
-              <a:ext uri="{FF2B5EF4-FFF2-40B4-BE49-F238E27FC236}">
-                <a16:creationId xmlns:a16="http://schemas.microsoft.com/office/drawing/2014/main" id="{7BA436C9-66CC-D73C-D092-0E384042C960}"/>
+          <p:cNvPr id="2" name="Title 1">
+            <a:extLst>
+              <a:ext uri="{FF2B5EF4-FFF2-40B4-BE49-F238E27FC236}">
+                <a16:creationId xmlns:a16="http://schemas.microsoft.com/office/drawing/2014/main" id="{093D9844-ED1D-75B2-5E07-773AAFDD56BB}"/>
               </a:ext>
             </a:extLst>
           </p:cNvPr>
@@ -8887,92 +8820,42 @@
           <a:p>
             <a:r>
               <a:rPr lang="en-US" dirty="0"/>
-              <a:t>Employment – Kol Herget (SC)</a:t>
-            </a:r>
-          </a:p>
-        </p:txBody>
-      </p:sp>
-      <p:sp>
-        <p:nvSpPr>
-          <p:cNvPr id="6" name="Content Placeholder 5">
-            <a:extLst>
-              <a:ext uri="{FF2B5EF4-FFF2-40B4-BE49-F238E27FC236}">
-                <a16:creationId xmlns:a16="http://schemas.microsoft.com/office/drawing/2014/main" id="{FCC221B4-90E9-FC58-97CC-876A17ED6599}"/>
-              </a:ext>
-            </a:extLst>
-          </p:cNvPr>
-          <p:cNvSpPr>
-            <a:spLocks noGrp="1"/>
-          </p:cNvSpPr>
-          <p:nvPr>
-            <p:ph idx="1"/>
+              <a:t>Kevin Hayes- Predicted Cases and Deaths</a:t>
+            </a:r>
+          </a:p>
+        </p:txBody>
+      </p:sp>
+      <p:sp>
+        <p:nvSpPr>
+          <p:cNvPr id="4" name="Text Placeholder 3">
+            <a:extLst>
+              <a:ext uri="{FF2B5EF4-FFF2-40B4-BE49-F238E27FC236}">
+                <a16:creationId xmlns:a16="http://schemas.microsoft.com/office/drawing/2014/main" id="{8287E9CC-692E-95AB-7C48-FB61BEA4DBC2}"/>
+              </a:ext>
+            </a:extLst>
+          </p:cNvPr>
+          <p:cNvSpPr>
+            <a:spLocks noGrp="1"/>
+          </p:cNvSpPr>
+          <p:nvPr>
+            <p:ph type="body" sz="half" idx="2"/>
           </p:nvPr>
         </p:nvSpPr>
         <p:spPr/>
         <p:txBody>
-          <a:bodyPr>
-            <a:normAutofit/>
-          </a:bodyPr>
-          <a:lstStyle/>
-          <a:p>
-            <a:r>
-              <a:rPr lang="en-US" dirty="0"/>
-              <a:t>Null hypothesis: there is no correlation between employee level and COVID-19 cases in SC</a:t>
-            </a:r>
-          </a:p>
-          <a:p>
-            <a:pPr lvl="1"/>
-            <a:r>
-              <a:rPr lang="en-US" dirty="0"/>
-              <a:t>Null rejected; alternative accepted (significantly positive correlation)</a:t>
-            </a:r>
-          </a:p>
-          <a:p>
-            <a:r>
-              <a:rPr lang="en-US" dirty="0"/>
-              <a:t>Null hypothesis: there is no correlation between taxable annual wage and COVID-19 cases in SC</a:t>
-            </a:r>
-          </a:p>
-          <a:p>
-            <a:pPr lvl="1"/>
-            <a:r>
-              <a:rPr lang="en-US" dirty="0"/>
-              <a:t>Null rejected; alternative accepted (significantly positive correlation)</a:t>
-            </a:r>
-          </a:p>
-          <a:p>
-            <a:r>
-              <a:rPr lang="en-US" dirty="0"/>
-              <a:t>Null hypothesis: there is no correlation between establishment count and COVID-19 cases in SC</a:t>
-            </a:r>
-          </a:p>
-          <a:p>
-            <a:pPr lvl="1"/>
-            <a:r>
-              <a:rPr lang="en-US" dirty="0"/>
-              <a:t>Null rejected; alternative </a:t>
-            </a:r>
-            <a:r>
-              <a:rPr lang="en-US"/>
-              <a:t>accepted (significantly positive </a:t>
-            </a:r>
-            <a:r>
-              <a:rPr lang="en-US" dirty="0"/>
-              <a:t>correlation)</a:t>
-            </a:r>
-          </a:p>
-          <a:p>
-            <a:pPr lvl="1"/>
+          <a:bodyPr/>
+          <a:lstStyle/>
+          <a:p>
             <a:endParaRPr lang="en-US" dirty="0"/>
           </a:p>
         </p:txBody>
       </p:sp>
       <p:sp>
         <p:nvSpPr>
-          <p:cNvPr id="4" name="Slide Number Placeholder 3">
-            <a:extLst>
-              <a:ext uri="{FF2B5EF4-FFF2-40B4-BE49-F238E27FC236}">
-                <a16:creationId xmlns:a16="http://schemas.microsoft.com/office/drawing/2014/main" id="{06358DE5-BCF0-9913-04E1-EA417320AD0A}"/>
+          <p:cNvPr id="5" name="Slide Number Placeholder 4">
+            <a:extLst>
+              <a:ext uri="{FF2B5EF4-FFF2-40B4-BE49-F238E27FC236}">
+                <a16:creationId xmlns:a16="http://schemas.microsoft.com/office/drawing/2014/main" id="{40C92503-36A8-1FF0-F4B7-7D39BD62E3FF}"/>
               </a:ext>
             </a:extLst>
           </p:cNvPr>
@@ -8991,118 +8874,6 @@
             <a:fld id="{BD0DFC8E-D006-4B55-BBF2-7AB50F8F017C}" type="slidenum">
               <a:rPr lang="en-US" smtClean="0"/>
               <a:t>14</a:t>
-            </a:fld>
-            <a:endParaRPr lang="en-US"/>
-          </a:p>
-        </p:txBody>
-      </p:sp>
-    </p:spTree>
-    <p:extLst>
-      <p:ext uri="{BB962C8B-B14F-4D97-AF65-F5344CB8AC3E}">
-        <p14:creationId xmlns:p14="http://schemas.microsoft.com/office/powerpoint/2010/main" val="642393437"/>
-      </p:ext>
-    </p:extLst>
-  </p:cSld>
-  <p:clrMapOvr>
-    <a:masterClrMapping/>
-  </p:clrMapOvr>
-</p:sld>
-</file>
-
-<file path=ppt/slides/slide15.xml><?xml version="1.0" encoding="utf-8"?>
-<p:sld xmlns:a="http://schemas.openxmlformats.org/drawingml/2006/main" xmlns:r="http://schemas.openxmlformats.org/officeDocument/2006/relationships" xmlns:p="http://schemas.openxmlformats.org/presentationml/2006/main">
-  <p:cSld>
-    <p:spTree>
-      <p:nvGrpSpPr>
-        <p:cNvPr id="1" name=""/>
-        <p:cNvGrpSpPr/>
-        <p:nvPr/>
-      </p:nvGrpSpPr>
-      <p:grpSpPr>
-        <a:xfrm>
-          <a:off x="0" y="0"/>
-          <a:ext cx="0" cy="0"/>
-          <a:chOff x="0" y="0"/>
-          <a:chExt cx="0" cy="0"/>
-        </a:xfrm>
-      </p:grpSpPr>
-      <p:sp>
-        <p:nvSpPr>
-          <p:cNvPr id="2" name="Title 1">
-            <a:extLst>
-              <a:ext uri="{FF2B5EF4-FFF2-40B4-BE49-F238E27FC236}">
-                <a16:creationId xmlns:a16="http://schemas.microsoft.com/office/drawing/2014/main" id="{093D9844-ED1D-75B2-5E07-773AAFDD56BB}"/>
-              </a:ext>
-            </a:extLst>
-          </p:cNvPr>
-          <p:cNvSpPr>
-            <a:spLocks noGrp="1"/>
-          </p:cNvSpPr>
-          <p:nvPr>
-            <p:ph type="title"/>
-          </p:nvPr>
-        </p:nvSpPr>
-        <p:spPr/>
-        <p:txBody>
-          <a:bodyPr/>
-          <a:lstStyle/>
-          <a:p>
-            <a:r>
-              <a:rPr lang="en-US" dirty="0"/>
-              <a:t>Kevin Hayes- Predicted Cases and Deaths</a:t>
-            </a:r>
-          </a:p>
-        </p:txBody>
-      </p:sp>
-      <p:sp>
-        <p:nvSpPr>
-          <p:cNvPr id="4" name="Text Placeholder 3">
-            <a:extLst>
-              <a:ext uri="{FF2B5EF4-FFF2-40B4-BE49-F238E27FC236}">
-                <a16:creationId xmlns:a16="http://schemas.microsoft.com/office/drawing/2014/main" id="{8287E9CC-692E-95AB-7C48-FB61BEA4DBC2}"/>
-              </a:ext>
-            </a:extLst>
-          </p:cNvPr>
-          <p:cNvSpPr>
-            <a:spLocks noGrp="1"/>
-          </p:cNvSpPr>
-          <p:nvPr>
-            <p:ph type="body" sz="half" idx="2"/>
-          </p:nvPr>
-        </p:nvSpPr>
-        <p:spPr/>
-        <p:txBody>
-          <a:bodyPr/>
-          <a:lstStyle/>
-          <a:p>
-            <a:endParaRPr lang="en-US" dirty="0"/>
-          </a:p>
-        </p:txBody>
-      </p:sp>
-      <p:sp>
-        <p:nvSpPr>
-          <p:cNvPr id="5" name="Slide Number Placeholder 4">
-            <a:extLst>
-              <a:ext uri="{FF2B5EF4-FFF2-40B4-BE49-F238E27FC236}">
-                <a16:creationId xmlns:a16="http://schemas.microsoft.com/office/drawing/2014/main" id="{40C92503-36A8-1FF0-F4B7-7D39BD62E3FF}"/>
-              </a:ext>
-            </a:extLst>
-          </p:cNvPr>
-          <p:cNvSpPr>
-            <a:spLocks noGrp="1"/>
-          </p:cNvSpPr>
-          <p:nvPr>
-            <p:ph type="sldNum" sz="quarter" idx="12"/>
-          </p:nvPr>
-        </p:nvSpPr>
-        <p:spPr/>
-        <p:txBody>
-          <a:bodyPr/>
-          <a:lstStyle/>
-          <a:p>
-            <a:fld id="{BD0DFC8E-D006-4B55-BBF2-7AB50F8F017C}" type="slidenum">
-              <a:rPr lang="en-US" smtClean="0"/>
-              <a:t>15</a:t>
             </a:fld>
             <a:endParaRPr lang="en-US"/>
           </a:p>
@@ -9309,6 +9080,476 @@
 </p:sld>
 </file>
 
+<file path=ppt/slides/slide15.xml><?xml version="1.0" encoding="utf-8"?>
+<p:sld xmlns:a="http://schemas.openxmlformats.org/drawingml/2006/main" xmlns:r="http://schemas.openxmlformats.org/officeDocument/2006/relationships" xmlns:p="http://schemas.openxmlformats.org/presentationml/2006/main">
+  <p:cSld>
+    <p:spTree>
+      <p:nvGrpSpPr>
+        <p:cNvPr id="1" name=""/>
+        <p:cNvGrpSpPr/>
+        <p:nvPr/>
+      </p:nvGrpSpPr>
+      <p:grpSpPr>
+        <a:xfrm>
+          <a:off x="0" y="0"/>
+          <a:ext cx="0" cy="0"/>
+          <a:chOff x="0" y="0"/>
+          <a:chExt cx="0" cy="0"/>
+        </a:xfrm>
+      </p:grpSpPr>
+      <p:sp>
+        <p:nvSpPr>
+          <p:cNvPr id="2" name="Title 1">
+            <a:extLst>
+              <a:ext uri="{FF2B5EF4-FFF2-40B4-BE49-F238E27FC236}">
+                <a16:creationId xmlns:a16="http://schemas.microsoft.com/office/drawing/2014/main" id="{D12C7965-0F1A-AEBA-9238-7DD74FBDB517}"/>
+              </a:ext>
+            </a:extLst>
+          </p:cNvPr>
+          <p:cNvSpPr>
+            <a:spLocks noGrp="1"/>
+          </p:cNvSpPr>
+          <p:nvPr>
+            <p:ph type="title"/>
+          </p:nvPr>
+        </p:nvSpPr>
+        <p:spPr/>
+        <p:txBody>
+          <a:bodyPr/>
+          <a:lstStyle/>
+          <a:p>
+            <a:r>
+              <a:rPr lang="en-US" dirty="0"/>
+              <a:t>Kevin Hayes- Hypothesis Tests</a:t>
+            </a:r>
+          </a:p>
+        </p:txBody>
+      </p:sp>
+      <p:sp>
+        <p:nvSpPr>
+          <p:cNvPr id="3" name="Content Placeholder 2">
+            <a:extLst>
+              <a:ext uri="{FF2B5EF4-FFF2-40B4-BE49-F238E27FC236}">
+                <a16:creationId xmlns:a16="http://schemas.microsoft.com/office/drawing/2014/main" id="{F53E22B7-12B3-36EA-88BD-D5A446A5E3A2}"/>
+              </a:ext>
+            </a:extLst>
+          </p:cNvPr>
+          <p:cNvSpPr>
+            <a:spLocks noGrp="1"/>
+          </p:cNvSpPr>
+          <p:nvPr>
+            <p:ph idx="1"/>
+          </p:nvPr>
+        </p:nvSpPr>
+        <p:spPr/>
+        <p:txBody>
+          <a:bodyPr>
+            <a:normAutofit lnSpcReduction="10000"/>
+          </a:bodyPr>
+          <a:lstStyle/>
+          <a:p>
+            <a:r>
+              <a:rPr lang="en-US" b="0" i="0" dirty="0">
+                <a:effectLst/>
+                <a:highlight>
+                  <a:srgbClr val="FFFFFF"/>
+                </a:highlight>
+                <a:latin typeface="+mn-lt"/>
+              </a:rPr>
+              <a:t>Does having a higher total population of </a:t>
+            </a:r>
+            <a:r>
+              <a:rPr lang="en-US" b="1" i="0" dirty="0" err="1">
+                <a:solidFill>
+                  <a:schemeClr val="tx2">
+                    <a:lumMod val="75000"/>
+                    <a:lumOff val="25000"/>
+                  </a:schemeClr>
+                </a:solidFill>
+                <a:effectLst/>
+                <a:highlight>
+                  <a:srgbClr val="FFFFFF"/>
+                </a:highlight>
+                <a:latin typeface="+mn-lt"/>
+              </a:rPr>
+              <a:t>hispanic</a:t>
+            </a:r>
+            <a:r>
+              <a:rPr lang="en-US" b="1" i="0" dirty="0">
+                <a:solidFill>
+                  <a:schemeClr val="tx2">
+                    <a:lumMod val="75000"/>
+                    <a:lumOff val="25000"/>
+                  </a:schemeClr>
+                </a:solidFill>
+                <a:effectLst/>
+                <a:highlight>
+                  <a:srgbClr val="FFFFFF"/>
+                </a:highlight>
+                <a:latin typeface="+mn-lt"/>
+              </a:rPr>
+              <a:t> or </a:t>
+            </a:r>
+            <a:r>
+              <a:rPr lang="en-US" b="1" i="0" dirty="0" err="1">
+                <a:solidFill>
+                  <a:schemeClr val="tx2">
+                    <a:lumMod val="75000"/>
+                    <a:lumOff val="25000"/>
+                  </a:schemeClr>
+                </a:solidFill>
+                <a:effectLst/>
+                <a:highlight>
+                  <a:srgbClr val="FFFFFF"/>
+                </a:highlight>
+                <a:latin typeface="+mn-lt"/>
+              </a:rPr>
+              <a:t>latino</a:t>
+            </a:r>
+            <a:r>
+              <a:rPr lang="en-US" b="1" i="0" dirty="0">
+                <a:solidFill>
+                  <a:schemeClr val="tx2">
+                    <a:lumMod val="75000"/>
+                    <a:lumOff val="25000"/>
+                  </a:schemeClr>
+                </a:solidFill>
+                <a:effectLst/>
+                <a:highlight>
+                  <a:srgbClr val="FFFFFF"/>
+                </a:highlight>
+                <a:latin typeface="+mn-lt"/>
+              </a:rPr>
+              <a:t> people of any race</a:t>
+            </a:r>
+            <a:r>
+              <a:rPr lang="en-US" b="0" i="0" dirty="0">
+                <a:effectLst/>
+                <a:highlight>
+                  <a:srgbClr val="FFFFFF"/>
+                </a:highlight>
+                <a:latin typeface="+mn-lt"/>
+              </a:rPr>
+              <a:t> in a given state lead to </a:t>
+            </a:r>
+            <a:r>
+              <a:rPr lang="en-US" b="1" i="0" dirty="0">
+                <a:solidFill>
+                  <a:schemeClr val="tx2">
+                    <a:lumMod val="75000"/>
+                    <a:lumOff val="25000"/>
+                  </a:schemeClr>
+                </a:solidFill>
+                <a:effectLst/>
+                <a:highlight>
+                  <a:srgbClr val="FFFFFF"/>
+                </a:highlight>
+                <a:latin typeface="+mn-lt"/>
+              </a:rPr>
+              <a:t>more</a:t>
+            </a:r>
+            <a:r>
+              <a:rPr lang="en-US" b="0" i="0" dirty="0">
+                <a:effectLst/>
+                <a:highlight>
+                  <a:srgbClr val="FFFFFF"/>
+                </a:highlight>
+                <a:latin typeface="+mn-lt"/>
+              </a:rPr>
+              <a:t> covid-19 infections for that state? (Label: DP05_0073E)</a:t>
+            </a:r>
+          </a:p>
+          <a:p>
+            <a:pPr lvl="1"/>
+            <a:r>
+              <a:rPr lang="en-US" dirty="0">
+                <a:highlight>
+                  <a:srgbClr val="FFFFFF"/>
+                </a:highlight>
+                <a:latin typeface="+mn-lt"/>
+              </a:rPr>
+              <a:t>Fail to reject null hypothesis. So </a:t>
+            </a:r>
+            <a:r>
+              <a:rPr lang="en-US" dirty="0">
+                <a:solidFill>
+                  <a:schemeClr val="accent1">
+                    <a:lumMod val="75000"/>
+                  </a:schemeClr>
+                </a:solidFill>
+                <a:highlight>
+                  <a:srgbClr val="FFFFFF"/>
+                </a:highlight>
+                <a:latin typeface="+mn-lt"/>
+              </a:rPr>
+              <a:t>no</a:t>
+            </a:r>
+            <a:r>
+              <a:rPr lang="en-US" dirty="0">
+                <a:highlight>
+                  <a:srgbClr val="FFFFFF"/>
+                </a:highlight>
+                <a:latin typeface="+mn-lt"/>
+              </a:rPr>
+              <a:t>.</a:t>
+            </a:r>
+          </a:p>
+          <a:p>
+            <a:r>
+              <a:rPr lang="en-US" b="0" i="0" dirty="0">
+                <a:effectLst/>
+                <a:highlight>
+                  <a:srgbClr val="FFFFFF"/>
+                </a:highlight>
+                <a:latin typeface="+mn-lt"/>
+              </a:rPr>
+              <a:t>Does having more people of </a:t>
+            </a:r>
+            <a:r>
+              <a:rPr lang="en-US" b="1" i="0" dirty="0">
+                <a:solidFill>
+                  <a:schemeClr val="tx2">
+                    <a:lumMod val="75000"/>
+                    <a:lumOff val="25000"/>
+                  </a:schemeClr>
+                </a:solidFill>
+                <a:effectLst/>
+                <a:highlight>
+                  <a:srgbClr val="FFFFFF"/>
+                </a:highlight>
+                <a:latin typeface="+mn-lt"/>
+              </a:rPr>
+              <a:t>35 to 44 years of age </a:t>
+            </a:r>
+            <a:r>
+              <a:rPr lang="en-US" b="0" i="0" dirty="0">
+                <a:effectLst/>
+                <a:highlight>
+                  <a:srgbClr val="FFFFFF"/>
+                </a:highlight>
+                <a:latin typeface="+mn-lt"/>
+              </a:rPr>
+              <a:t>in a given state lead to </a:t>
+            </a:r>
+            <a:r>
+              <a:rPr lang="en-US" b="1" i="0" dirty="0">
+                <a:solidFill>
+                  <a:schemeClr val="tx2">
+                    <a:lumMod val="75000"/>
+                    <a:lumOff val="25000"/>
+                  </a:schemeClr>
+                </a:solidFill>
+                <a:effectLst/>
+                <a:highlight>
+                  <a:srgbClr val="FFFFFF"/>
+                </a:highlight>
+                <a:latin typeface="+mn-lt"/>
+              </a:rPr>
+              <a:t>fewer</a:t>
+            </a:r>
+            <a:r>
+              <a:rPr lang="en-US" b="0" i="0" dirty="0">
+                <a:effectLst/>
+                <a:highlight>
+                  <a:srgbClr val="FFFFFF"/>
+                </a:highlight>
+                <a:latin typeface="+mn-lt"/>
+              </a:rPr>
+              <a:t> covid-19 infections for that state? (Label: DP05_0011E)</a:t>
+            </a:r>
+          </a:p>
+          <a:p>
+            <a:pPr lvl="1"/>
+            <a:r>
+              <a:rPr lang="en-US" dirty="0">
+                <a:highlight>
+                  <a:srgbClr val="FFFFFF"/>
+                </a:highlight>
+                <a:latin typeface="+mn-lt"/>
+              </a:rPr>
+              <a:t>Reject null hypothesis. So </a:t>
+            </a:r>
+            <a:r>
+              <a:rPr lang="en-US" dirty="0">
+                <a:solidFill>
+                  <a:schemeClr val="accent1">
+                    <a:lumMod val="75000"/>
+                  </a:schemeClr>
+                </a:solidFill>
+                <a:highlight>
+                  <a:srgbClr val="FFFFFF"/>
+                </a:highlight>
+                <a:latin typeface="+mn-lt"/>
+              </a:rPr>
+              <a:t>yes</a:t>
+            </a:r>
+            <a:r>
+              <a:rPr lang="en-US" dirty="0">
+                <a:highlight>
+                  <a:srgbClr val="FFFFFF"/>
+                </a:highlight>
+                <a:latin typeface="+mn-lt"/>
+              </a:rPr>
+              <a:t>.</a:t>
+            </a:r>
+            <a:endParaRPr lang="en-US" b="0" i="0" dirty="0">
+              <a:effectLst/>
+              <a:highlight>
+                <a:srgbClr val="FFFFFF"/>
+              </a:highlight>
+              <a:latin typeface="+mn-lt"/>
+            </a:endParaRPr>
+          </a:p>
+          <a:p>
+            <a:r>
+              <a:rPr lang="en-US" b="0" i="0" dirty="0">
+                <a:effectLst/>
+                <a:highlight>
+                  <a:srgbClr val="FFFFFF"/>
+                </a:highlight>
+                <a:latin typeface="+mn-lt"/>
+              </a:rPr>
+              <a:t>Does having more people </a:t>
+            </a:r>
+            <a:r>
+              <a:rPr lang="en-US" b="1" i="0" dirty="0">
+                <a:solidFill>
+                  <a:schemeClr val="tx2">
+                    <a:lumMod val="75000"/>
+                    <a:lumOff val="25000"/>
+                  </a:schemeClr>
+                </a:solidFill>
+                <a:effectLst/>
+                <a:highlight>
+                  <a:srgbClr val="FFFFFF"/>
+                </a:highlight>
+                <a:latin typeface="+mn-lt"/>
+              </a:rPr>
+              <a:t>aged 60 to 64 </a:t>
+            </a:r>
+            <a:r>
+              <a:rPr lang="en-US" b="0" i="0" dirty="0">
+                <a:effectLst/>
+                <a:highlight>
+                  <a:srgbClr val="FFFFFF"/>
+                </a:highlight>
+                <a:latin typeface="+mn-lt"/>
+              </a:rPr>
+              <a:t>in a given state lead to </a:t>
+            </a:r>
+            <a:r>
+              <a:rPr lang="en-US" b="1" i="0" dirty="0">
+                <a:solidFill>
+                  <a:schemeClr val="tx2">
+                    <a:lumMod val="75000"/>
+                    <a:lumOff val="25000"/>
+                  </a:schemeClr>
+                </a:solidFill>
+                <a:effectLst/>
+                <a:highlight>
+                  <a:srgbClr val="FFFFFF"/>
+                </a:highlight>
+                <a:latin typeface="+mn-lt"/>
+              </a:rPr>
+              <a:t>more</a:t>
+            </a:r>
+            <a:r>
+              <a:rPr lang="en-US" b="0" i="0" dirty="0">
+                <a:effectLst/>
+                <a:highlight>
+                  <a:srgbClr val="FFFFFF"/>
+                </a:highlight>
+                <a:latin typeface="+mn-lt"/>
+              </a:rPr>
+              <a:t> covid-19 cases for that state? (Label : DP05_0014E)</a:t>
+            </a:r>
+          </a:p>
+          <a:p>
+            <a:pPr lvl="1"/>
+            <a:r>
+              <a:rPr lang="en-US" dirty="0">
+                <a:highlight>
+                  <a:srgbClr val="FFFFFF"/>
+                </a:highlight>
+                <a:latin typeface="+mn-lt"/>
+              </a:rPr>
+              <a:t>Reject null hypothesis. So </a:t>
+            </a:r>
+            <a:r>
+              <a:rPr lang="en-US" dirty="0">
+                <a:solidFill>
+                  <a:schemeClr val="accent1">
+                    <a:lumMod val="75000"/>
+                  </a:schemeClr>
+                </a:solidFill>
+                <a:highlight>
+                  <a:srgbClr val="FFFFFF"/>
+                </a:highlight>
+                <a:latin typeface="+mn-lt"/>
+              </a:rPr>
+              <a:t>yes</a:t>
+            </a:r>
+            <a:r>
+              <a:rPr lang="en-US" dirty="0">
+                <a:highlight>
+                  <a:srgbClr val="FFFFFF"/>
+                </a:highlight>
+                <a:latin typeface="+mn-lt"/>
+              </a:rPr>
+              <a:t>.</a:t>
+            </a:r>
+            <a:endParaRPr lang="en-US" b="0" i="0" dirty="0">
+              <a:effectLst/>
+              <a:highlight>
+                <a:srgbClr val="FFFFFF"/>
+              </a:highlight>
+              <a:latin typeface="+mn-lt"/>
+            </a:endParaRPr>
+          </a:p>
+        </p:txBody>
+      </p:sp>
+      <p:sp>
+        <p:nvSpPr>
+          <p:cNvPr id="4" name="Slide Number Placeholder 3">
+            <a:extLst>
+              <a:ext uri="{FF2B5EF4-FFF2-40B4-BE49-F238E27FC236}">
+                <a16:creationId xmlns:a16="http://schemas.microsoft.com/office/drawing/2014/main" id="{6282CF4F-CBB0-C14E-002E-125B52A994D7}"/>
+              </a:ext>
+            </a:extLst>
+          </p:cNvPr>
+          <p:cNvSpPr>
+            <a:spLocks noGrp="1"/>
+          </p:cNvSpPr>
+          <p:nvPr>
+            <p:ph type="sldNum" sz="quarter" idx="12"/>
+          </p:nvPr>
+        </p:nvSpPr>
+        <p:spPr/>
+        <p:txBody>
+          <a:bodyPr/>
+          <a:lstStyle/>
+          <a:p>
+            <a:fld id="{BD0DFC8E-D006-4B55-BBF2-7AB50F8F017C}" type="slidenum">
+              <a:rPr lang="en-US" smtClean="0"/>
+              <a:t>15</a:t>
+            </a:fld>
+            <a:endParaRPr lang="en-US"/>
+          </a:p>
+        </p:txBody>
+      </p:sp>
+    </p:spTree>
+    <p:extLst>
+      <p:ext uri="{BB962C8B-B14F-4D97-AF65-F5344CB8AC3E}">
+        <p14:creationId xmlns:p14="http://schemas.microsoft.com/office/powerpoint/2010/main" val="3863562835"/>
+      </p:ext>
+    </p:extLst>
+  </p:cSld>
+  <p:clrMapOvr>
+    <a:masterClrMapping/>
+  </p:clrMapOvr>
+</p:sld>
+</file>
+
 <file path=ppt/slides/slide16.xml><?xml version="1.0" encoding="utf-8"?>
 <p:sld xmlns:a="http://schemas.openxmlformats.org/drawingml/2006/main" xmlns:r="http://schemas.openxmlformats.org/officeDocument/2006/relationships" xmlns:p="http://schemas.openxmlformats.org/presentationml/2006/main">
   <p:cSld>
@@ -9331,7 +9572,7 @@
           <p:cNvPr id="2" name="Title 1">
             <a:extLst>
               <a:ext uri="{FF2B5EF4-FFF2-40B4-BE49-F238E27FC236}">
-                <a16:creationId xmlns:a16="http://schemas.microsoft.com/office/drawing/2014/main" id="{D12C7965-0F1A-AEBA-9238-7DD74FBDB517}"/>
+                <a16:creationId xmlns:a16="http://schemas.microsoft.com/office/drawing/2014/main" id="{6221F52D-B146-E28D-6434-32AC8FB3861D}"/>
               </a:ext>
             </a:extLst>
           </p:cNvPr>
@@ -9349,7 +9590,7 @@
           <a:p>
             <a:r>
               <a:rPr lang="en-US" dirty="0"/>
-              <a:t>Kevin Hayes- Hypothesis Tests</a:t>
+              <a:t>Hypothesis test – Neetha Ravva</a:t>
             </a:r>
           </a:p>
         </p:txBody>
@@ -9359,7 +9600,7 @@
           <p:cNvPr id="3" name="Content Placeholder 2">
             <a:extLst>
               <a:ext uri="{FF2B5EF4-FFF2-40B4-BE49-F238E27FC236}">
-                <a16:creationId xmlns:a16="http://schemas.microsoft.com/office/drawing/2014/main" id="{F53E22B7-12B3-36EA-88BD-D5A446A5E3A2}"/>
+                <a16:creationId xmlns:a16="http://schemas.microsoft.com/office/drawing/2014/main" id="{BD9EF911-40F8-7B2E-277C-B05AC18DA857}"/>
               </a:ext>
             </a:extLst>
           </p:cNvPr>
@@ -9376,130 +9617,241 @@
           <a:lstStyle/>
           <a:p>
             <a:r>
-              <a:rPr lang="en-US" b="0" i="0" dirty="0">
+              <a:rPr lang="en-US" sz="2400" b="0" i="0" dirty="0">
                 <a:effectLst/>
-                <a:highlight>
-                  <a:srgbClr val="FFFFFF"/>
-                </a:highlight>
-                <a:latin typeface="system-ui"/>
+                <a:latin typeface="+mn-lt"/>
               </a:rPr>
-              <a:t>Does having a higher total population of </a:t>
-            </a:r>
-            <a:r>
-              <a:rPr lang="en-US" b="0" i="0" dirty="0" err="1">
+              <a:t>There is no significant correlation between the </a:t>
+            </a:r>
+            <a:r>
+              <a:rPr lang="en-US" sz="2400" b="1" i="0" dirty="0">
+                <a:solidFill>
+                  <a:schemeClr val="tx2">
+                    <a:lumMod val="75000"/>
+                    <a:lumOff val="25000"/>
+                  </a:schemeClr>
+                </a:solidFill>
                 <a:effectLst/>
-                <a:highlight>
-                  <a:srgbClr val="FFFFFF"/>
-                </a:highlight>
-                <a:latin typeface="system-ui"/>
+                <a:latin typeface="+mn-lt"/>
               </a:rPr>
-              <a:t>hispanic</a:t>
-            </a:r>
-            <a:r>
-              <a:rPr lang="en-US" b="0" i="0" dirty="0">
+              <a:t>political party of the winning candidate</a:t>
+            </a:r>
+            <a:r>
+              <a:rPr lang="en-US" sz="2400" b="0" i="0" dirty="0">
                 <a:effectLst/>
-                <a:highlight>
-                  <a:srgbClr val="FFFFFF"/>
-                </a:highlight>
-                <a:latin typeface="system-ui"/>
+                <a:latin typeface="+mn-lt"/>
               </a:rPr>
-              <a:t> or </a:t>
-            </a:r>
-            <a:r>
-              <a:rPr lang="en-US" b="0" i="0" dirty="0" err="1">
+              <a:t> in a state and the total number of COVID-19 cases reported in that state.</a:t>
+            </a:r>
+          </a:p>
+          <a:p>
+            <a:pPr marL="0" indent="0">
+              <a:buNone/>
+            </a:pPr>
+            <a:r>
+              <a:rPr lang="en-US" sz="2400" b="0" i="0" dirty="0">
                 <a:effectLst/>
-                <a:highlight>
-                  <a:srgbClr val="FFFFFF"/>
-                </a:highlight>
-                <a:latin typeface="system-ui"/>
+                <a:latin typeface="+mn-lt"/>
               </a:rPr>
-              <a:t>latino</a:t>
-            </a:r>
-            <a:r>
-              <a:rPr lang="en-US" b="0" i="0" dirty="0">
+              <a:t>	Reject null hypothesis – so </a:t>
+            </a:r>
+            <a:r>
+              <a:rPr lang="en-US" sz="2400" b="0" i="0" dirty="0">
+                <a:solidFill>
+                  <a:schemeClr val="accent1">
+                    <a:lumMod val="75000"/>
+                  </a:schemeClr>
+                </a:solidFill>
                 <a:effectLst/>
-                <a:highlight>
-                  <a:srgbClr val="FFFFFF"/>
-                </a:highlight>
-                <a:latin typeface="system-ui"/>
+                <a:latin typeface="+mn-lt"/>
               </a:rPr>
-              <a:t> people of any race in a given state lead to more covid-19 infections for that state? (Label: DP05_0073E)</a:t>
-            </a:r>
-          </a:p>
-          <a:p>
-            <a:pPr lvl="1"/>
-            <a:r>
-              <a:rPr lang="en-US" dirty="0">
-                <a:highlight>
-                  <a:srgbClr val="FFFFFF"/>
-                </a:highlight>
-                <a:latin typeface="system-ui"/>
+              <a:t>yes</a:t>
+            </a:r>
+            <a:r>
+              <a:rPr lang="en-US" sz="2400" b="0" i="0" dirty="0">
+                <a:effectLst/>
+                <a:latin typeface="+mn-lt"/>
               </a:rPr>
-              <a:t>Fail to reject null hypothesis. So no.</a:t>
-            </a:r>
-          </a:p>
-          <a:p>
-            <a:r>
-              <a:rPr lang="en-US" b="0" i="0" dirty="0">
+              <a:t>.</a:t>
+            </a:r>
+          </a:p>
+          <a:p>
+            <a:r>
+              <a:rPr lang="en-US" sz="2400" b="0" i="0" dirty="0">
                 <a:effectLst/>
-                <a:highlight>
-                  <a:srgbClr val="FFFFFF"/>
-                </a:highlight>
-                <a:latin typeface="system-ui"/>
+                <a:latin typeface="+mn-lt"/>
               </a:rPr>
-              <a:t>Does having more people of 35 to 44 years of age in a given state lead to fewer covid-19 infections for that state? (Label: DP05_0011E)</a:t>
-            </a:r>
-          </a:p>
-          <a:p>
-            <a:pPr lvl="1"/>
-            <a:r>
-              <a:rPr lang="en-US" dirty="0">
-                <a:highlight>
-                  <a:srgbClr val="FFFFFF"/>
-                </a:highlight>
-                <a:latin typeface="system-ui"/>
+              <a:t>There is no significant relationship between </a:t>
+            </a:r>
+            <a:r>
+              <a:rPr lang="en-US" sz="2400" b="1" i="0" dirty="0">
+                <a:solidFill>
+                  <a:schemeClr val="tx2">
+                    <a:lumMod val="75000"/>
+                    <a:lumOff val="25000"/>
+                  </a:schemeClr>
+                </a:solidFill>
+                <a:effectLst/>
+                <a:latin typeface="+mn-lt"/>
               </a:rPr>
-              <a:t>Reject null hypothesis. So yes.</a:t>
-            </a:r>
-            <a:endParaRPr lang="en-US" b="0" i="0" dirty="0">
+              <a:t>voter turnout </a:t>
+            </a:r>
+            <a:r>
+              <a:rPr lang="en-US" sz="2400" b="0" i="0" dirty="0">
+                <a:effectLst/>
+                <a:latin typeface="+mn-lt"/>
+              </a:rPr>
+              <a:t>in a state and the total number of COVID-19 cases reported in that state.</a:t>
+            </a:r>
+            <a:endParaRPr lang="en-US" sz="2400" dirty="0">
+              <a:latin typeface="+mn-lt"/>
+            </a:endParaRPr>
+          </a:p>
+          <a:p>
+            <a:pPr marL="0" indent="0">
+              <a:buNone/>
+            </a:pPr>
+            <a:r>
+              <a:rPr lang="en-US" sz="2400" b="0" i="0" dirty="0">
+                <a:effectLst/>
+                <a:latin typeface="+mn-lt"/>
+              </a:rPr>
+              <a:t>	Reject null hypothesis – so </a:t>
+            </a:r>
+            <a:r>
+              <a:rPr lang="en-US" sz="2400" b="0" i="0" dirty="0">
+                <a:solidFill>
+                  <a:schemeClr val="accent1">
+                    <a:lumMod val="75000"/>
+                  </a:schemeClr>
+                </a:solidFill>
+                <a:effectLst/>
+                <a:latin typeface="+mn-lt"/>
+              </a:rPr>
+              <a:t>yes</a:t>
+            </a:r>
+            <a:r>
+              <a:rPr lang="en-US" sz="2400" b="0" i="0" dirty="0">
+                <a:effectLst/>
+                <a:latin typeface="+mn-lt"/>
+              </a:rPr>
+              <a:t>.</a:t>
+            </a:r>
+          </a:p>
+          <a:p>
+            <a:r>
+              <a:rPr lang="en-US" sz="2400" dirty="0">
+                <a:latin typeface="+mn-lt"/>
+              </a:rPr>
+              <a:t> </a:t>
+            </a:r>
+            <a:r>
+              <a:rPr lang="en-US" sz="2400" b="0" i="0" dirty="0">
+                <a:effectLst/>
+                <a:latin typeface="+mn-lt"/>
+              </a:rPr>
+              <a:t>There is no significant correlation between the </a:t>
+            </a:r>
+            <a:r>
+              <a:rPr lang="en-US" sz="2400" b="1" i="0" dirty="0">
+                <a:solidFill>
+                  <a:schemeClr val="tx2">
+                    <a:lumMod val="75000"/>
+                    <a:lumOff val="25000"/>
+                  </a:schemeClr>
+                </a:solidFill>
+                <a:effectLst/>
+                <a:latin typeface="+mn-lt"/>
+              </a:rPr>
+              <a:t>population size </a:t>
+            </a:r>
+            <a:r>
+              <a:rPr lang="en-US" sz="2400" b="0" i="0" dirty="0">
+                <a:effectLst/>
+                <a:latin typeface="+mn-lt"/>
+              </a:rPr>
+              <a:t>of a state and the total number of COVID-19 cases reported in that state.</a:t>
+            </a:r>
+          </a:p>
+          <a:p>
+            <a:pPr marL="0" indent="0">
+              <a:buNone/>
+            </a:pPr>
+            <a:r>
+              <a:rPr lang="en-US" sz="2400" b="0" i="0" dirty="0">
+                <a:effectLst/>
+                <a:latin typeface="+mn-lt"/>
+              </a:rPr>
+              <a:t>	Fail to reject null hypothesis – so </a:t>
+            </a:r>
+            <a:r>
+              <a:rPr lang="en-US" sz="2400" b="0" i="0" dirty="0">
+                <a:solidFill>
+                  <a:schemeClr val="accent1">
+                    <a:lumMod val="75000"/>
+                  </a:schemeClr>
+                </a:solidFill>
+                <a:effectLst/>
+                <a:latin typeface="+mn-lt"/>
+              </a:rPr>
+              <a:t>no</a:t>
+            </a:r>
+            <a:r>
+              <a:rPr lang="en-US" sz="2400" b="0" i="0" dirty="0">
+                <a:effectLst/>
+                <a:latin typeface="+mn-lt"/>
+              </a:rPr>
+              <a:t>.</a:t>
+            </a:r>
+          </a:p>
+          <a:p>
+            <a:pPr marL="0" indent="0">
+              <a:buNone/>
+            </a:pPr>
+            <a:endParaRPr lang="en-US" sz="1800" b="0" i="0" dirty="0">
+              <a:solidFill>
+                <a:srgbClr val="212121"/>
+              </a:solidFill>
               <a:effectLst/>
-              <a:highlight>
-                <a:srgbClr val="FFFFFF"/>
-              </a:highlight>
-              <a:latin typeface="system-ui"/>
+              <a:latin typeface="+mn-lt"/>
             </a:endParaRPr>
           </a:p>
           <a:p>
-            <a:r>
-              <a:rPr lang="en-US" b="0" i="0" dirty="0">
-                <a:effectLst/>
-                <a:highlight>
-                  <a:srgbClr val="FFFFFF"/>
-                </a:highlight>
-                <a:latin typeface="system-ui"/>
-              </a:rPr>
-              <a:t>Does having more people aged 60 to 64 in a given state lead to more covid-19 cases for that state? (Label : DP05_0014E)</a:t>
-            </a:r>
-          </a:p>
-          <a:p>
-            <a:pPr lvl="1"/>
-            <a:r>
-              <a:rPr lang="en-US" dirty="0">
-                <a:highlight>
-                  <a:srgbClr val="FFFFFF"/>
-                </a:highlight>
-                <a:latin typeface="system-ui"/>
-              </a:rPr>
-              <a:t>Reject null hypothesis. So yes.</a:t>
-            </a:r>
-            <a:endParaRPr lang="en-US" b="0" i="0" dirty="0">
+            <a:pPr marL="0" indent="0">
+              <a:buNone/>
+            </a:pPr>
+            <a:endParaRPr lang="en-US" sz="1800" b="0" i="0" dirty="0">
+              <a:solidFill>
+                <a:srgbClr val="212121"/>
+              </a:solidFill>
               <a:effectLst/>
-              <a:highlight>
-                <a:srgbClr val="FFFFFF"/>
-              </a:highlight>
-              <a:latin typeface="system-ui"/>
+              <a:latin typeface="+mn-lt"/>
             </a:endParaRPr>
           </a:p>
+          <a:p>
+            <a:pPr marL="0" indent="0">
+              <a:buNone/>
+            </a:pPr>
+            <a:endParaRPr lang="en-US" sz="1800" b="0" i="0" dirty="0">
+              <a:solidFill>
+                <a:srgbClr val="212121"/>
+              </a:solidFill>
+              <a:effectLst/>
+              <a:latin typeface="+mn-lt"/>
+            </a:endParaRPr>
+          </a:p>
+          <a:p>
+            <a:endParaRPr lang="en-US" sz="1800" b="0" i="0" dirty="0">
+              <a:solidFill>
+                <a:srgbClr val="212121"/>
+              </a:solidFill>
+              <a:effectLst/>
+              <a:latin typeface="+mn-lt"/>
+            </a:endParaRPr>
+          </a:p>
+          <a:p>
+            <a:endParaRPr lang="en-US" dirty="0"/>
+          </a:p>
         </p:txBody>
       </p:sp>
       <p:sp>
@@ -9507,7 +9859,7 @@
           <p:cNvPr id="4" name="Slide Number Placeholder 3">
             <a:extLst>
               <a:ext uri="{FF2B5EF4-FFF2-40B4-BE49-F238E27FC236}">
-                <a16:creationId xmlns:a16="http://schemas.microsoft.com/office/drawing/2014/main" id="{6282CF4F-CBB0-C14E-002E-125B52A994D7}"/>
+                <a16:creationId xmlns:a16="http://schemas.microsoft.com/office/drawing/2014/main" id="{5A442099-1CA4-40F5-7D40-6EDEE0B48830}"/>
               </a:ext>
             </a:extLst>
           </p:cNvPr>
@@ -9534,7 +9886,7 @@
     </p:spTree>
     <p:extLst>
       <p:ext uri="{BB962C8B-B14F-4D97-AF65-F5344CB8AC3E}">
-        <p14:creationId xmlns:p14="http://schemas.microsoft.com/office/powerpoint/2010/main" val="3863562835"/>
+        <p14:creationId xmlns:p14="http://schemas.microsoft.com/office/powerpoint/2010/main" val="3345486609"/>
       </p:ext>
     </p:extLst>
   </p:cSld>
@@ -9566,7 +9918,7 @@
           <p:cNvPr id="2" name="Title 1">
             <a:extLst>
               <a:ext uri="{FF2B5EF4-FFF2-40B4-BE49-F238E27FC236}">
-                <a16:creationId xmlns:a16="http://schemas.microsoft.com/office/drawing/2014/main" id="{6221F52D-B146-E28D-6434-32AC8FB3861D}"/>
+                <a16:creationId xmlns:a16="http://schemas.microsoft.com/office/drawing/2014/main" id="{A8582CFB-D499-4A27-66AF-BCC0E53B5F0A}"/>
               </a:ext>
             </a:extLst>
           </p:cNvPr>
@@ -9577,178 +9929,55 @@
             <p:ph type="title"/>
           </p:nvPr>
         </p:nvSpPr>
-        <p:spPr/>
-        <p:txBody>
-          <a:bodyPr/>
-          <a:lstStyle/>
-          <a:p>
+        <p:spPr>
+          <a:xfrm>
+            <a:off x="838200" y="2885375"/>
+            <a:ext cx="10515600" cy="1087250"/>
+          </a:xfrm>
+        </p:spPr>
+        <p:txBody>
+          <a:bodyPr/>
+          <a:lstStyle/>
+          <a:p>
+            <a:pPr algn="ctr"/>
             <a:r>
               <a:rPr lang="en-US" dirty="0"/>
-              <a:t>Hypothesis test – Neetha Ravva</a:t>
-            </a:r>
-          </a:p>
-        </p:txBody>
-      </p:sp>
-      <p:sp>
-        <p:nvSpPr>
-          <p:cNvPr id="3" name="Content Placeholder 2">
-            <a:extLst>
-              <a:ext uri="{FF2B5EF4-FFF2-40B4-BE49-F238E27FC236}">
-                <a16:creationId xmlns:a16="http://schemas.microsoft.com/office/drawing/2014/main" id="{BD9EF911-40F8-7B2E-277C-B05AC18DA857}"/>
-              </a:ext>
-            </a:extLst>
-          </p:cNvPr>
-          <p:cNvSpPr>
-            <a:spLocks noGrp="1"/>
-          </p:cNvSpPr>
-          <p:nvPr>
-            <p:ph idx="1"/>
-          </p:nvPr>
-        </p:nvSpPr>
-        <p:spPr/>
-        <p:txBody>
-          <a:bodyPr/>
-          <a:lstStyle/>
-          <a:p>
-            <a:r>
-              <a:rPr lang="en-US" sz="1800" b="0" i="0" dirty="0">
-                <a:solidFill>
-                  <a:srgbClr val="212121"/>
-                </a:solidFill>
-                <a:effectLst/>
-                <a:latin typeface="+mn-lt"/>
-              </a:rPr>
-              <a:t>There is no significant correlation between the political party of the winning candidate in a state and the total number of COVID-19 cases reported in that state.</a:t>
-            </a:r>
-          </a:p>
-          <a:p>
-            <a:pPr marL="0" indent="0">
-              <a:buNone/>
-            </a:pPr>
-            <a:r>
-              <a:rPr lang="en-US" sz="1800" b="0" i="0" dirty="0">
-                <a:solidFill>
-                  <a:srgbClr val="212121"/>
-                </a:solidFill>
-                <a:effectLst/>
-                <a:latin typeface="+mn-lt"/>
-              </a:rPr>
-              <a:t>	Reject null hypothesis – so yes.</a:t>
-            </a:r>
-          </a:p>
-          <a:p>
-            <a:r>
-              <a:rPr lang="en-US" sz="1800" b="0" i="0" dirty="0">
-                <a:solidFill>
-                  <a:srgbClr val="212121"/>
-                </a:solidFill>
-                <a:effectLst/>
-                <a:latin typeface="+mn-lt"/>
-              </a:rPr>
-              <a:t>There is no significant relationship between voter turnout in a state and the total number of COVID-19 cases reported in that state.</a:t>
-            </a:r>
-            <a:endParaRPr lang="en-US" sz="1800" dirty="0">
-              <a:solidFill>
-                <a:srgbClr val="212121"/>
-              </a:solidFill>
-              <a:latin typeface="+mn-lt"/>
-            </a:endParaRPr>
-          </a:p>
-          <a:p>
-            <a:pPr marL="0" indent="0">
-              <a:buNone/>
-            </a:pPr>
-            <a:r>
-              <a:rPr lang="en-US" sz="1800" b="0" i="0" dirty="0">
-                <a:solidFill>
-                  <a:srgbClr val="212121"/>
-                </a:solidFill>
-                <a:effectLst/>
-                <a:latin typeface="+mn-lt"/>
-              </a:rPr>
-              <a:t>	Reject null hypothesis – so yes.</a:t>
-            </a:r>
-          </a:p>
-          <a:p>
-            <a:r>
-              <a:rPr lang="en-US" sz="1800" dirty="0">
-                <a:solidFill>
-                  <a:srgbClr val="212121"/>
-                </a:solidFill>
-                <a:latin typeface="+mn-lt"/>
-              </a:rPr>
-              <a:t> </a:t>
-            </a:r>
-            <a:r>
-              <a:rPr lang="en-US" sz="1800" b="0" i="0" dirty="0">
-                <a:solidFill>
-                  <a:srgbClr val="212121"/>
-                </a:solidFill>
-                <a:effectLst/>
-                <a:latin typeface="+mn-lt"/>
-              </a:rPr>
-              <a:t>There is no significant correlation between the population size of a state and the total number of COVID-19 cases reported in that state.</a:t>
-            </a:r>
-          </a:p>
-          <a:p>
-            <a:pPr marL="0" indent="0">
-              <a:buNone/>
-            </a:pPr>
-            <a:r>
-              <a:rPr lang="en-US" sz="1800" b="0" i="0" dirty="0">
-                <a:solidFill>
-                  <a:srgbClr val="212121"/>
-                </a:solidFill>
-                <a:effectLst/>
-                <a:latin typeface="+mn-lt"/>
-              </a:rPr>
-              <a:t>	Fail to reject null hypothesis – so no.</a:t>
-            </a:r>
-          </a:p>
-          <a:p>
-            <a:pPr marL="0" indent="0">
-              <a:buNone/>
-            </a:pPr>
-            <a:endParaRPr lang="en-US" sz="1800" b="0" i="0" dirty="0">
-              <a:solidFill>
-                <a:srgbClr val="212121"/>
-              </a:solidFill>
-              <a:effectLst/>
-              <a:latin typeface="+mn-lt"/>
-            </a:endParaRPr>
-          </a:p>
-          <a:p>
-            <a:pPr marL="0" indent="0">
-              <a:buNone/>
-            </a:pPr>
-            <a:endParaRPr lang="en-US" sz="1800" b="0" i="0" dirty="0">
-              <a:solidFill>
-                <a:srgbClr val="212121"/>
-              </a:solidFill>
-              <a:effectLst/>
-              <a:latin typeface="+mn-lt"/>
-            </a:endParaRPr>
-          </a:p>
-          <a:p>
-            <a:pPr marL="0" indent="0">
-              <a:buNone/>
-            </a:pPr>
-            <a:endParaRPr lang="en-US" sz="1800" b="0" i="0" dirty="0">
-              <a:solidFill>
-                <a:srgbClr val="212121"/>
-              </a:solidFill>
-              <a:effectLst/>
-              <a:latin typeface="+mn-lt"/>
-            </a:endParaRPr>
-          </a:p>
-          <a:p>
-            <a:endParaRPr lang="en-US" sz="1800" b="0" i="0" dirty="0">
-              <a:solidFill>
-                <a:srgbClr val="212121"/>
-              </a:solidFill>
-              <a:effectLst/>
-              <a:latin typeface="+mn-lt"/>
-            </a:endParaRPr>
+              <a:t>Stage 5: Dashboard</a:t>
+            </a:r>
+          </a:p>
+        </p:txBody>
+      </p:sp>
+      <p:sp>
+        <p:nvSpPr>
+          <p:cNvPr id="3" name="Text Placeholder 2">
+            <a:extLst>
+              <a:ext uri="{FF2B5EF4-FFF2-40B4-BE49-F238E27FC236}">
+                <a16:creationId xmlns:a16="http://schemas.microsoft.com/office/drawing/2014/main" id="{24211640-C3CF-59AE-6A31-08637E243D68}"/>
+              </a:ext>
+            </a:extLst>
+          </p:cNvPr>
+          <p:cNvSpPr>
+            <a:spLocks noGrp="1"/>
+          </p:cNvSpPr>
+          <p:nvPr>
+            <p:ph type="body" idx="1"/>
+          </p:nvPr>
+        </p:nvSpPr>
+        <p:spPr>
+          <a:xfrm>
+            <a:off x="838200" y="4066234"/>
+            <a:ext cx="10515600" cy="570313"/>
+          </a:xfrm>
+        </p:spPr>
+        <p:txBody>
+          <a:bodyPr/>
+          <a:lstStyle/>
+          <a:p>
+            <a:pPr algn="ctr"/>
+            <a:r>
+              <a:rPr lang="en-US" sz="2400" dirty="0"/>
+              <a:t>Interactive dashboard based on current analysis</a:t>
+            </a:r>
           </a:p>
           <a:p>
             <a:endParaRPr lang="en-US" dirty="0"/>
@@ -9757,10 +9986,10 @@
       </p:sp>
       <p:sp>
         <p:nvSpPr>
-          <p:cNvPr id="4" name="Slide Number Placeholder 3">
-            <a:extLst>
-              <a:ext uri="{FF2B5EF4-FFF2-40B4-BE49-F238E27FC236}">
-                <a16:creationId xmlns:a16="http://schemas.microsoft.com/office/drawing/2014/main" id="{5A442099-1CA4-40F5-7D40-6EDEE0B48830}"/>
+          <p:cNvPr id="5" name="Slide Number Placeholder 4">
+            <a:extLst>
+              <a:ext uri="{FF2B5EF4-FFF2-40B4-BE49-F238E27FC236}">
+                <a16:creationId xmlns:a16="http://schemas.microsoft.com/office/drawing/2014/main" id="{E52C6452-8D98-24F3-0F97-5A4F01A07796}"/>
               </a:ext>
             </a:extLst>
           </p:cNvPr>
@@ -9787,7 +10016,7 @@
     </p:spTree>
     <p:extLst>
       <p:ext uri="{BB962C8B-B14F-4D97-AF65-F5344CB8AC3E}">
-        <p14:creationId xmlns:p14="http://schemas.microsoft.com/office/powerpoint/2010/main" val="3345486609"/>
+        <p14:creationId xmlns:p14="http://schemas.microsoft.com/office/powerpoint/2010/main" val="3828559414"/>
       </p:ext>
     </p:extLst>
   </p:cSld>
@@ -9814,83 +10043,42 @@
           <a:chExt cx="0" cy="0"/>
         </a:xfrm>
       </p:grpSpPr>
-      <p:sp>
-        <p:nvSpPr>
-          <p:cNvPr id="2" name="Title 1">
-            <a:extLst>
-              <a:ext uri="{FF2B5EF4-FFF2-40B4-BE49-F238E27FC236}">
-                <a16:creationId xmlns:a16="http://schemas.microsoft.com/office/drawing/2014/main" id="{A8582CFB-D499-4A27-66AF-BCC0E53B5F0A}"/>
-              </a:ext>
-            </a:extLst>
-          </p:cNvPr>
-          <p:cNvSpPr>
-            <a:spLocks noGrp="1"/>
-          </p:cNvSpPr>
-          <p:nvPr>
-            <p:ph type="title"/>
-          </p:nvPr>
-        </p:nvSpPr>
+      <p:pic>
+        <p:nvPicPr>
+          <p:cNvPr id="5" name="Picture 4">
+            <a:extLst>
+              <a:ext uri="{FF2B5EF4-FFF2-40B4-BE49-F238E27FC236}">
+                <a16:creationId xmlns:a16="http://schemas.microsoft.com/office/drawing/2014/main" id="{5EFB312C-62DB-102C-B00C-9797C2B96A5C}"/>
+              </a:ext>
+            </a:extLst>
+          </p:cNvPr>
+          <p:cNvPicPr>
+            <a:picLocks noChangeAspect="1"/>
+          </p:cNvPicPr>
+          <p:nvPr/>
+        </p:nvPicPr>
+        <p:blipFill>
+          <a:blip r:embed="rId2"/>
+          <a:stretch>
+            <a:fillRect/>
+          </a:stretch>
+        </p:blipFill>
         <p:spPr>
           <a:xfrm>
-            <a:off x="838200" y="2885375"/>
-            <a:ext cx="10515600" cy="1087250"/>
+            <a:off x="1673629" y="295101"/>
+            <a:ext cx="9315796" cy="6305204"/>
           </a:xfrm>
+          <a:prstGeom prst="rect">
+            <a:avLst/>
+          </a:prstGeom>
         </p:spPr>
-        <p:txBody>
-          <a:bodyPr/>
-          <a:lstStyle/>
-          <a:p>
-            <a:pPr algn="ctr"/>
-            <a:r>
-              <a:rPr lang="en-US" dirty="0"/>
-              <a:t>Stage 5: Dashboard</a:t>
-            </a:r>
-          </a:p>
-        </p:txBody>
-      </p:sp>
-      <p:sp>
-        <p:nvSpPr>
-          <p:cNvPr id="3" name="Text Placeholder 2">
-            <a:extLst>
-              <a:ext uri="{FF2B5EF4-FFF2-40B4-BE49-F238E27FC236}">
-                <a16:creationId xmlns:a16="http://schemas.microsoft.com/office/drawing/2014/main" id="{24211640-C3CF-59AE-6A31-08637E243D68}"/>
-              </a:ext>
-            </a:extLst>
-          </p:cNvPr>
-          <p:cNvSpPr>
-            <a:spLocks noGrp="1"/>
-          </p:cNvSpPr>
-          <p:nvPr>
-            <p:ph type="body" idx="1"/>
-          </p:nvPr>
-        </p:nvSpPr>
-        <p:spPr>
-          <a:xfrm>
-            <a:off x="838200" y="4066234"/>
-            <a:ext cx="10515600" cy="570313"/>
-          </a:xfrm>
-        </p:spPr>
-        <p:txBody>
-          <a:bodyPr/>
-          <a:lstStyle/>
-          <a:p>
-            <a:pPr algn="ctr"/>
-            <a:r>
-              <a:rPr lang="en-US" sz="2400" dirty="0"/>
-              <a:t>Interactive dashboard based on current analysis</a:t>
-            </a:r>
-          </a:p>
-          <a:p>
-            <a:endParaRPr lang="en-US" dirty="0"/>
-          </a:p>
-        </p:txBody>
-      </p:sp>
-      <p:sp>
-        <p:nvSpPr>
-          <p:cNvPr id="5" name="Slide Number Placeholder 4">
-            <a:extLst>
-              <a:ext uri="{FF2B5EF4-FFF2-40B4-BE49-F238E27FC236}">
-                <a16:creationId xmlns:a16="http://schemas.microsoft.com/office/drawing/2014/main" id="{E52C6452-8D98-24F3-0F97-5A4F01A07796}"/>
+      </p:pic>
+      <p:sp>
+        <p:nvSpPr>
+          <p:cNvPr id="2" name="Slide Number Placeholder 1">
+            <a:extLst>
+              <a:ext uri="{FF2B5EF4-FFF2-40B4-BE49-F238E27FC236}">
+                <a16:creationId xmlns:a16="http://schemas.microsoft.com/office/drawing/2014/main" id="{5A1E8557-B88E-36CE-2F6E-0BABB6851E91}"/>
               </a:ext>
             </a:extLst>
           </p:cNvPr>
@@ -9917,7 +10105,7 @@
     </p:spTree>
     <p:extLst>
       <p:ext uri="{BB962C8B-B14F-4D97-AF65-F5344CB8AC3E}">
-        <p14:creationId xmlns:p14="http://schemas.microsoft.com/office/powerpoint/2010/main" val="3828559414"/>
+        <p14:creationId xmlns:p14="http://schemas.microsoft.com/office/powerpoint/2010/main" val="1349787492"/>
       </p:ext>
     </p:extLst>
   </p:cSld>
@@ -9946,10 +10134,10 @@
       </p:grpSpPr>
       <p:pic>
         <p:nvPicPr>
-          <p:cNvPr id="5" name="Picture 4">
-            <a:extLst>
-              <a:ext uri="{FF2B5EF4-FFF2-40B4-BE49-F238E27FC236}">
-                <a16:creationId xmlns:a16="http://schemas.microsoft.com/office/drawing/2014/main" id="{5EFB312C-62DB-102C-B00C-9797C2B96A5C}"/>
+          <p:cNvPr id="3" name="Picture 2">
+            <a:extLst>
+              <a:ext uri="{FF2B5EF4-FFF2-40B4-BE49-F238E27FC236}">
+                <a16:creationId xmlns:a16="http://schemas.microsoft.com/office/drawing/2014/main" id="{CF6E96EF-FF46-3F7F-20C5-FF12D3F4EFB4}"/>
               </a:ext>
             </a:extLst>
           </p:cNvPr>
@@ -9966,8 +10154,8 @@
         </p:blipFill>
         <p:spPr>
           <a:xfrm>
-            <a:off x="1673629" y="295101"/>
-            <a:ext cx="9315796" cy="6305204"/>
+            <a:off x="1667155" y="292681"/>
+            <a:ext cx="9200350" cy="6290999"/>
           </a:xfrm>
           <a:prstGeom prst="rect">
             <a:avLst/>
@@ -9979,7 +10167,7 @@
           <p:cNvPr id="2" name="Slide Number Placeholder 1">
             <a:extLst>
               <a:ext uri="{FF2B5EF4-FFF2-40B4-BE49-F238E27FC236}">
-                <a16:creationId xmlns:a16="http://schemas.microsoft.com/office/drawing/2014/main" id="{5A1E8557-B88E-36CE-2F6E-0BABB6851E91}"/>
+                <a16:creationId xmlns:a16="http://schemas.microsoft.com/office/drawing/2014/main" id="{B021B3E3-3613-537B-F642-992B9FB18B2F}"/>
               </a:ext>
             </a:extLst>
           </p:cNvPr>
@@ -10006,7 +10194,7 @@
     </p:spTree>
     <p:extLst>
       <p:ext uri="{BB962C8B-B14F-4D97-AF65-F5344CB8AC3E}">
-        <p14:creationId xmlns:p14="http://schemas.microsoft.com/office/powerpoint/2010/main" val="1349787492"/>
+        <p14:creationId xmlns:p14="http://schemas.microsoft.com/office/powerpoint/2010/main" val="431513734"/>
       </p:ext>
     </p:extLst>
   </p:cSld>
@@ -10167,95 +10355,6 @@
           <p:cNvPr id="3" name="Picture 2">
             <a:extLst>
               <a:ext uri="{FF2B5EF4-FFF2-40B4-BE49-F238E27FC236}">
-                <a16:creationId xmlns:a16="http://schemas.microsoft.com/office/drawing/2014/main" id="{CF6E96EF-FF46-3F7F-20C5-FF12D3F4EFB4}"/>
-              </a:ext>
-            </a:extLst>
-          </p:cNvPr>
-          <p:cNvPicPr>
-            <a:picLocks noChangeAspect="1"/>
-          </p:cNvPicPr>
-          <p:nvPr/>
-        </p:nvPicPr>
-        <p:blipFill>
-          <a:blip r:embed="rId2"/>
-          <a:stretch>
-            <a:fillRect/>
-          </a:stretch>
-        </p:blipFill>
-        <p:spPr>
-          <a:xfrm>
-            <a:off x="1667155" y="292681"/>
-            <a:ext cx="9200350" cy="6290999"/>
-          </a:xfrm>
-          <a:prstGeom prst="rect">
-            <a:avLst/>
-          </a:prstGeom>
-        </p:spPr>
-      </p:pic>
-      <p:sp>
-        <p:nvSpPr>
-          <p:cNvPr id="2" name="Slide Number Placeholder 1">
-            <a:extLst>
-              <a:ext uri="{FF2B5EF4-FFF2-40B4-BE49-F238E27FC236}">
-                <a16:creationId xmlns:a16="http://schemas.microsoft.com/office/drawing/2014/main" id="{B021B3E3-3613-537B-F642-992B9FB18B2F}"/>
-              </a:ext>
-            </a:extLst>
-          </p:cNvPr>
-          <p:cNvSpPr>
-            <a:spLocks noGrp="1"/>
-          </p:cNvSpPr>
-          <p:nvPr>
-            <p:ph type="sldNum" sz="quarter" idx="12"/>
-          </p:nvPr>
-        </p:nvSpPr>
-        <p:spPr/>
-        <p:txBody>
-          <a:bodyPr/>
-          <a:lstStyle/>
-          <a:p>
-            <a:fld id="{BD0DFC8E-D006-4B55-BBF2-7AB50F8F017C}" type="slidenum">
-              <a:rPr lang="en-US" smtClean="0"/>
-              <a:t>20</a:t>
-            </a:fld>
-            <a:endParaRPr lang="en-US"/>
-          </a:p>
-        </p:txBody>
-      </p:sp>
-    </p:spTree>
-    <p:extLst>
-      <p:ext uri="{BB962C8B-B14F-4D97-AF65-F5344CB8AC3E}">
-        <p14:creationId xmlns:p14="http://schemas.microsoft.com/office/powerpoint/2010/main" val="431513734"/>
-      </p:ext>
-    </p:extLst>
-  </p:cSld>
-  <p:clrMapOvr>
-    <a:masterClrMapping/>
-  </p:clrMapOvr>
-</p:sld>
-</file>
-
-<file path=ppt/slides/slide21.xml><?xml version="1.0" encoding="utf-8"?>
-<p:sld xmlns:a="http://schemas.openxmlformats.org/drawingml/2006/main" xmlns:r="http://schemas.openxmlformats.org/officeDocument/2006/relationships" xmlns:p="http://schemas.openxmlformats.org/presentationml/2006/main">
-  <p:cSld>
-    <p:spTree>
-      <p:nvGrpSpPr>
-        <p:cNvPr id="1" name=""/>
-        <p:cNvGrpSpPr/>
-        <p:nvPr/>
-      </p:nvGrpSpPr>
-      <p:grpSpPr>
-        <a:xfrm>
-          <a:off x="0" y="0"/>
-          <a:ext cx="0" cy="0"/>
-          <a:chOff x="0" y="0"/>
-          <a:chExt cx="0" cy="0"/>
-        </a:xfrm>
-      </p:grpSpPr>
-      <p:pic>
-        <p:nvPicPr>
-          <p:cNvPr id="3" name="Picture 2">
-            <a:extLst>
-              <a:ext uri="{FF2B5EF4-FFF2-40B4-BE49-F238E27FC236}">
                 <a16:creationId xmlns:a16="http://schemas.microsoft.com/office/drawing/2014/main" id="{99222D59-3A7D-6256-FE6A-2C73012C9B90}"/>
               </a:ext>
             </a:extLst>
@@ -10304,7 +10403,7 @@
           <a:p>
             <a:fld id="{BD0DFC8E-D006-4B55-BBF2-7AB50F8F017C}" type="slidenum">
               <a:rPr lang="en-US" smtClean="0"/>
-              <a:t>21</a:t>
+              <a:t>20</a:t>
             </a:fld>
             <a:endParaRPr lang="en-US"/>
           </a:p>
@@ -10410,6 +10509,12 @@
             <a:endParaRPr lang="en-US" dirty="0"/>
           </a:p>
           <a:p>
+            <a:pPr marL="0" indent="0">
+              <a:buNone/>
+            </a:pPr>
+            <a:endParaRPr lang="en-US" dirty="0"/>
+          </a:p>
+          <a:p>
             <a:r>
               <a:rPr lang="en-US" b="1" dirty="0"/>
               <a:t> Housing</a:t>
@@ -10418,6 +10523,9 @@
               <a:rPr lang="en-US" dirty="0"/>
               <a:t> – Kevin Hayes</a:t>
             </a:r>
+          </a:p>
+          <a:p>
+            <a:endParaRPr lang="en-US" dirty="0"/>
           </a:p>
           <a:p>
             <a:endParaRPr lang="en-US" dirty="0"/>
@@ -10463,6 +10571,147 @@
           </a:p>
         </p:txBody>
       </p:sp>
+      <p:pic>
+        <p:nvPicPr>
+          <p:cNvPr id="1026" name="Picture 2" descr="Voter Learning Center - Cicero Public Library">
+            <a:extLst>
+              <a:ext uri="{FF2B5EF4-FFF2-40B4-BE49-F238E27FC236}">
+                <a16:creationId xmlns:a16="http://schemas.microsoft.com/office/drawing/2014/main" id="{FF65C2EF-8A6D-8706-ABDD-A906122CC312}"/>
+              </a:ext>
+            </a:extLst>
+          </p:cNvPr>
+          <p:cNvPicPr>
+            <a:picLocks noChangeAspect="1" noChangeArrowheads="1"/>
+          </p:cNvPicPr>
+          <p:nvPr/>
+        </p:nvPicPr>
+        <p:blipFill>
+          <a:blip r:embed="rId2">
+            <a:extLst>
+              <a:ext uri="{28A0092B-C50C-407E-A947-70E740481C1C}">
+                <a14:useLocalDpi xmlns:a14="http://schemas.microsoft.com/office/drawing/2010/main" val="0"/>
+              </a:ext>
+            </a:extLst>
+          </a:blip>
+          <a:srcRect/>
+          <a:stretch>
+            <a:fillRect/>
+          </a:stretch>
+        </p:blipFill>
+        <p:spPr bwMode="auto">
+          <a:xfrm>
+            <a:off x="6798742" y="1211962"/>
+            <a:ext cx="2384107" cy="1316226"/>
+          </a:xfrm>
+          <a:prstGeom prst="rect">
+            <a:avLst/>
+          </a:prstGeom>
+          <a:noFill/>
+          <a:extLst>
+            <a:ext uri="{909E8E84-426E-40DD-AFC4-6F175D3DCCD1}">
+              <a14:hiddenFill xmlns:a14="http://schemas.microsoft.com/office/drawing/2010/main">
+                <a:solidFill>
+                  <a:srgbClr val="FFFFFF"/>
+                </a:solidFill>
+              </a14:hiddenFill>
+            </a:ext>
+          </a:extLst>
+        </p:spPr>
+      </p:pic>
+      <p:pic>
+        <p:nvPicPr>
+          <p:cNvPr id="1028" name="Picture 4" descr="House PNG Transparent Images Free Download - Pngfre">
+            <a:extLst>
+              <a:ext uri="{FF2B5EF4-FFF2-40B4-BE49-F238E27FC236}">
+                <a16:creationId xmlns:a16="http://schemas.microsoft.com/office/drawing/2014/main" id="{AC5A5C7A-A7F2-AD26-73C2-C1752CDF2C5F}"/>
+              </a:ext>
+            </a:extLst>
+          </p:cNvPr>
+          <p:cNvPicPr>
+            <a:picLocks noChangeAspect="1" noChangeArrowheads="1"/>
+          </p:cNvPicPr>
+          <p:nvPr/>
+        </p:nvPicPr>
+        <p:blipFill>
+          <a:blip r:embed="rId3">
+            <a:extLst>
+              <a:ext uri="{28A0092B-C50C-407E-A947-70E740481C1C}">
+                <a14:useLocalDpi xmlns:a14="http://schemas.microsoft.com/office/drawing/2010/main" val="0"/>
+              </a:ext>
+            </a:extLst>
+          </a:blip>
+          <a:srcRect/>
+          <a:stretch>
+            <a:fillRect/>
+          </a:stretch>
+        </p:blipFill>
+        <p:spPr bwMode="auto">
+          <a:xfrm>
+            <a:off x="5383367" y="3020392"/>
+            <a:ext cx="1089061" cy="1089061"/>
+          </a:xfrm>
+          <a:prstGeom prst="rect">
+            <a:avLst/>
+          </a:prstGeom>
+          <a:noFill/>
+          <a:extLst>
+            <a:ext uri="{909E8E84-426E-40DD-AFC4-6F175D3DCCD1}">
+              <a14:hiddenFill xmlns:a14="http://schemas.microsoft.com/office/drawing/2010/main">
+                <a:solidFill>
+                  <a:srgbClr val="FFFFFF"/>
+                </a:solidFill>
+              </a14:hiddenFill>
+            </a:ext>
+          </a:extLst>
+        </p:spPr>
+      </p:pic>
+      <p:pic>
+        <p:nvPicPr>
+          <p:cNvPr id="1036" name="Picture 12" descr="Briefcase Clip Art at Clker.com - vector clip art online, royalty free &amp;  public domain">
+            <a:extLst>
+              <a:ext uri="{FF2B5EF4-FFF2-40B4-BE49-F238E27FC236}">
+                <a16:creationId xmlns:a16="http://schemas.microsoft.com/office/drawing/2014/main" id="{DAFA2657-2FD1-5E16-47C8-21748E2B50CE}"/>
+              </a:ext>
+            </a:extLst>
+          </p:cNvPr>
+          <p:cNvPicPr>
+            <a:picLocks noChangeAspect="1" noChangeArrowheads="1"/>
+          </p:cNvPicPr>
+          <p:nvPr/>
+        </p:nvPicPr>
+        <p:blipFill>
+          <a:blip r:embed="rId4">
+            <a:extLst>
+              <a:ext uri="{28A0092B-C50C-407E-A947-70E740481C1C}">
+                <a14:useLocalDpi xmlns:a14="http://schemas.microsoft.com/office/drawing/2010/main" val="0"/>
+              </a:ext>
+            </a:extLst>
+          </a:blip>
+          <a:srcRect/>
+          <a:stretch>
+            <a:fillRect/>
+          </a:stretch>
+        </p:blipFill>
+        <p:spPr bwMode="auto">
+          <a:xfrm>
+            <a:off x="5927897" y="4652369"/>
+            <a:ext cx="1536999" cy="1291079"/>
+          </a:xfrm>
+          <a:prstGeom prst="rect">
+            <a:avLst/>
+          </a:prstGeom>
+          <a:noFill/>
+          <a:extLst>
+            <a:ext uri="{909E8E84-426E-40DD-AFC4-6F175D3DCCD1}">
+              <a14:hiddenFill xmlns:a14="http://schemas.microsoft.com/office/drawing/2010/main">
+                <a:solidFill>
+                  <a:srgbClr val="FFFFFF"/>
+                </a:solidFill>
+              </a14:hiddenFill>
+            </a:ext>
+          </a:extLst>
+        </p:spPr>
+      </p:pic>
     </p:spTree>
     <p:extLst>
       <p:ext uri="{BB962C8B-B14F-4D97-AF65-F5344CB8AC3E}">
@@ -11034,16 +11283,11 @@
               <a:rPr lang="en-US" dirty="0"/>
               <a:t> develop formal hypotheses for testing</a:t>
             </a:r>
-          </a:p>
-          <a:p>
-            <a:r>
-              <a:rPr lang="en-US" dirty="0">
-                <a:highlight>
-                  <a:srgbClr val="FFFF00"/>
-                </a:highlight>
-              </a:rPr>
-              <a:t>Each insert our own findings</a:t>
-            </a:r>
+            <a:endParaRPr lang="en-US" dirty="0">
+              <a:highlight>
+                <a:srgbClr val="FFFF00"/>
+              </a:highlight>
+            </a:endParaRPr>
           </a:p>
         </p:txBody>
       </p:sp>
@@ -11108,45 +11352,10 @@
       </p:grpSpPr>
       <p:sp>
         <p:nvSpPr>
-          <p:cNvPr id="2" name="Title 1">
-            <a:extLst>
-              <a:ext uri="{FF2B5EF4-FFF2-40B4-BE49-F238E27FC236}">
-                <a16:creationId xmlns:a16="http://schemas.microsoft.com/office/drawing/2014/main" id="{BDECF0B9-4322-F7B7-3373-CF5E092064B7}"/>
-              </a:ext>
-            </a:extLst>
-          </p:cNvPr>
-          <p:cNvSpPr>
-            <a:spLocks noGrp="1"/>
-          </p:cNvSpPr>
-          <p:nvPr>
-            <p:ph type="title"/>
-          </p:nvPr>
-        </p:nvSpPr>
-        <p:spPr>
-          <a:xfrm>
-            <a:off x="762896" y="239584"/>
-            <a:ext cx="10515600" cy="1114742"/>
-          </a:xfrm>
-        </p:spPr>
-        <p:txBody>
-          <a:bodyPr>
-            <a:normAutofit fontScale="90000"/>
-          </a:bodyPr>
-          <a:lstStyle/>
-          <a:p>
-            <a:r>
-              <a:rPr lang="en-US" dirty="0"/>
-              <a:t>Ayodeji Iwayemi –New York State</a:t>
-            </a:r>
-          </a:p>
-        </p:txBody>
-      </p:sp>
-      <p:sp>
-        <p:nvSpPr>
           <p:cNvPr id="4" name="Slide Number Placeholder 3">
             <a:extLst>
               <a:ext uri="{FF2B5EF4-FFF2-40B4-BE49-F238E27FC236}">
-                <a16:creationId xmlns:a16="http://schemas.microsoft.com/office/drawing/2014/main" id="{EFB8A8B7-ED6D-A0DF-43C4-7E0348013F56}"/>
+                <a16:creationId xmlns:a16="http://schemas.microsoft.com/office/drawing/2014/main" id="{1A20835A-50EC-D204-4515-7019B335C973}"/>
               </a:ext>
             </a:extLst>
           </p:cNvPr>
@@ -11170,12 +11379,180 @@
           </a:p>
         </p:txBody>
       </p:sp>
+      <p:sp>
+        <p:nvSpPr>
+          <p:cNvPr id="6" name="TextBox 5">
+            <a:extLst>
+              <a:ext uri="{FF2B5EF4-FFF2-40B4-BE49-F238E27FC236}">
+                <a16:creationId xmlns:a16="http://schemas.microsoft.com/office/drawing/2014/main" id="{CB8D7F04-13CA-5BBC-7A77-3D9D4B076D6D}"/>
+              </a:ext>
+            </a:extLst>
+          </p:cNvPr>
+          <p:cNvSpPr txBox="1"/>
+          <p:nvPr/>
+        </p:nvSpPr>
+        <p:spPr>
+          <a:xfrm>
+            <a:off x="460586" y="3853928"/>
+            <a:ext cx="11270827" cy="2785378"/>
+          </a:xfrm>
+          <a:prstGeom prst="rect">
+            <a:avLst/>
+          </a:prstGeom>
+          <a:noFill/>
+        </p:spPr>
+        <p:txBody>
+          <a:bodyPr wrap="square">
+            <a:spAutoFit/>
+          </a:bodyPr>
+          <a:lstStyle/>
+          <a:p>
+            <a:pPr marL="342900" indent="-342900" algn="just">
+              <a:spcAft>
+                <a:spcPts val="600"/>
+              </a:spcAft>
+              <a:buFont typeface="Arial" panose="020B0604020202020204" pitchFamily="34" charset="0"/>
+              <a:buChar char="•"/>
+            </a:pPr>
+            <a:r>
+              <a:rPr lang="en-US" sz="2000" b="1" dirty="0"/>
+              <a:t>Hypothesis 1: </a:t>
+            </a:r>
+            <a:r>
+              <a:rPr lang="en-US" sz="2000" dirty="0"/>
+              <a:t>There is a significant correlation between the total number of votes cast in the 2020 presidential election and the number of COVID-19 cases in New York counties between 2020-06-01 and 2021-01-03.</a:t>
+            </a:r>
+          </a:p>
+          <a:p>
+            <a:pPr marL="342900" indent="-342900" algn="just">
+              <a:spcAft>
+                <a:spcPts val="600"/>
+              </a:spcAft>
+              <a:buFont typeface="Arial" panose="020B0604020202020204" pitchFamily="34" charset="0"/>
+              <a:buChar char="•"/>
+            </a:pPr>
+            <a:r>
+              <a:rPr lang="en-US" sz="2000" b="1" dirty="0"/>
+              <a:t>Hypothesis 2: </a:t>
+            </a:r>
+            <a:r>
+              <a:rPr lang="en-US" sz="2000" dirty="0"/>
+              <a:t>Counties where a Democratic candidate won the election led to a higher number of COVID-19 cases compared to counties where a Republican candidate won.</a:t>
+            </a:r>
+          </a:p>
+          <a:p>
+            <a:pPr marL="342900" indent="-342900" algn="just">
+              <a:spcAft>
+                <a:spcPts val="600"/>
+              </a:spcAft>
+              <a:buFont typeface="Arial" panose="020B0604020202020204" pitchFamily="34" charset="0"/>
+              <a:buChar char="•"/>
+            </a:pPr>
+            <a:r>
+              <a:rPr lang="en-US" sz="2000" b="1" dirty="0"/>
+              <a:t>Hypothesis 3: </a:t>
+            </a:r>
+            <a:r>
+              <a:rPr lang="en-US" sz="2000" dirty="0"/>
+              <a:t>The victory of Joe Biden in the 2020 presidential election in New York has a significant influence on the increase in COVID-19 cases in the state.</a:t>
+            </a:r>
+          </a:p>
+          <a:p>
+            <a:pPr algn="just" rtl="0"/>
+            <a:endParaRPr lang="en-US" sz="2000" dirty="0"/>
+          </a:p>
+        </p:txBody>
+      </p:sp>
+      <p:sp>
+        <p:nvSpPr>
+          <p:cNvPr id="7" name="TextBox 6">
+            <a:extLst>
+              <a:ext uri="{FF2B5EF4-FFF2-40B4-BE49-F238E27FC236}">
+                <a16:creationId xmlns:a16="http://schemas.microsoft.com/office/drawing/2014/main" id="{FE52078A-E7CA-9013-93B3-686DFA0B282D}"/>
+              </a:ext>
+            </a:extLst>
+          </p:cNvPr>
+          <p:cNvSpPr txBox="1"/>
+          <p:nvPr/>
+        </p:nvSpPr>
+        <p:spPr>
+          <a:xfrm>
+            <a:off x="355598" y="464915"/>
+            <a:ext cx="11270827" cy="923330"/>
+          </a:xfrm>
+          <a:prstGeom prst="rect">
+            <a:avLst/>
+          </a:prstGeom>
+          <a:noFill/>
+        </p:spPr>
+        <p:txBody>
+          <a:bodyPr wrap="square">
+            <a:spAutoFit/>
+          </a:bodyPr>
+          <a:lstStyle/>
+          <a:p>
+            <a:pPr rtl="0"/>
+            <a:r>
+              <a:rPr kumimoji="0" lang="en-US" sz="5400" b="0" i="0" u="none" strike="noStrike" kern="1200" cap="none" spc="0" normalizeH="0" baseline="0" noProof="0" dirty="0">
+                <a:ln>
+                  <a:noFill/>
+                </a:ln>
+                <a:solidFill>
+                  <a:srgbClr val="0F2044"/>
+                </a:solidFill>
+                <a:effectLst/>
+                <a:uLnTx/>
+                <a:uFillTx/>
+                <a:latin typeface="Georgia" panose="02040502050405020303" pitchFamily="18" charset="0"/>
+                <a:ea typeface="+mj-ea"/>
+                <a:cs typeface="+mj-cs"/>
+              </a:rPr>
+              <a:t>Ayodeji </a:t>
+            </a:r>
+            <a:r>
+              <a:rPr kumimoji="0" lang="en-US" sz="5400" b="0" i="0" u="none" strike="noStrike" kern="1200" cap="none" spc="0" normalizeH="0" baseline="0" noProof="0" dirty="0" err="1">
+                <a:ln>
+                  <a:noFill/>
+                </a:ln>
+                <a:solidFill>
+                  <a:srgbClr val="0F2044"/>
+                </a:solidFill>
+                <a:effectLst/>
+                <a:uLnTx/>
+                <a:uFillTx/>
+                <a:latin typeface="Georgia" panose="02040502050405020303" pitchFamily="18" charset="0"/>
+                <a:ea typeface="+mj-ea"/>
+                <a:cs typeface="+mj-cs"/>
+              </a:rPr>
+              <a:t>Iwayemi</a:t>
+            </a:r>
+            <a:r>
+              <a:rPr kumimoji="0" lang="en-US" sz="5400" b="0" i="0" u="none" strike="noStrike" kern="1200" cap="none" spc="0" normalizeH="0" baseline="0" noProof="0" dirty="0">
+                <a:ln>
+                  <a:noFill/>
+                </a:ln>
+                <a:solidFill>
+                  <a:srgbClr val="0F2044"/>
+                </a:solidFill>
+                <a:effectLst/>
+                <a:uLnTx/>
+                <a:uFillTx/>
+                <a:latin typeface="Georgia" panose="02040502050405020303" pitchFamily="18" charset="0"/>
+                <a:ea typeface="+mj-ea"/>
+                <a:cs typeface="+mj-cs"/>
+              </a:rPr>
+              <a:t> –New York State</a:t>
+            </a:r>
+            <a:endParaRPr lang="en-US" sz="2800" dirty="0"/>
+          </a:p>
+        </p:txBody>
+      </p:sp>
       <p:pic>
         <p:nvPicPr>
-          <p:cNvPr id="5" name="Picture 4" descr="A graph of a number of cases&#10;&#10;Description automatically generated">
-            <a:extLst>
-              <a:ext uri="{FF2B5EF4-FFF2-40B4-BE49-F238E27FC236}">
-                <a16:creationId xmlns:a16="http://schemas.microsoft.com/office/drawing/2014/main" id="{EBDEFD7F-54A2-1834-B409-6327F28A0BB9}"/>
+          <p:cNvPr id="2" name="Picture 1" descr="A graph of a number of cases&#10;&#10;Description automatically generated">
+            <a:extLst>
+              <a:ext uri="{FF2B5EF4-FFF2-40B4-BE49-F238E27FC236}">
+                <a16:creationId xmlns:a16="http://schemas.microsoft.com/office/drawing/2014/main" id="{B2BFAFCC-153E-94D9-116D-C0C8F133E8A3}"/>
               </a:ext>
             </a:extLst>
           </p:cNvPr>
@@ -11198,8 +11575,8 @@
         </p:blipFill>
         <p:spPr>
           <a:xfrm>
-            <a:off x="762896" y="1621934"/>
-            <a:ext cx="5021947" cy="3829869"/>
+            <a:off x="2423094" y="1527197"/>
+            <a:ext cx="3058757" cy="2332687"/>
           </a:xfrm>
           <a:prstGeom prst="rect">
             <a:avLst/>
@@ -11208,10 +11585,10 @@
       </p:pic>
       <p:pic>
         <p:nvPicPr>
-          <p:cNvPr id="6" name="Picture 5" descr="A graph with a blue line&#10;&#10;Description automatically generated">
-            <a:extLst>
-              <a:ext uri="{FF2B5EF4-FFF2-40B4-BE49-F238E27FC236}">
-                <a16:creationId xmlns:a16="http://schemas.microsoft.com/office/drawing/2014/main" id="{A3D411CD-A398-6247-5C4A-D785D69FD1E3}"/>
+          <p:cNvPr id="3" name="Picture 2" descr="A graph with a blue line&#10;&#10;Description automatically generated">
+            <a:extLst>
+              <a:ext uri="{FF2B5EF4-FFF2-40B4-BE49-F238E27FC236}">
+                <a16:creationId xmlns:a16="http://schemas.microsoft.com/office/drawing/2014/main" id="{E9CE70FA-D5C6-EA8E-57C3-A8F5C20FC8FF}"/>
               </a:ext>
             </a:extLst>
           </p:cNvPr>
@@ -11234,8 +11611,8 @@
         </p:blipFill>
         <p:spPr>
           <a:xfrm>
-            <a:off x="6256549" y="1621935"/>
-            <a:ext cx="5021947" cy="3829868"/>
+            <a:off x="6096001" y="1527197"/>
+            <a:ext cx="3058757" cy="2332686"/>
           </a:xfrm>
           <a:prstGeom prst="rect">
             <a:avLst/>
@@ -11244,10 +11621,10 @@
       </p:pic>
       <p:sp>
         <p:nvSpPr>
-          <p:cNvPr id="7" name="TextBox 6">
-            <a:extLst>
-              <a:ext uri="{FF2B5EF4-FFF2-40B4-BE49-F238E27FC236}">
-                <a16:creationId xmlns:a16="http://schemas.microsoft.com/office/drawing/2014/main" id="{CE2FE2DA-87CA-2DBF-3F7B-0AB5FC68E281}"/>
+          <p:cNvPr id="5" name="TextBox 4">
+            <a:extLst>
+              <a:ext uri="{FF2B5EF4-FFF2-40B4-BE49-F238E27FC236}">
+                <a16:creationId xmlns:a16="http://schemas.microsoft.com/office/drawing/2014/main" id="{97CA58CD-174D-4EB5-AA37-AD47636CAD1D}"/>
               </a:ext>
             </a:extLst>
           </p:cNvPr>
@@ -11256,8 +11633,8 @@
         </p:nvSpPr>
         <p:spPr>
           <a:xfrm>
-            <a:off x="1699683" y="5492166"/>
-            <a:ext cx="9654117" cy="276999"/>
+            <a:off x="9684278" y="1649868"/>
+            <a:ext cx="1895891" cy="738664"/>
           </a:xfrm>
           <a:prstGeom prst="rect">
             <a:avLst/>
@@ -11270,10 +11647,9 @@
           </a:bodyPr>
           <a:lstStyle/>
           <a:p>
-            <a:pPr algn="ctr"/>
-            <a:r>
-              <a:rPr lang="en-US" sz="1200" b="1" dirty="0"/>
-              <a:t>Figure 1:  Poisson Distribution of COVID-19 cases and deaths in New York State</a:t>
+            <a:r>
+              <a:rPr lang="en-US" sz="1050" b="1" dirty="0"/>
+              <a:t>Figures:  Poisson Distribution of COVID-19 cases and deaths in New York State</a:t>
             </a:r>
           </a:p>
         </p:txBody>
@@ -11281,7 +11657,7 @@
     </p:spTree>
     <p:extLst>
       <p:ext uri="{BB962C8B-B14F-4D97-AF65-F5344CB8AC3E}">
-        <p14:creationId xmlns:p14="http://schemas.microsoft.com/office/powerpoint/2010/main" val="3531089478"/>
+        <p14:creationId xmlns:p14="http://schemas.microsoft.com/office/powerpoint/2010/main" val="846081418"/>
       </p:ext>
     </p:extLst>
   </p:cSld>
@@ -11310,18 +11686,18 @@
       </p:grpSpPr>
       <p:sp>
         <p:nvSpPr>
-          <p:cNvPr id="4" name="Slide Number Placeholder 3">
-            <a:extLst>
-              <a:ext uri="{FF2B5EF4-FFF2-40B4-BE49-F238E27FC236}">
-                <a16:creationId xmlns:a16="http://schemas.microsoft.com/office/drawing/2014/main" id="{1A20835A-50EC-D204-4515-7019B335C973}"/>
-              </a:ext>
-            </a:extLst>
-          </p:cNvPr>
-          <p:cNvSpPr>
-            <a:spLocks noGrp="1"/>
-          </p:cNvSpPr>
-          <p:nvPr>
-            <p:ph type="sldNum" sz="quarter" idx="12"/>
+          <p:cNvPr id="2" name="Title 1">
+            <a:extLst>
+              <a:ext uri="{FF2B5EF4-FFF2-40B4-BE49-F238E27FC236}">
+                <a16:creationId xmlns:a16="http://schemas.microsoft.com/office/drawing/2014/main" id="{1692FA9F-CF39-A7AE-6A66-2DFACA6475D8}"/>
+              </a:ext>
+            </a:extLst>
+          </p:cNvPr>
+          <p:cNvSpPr>
+            <a:spLocks noGrp="1"/>
+          </p:cNvSpPr>
+          <p:nvPr>
+            <p:ph type="title"/>
           </p:nvPr>
         </p:nvSpPr>
         <p:spPr/>
@@ -11329,20 +11705,181 @@
           <a:bodyPr/>
           <a:lstStyle/>
           <a:p>
-            <a:fld id="{BD0DFC8E-D006-4B55-BBF2-7AB50F8F017C}" type="slidenum">
-              <a:rPr lang="en-US" smtClean="0"/>
-              <a:t>8</a:t>
-            </a:fld>
-            <a:endParaRPr lang="en-US"/>
-          </a:p>
-        </p:txBody>
-      </p:sp>
-      <p:sp>
-        <p:nvSpPr>
-          <p:cNvPr id="6" name="TextBox 5">
-            <a:extLst>
-              <a:ext uri="{FF2B5EF4-FFF2-40B4-BE49-F238E27FC236}">
-                <a16:creationId xmlns:a16="http://schemas.microsoft.com/office/drawing/2014/main" id="{CB8D7F04-13CA-5BBC-7A77-3D9D4B076D6D}"/>
+            <a:r>
+              <a:rPr lang="en-US" dirty="0"/>
+              <a:t>Employment – Kol Herget (SC)</a:t>
+            </a:r>
+          </a:p>
+        </p:txBody>
+      </p:sp>
+      <p:sp>
+        <p:nvSpPr>
+          <p:cNvPr id="3" name="Content Placeholder 2">
+            <a:extLst>
+              <a:ext uri="{FF2B5EF4-FFF2-40B4-BE49-F238E27FC236}">
+                <a16:creationId xmlns:a16="http://schemas.microsoft.com/office/drawing/2014/main" id="{6BA5FA6A-48CE-38FF-2666-8E237984281D}"/>
+              </a:ext>
+            </a:extLst>
+          </p:cNvPr>
+          <p:cNvSpPr>
+            <a:spLocks noGrp="1"/>
+          </p:cNvSpPr>
+          <p:nvPr>
+            <p:ph idx="1"/>
+          </p:nvPr>
+        </p:nvSpPr>
+        <p:spPr>
+          <a:xfrm>
+            <a:off x="838200" y="4195482"/>
+            <a:ext cx="10515600" cy="1981480"/>
+          </a:xfrm>
+        </p:spPr>
+        <p:txBody>
+          <a:bodyPr>
+            <a:normAutofit lnSpcReduction="10000"/>
+          </a:bodyPr>
+          <a:lstStyle/>
+          <a:p>
+            <a:pPr marL="0" indent="0">
+              <a:buNone/>
+            </a:pPr>
+            <a:r>
+              <a:rPr lang="en-US" dirty="0"/>
+              <a:t>Hypotheses:</a:t>
+            </a:r>
+          </a:p>
+          <a:p>
+            <a:pPr lvl="1"/>
+            <a:r>
+              <a:rPr lang="en-US" dirty="0"/>
+              <a:t>Higher employment level…</a:t>
+            </a:r>
+          </a:p>
+          <a:p>
+            <a:pPr lvl="1"/>
+            <a:r>
+              <a:rPr lang="en-US" dirty="0"/>
+              <a:t>Higher taxable annual wages…</a:t>
+            </a:r>
+          </a:p>
+          <a:p>
+            <a:pPr lvl="1"/>
+            <a:r>
+              <a:rPr lang="en-US" dirty="0"/>
+              <a:t>Higher establishments counts…</a:t>
+            </a:r>
+          </a:p>
+          <a:p>
+            <a:pPr marL="0" indent="0">
+              <a:buNone/>
+            </a:pPr>
+            <a:r>
+              <a:rPr lang="en-US" sz="2400" dirty="0"/>
+              <a:t>…lead to higher numbers of cases in all states</a:t>
+            </a:r>
+          </a:p>
+        </p:txBody>
+      </p:sp>
+      <p:pic>
+        <p:nvPicPr>
+          <p:cNvPr id="5" name="Picture 4">
+            <a:extLst>
+              <a:ext uri="{FF2B5EF4-FFF2-40B4-BE49-F238E27FC236}">
+                <a16:creationId xmlns:a16="http://schemas.microsoft.com/office/drawing/2014/main" id="{4C066E62-B085-06AB-9ED1-0115BEC7D16B}"/>
+              </a:ext>
+            </a:extLst>
+          </p:cNvPr>
+          <p:cNvPicPr>
+            <a:picLocks noChangeAspect="1"/>
+          </p:cNvPicPr>
+          <p:nvPr/>
+        </p:nvPicPr>
+        <p:blipFill rotWithShape="1">
+          <a:blip r:embed="rId3"/>
+          <a:srcRect t="1026" b="1"/>
+          <a:stretch/>
+        </p:blipFill>
+        <p:spPr>
+          <a:xfrm>
+            <a:off x="838199" y="1477399"/>
+            <a:ext cx="3268831" cy="2529361"/>
+          </a:xfrm>
+          <a:prstGeom prst="rect">
+            <a:avLst/>
+          </a:prstGeom>
+        </p:spPr>
+      </p:pic>
+      <p:pic>
+        <p:nvPicPr>
+          <p:cNvPr id="7" name="Picture 6">
+            <a:extLst>
+              <a:ext uri="{FF2B5EF4-FFF2-40B4-BE49-F238E27FC236}">
+                <a16:creationId xmlns:a16="http://schemas.microsoft.com/office/drawing/2014/main" id="{F3B78F6A-568E-4923-72AF-5AF585AA4ADC}"/>
+              </a:ext>
+            </a:extLst>
+          </p:cNvPr>
+          <p:cNvPicPr>
+            <a:picLocks noChangeAspect="1"/>
+          </p:cNvPicPr>
+          <p:nvPr/>
+        </p:nvPicPr>
+        <p:blipFill>
+          <a:blip r:embed="rId4">
+            <a:extLst>
+              <a:ext uri="{28A0092B-C50C-407E-A947-70E740481C1C}">
+                <a14:useLocalDpi xmlns:a14="http://schemas.microsoft.com/office/drawing/2010/main" val="0"/>
+              </a:ext>
+            </a:extLst>
+          </a:blip>
+          <a:srcRect/>
+          <a:stretch/>
+        </p:blipFill>
+        <p:spPr>
+          <a:xfrm>
+            <a:off x="4270783" y="1477399"/>
+            <a:ext cx="3303387" cy="2529360"/>
+          </a:xfrm>
+          <a:prstGeom prst="rect">
+            <a:avLst/>
+          </a:prstGeom>
+        </p:spPr>
+      </p:pic>
+      <p:pic>
+        <p:nvPicPr>
+          <p:cNvPr id="9" name="Picture 8">
+            <a:extLst>
+              <a:ext uri="{FF2B5EF4-FFF2-40B4-BE49-F238E27FC236}">
+                <a16:creationId xmlns:a16="http://schemas.microsoft.com/office/drawing/2014/main" id="{E1096F58-4AB0-E1C1-38E3-5B48C5CAD003}"/>
+              </a:ext>
+            </a:extLst>
+          </p:cNvPr>
+          <p:cNvPicPr>
+            <a:picLocks noChangeAspect="1"/>
+          </p:cNvPicPr>
+          <p:nvPr/>
+        </p:nvPicPr>
+        <p:blipFill>
+          <a:blip r:embed="rId5"/>
+          <a:stretch>
+            <a:fillRect/>
+          </a:stretch>
+        </p:blipFill>
+        <p:spPr>
+          <a:xfrm>
+            <a:off x="7696252" y="1477400"/>
+            <a:ext cx="3257310" cy="2529360"/>
+          </a:xfrm>
+          <a:prstGeom prst="rect">
+            <a:avLst/>
+          </a:prstGeom>
+        </p:spPr>
+      </p:pic>
+      <p:sp>
+        <p:nvSpPr>
+          <p:cNvPr id="10" name="TextBox 9">
+            <a:extLst>
+              <a:ext uri="{FF2B5EF4-FFF2-40B4-BE49-F238E27FC236}">
+                <a16:creationId xmlns:a16="http://schemas.microsoft.com/office/drawing/2014/main" id="{127A22CD-B57D-BEF5-48C0-5FA9B526A8B2}"/>
               </a:ext>
             </a:extLst>
           </p:cNvPr>
@@ -11351,8 +11888,8 @@
         </p:nvSpPr>
         <p:spPr>
           <a:xfrm>
-            <a:off x="355598" y="1302497"/>
-            <a:ext cx="11270827" cy="4585871"/>
+            <a:off x="8374828" y="4186148"/>
+            <a:ext cx="2616386" cy="738664"/>
           </a:xfrm>
           <a:prstGeom prst="rect">
             <a:avLst/>
@@ -11360,115 +11897,51 @@
           <a:noFill/>
         </p:spPr>
         <p:txBody>
-          <a:bodyPr wrap="square">
+          <a:bodyPr wrap="square" rtlCol="0">
             <a:spAutoFit/>
           </a:bodyPr>
           <a:lstStyle/>
           <a:p>
-            <a:pPr marL="342900" indent="-342900" algn="just">
-              <a:buFont typeface="Arial" panose="020B0604020202020204" pitchFamily="34" charset="0"/>
-              <a:buChar char="•"/>
-            </a:pPr>
-            <a:r>
-              <a:rPr lang="en-US" sz="2200" b="1" dirty="0"/>
-              <a:t>Hypothesis 1: </a:t>
-            </a:r>
-            <a:r>
-              <a:rPr lang="en-US" sz="2200" dirty="0"/>
-              <a:t>There is a significant correlation between the total number of votes cast in the 2020 presidential election and the number of COVID-19 cases in New York counties between 2020-06-01 and 2021-01-03.</a:t>
-            </a:r>
-          </a:p>
-          <a:p>
-            <a:pPr algn="just"/>
-            <a:endParaRPr lang="en-US" sz="2200" dirty="0"/>
-          </a:p>
-          <a:p>
-            <a:pPr algn="just"/>
-            <a:endParaRPr lang="en-US" sz="2200" dirty="0"/>
-          </a:p>
-          <a:p>
-            <a:pPr marL="342900" indent="-342900" algn="just">
-              <a:buFont typeface="Arial" panose="020B0604020202020204" pitchFamily="34" charset="0"/>
-              <a:buChar char="•"/>
-            </a:pPr>
-            <a:r>
-              <a:rPr lang="en-US" sz="2200" b="1" dirty="0"/>
-              <a:t>Hypothesis 2: </a:t>
-            </a:r>
-            <a:r>
-              <a:rPr lang="en-US" sz="2200" dirty="0"/>
-              <a:t>Counties where a Democratic candidate won the election led to a higher number of COVID-19 cases compared to counties where a Republican candidate won.</a:t>
-            </a:r>
-          </a:p>
-          <a:p>
-            <a:pPr algn="just"/>
-            <a:endParaRPr lang="en-US" sz="2200" dirty="0"/>
-          </a:p>
-          <a:p>
-            <a:pPr algn="just"/>
-            <a:endParaRPr lang="en-US" sz="2200" dirty="0"/>
-          </a:p>
-          <a:p>
-            <a:pPr marL="342900" indent="-342900" algn="just">
-              <a:buFont typeface="Arial" panose="020B0604020202020204" pitchFamily="34" charset="0"/>
-              <a:buChar char="•"/>
-            </a:pPr>
-            <a:r>
-              <a:rPr lang="en-US" sz="2200" b="1" dirty="0"/>
-              <a:t>Hypothesis 3: </a:t>
-            </a:r>
-            <a:r>
-              <a:rPr lang="en-US" sz="2200" dirty="0"/>
-              <a:t>The victory of Joe Biden in the 2020 presidential election in New York has a significant influence on the increase in COVID-19 cases in the state.</a:t>
-            </a:r>
-          </a:p>
-          <a:p>
-            <a:pPr algn="just" rtl="0"/>
-            <a:endParaRPr lang="en-US" sz="2800" dirty="0"/>
-          </a:p>
-        </p:txBody>
-      </p:sp>
-      <p:sp>
-        <p:nvSpPr>
-          <p:cNvPr id="7" name="TextBox 6">
-            <a:extLst>
-              <a:ext uri="{FF2B5EF4-FFF2-40B4-BE49-F238E27FC236}">
-                <a16:creationId xmlns:a16="http://schemas.microsoft.com/office/drawing/2014/main" id="{FE52078A-E7CA-9013-93B3-686DFA0B282D}"/>
-              </a:ext>
-            </a:extLst>
-          </p:cNvPr>
-          <p:cNvSpPr txBox="1"/>
-          <p:nvPr/>
-        </p:nvSpPr>
-        <p:spPr>
-          <a:xfrm>
-            <a:off x="355598" y="464915"/>
-            <a:ext cx="11270827" cy="523220"/>
-          </a:xfrm>
-          <a:prstGeom prst="rect">
-            <a:avLst/>
-          </a:prstGeom>
-          <a:noFill/>
-        </p:spPr>
-        <p:txBody>
-          <a:bodyPr wrap="square">
-            <a:spAutoFit/>
-          </a:bodyPr>
-          <a:lstStyle/>
-          <a:p>
-            <a:pPr rtl="0"/>
-            <a:r>
-              <a:rPr lang="en-US" sz="2800" b="1" dirty="0"/>
-              <a:t>Hypothesis Tests</a:t>
-            </a:r>
-            <a:endParaRPr lang="en-US" sz="2800" dirty="0"/>
+            <a:r>
+              <a:rPr lang="en-US" sz="1400" i="1" dirty="0"/>
+              <a:t>Compared normalized data from each category against normalized COVID cases data</a:t>
+            </a:r>
+          </a:p>
+        </p:txBody>
+      </p:sp>
+      <p:sp>
+        <p:nvSpPr>
+          <p:cNvPr id="4" name="Slide Number Placeholder 3">
+            <a:extLst>
+              <a:ext uri="{FF2B5EF4-FFF2-40B4-BE49-F238E27FC236}">
+                <a16:creationId xmlns:a16="http://schemas.microsoft.com/office/drawing/2014/main" id="{B91EC445-2B2A-0102-2A2C-1DA52E774D81}"/>
+              </a:ext>
+            </a:extLst>
+          </p:cNvPr>
+          <p:cNvSpPr>
+            <a:spLocks noGrp="1"/>
+          </p:cNvSpPr>
+          <p:nvPr>
+            <p:ph type="sldNum" sz="quarter" idx="12"/>
+          </p:nvPr>
+        </p:nvSpPr>
+        <p:spPr/>
+        <p:txBody>
+          <a:bodyPr/>
+          <a:lstStyle/>
+          <a:p>
+            <a:fld id="{BD0DFC8E-D006-4B55-BBF2-7AB50F8F017C}" type="slidenum">
+              <a:rPr lang="en-US" smtClean="0"/>
+              <a:t>8</a:t>
+            </a:fld>
+            <a:endParaRPr lang="en-US"/>
           </a:p>
         </p:txBody>
       </p:sp>
     </p:spTree>
     <p:extLst>
       <p:ext uri="{BB962C8B-B14F-4D97-AF65-F5344CB8AC3E}">
-        <p14:creationId xmlns:p14="http://schemas.microsoft.com/office/powerpoint/2010/main" val="846081418"/>
+        <p14:creationId xmlns:p14="http://schemas.microsoft.com/office/powerpoint/2010/main" val="2093751284"/>
       </p:ext>
     </p:extLst>
   </p:cSld>
@@ -11500,7 +11973,7 @@
           <p:cNvPr id="2" name="Title 1">
             <a:extLst>
               <a:ext uri="{FF2B5EF4-FFF2-40B4-BE49-F238E27FC236}">
-                <a16:creationId xmlns:a16="http://schemas.microsoft.com/office/drawing/2014/main" id="{1692FA9F-CF39-A7AE-6A66-2DFACA6475D8}"/>
+                <a16:creationId xmlns:a16="http://schemas.microsoft.com/office/drawing/2014/main" id="{1266D3D0-145B-C09E-1869-AC96D4B3F0C1}"/>
               </a:ext>
             </a:extLst>
           </p:cNvPr>
@@ -11518,7 +11991,7 @@
           <a:p>
             <a:r>
               <a:rPr lang="en-US" dirty="0"/>
-              <a:t>Employment – Kol Herget (SC)</a:t>
+              <a:t>Housing - Kevin Hayes</a:t>
             </a:r>
           </a:p>
         </p:txBody>
@@ -11528,7 +12001,7 @@
           <p:cNvPr id="3" name="Content Placeholder 2">
             <a:extLst>
               <a:ext uri="{FF2B5EF4-FFF2-40B4-BE49-F238E27FC236}">
-                <a16:creationId xmlns:a16="http://schemas.microsoft.com/office/drawing/2014/main" id="{6BA5FA6A-48CE-38FF-2666-8E237984281D}"/>
+                <a16:creationId xmlns:a16="http://schemas.microsoft.com/office/drawing/2014/main" id="{56F64E25-C795-B257-2E57-46F801568744}"/>
               </a:ext>
             </a:extLst>
           </p:cNvPr>
@@ -11541,101 +12014,139 @@
         </p:nvSpPr>
         <p:spPr>
           <a:xfrm>
-            <a:off x="838200" y="4195482"/>
-            <a:ext cx="10515600" cy="1981480"/>
+            <a:off x="838200" y="4453591"/>
+            <a:ext cx="10515600" cy="1723372"/>
           </a:xfrm>
         </p:spPr>
         <p:txBody>
           <a:bodyPr>
-            <a:normAutofit lnSpcReduction="10000"/>
+            <a:normAutofit fontScale="70000" lnSpcReduction="20000"/>
           </a:bodyPr>
           <a:lstStyle/>
           <a:p>
-            <a:pPr marL="0" indent="0">
-              <a:buNone/>
-            </a:pPr>
-            <a:r>
-              <a:rPr lang="en-US" dirty="0"/>
-              <a:t>Hypotheses:</a:t>
-            </a:r>
-          </a:p>
-          <a:p>
-            <a:pPr lvl="1"/>
-            <a:r>
-              <a:rPr lang="en-US" dirty="0"/>
-              <a:t>Higher employment level…</a:t>
-            </a:r>
-          </a:p>
-          <a:p>
-            <a:pPr lvl="1"/>
-            <a:r>
-              <a:rPr lang="en-US" dirty="0"/>
-              <a:t>Higher taxable annual wages…</a:t>
-            </a:r>
-          </a:p>
-          <a:p>
-            <a:pPr lvl="1"/>
-            <a:r>
-              <a:rPr lang="en-US" dirty="0"/>
-              <a:t>Higher establishments counts…</a:t>
-            </a:r>
-          </a:p>
-          <a:p>
-            <a:pPr marL="0" indent="0">
-              <a:buNone/>
-            </a:pPr>
-            <a:r>
-              <a:rPr lang="en-US" sz="2400" dirty="0"/>
-              <a:t>…lead to higher numbers of cases in all states</a:t>
-            </a:r>
+            <a:r>
+              <a:rPr lang="en-US" b="0" i="0" dirty="0">
+                <a:effectLst/>
+                <a:highlight>
+                  <a:srgbClr val="FFFFFF"/>
+                </a:highlight>
+                <a:latin typeface="system-ui"/>
+              </a:rPr>
+              <a:t>Does having a higher total population of </a:t>
+            </a:r>
+            <a:r>
+              <a:rPr lang="en-US" b="0" i="0" dirty="0" err="1">
+                <a:effectLst/>
+                <a:highlight>
+                  <a:srgbClr val="FFFFFF"/>
+                </a:highlight>
+                <a:latin typeface="system-ui"/>
+              </a:rPr>
+              <a:t>hispanic</a:t>
+            </a:r>
+            <a:r>
+              <a:rPr lang="en-US" b="0" i="0" dirty="0">
+                <a:effectLst/>
+                <a:highlight>
+                  <a:srgbClr val="FFFFFF"/>
+                </a:highlight>
+                <a:latin typeface="system-ui"/>
+              </a:rPr>
+              <a:t> or </a:t>
+            </a:r>
+            <a:r>
+              <a:rPr lang="en-US" b="0" i="0" dirty="0" err="1">
+                <a:effectLst/>
+                <a:highlight>
+                  <a:srgbClr val="FFFFFF"/>
+                </a:highlight>
+                <a:latin typeface="system-ui"/>
+              </a:rPr>
+              <a:t>latino</a:t>
+            </a:r>
+            <a:r>
+              <a:rPr lang="en-US" b="0" i="0" dirty="0">
+                <a:effectLst/>
+                <a:highlight>
+                  <a:srgbClr val="FFFFFF"/>
+                </a:highlight>
+                <a:latin typeface="system-ui"/>
+              </a:rPr>
+              <a:t> people of any race in a given state lead to more covid-19 infections for that state? (Label: DP05_0073E)</a:t>
+            </a:r>
+          </a:p>
+          <a:p>
+            <a:r>
+              <a:rPr lang="en-US" b="0" i="0" dirty="0">
+                <a:effectLst/>
+                <a:highlight>
+                  <a:srgbClr val="FFFFFF"/>
+                </a:highlight>
+                <a:latin typeface="system-ui"/>
+              </a:rPr>
+              <a:t>Does having more people of 35 to 44 years of age in a given state lead to fewer covid-19 infections for that state? (Label: DP05_0011E)</a:t>
+            </a:r>
+          </a:p>
+          <a:p>
+            <a:r>
+              <a:rPr lang="en-US" b="0" i="0" dirty="0">
+                <a:effectLst/>
+                <a:highlight>
+                  <a:srgbClr val="FFFFFF"/>
+                </a:highlight>
+                <a:latin typeface="system-ui"/>
+              </a:rPr>
+              <a:t>Does having more people aged 60 to 64 in a given state lead to more covid-19 cases for that state? (Label : DP05_0014E)</a:t>
+            </a:r>
+            <a:endParaRPr lang="en-US" dirty="0"/>
+          </a:p>
+        </p:txBody>
+      </p:sp>
+      <p:sp>
+        <p:nvSpPr>
+          <p:cNvPr id="4" name="Slide Number Placeholder 3">
+            <a:extLst>
+              <a:ext uri="{FF2B5EF4-FFF2-40B4-BE49-F238E27FC236}">
+                <a16:creationId xmlns:a16="http://schemas.microsoft.com/office/drawing/2014/main" id="{14810756-614E-B658-4A79-F41E3A7D2FFC}"/>
+              </a:ext>
+            </a:extLst>
+          </p:cNvPr>
+          <p:cNvSpPr>
+            <a:spLocks noGrp="1"/>
+          </p:cNvSpPr>
+          <p:nvPr>
+            <p:ph type="sldNum" sz="quarter" idx="12"/>
+          </p:nvPr>
+        </p:nvSpPr>
+        <p:spPr/>
+        <p:txBody>
+          <a:bodyPr/>
+          <a:lstStyle/>
+          <a:p>
+            <a:fld id="{BD0DFC8E-D006-4B55-BBF2-7AB50F8F017C}" type="slidenum">
+              <a:rPr lang="en-US" smtClean="0"/>
+              <a:t>9</a:t>
+            </a:fld>
+            <a:endParaRPr lang="en-US"/>
           </a:p>
         </p:txBody>
       </p:sp>
       <p:pic>
         <p:nvPicPr>
-          <p:cNvPr id="5" name="Picture 4">
-            <a:extLst>
-              <a:ext uri="{FF2B5EF4-FFF2-40B4-BE49-F238E27FC236}">
-                <a16:creationId xmlns:a16="http://schemas.microsoft.com/office/drawing/2014/main" id="{4C066E62-B085-06AB-9ED1-0115BEC7D16B}"/>
+          <p:cNvPr id="5" name="Picture 2">
+            <a:extLst>
+              <a:ext uri="{FF2B5EF4-FFF2-40B4-BE49-F238E27FC236}">
+                <a16:creationId xmlns:a16="http://schemas.microsoft.com/office/drawing/2014/main" id="{D7E59CE7-EF02-74DF-A6F3-C6EC91925E1C}"/>
               </a:ext>
             </a:extLst>
           </p:cNvPr>
           <p:cNvPicPr>
-            <a:picLocks noChangeAspect="1"/>
-          </p:cNvPicPr>
-          <p:nvPr/>
-        </p:nvPicPr>
-        <p:blipFill rotWithShape="1">
-          <a:blip r:embed="rId3"/>
-          <a:srcRect t="1026" b="1"/>
-          <a:stretch/>
-        </p:blipFill>
-        <p:spPr>
-          <a:xfrm>
-            <a:off x="838199" y="1477399"/>
-            <a:ext cx="3268831" cy="2529361"/>
-          </a:xfrm>
-          <a:prstGeom prst="rect">
-            <a:avLst/>
-          </a:prstGeom>
-        </p:spPr>
-      </p:pic>
-      <p:pic>
-        <p:nvPicPr>
-          <p:cNvPr id="7" name="Picture 6">
-            <a:extLst>
-              <a:ext uri="{FF2B5EF4-FFF2-40B4-BE49-F238E27FC236}">
-                <a16:creationId xmlns:a16="http://schemas.microsoft.com/office/drawing/2014/main" id="{F3B78F6A-568E-4923-72AF-5AF585AA4ADC}"/>
-              </a:ext>
-            </a:extLst>
-          </p:cNvPr>
-          <p:cNvPicPr>
-            <a:picLocks noChangeAspect="1"/>
+            <a:picLocks noChangeAspect="1" noChangeArrowheads="1"/>
           </p:cNvPicPr>
           <p:nvPr/>
         </p:nvPicPr>
         <p:blipFill>
-          <a:blip r:embed="rId4">
+          <a:blip r:embed="rId2">
             <a:extLst>
               <a:ext uri="{28A0092B-C50C-407E-A947-70E740481C1C}">
                 <a14:useLocalDpi xmlns:a14="http://schemas.microsoft.com/office/drawing/2010/main" val="0"/>
@@ -11643,116 +12154,81 @@
             </a:extLst>
           </a:blip>
           <a:srcRect/>
-          <a:stretch/>
-        </p:blipFill>
-        <p:spPr>
-          <a:xfrm>
-            <a:off x="4270783" y="1477399"/>
-            <a:ext cx="3303387" cy="2529360"/>
-          </a:xfrm>
-          <a:prstGeom prst="rect">
-            <a:avLst/>
-          </a:prstGeom>
-        </p:spPr>
-      </p:pic>
-      <p:pic>
-        <p:nvPicPr>
-          <p:cNvPr id="9" name="Picture 8">
-            <a:extLst>
-              <a:ext uri="{FF2B5EF4-FFF2-40B4-BE49-F238E27FC236}">
-                <a16:creationId xmlns:a16="http://schemas.microsoft.com/office/drawing/2014/main" id="{E1096F58-4AB0-E1C1-38E3-5B48C5CAD003}"/>
-              </a:ext>
-            </a:extLst>
-          </p:cNvPr>
-          <p:cNvPicPr>
-            <a:picLocks noChangeAspect="1"/>
-          </p:cNvPicPr>
-          <p:nvPr/>
-        </p:nvPicPr>
-        <p:blipFill>
-          <a:blip r:embed="rId5"/>
           <a:stretch>
             <a:fillRect/>
           </a:stretch>
         </p:blipFill>
-        <p:spPr>
+        <p:spPr bwMode="auto">
           <a:xfrm>
-            <a:off x="7696252" y="1477400"/>
-            <a:ext cx="3257310" cy="2529360"/>
-          </a:xfrm>
-          <a:prstGeom prst="rect">
-            <a:avLst/>
-          </a:prstGeom>
-        </p:spPr>
-      </p:pic>
-      <p:sp>
-        <p:nvSpPr>
-          <p:cNvPr id="10" name="TextBox 9">
-            <a:extLst>
-              <a:ext uri="{FF2B5EF4-FFF2-40B4-BE49-F238E27FC236}">
-                <a16:creationId xmlns:a16="http://schemas.microsoft.com/office/drawing/2014/main" id="{127A22CD-B57D-BEF5-48C0-5FA9B526A8B2}"/>
-              </a:ext>
-            </a:extLst>
-          </p:cNvPr>
-          <p:cNvSpPr txBox="1"/>
-          <p:nvPr/>
-        </p:nvSpPr>
-        <p:spPr>
-          <a:xfrm>
-            <a:off x="8374828" y="4186148"/>
-            <a:ext cx="2616386" cy="738664"/>
+            <a:off x="1742769" y="1825626"/>
+            <a:ext cx="3075038" cy="2493027"/>
           </a:xfrm>
           <a:prstGeom prst="rect">
             <a:avLst/>
           </a:prstGeom>
           <a:noFill/>
+          <a:extLst>
+            <a:ext uri="{909E8E84-426E-40DD-AFC4-6F175D3DCCD1}">
+              <a14:hiddenFill xmlns:a14="http://schemas.microsoft.com/office/drawing/2010/main">
+                <a:solidFill>
+                  <a:srgbClr val="FFFFFF"/>
+                </a:solidFill>
+              </a14:hiddenFill>
+            </a:ext>
+          </a:extLst>
         </p:spPr>
-        <p:txBody>
-          <a:bodyPr wrap="square" rtlCol="0">
-            <a:spAutoFit/>
-          </a:bodyPr>
-          <a:lstStyle/>
-          <a:p>
-            <a:r>
-              <a:rPr lang="en-US" sz="1400" i="1" dirty="0"/>
-              <a:t>Compared normalized data from each category against normalized COVID cases data</a:t>
-            </a:r>
-          </a:p>
-        </p:txBody>
-      </p:sp>
-      <p:sp>
-        <p:nvSpPr>
-          <p:cNvPr id="4" name="Slide Number Placeholder 3">
-            <a:extLst>
-              <a:ext uri="{FF2B5EF4-FFF2-40B4-BE49-F238E27FC236}">
-                <a16:creationId xmlns:a16="http://schemas.microsoft.com/office/drawing/2014/main" id="{B91EC445-2B2A-0102-2A2C-1DA52E774D81}"/>
-              </a:ext>
-            </a:extLst>
-          </p:cNvPr>
-          <p:cNvSpPr>
-            <a:spLocks noGrp="1"/>
-          </p:cNvSpPr>
-          <p:nvPr>
-            <p:ph type="sldNum" sz="quarter" idx="12"/>
-          </p:nvPr>
-        </p:nvSpPr>
-        <p:spPr/>
-        <p:txBody>
-          <a:bodyPr/>
-          <a:lstStyle/>
-          <a:p>
-            <a:fld id="{BD0DFC8E-D006-4B55-BBF2-7AB50F8F017C}" type="slidenum">
-              <a:rPr lang="en-US" smtClean="0"/>
-              <a:t>9</a:t>
-            </a:fld>
-            <a:endParaRPr lang="en-US"/>
-          </a:p>
-        </p:txBody>
-      </p:sp>
+      </p:pic>
+      <p:pic>
+        <p:nvPicPr>
+          <p:cNvPr id="6" name="Picture 4">
+            <a:extLst>
+              <a:ext uri="{FF2B5EF4-FFF2-40B4-BE49-F238E27FC236}">
+                <a16:creationId xmlns:a16="http://schemas.microsoft.com/office/drawing/2014/main" id="{1F06D0C8-633D-4F2F-FDC1-780320C291B9}"/>
+              </a:ext>
+            </a:extLst>
+          </p:cNvPr>
+          <p:cNvPicPr>
+            <a:picLocks noChangeAspect="1" noChangeArrowheads="1"/>
+          </p:cNvPicPr>
+          <p:nvPr/>
+        </p:nvPicPr>
+        <p:blipFill>
+          <a:blip r:embed="rId3">
+            <a:extLst>
+              <a:ext uri="{28A0092B-C50C-407E-A947-70E740481C1C}">
+                <a14:useLocalDpi xmlns:a14="http://schemas.microsoft.com/office/drawing/2010/main" val="0"/>
+              </a:ext>
+            </a:extLst>
+          </a:blip>
+          <a:srcRect/>
+          <a:stretch>
+            <a:fillRect/>
+          </a:stretch>
+        </p:blipFill>
+        <p:spPr bwMode="auto">
+          <a:xfrm>
+            <a:off x="5046561" y="1825626"/>
+            <a:ext cx="3229873" cy="2498402"/>
+          </a:xfrm>
+          <a:prstGeom prst="rect">
+            <a:avLst/>
+          </a:prstGeom>
+          <a:noFill/>
+          <a:extLst>
+            <a:ext uri="{909E8E84-426E-40DD-AFC4-6F175D3DCCD1}">
+              <a14:hiddenFill xmlns:a14="http://schemas.microsoft.com/office/drawing/2010/main">
+                <a:solidFill>
+                  <a:srgbClr val="FFFFFF"/>
+                </a:solidFill>
+              </a14:hiddenFill>
+            </a:ext>
+          </a:extLst>
+        </p:spPr>
+      </p:pic>
     </p:spTree>
     <p:extLst>
       <p:ext uri="{BB962C8B-B14F-4D97-AF65-F5344CB8AC3E}">
-        <p14:creationId xmlns:p14="http://schemas.microsoft.com/office/powerpoint/2010/main" val="2093751284"/>
+        <p14:creationId xmlns:p14="http://schemas.microsoft.com/office/powerpoint/2010/main" val="1244231696"/>
       </p:ext>
     </p:extLst>
   </p:cSld>

</xml_diff>

<commit_message>
edits to presentation PPT
</commit_message>
<xml_diff>
--- a/ProjPresentation.pptx
+++ b/ProjPresentation.pptx
@@ -12,17 +12,17 @@
   <p:sldIdLst>
     <p:sldId id="266" r:id="rId4"/>
     <p:sldId id="267" r:id="rId5"/>
-    <p:sldId id="283" r:id="rId6"/>
-    <p:sldId id="295" r:id="rId7"/>
-    <p:sldId id="268" r:id="rId8"/>
-    <p:sldId id="282" r:id="rId9"/>
-    <p:sldId id="269" r:id="rId10"/>
-    <p:sldId id="281" r:id="rId11"/>
-    <p:sldId id="275" r:id="rId12"/>
-    <p:sldId id="288" r:id="rId13"/>
-    <p:sldId id="289" r:id="rId14"/>
-    <p:sldId id="290" r:id="rId15"/>
-    <p:sldId id="270" r:id="rId16"/>
+    <p:sldId id="295" r:id="rId6"/>
+    <p:sldId id="268" r:id="rId7"/>
+    <p:sldId id="282" r:id="rId8"/>
+    <p:sldId id="269" r:id="rId9"/>
+    <p:sldId id="281" r:id="rId10"/>
+    <p:sldId id="275" r:id="rId11"/>
+    <p:sldId id="288" r:id="rId12"/>
+    <p:sldId id="289" r:id="rId13"/>
+    <p:sldId id="290" r:id="rId14"/>
+    <p:sldId id="270" r:id="rId15"/>
+    <p:sldId id="301" r:id="rId16"/>
     <p:sldId id="292" r:id="rId17"/>
     <p:sldId id="293" r:id="rId18"/>
     <p:sldId id="284" r:id="rId19"/>
@@ -142,7 +142,6 @@
           <p14:sldIdLst>
             <p14:sldId id="266"/>
             <p14:sldId id="267"/>
-            <p14:sldId id="283"/>
             <p14:sldId id="295"/>
             <p14:sldId id="268"/>
             <p14:sldId id="282"/>
@@ -153,6 +152,7 @@
             <p14:sldId id="289"/>
             <p14:sldId id="290"/>
             <p14:sldId id="270"/>
+            <p14:sldId id="301"/>
             <p14:sldId id="292"/>
             <p14:sldId id="293"/>
             <p14:sldId id="284"/>
@@ -701,6 +701,261 @@
           <a:bodyPr/>
           <a:lstStyle/>
           <a:p>
+            <a:r>
+              <a:rPr lang="en-US" dirty="0"/>
+              <a:t>Talk briefly about predictions for US cases/deaths from linear/polynomial regression</a:t>
+            </a:r>
+          </a:p>
+        </p:txBody>
+      </p:sp>
+      <p:sp>
+        <p:nvSpPr>
+          <p:cNvPr id="4" name="Slide Number Placeholder 3"/>
+          <p:cNvSpPr>
+            <a:spLocks noGrp="1"/>
+          </p:cNvSpPr>
+          <p:nvPr>
+            <p:ph type="sldNum" sz="quarter" idx="5"/>
+          </p:nvPr>
+        </p:nvSpPr>
+        <p:spPr/>
+        <p:txBody>
+          <a:bodyPr/>
+          <a:lstStyle/>
+          <a:p>
+            <a:fld id="{EC6F6E41-1F62-4E61-82DC-4FF03C9667B9}" type="slidenum">
+              <a:rPr lang="en-US" smtClean="0"/>
+              <a:t>13</a:t>
+            </a:fld>
+            <a:endParaRPr lang="en-US"/>
+          </a:p>
+        </p:txBody>
+      </p:sp>
+    </p:spTree>
+    <p:extLst>
+      <p:ext uri="{BB962C8B-B14F-4D97-AF65-F5344CB8AC3E}">
+        <p14:creationId xmlns:p14="http://schemas.microsoft.com/office/powerpoint/2010/main" val="1396920030"/>
+      </p:ext>
+    </p:extLst>
+  </p:cSld>
+  <p:clrMapOvr>
+    <a:masterClrMapping/>
+  </p:clrMapOvr>
+</p:notes>
+</file>
+
+<file path=ppt/notesSlides/notesSlide11.xml><?xml version="1.0" encoding="utf-8"?>
+<p:notes xmlns:a="http://schemas.openxmlformats.org/drawingml/2006/main" xmlns:r="http://schemas.openxmlformats.org/officeDocument/2006/relationships" xmlns:p="http://schemas.openxmlformats.org/presentationml/2006/main">
+  <p:cSld>
+    <p:spTree>
+      <p:nvGrpSpPr>
+        <p:cNvPr id="1" name=""/>
+        <p:cNvGrpSpPr/>
+        <p:nvPr/>
+      </p:nvGrpSpPr>
+      <p:grpSpPr>
+        <a:xfrm>
+          <a:off x="0" y="0"/>
+          <a:ext cx="0" cy="0"/>
+          <a:chOff x="0" y="0"/>
+          <a:chExt cx="0" cy="0"/>
+        </a:xfrm>
+      </p:grpSpPr>
+      <p:sp>
+        <p:nvSpPr>
+          <p:cNvPr id="2" name="Slide Image Placeholder 1"/>
+          <p:cNvSpPr>
+            <a:spLocks noGrp="1" noRot="1" noChangeAspect="1"/>
+          </p:cNvSpPr>
+          <p:nvPr>
+            <p:ph type="sldImg"/>
+          </p:nvPr>
+        </p:nvSpPr>
+        <p:spPr/>
+      </p:sp>
+      <p:sp>
+        <p:nvSpPr>
+          <p:cNvPr id="3" name="Notes Placeholder 2"/>
+          <p:cNvSpPr>
+            <a:spLocks noGrp="1"/>
+          </p:cNvSpPr>
+          <p:nvPr>
+            <p:ph type="body" idx="1"/>
+          </p:nvPr>
+        </p:nvSpPr>
+        <p:spPr/>
+        <p:txBody>
+          <a:bodyPr/>
+          <a:lstStyle/>
+          <a:p>
+            <a:endParaRPr lang="en-US" dirty="0"/>
+          </a:p>
+        </p:txBody>
+      </p:sp>
+      <p:sp>
+        <p:nvSpPr>
+          <p:cNvPr id="4" name="Slide Number Placeholder 3"/>
+          <p:cNvSpPr>
+            <a:spLocks noGrp="1"/>
+          </p:cNvSpPr>
+          <p:nvPr>
+            <p:ph type="sldNum" sz="quarter" idx="5"/>
+          </p:nvPr>
+        </p:nvSpPr>
+        <p:spPr/>
+        <p:txBody>
+          <a:bodyPr/>
+          <a:lstStyle/>
+          <a:p>
+            <a:fld id="{EC6F6E41-1F62-4E61-82DC-4FF03C9667B9}" type="slidenum">
+              <a:rPr lang="en-US" smtClean="0"/>
+              <a:t>14</a:t>
+            </a:fld>
+            <a:endParaRPr lang="en-US"/>
+          </a:p>
+        </p:txBody>
+      </p:sp>
+    </p:spTree>
+    <p:extLst>
+      <p:ext uri="{BB962C8B-B14F-4D97-AF65-F5344CB8AC3E}">
+        <p14:creationId xmlns:p14="http://schemas.microsoft.com/office/powerpoint/2010/main" val="2184548651"/>
+      </p:ext>
+    </p:extLst>
+  </p:cSld>
+  <p:clrMapOvr>
+    <a:masterClrMapping/>
+  </p:clrMapOvr>
+</p:notes>
+</file>
+
+<file path=ppt/notesSlides/notesSlide12.xml><?xml version="1.0" encoding="utf-8"?>
+<p:notes xmlns:a="http://schemas.openxmlformats.org/drawingml/2006/main" xmlns:r="http://schemas.openxmlformats.org/officeDocument/2006/relationships" xmlns:p="http://schemas.openxmlformats.org/presentationml/2006/main">
+  <p:cSld>
+    <p:spTree>
+      <p:nvGrpSpPr>
+        <p:cNvPr id="1" name=""/>
+        <p:cNvGrpSpPr/>
+        <p:nvPr/>
+      </p:nvGrpSpPr>
+      <p:grpSpPr>
+        <a:xfrm>
+          <a:off x="0" y="0"/>
+          <a:ext cx="0" cy="0"/>
+          <a:chOff x="0" y="0"/>
+          <a:chExt cx="0" cy="0"/>
+        </a:xfrm>
+      </p:grpSpPr>
+      <p:sp>
+        <p:nvSpPr>
+          <p:cNvPr id="2" name="Slide Image Placeholder 1"/>
+          <p:cNvSpPr>
+            <a:spLocks noGrp="1" noRot="1" noChangeAspect="1"/>
+          </p:cNvSpPr>
+          <p:nvPr>
+            <p:ph type="sldImg"/>
+          </p:nvPr>
+        </p:nvSpPr>
+        <p:spPr/>
+      </p:sp>
+      <p:sp>
+        <p:nvSpPr>
+          <p:cNvPr id="3" name="Notes Placeholder 2"/>
+          <p:cNvSpPr>
+            <a:spLocks noGrp="1"/>
+          </p:cNvSpPr>
+          <p:nvPr>
+            <p:ph type="body" idx="1"/>
+          </p:nvPr>
+        </p:nvSpPr>
+        <p:spPr/>
+        <p:txBody>
+          <a:bodyPr/>
+          <a:lstStyle/>
+          <a:p>
+            <a:endParaRPr lang="en-US" dirty="0"/>
+          </a:p>
+        </p:txBody>
+      </p:sp>
+      <p:sp>
+        <p:nvSpPr>
+          <p:cNvPr id="4" name="Slide Number Placeholder 3"/>
+          <p:cNvSpPr>
+            <a:spLocks noGrp="1"/>
+          </p:cNvSpPr>
+          <p:nvPr>
+            <p:ph type="sldNum" sz="quarter" idx="5"/>
+          </p:nvPr>
+        </p:nvSpPr>
+        <p:spPr/>
+        <p:txBody>
+          <a:bodyPr/>
+          <a:lstStyle/>
+          <a:p>
+            <a:fld id="{EC6F6E41-1F62-4E61-82DC-4FF03C9667B9}" type="slidenum">
+              <a:rPr lang="en-US" smtClean="0"/>
+              <a:t>16</a:t>
+            </a:fld>
+            <a:endParaRPr lang="en-US"/>
+          </a:p>
+        </p:txBody>
+      </p:sp>
+    </p:spTree>
+    <p:extLst>
+      <p:ext uri="{BB962C8B-B14F-4D97-AF65-F5344CB8AC3E}">
+        <p14:creationId xmlns:p14="http://schemas.microsoft.com/office/powerpoint/2010/main" val="1290260596"/>
+      </p:ext>
+    </p:extLst>
+  </p:cSld>
+  <p:clrMapOvr>
+    <a:masterClrMapping/>
+  </p:clrMapOvr>
+</p:notes>
+</file>
+
+<file path=ppt/notesSlides/notesSlide13.xml><?xml version="1.0" encoding="utf-8"?>
+<p:notes xmlns:a="http://schemas.openxmlformats.org/drawingml/2006/main" xmlns:r="http://schemas.openxmlformats.org/officeDocument/2006/relationships" xmlns:p="http://schemas.openxmlformats.org/presentationml/2006/main">
+  <p:cSld>
+    <p:spTree>
+      <p:nvGrpSpPr>
+        <p:cNvPr id="1" name=""/>
+        <p:cNvGrpSpPr/>
+        <p:nvPr/>
+      </p:nvGrpSpPr>
+      <p:grpSpPr>
+        <a:xfrm>
+          <a:off x="0" y="0"/>
+          <a:ext cx="0" cy="0"/>
+          <a:chOff x="0" y="0"/>
+          <a:chExt cx="0" cy="0"/>
+        </a:xfrm>
+      </p:grpSpPr>
+      <p:sp>
+        <p:nvSpPr>
+          <p:cNvPr id="2" name="Slide Image Placeholder 1"/>
+          <p:cNvSpPr>
+            <a:spLocks noGrp="1" noRot="1" noChangeAspect="1"/>
+          </p:cNvSpPr>
+          <p:nvPr>
+            <p:ph type="sldImg"/>
+          </p:nvPr>
+        </p:nvSpPr>
+        <p:spPr/>
+      </p:sp>
+      <p:sp>
+        <p:nvSpPr>
+          <p:cNvPr id="3" name="Notes Placeholder 2"/>
+          <p:cNvSpPr>
+            <a:spLocks noGrp="1"/>
+          </p:cNvSpPr>
+          <p:nvPr>
+            <p:ph type="body" idx="1"/>
+          </p:nvPr>
+        </p:nvSpPr>
+        <p:spPr/>
+        <p:txBody>
+          <a:bodyPr/>
+          <a:lstStyle/>
+          <a:p>
             <a:pPr marL="0" marR="0" lvl="0" indent="0" algn="l" defTabSz="914400" rtl="0" eaLnBrk="1" fontAlgn="auto" latinLnBrk="0" hangingPunct="1">
               <a:lnSpc>
                 <a:spcPct val="100000"/>
@@ -808,30 +1063,10 @@
           <a:bodyPr/>
           <a:lstStyle/>
           <a:p>
-            <a:pPr marL="0" marR="0" lvl="0" indent="0" algn="l" defTabSz="914400" rtl="0" eaLnBrk="1" fontAlgn="auto" latinLnBrk="0" hangingPunct="1">
-              <a:lnSpc>
-                <a:spcPct val="100000"/>
-              </a:lnSpc>
-              <a:spcBef>
-                <a:spcPts val="0"/>
-              </a:spcBef>
-              <a:spcAft>
-                <a:spcPts val="0"/>
-              </a:spcAft>
-              <a:buClrTx/>
-              <a:buSzTx/>
-              <a:buFontTx/>
-              <a:buNone/>
-              <a:tabLst/>
-              <a:defRPr/>
-            </a:pPr>
-            <a:r>
-              <a:rPr lang="en-US" sz="1200" dirty="0"/>
-              <a:t>Aim: The goal of Stage II was to develop the data for modeling and comparative analysis. </a:t>
-            </a:r>
-          </a:p>
-          <a:p>
-            <a:endParaRPr lang="en-US" dirty="0"/>
+            <a:r>
+              <a:rPr lang="en-US" dirty="0"/>
+              <a:t>Go over who chose what enrichment data, mention that we did data dictionaries, mention merging data</a:t>
+            </a:r>
           </a:p>
         </p:txBody>
       </p:sp>
@@ -852,7 +1087,7 @@
           <a:p>
             <a:fld id="{EC6F6E41-1F62-4E61-82DC-4FF03C9667B9}" type="slidenum">
               <a:rPr lang="en-US" smtClean="0"/>
-              <a:t>5</a:t>
+              <a:t>3</a:t>
             </a:fld>
             <a:endParaRPr lang="en-US"/>
           </a:p>
@@ -861,7 +1096,7 @@
     </p:spTree>
     <p:extLst>
       <p:ext uri="{BB962C8B-B14F-4D97-AF65-F5344CB8AC3E}">
-        <p14:creationId xmlns:p14="http://schemas.microsoft.com/office/powerpoint/2010/main" val="285236062"/>
+        <p14:creationId xmlns:p14="http://schemas.microsoft.com/office/powerpoint/2010/main" val="702353931"/>
       </p:ext>
     </p:extLst>
   </p:cSld>
@@ -915,10 +1150,30 @@
           <a:bodyPr/>
           <a:lstStyle/>
           <a:p>
-            <a:r>
-              <a:rPr lang="en-US" dirty="0"/>
-              <a:t>Mode was always 0 for both</a:t>
-            </a:r>
+            <a:pPr marL="0" marR="0" lvl="0" indent="0" algn="l" defTabSz="914400" rtl="0" eaLnBrk="1" fontAlgn="auto" latinLnBrk="0" hangingPunct="1">
+              <a:lnSpc>
+                <a:spcPct val="100000"/>
+              </a:lnSpc>
+              <a:spcBef>
+                <a:spcPts val="0"/>
+              </a:spcBef>
+              <a:spcAft>
+                <a:spcPts val="0"/>
+              </a:spcAft>
+              <a:buClrTx/>
+              <a:buSzTx/>
+              <a:buFontTx/>
+              <a:buNone/>
+              <a:tabLst/>
+              <a:defRPr/>
+            </a:pPr>
+            <a:r>
+              <a:rPr lang="en-US" sz="1200" dirty="0"/>
+              <a:t>Aim: The goal of Stage II was to develop the data for modeling and comparative analysis. </a:t>
+            </a:r>
+          </a:p>
+          <a:p>
+            <a:endParaRPr lang="en-US" dirty="0"/>
           </a:p>
         </p:txBody>
       </p:sp>
@@ -939,7 +1194,7 @@
           <a:p>
             <a:fld id="{EC6F6E41-1F62-4E61-82DC-4FF03C9667B9}" type="slidenum">
               <a:rPr lang="en-US" smtClean="0"/>
-              <a:t>6</a:t>
+              <a:t>4</a:t>
             </a:fld>
             <a:endParaRPr lang="en-US"/>
           </a:p>
@@ -948,7 +1203,7 @@
     </p:spTree>
     <p:extLst>
       <p:ext uri="{BB962C8B-B14F-4D97-AF65-F5344CB8AC3E}">
-        <p14:creationId xmlns:p14="http://schemas.microsoft.com/office/powerpoint/2010/main" val="2501845649"/>
+        <p14:creationId xmlns:p14="http://schemas.microsoft.com/office/powerpoint/2010/main" val="285236062"/>
       </p:ext>
     </p:extLst>
   </p:cSld>
@@ -1002,30 +1257,10 @@
           <a:bodyPr/>
           <a:lstStyle/>
           <a:p>
-            <a:pPr marL="0" marR="0" lvl="0" indent="0" algn="l" defTabSz="914400" rtl="0" eaLnBrk="1" fontAlgn="auto" latinLnBrk="0" hangingPunct="1">
-              <a:lnSpc>
-                <a:spcPct val="100000"/>
-              </a:lnSpc>
-              <a:spcBef>
-                <a:spcPts val="0"/>
-              </a:spcBef>
-              <a:spcAft>
-                <a:spcPts val="0"/>
-              </a:spcAft>
-              <a:buClrTx/>
-              <a:buSzTx/>
-              <a:buFontTx/>
-              <a:buNone/>
-              <a:tabLst/>
-              <a:defRPr/>
-            </a:pPr>
-            <a:r>
-              <a:rPr lang="en-US" sz="1200" dirty="0"/>
-              <a:t>Aim: The goal of Stage III was to develop distributions and formal hypothesis tests for the intuitions had in Stage I and II and utilize statistical modeling to prove/disprove them.</a:t>
-            </a:r>
-          </a:p>
-          <a:p>
-            <a:endParaRPr lang="en-US" dirty="0"/>
+            <a:r>
+              <a:rPr lang="en-US" dirty="0"/>
+              <a:t>Mode was always 0 for both</a:t>
+            </a:r>
           </a:p>
         </p:txBody>
       </p:sp>
@@ -1046,7 +1281,7 @@
           <a:p>
             <a:fld id="{EC6F6E41-1F62-4E61-82DC-4FF03C9667B9}" type="slidenum">
               <a:rPr lang="en-US" smtClean="0"/>
-              <a:t>7</a:t>
+              <a:t>5</a:t>
             </a:fld>
             <a:endParaRPr lang="en-US"/>
           </a:p>
@@ -1055,7 +1290,7 @@
     </p:spTree>
     <p:extLst>
       <p:ext uri="{BB962C8B-B14F-4D97-AF65-F5344CB8AC3E}">
-        <p14:creationId xmlns:p14="http://schemas.microsoft.com/office/powerpoint/2010/main" val="2718240240"/>
+        <p14:creationId xmlns:p14="http://schemas.microsoft.com/office/powerpoint/2010/main" val="2501845649"/>
       </p:ext>
     </p:extLst>
   </p:cSld>
@@ -1109,6 +1344,29 @@
           <a:bodyPr/>
           <a:lstStyle/>
           <a:p>
+            <a:pPr marL="0" marR="0" lvl="0" indent="0" algn="l" defTabSz="914400" rtl="0" eaLnBrk="1" fontAlgn="auto" latinLnBrk="0" hangingPunct="1">
+              <a:lnSpc>
+                <a:spcPct val="100000"/>
+              </a:lnSpc>
+              <a:spcBef>
+                <a:spcPts val="0"/>
+              </a:spcBef>
+              <a:spcAft>
+                <a:spcPts val="0"/>
+              </a:spcAft>
+              <a:buClrTx/>
+              <a:buSzTx/>
+              <a:buFontTx/>
+              <a:buNone/>
+              <a:tabLst/>
+              <a:defRPr/>
+            </a:pPr>
+            <a:r>
+              <a:rPr lang="en-US" sz="1200" dirty="0"/>
+              <a:t>Aim: The goal of Stage III was to develop distributions and formal hypothesis tests for the intuitions had in Stage I and II and utilize statistical modeling to prove/disprove them.</a:t>
+            </a:r>
+          </a:p>
+          <a:p>
             <a:endParaRPr lang="en-US" dirty="0"/>
           </a:p>
         </p:txBody>
@@ -1130,7 +1388,7 @@
           <a:p>
             <a:fld id="{EC6F6E41-1F62-4E61-82DC-4FF03C9667B9}" type="slidenum">
               <a:rPr lang="en-US" smtClean="0"/>
-              <a:t>8</a:t>
+              <a:t>6</a:t>
             </a:fld>
             <a:endParaRPr lang="en-US"/>
           </a:p>
@@ -1139,7 +1397,7 @@
     </p:spTree>
     <p:extLst>
       <p:ext uri="{BB962C8B-B14F-4D97-AF65-F5344CB8AC3E}">
-        <p14:creationId xmlns:p14="http://schemas.microsoft.com/office/powerpoint/2010/main" val="3294284303"/>
+        <p14:creationId xmlns:p14="http://schemas.microsoft.com/office/powerpoint/2010/main" val="2718240240"/>
       </p:ext>
     </p:extLst>
   </p:cSld>
@@ -1214,7 +1472,7 @@
           <a:p>
             <a:fld id="{EC6F6E41-1F62-4E61-82DC-4FF03C9667B9}" type="slidenum">
               <a:rPr lang="en-US" smtClean="0"/>
-              <a:t>9</a:t>
+              <a:t>7</a:t>
             </a:fld>
             <a:endParaRPr lang="en-US"/>
           </a:p>
@@ -1223,7 +1481,7 @@
     </p:spTree>
     <p:extLst>
       <p:ext uri="{BB962C8B-B14F-4D97-AF65-F5344CB8AC3E}">
-        <p14:creationId xmlns:p14="http://schemas.microsoft.com/office/powerpoint/2010/main" val="3900447505"/>
+        <p14:creationId xmlns:p14="http://schemas.microsoft.com/office/powerpoint/2010/main" val="3294284303"/>
       </p:ext>
     </p:extLst>
   </p:cSld>
@@ -1298,7 +1556,7 @@
           <a:p>
             <a:fld id="{EC6F6E41-1F62-4E61-82DC-4FF03C9667B9}" type="slidenum">
               <a:rPr lang="en-US" smtClean="0"/>
-              <a:t>12</a:t>
+              <a:t>8</a:t>
             </a:fld>
             <a:endParaRPr lang="en-US"/>
           </a:p>
@@ -1307,7 +1565,7 @@
     </p:spTree>
     <p:extLst>
       <p:ext uri="{BB962C8B-B14F-4D97-AF65-F5344CB8AC3E}">
-        <p14:creationId xmlns:p14="http://schemas.microsoft.com/office/powerpoint/2010/main" val="379766082"/>
+        <p14:creationId xmlns:p14="http://schemas.microsoft.com/office/powerpoint/2010/main" val="3900447505"/>
       </p:ext>
     </p:extLst>
   </p:cSld>
@@ -1361,37 +1619,6 @@
           <a:bodyPr/>
           <a:lstStyle/>
           <a:p>
-            <a:pPr marL="0" marR="0" lvl="0" indent="0" algn="l" defTabSz="914400" rtl="0" eaLnBrk="1" fontAlgn="auto" latinLnBrk="0" hangingPunct="1">
-              <a:lnSpc>
-                <a:spcPct val="100000"/>
-              </a:lnSpc>
-              <a:spcBef>
-                <a:spcPts val="0"/>
-              </a:spcBef>
-              <a:spcAft>
-                <a:spcPts val="0"/>
-              </a:spcAft>
-              <a:buClrTx/>
-              <a:buSzTx/>
-              <a:buFontTx/>
-              <a:buNone/>
-              <a:tabLst/>
-              <a:defRPr/>
-            </a:pPr>
-            <a:r>
-              <a:rPr lang="en-US" sz="1200" dirty="0"/>
-              <a:t>Aim: The goal of Stage IV was to </a:t>
-            </a:r>
-            <a:r>
-              <a:rPr lang="en-US" sz="1200" dirty="0" err="1"/>
-              <a:t>utlize</a:t>
-            </a:r>
-            <a:r>
-              <a:rPr lang="en-US" sz="1200" dirty="0"/>
-              <a:t> machine learning and statistical models to predict the trend of COVID-19 cases / deaths.</a:t>
-            </a:r>
-          </a:p>
-          <a:p>
             <a:endParaRPr lang="en-US" dirty="0"/>
           </a:p>
         </p:txBody>
@@ -1413,7 +1640,7 @@
           <a:p>
             <a:fld id="{EC6F6E41-1F62-4E61-82DC-4FF03C9667B9}" type="slidenum">
               <a:rPr lang="en-US" smtClean="0"/>
-              <a:t>13</a:t>
+              <a:t>11</a:t>
             </a:fld>
             <a:endParaRPr lang="en-US"/>
           </a:p>
@@ -1422,7 +1649,7 @@
     </p:spTree>
     <p:extLst>
       <p:ext uri="{BB962C8B-B14F-4D97-AF65-F5344CB8AC3E}">
-        <p14:creationId xmlns:p14="http://schemas.microsoft.com/office/powerpoint/2010/main" val="3195875454"/>
+        <p14:creationId xmlns:p14="http://schemas.microsoft.com/office/powerpoint/2010/main" val="379766082"/>
       </p:ext>
     </p:extLst>
   </p:cSld>
@@ -1476,6 +1703,37 @@
           <a:bodyPr/>
           <a:lstStyle/>
           <a:p>
+            <a:pPr marL="0" marR="0" lvl="0" indent="0" algn="l" defTabSz="914400" rtl="0" eaLnBrk="1" fontAlgn="auto" latinLnBrk="0" hangingPunct="1">
+              <a:lnSpc>
+                <a:spcPct val="100000"/>
+              </a:lnSpc>
+              <a:spcBef>
+                <a:spcPts val="0"/>
+              </a:spcBef>
+              <a:spcAft>
+                <a:spcPts val="0"/>
+              </a:spcAft>
+              <a:buClrTx/>
+              <a:buSzTx/>
+              <a:buFontTx/>
+              <a:buNone/>
+              <a:tabLst/>
+              <a:defRPr/>
+            </a:pPr>
+            <a:r>
+              <a:rPr lang="en-US" sz="1200" dirty="0"/>
+              <a:t>Aim: The goal of Stage IV was to </a:t>
+            </a:r>
+            <a:r>
+              <a:rPr lang="en-US" sz="1200" dirty="0" err="1"/>
+              <a:t>utlize</a:t>
+            </a:r>
+            <a:r>
+              <a:rPr lang="en-US" sz="1200" dirty="0"/>
+              <a:t> machine learning and statistical models to predict the trend of COVID-19 cases / deaths.</a:t>
+            </a:r>
+          </a:p>
+          <a:p>
             <a:endParaRPr lang="en-US" dirty="0"/>
           </a:p>
         </p:txBody>
@@ -1497,7 +1755,7 @@
           <a:p>
             <a:fld id="{EC6F6E41-1F62-4E61-82DC-4FF03C9667B9}" type="slidenum">
               <a:rPr lang="en-US" smtClean="0"/>
-              <a:t>16</a:t>
+              <a:t>12</a:t>
             </a:fld>
             <a:endParaRPr lang="en-US"/>
           </a:p>
@@ -1506,7 +1764,7 @@
     </p:spTree>
     <p:extLst>
       <p:ext uri="{BB962C8B-B14F-4D97-AF65-F5344CB8AC3E}">
-        <p14:creationId xmlns:p14="http://schemas.microsoft.com/office/powerpoint/2010/main" val="1290260596"/>
+        <p14:creationId xmlns:p14="http://schemas.microsoft.com/office/powerpoint/2010/main" val="3195875454"/>
       </p:ext>
     </p:extLst>
   </p:cSld>
@@ -7963,6 +8221,72 @@
           </a:p>
         </p:txBody>
       </p:sp>
+      <p:sp>
+        <p:nvSpPr>
+          <p:cNvPr id="8" name="TextBox 7">
+            <a:extLst>
+              <a:ext uri="{FF2B5EF4-FFF2-40B4-BE49-F238E27FC236}">
+                <a16:creationId xmlns:a16="http://schemas.microsoft.com/office/drawing/2014/main" id="{A5DF6BE9-55CE-3F16-B13A-0EC6D10EC3E2}"/>
+              </a:ext>
+            </a:extLst>
+          </p:cNvPr>
+          <p:cNvSpPr txBox="1"/>
+          <p:nvPr/>
+        </p:nvSpPr>
+        <p:spPr>
+          <a:xfrm>
+            <a:off x="3047552" y="4830379"/>
+            <a:ext cx="6096896" cy="369332"/>
+          </a:xfrm>
+          <a:prstGeom prst="rect">
+            <a:avLst/>
+          </a:prstGeom>
+          <a:noFill/>
+        </p:spPr>
+        <p:txBody>
+          <a:bodyPr wrap="square">
+            <a:spAutoFit/>
+          </a:bodyPr>
+          <a:lstStyle/>
+          <a:p>
+            <a:pPr marR="0" lvl="0" algn="ctr" defTabSz="914400" rtl="0" eaLnBrk="1" fontAlgn="auto" latinLnBrk="0" hangingPunct="1">
+              <a:lnSpc>
+                <a:spcPct val="90000"/>
+              </a:lnSpc>
+              <a:spcBef>
+                <a:spcPts val="1000"/>
+              </a:spcBef>
+              <a:spcAft>
+                <a:spcPts val="0"/>
+              </a:spcAft>
+              <a:buClrTx/>
+              <a:buSzTx/>
+              <a:tabLst/>
+              <a:defRPr/>
+            </a:pPr>
+            <a:r>
+              <a:rPr kumimoji="0" lang="en-US" sz="2000" i="0" u="none" strike="noStrike" kern="1200" cap="none" spc="0" normalizeH="0" baseline="0" noProof="0" dirty="0">
+                <a:ln>
+                  <a:noFill/>
+                </a:ln>
+                <a:solidFill>
+                  <a:schemeClr val="tx1">
+                    <a:lumMod val="50000"/>
+                    <a:lumOff val="50000"/>
+                  </a:schemeClr>
+                </a:solidFill>
+                <a:effectLst/>
+                <a:uLnTx/>
+                <a:uFillTx/>
+                <a:latin typeface="Arial" panose="020B0604020202020204" pitchFamily="34" charset="0"/>
+                <a:ea typeface="+mn-ea"/>
+                <a:cs typeface="Arial" panose="020B0604020202020204" pitchFamily="34" charset="0"/>
+              </a:rPr>
+              <a:t>https://github.com/aiwayemi/Group-1</a:t>
+            </a:r>
+          </a:p>
+        </p:txBody>
+      </p:sp>
     </p:spTree>
     <p:extLst>
       <p:ext uri="{BB962C8B-B14F-4D97-AF65-F5344CB8AC3E}">
@@ -7998,7 +8322,7 @@
           <p:cNvPr id="2" name="Title 1">
             <a:extLst>
               <a:ext uri="{FF2B5EF4-FFF2-40B4-BE49-F238E27FC236}">
-                <a16:creationId xmlns:a16="http://schemas.microsoft.com/office/drawing/2014/main" id="{1266D3D0-145B-C09E-1869-AC96D4B3F0C1}"/>
+                <a16:creationId xmlns:a16="http://schemas.microsoft.com/office/drawing/2014/main" id="{691F7F71-9C50-5CE8-1E0A-137DA1B5A270}"/>
               </a:ext>
             </a:extLst>
           </p:cNvPr>
@@ -8016,114 +8340,8 @@
           <a:p>
             <a:r>
               <a:rPr lang="en-US" dirty="0"/>
-              <a:t>Housing - Kevin Hayes</a:t>
-            </a:r>
-          </a:p>
-        </p:txBody>
-      </p:sp>
-      <p:sp>
-        <p:nvSpPr>
-          <p:cNvPr id="3" name="Content Placeholder 2">
-            <a:extLst>
-              <a:ext uri="{FF2B5EF4-FFF2-40B4-BE49-F238E27FC236}">
-                <a16:creationId xmlns:a16="http://schemas.microsoft.com/office/drawing/2014/main" id="{56F64E25-C795-B257-2E57-46F801568744}"/>
-              </a:ext>
-            </a:extLst>
-          </p:cNvPr>
-          <p:cNvSpPr>
-            <a:spLocks noGrp="1"/>
-          </p:cNvSpPr>
-          <p:nvPr>
-            <p:ph idx="1"/>
-          </p:nvPr>
-        </p:nvSpPr>
-        <p:spPr>
-          <a:xfrm>
-            <a:off x="838200" y="4453591"/>
-            <a:ext cx="10515600" cy="1723372"/>
-          </a:xfrm>
-        </p:spPr>
-        <p:txBody>
-          <a:bodyPr>
-            <a:normAutofit fontScale="70000" lnSpcReduction="20000"/>
-          </a:bodyPr>
-          <a:lstStyle/>
-          <a:p>
-            <a:r>
-              <a:rPr lang="en-US" b="0" i="0" dirty="0">
-                <a:effectLst/>
-                <a:highlight>
-                  <a:srgbClr val="FFFFFF"/>
-                </a:highlight>
-                <a:latin typeface="system-ui"/>
-              </a:rPr>
-              <a:t>Does having a higher total population of </a:t>
-            </a:r>
-            <a:r>
-              <a:rPr lang="en-US" b="0" i="0" dirty="0" err="1">
-                <a:effectLst/>
-                <a:highlight>
-                  <a:srgbClr val="FFFFFF"/>
-                </a:highlight>
-                <a:latin typeface="system-ui"/>
-              </a:rPr>
-              <a:t>hispanic</a:t>
-            </a:r>
-            <a:r>
-              <a:rPr lang="en-US" b="0" i="0" dirty="0">
-                <a:effectLst/>
-                <a:highlight>
-                  <a:srgbClr val="FFFFFF"/>
-                </a:highlight>
-                <a:latin typeface="system-ui"/>
-              </a:rPr>
-              <a:t> or </a:t>
-            </a:r>
-            <a:r>
-              <a:rPr lang="en-US" b="0" i="0" dirty="0" err="1">
-                <a:effectLst/>
-                <a:highlight>
-                  <a:srgbClr val="FFFFFF"/>
-                </a:highlight>
-                <a:latin typeface="system-ui"/>
-              </a:rPr>
-              <a:t>latino</a:t>
-            </a:r>
-            <a:r>
-              <a:rPr lang="en-US" b="0" i="0" dirty="0">
-                <a:effectLst/>
-                <a:highlight>
-                  <a:srgbClr val="FFFFFF"/>
-                </a:highlight>
-                <a:latin typeface="system-ui"/>
-              </a:rPr>
-              <a:t> people of any race in a given state lead to more covid-19 infections for that state? (Label: DP05_0073E)</a:t>
-            </a:r>
-          </a:p>
-          <a:p>
-            <a:r>
-              <a:rPr lang="en-US" b="0" i="0" dirty="0">
-                <a:effectLst/>
-                <a:highlight>
-                  <a:srgbClr val="FFFFFF"/>
-                </a:highlight>
-                <a:latin typeface="system-ui"/>
-              </a:rPr>
-              <a:t>Does having more people of 35 to 44 years of age in a given state lead to fewer covid-19 infections for that state? (Label: DP05_0011E)</a:t>
-            </a:r>
-          </a:p>
-          <a:p>
-            <a:r>
-              <a:rPr lang="en-US" b="0" i="0" dirty="0">
-                <a:effectLst/>
-                <a:highlight>
-                  <a:srgbClr val="FFFFFF"/>
-                </a:highlight>
-                <a:latin typeface="system-ui"/>
-              </a:rPr>
-              <a:t>Does having more people aged 60 to 64 in a given state lead to more covid-19 cases for that state? (Label : DP05_0014E)</a:t>
-            </a:r>
-            <a:endParaRPr lang="en-US" dirty="0"/>
+              <a:t>Presidential – Neetha Ravva</a:t>
+            </a:r>
           </a:p>
         </p:txBody>
       </p:sp>
@@ -8132,7 +8350,7 @@
           <p:cNvPr id="4" name="Slide Number Placeholder 3">
             <a:extLst>
               <a:ext uri="{FF2B5EF4-FFF2-40B4-BE49-F238E27FC236}">
-                <a16:creationId xmlns:a16="http://schemas.microsoft.com/office/drawing/2014/main" id="{14810756-614E-B658-4A79-F41E3A7D2FFC}"/>
+                <a16:creationId xmlns:a16="http://schemas.microsoft.com/office/drawing/2014/main" id="{A3D34BE9-B2E4-7087-1E93-3C2B9595A316}"/>
               </a:ext>
             </a:extLst>
           </p:cNvPr>
@@ -8151,187 +8369,6 @@
             <a:fld id="{BD0DFC8E-D006-4B55-BBF2-7AB50F8F017C}" type="slidenum">
               <a:rPr lang="en-US" smtClean="0"/>
               <a:t>10</a:t>
-            </a:fld>
-            <a:endParaRPr lang="en-US"/>
-          </a:p>
-        </p:txBody>
-      </p:sp>
-      <p:pic>
-        <p:nvPicPr>
-          <p:cNvPr id="5" name="Picture 2">
-            <a:extLst>
-              <a:ext uri="{FF2B5EF4-FFF2-40B4-BE49-F238E27FC236}">
-                <a16:creationId xmlns:a16="http://schemas.microsoft.com/office/drawing/2014/main" id="{D7E59CE7-EF02-74DF-A6F3-C6EC91925E1C}"/>
-              </a:ext>
-            </a:extLst>
-          </p:cNvPr>
-          <p:cNvPicPr>
-            <a:picLocks noChangeAspect="1" noChangeArrowheads="1"/>
-          </p:cNvPicPr>
-          <p:nvPr/>
-        </p:nvPicPr>
-        <p:blipFill>
-          <a:blip r:embed="rId2">
-            <a:extLst>
-              <a:ext uri="{28A0092B-C50C-407E-A947-70E740481C1C}">
-                <a14:useLocalDpi xmlns:a14="http://schemas.microsoft.com/office/drawing/2010/main" val="0"/>
-              </a:ext>
-            </a:extLst>
-          </a:blip>
-          <a:srcRect/>
-          <a:stretch>
-            <a:fillRect/>
-          </a:stretch>
-        </p:blipFill>
-        <p:spPr bwMode="auto">
-          <a:xfrm>
-            <a:off x="1742769" y="1825626"/>
-            <a:ext cx="3075038" cy="2493027"/>
-          </a:xfrm>
-          <a:prstGeom prst="rect">
-            <a:avLst/>
-          </a:prstGeom>
-          <a:noFill/>
-          <a:extLst>
-            <a:ext uri="{909E8E84-426E-40DD-AFC4-6F175D3DCCD1}">
-              <a14:hiddenFill xmlns:a14="http://schemas.microsoft.com/office/drawing/2010/main">
-                <a:solidFill>
-                  <a:srgbClr val="FFFFFF"/>
-                </a:solidFill>
-              </a14:hiddenFill>
-            </a:ext>
-          </a:extLst>
-        </p:spPr>
-      </p:pic>
-      <p:pic>
-        <p:nvPicPr>
-          <p:cNvPr id="6" name="Picture 4">
-            <a:extLst>
-              <a:ext uri="{FF2B5EF4-FFF2-40B4-BE49-F238E27FC236}">
-                <a16:creationId xmlns:a16="http://schemas.microsoft.com/office/drawing/2014/main" id="{1F06D0C8-633D-4F2F-FDC1-780320C291B9}"/>
-              </a:ext>
-            </a:extLst>
-          </p:cNvPr>
-          <p:cNvPicPr>
-            <a:picLocks noChangeAspect="1" noChangeArrowheads="1"/>
-          </p:cNvPicPr>
-          <p:nvPr/>
-        </p:nvPicPr>
-        <p:blipFill>
-          <a:blip r:embed="rId3">
-            <a:extLst>
-              <a:ext uri="{28A0092B-C50C-407E-A947-70E740481C1C}">
-                <a14:useLocalDpi xmlns:a14="http://schemas.microsoft.com/office/drawing/2010/main" val="0"/>
-              </a:ext>
-            </a:extLst>
-          </a:blip>
-          <a:srcRect/>
-          <a:stretch>
-            <a:fillRect/>
-          </a:stretch>
-        </p:blipFill>
-        <p:spPr bwMode="auto">
-          <a:xfrm>
-            <a:off x="5046561" y="1825626"/>
-            <a:ext cx="3229873" cy="2498402"/>
-          </a:xfrm>
-          <a:prstGeom prst="rect">
-            <a:avLst/>
-          </a:prstGeom>
-          <a:noFill/>
-          <a:extLst>
-            <a:ext uri="{909E8E84-426E-40DD-AFC4-6F175D3DCCD1}">
-              <a14:hiddenFill xmlns:a14="http://schemas.microsoft.com/office/drawing/2010/main">
-                <a:solidFill>
-                  <a:srgbClr val="FFFFFF"/>
-                </a:solidFill>
-              </a14:hiddenFill>
-            </a:ext>
-          </a:extLst>
-        </p:spPr>
-      </p:pic>
-    </p:spTree>
-    <p:extLst>
-      <p:ext uri="{BB962C8B-B14F-4D97-AF65-F5344CB8AC3E}">
-        <p14:creationId xmlns:p14="http://schemas.microsoft.com/office/powerpoint/2010/main" val="1244231696"/>
-      </p:ext>
-    </p:extLst>
-  </p:cSld>
-  <p:clrMapOvr>
-    <a:masterClrMapping/>
-  </p:clrMapOvr>
-</p:sld>
-</file>
-
-<file path=ppt/slides/slide11.xml><?xml version="1.0" encoding="utf-8"?>
-<p:sld xmlns:a="http://schemas.openxmlformats.org/drawingml/2006/main" xmlns:r="http://schemas.openxmlformats.org/officeDocument/2006/relationships" xmlns:p="http://schemas.openxmlformats.org/presentationml/2006/main">
-  <p:cSld>
-    <p:spTree>
-      <p:nvGrpSpPr>
-        <p:cNvPr id="1" name=""/>
-        <p:cNvGrpSpPr/>
-        <p:nvPr/>
-      </p:nvGrpSpPr>
-      <p:grpSpPr>
-        <a:xfrm>
-          <a:off x="0" y="0"/>
-          <a:ext cx="0" cy="0"/>
-          <a:chOff x="0" y="0"/>
-          <a:chExt cx="0" cy="0"/>
-        </a:xfrm>
-      </p:grpSpPr>
-      <p:sp>
-        <p:nvSpPr>
-          <p:cNvPr id="2" name="Title 1">
-            <a:extLst>
-              <a:ext uri="{FF2B5EF4-FFF2-40B4-BE49-F238E27FC236}">
-                <a16:creationId xmlns:a16="http://schemas.microsoft.com/office/drawing/2014/main" id="{691F7F71-9C50-5CE8-1E0A-137DA1B5A270}"/>
-              </a:ext>
-            </a:extLst>
-          </p:cNvPr>
-          <p:cNvSpPr>
-            <a:spLocks noGrp="1"/>
-          </p:cNvSpPr>
-          <p:nvPr>
-            <p:ph type="title"/>
-          </p:nvPr>
-        </p:nvSpPr>
-        <p:spPr/>
-        <p:txBody>
-          <a:bodyPr/>
-          <a:lstStyle/>
-          <a:p>
-            <a:r>
-              <a:rPr lang="en-US" dirty="0"/>
-              <a:t>Presidential – Neetha Ravva</a:t>
-            </a:r>
-          </a:p>
-        </p:txBody>
-      </p:sp>
-      <p:sp>
-        <p:nvSpPr>
-          <p:cNvPr id="4" name="Slide Number Placeholder 3">
-            <a:extLst>
-              <a:ext uri="{FF2B5EF4-FFF2-40B4-BE49-F238E27FC236}">
-                <a16:creationId xmlns:a16="http://schemas.microsoft.com/office/drawing/2014/main" id="{A3D34BE9-B2E4-7087-1E93-3C2B9595A316}"/>
-              </a:ext>
-            </a:extLst>
-          </p:cNvPr>
-          <p:cNvSpPr>
-            <a:spLocks noGrp="1"/>
-          </p:cNvSpPr>
-          <p:nvPr>
-            <p:ph type="sldNum" sz="quarter" idx="12"/>
-          </p:nvPr>
-        </p:nvSpPr>
-        <p:spPr/>
-        <p:txBody>
-          <a:bodyPr/>
-          <a:lstStyle/>
-          <a:p>
-            <a:fld id="{BD0DFC8E-D006-4B55-BBF2-7AB50F8F017C}" type="slidenum">
-              <a:rPr lang="en-US" smtClean="0"/>
-              <a:t>11</a:t>
             </a:fld>
             <a:endParaRPr lang="en-US"/>
           </a:p>
@@ -8493,6 +8530,273 @@
 </p:sld>
 </file>
 
+<file path=ppt/slides/slide11.xml><?xml version="1.0" encoding="utf-8"?>
+<p:sld xmlns:a="http://schemas.openxmlformats.org/drawingml/2006/main" xmlns:r="http://schemas.openxmlformats.org/officeDocument/2006/relationships" xmlns:p="http://schemas.openxmlformats.org/presentationml/2006/main">
+  <p:cSld>
+    <p:spTree>
+      <p:nvGrpSpPr>
+        <p:cNvPr id="1" name=""/>
+        <p:cNvGrpSpPr/>
+        <p:nvPr/>
+      </p:nvGrpSpPr>
+      <p:grpSpPr>
+        <a:xfrm>
+          <a:off x="0" y="0"/>
+          <a:ext cx="0" cy="0"/>
+          <a:chOff x="0" y="0"/>
+          <a:chExt cx="0" cy="0"/>
+        </a:xfrm>
+      </p:grpSpPr>
+      <p:sp>
+        <p:nvSpPr>
+          <p:cNvPr id="2" name="Title 1">
+            <a:extLst>
+              <a:ext uri="{FF2B5EF4-FFF2-40B4-BE49-F238E27FC236}">
+                <a16:creationId xmlns:a16="http://schemas.microsoft.com/office/drawing/2014/main" id="{D29B31B8-3B08-955E-ABDE-D7BA45C439D7}"/>
+              </a:ext>
+            </a:extLst>
+          </p:cNvPr>
+          <p:cNvSpPr>
+            <a:spLocks noGrp="1"/>
+          </p:cNvSpPr>
+          <p:nvPr>
+            <p:ph type="title"/>
+          </p:nvPr>
+        </p:nvSpPr>
+        <p:spPr/>
+        <p:txBody>
+          <a:bodyPr/>
+          <a:lstStyle/>
+          <a:p>
+            <a:r>
+              <a:rPr lang="en-US" dirty="0"/>
+              <a:t>Hypothesis</a:t>
+            </a:r>
+          </a:p>
+        </p:txBody>
+      </p:sp>
+      <p:sp>
+        <p:nvSpPr>
+          <p:cNvPr id="3" name="Content Placeholder 2">
+            <a:extLst>
+              <a:ext uri="{FF2B5EF4-FFF2-40B4-BE49-F238E27FC236}">
+                <a16:creationId xmlns:a16="http://schemas.microsoft.com/office/drawing/2014/main" id="{D0983B0A-1A58-76AD-78A3-77E268FBF7F9}"/>
+              </a:ext>
+            </a:extLst>
+          </p:cNvPr>
+          <p:cNvSpPr>
+            <a:spLocks noGrp="1"/>
+          </p:cNvSpPr>
+          <p:nvPr>
+            <p:ph idx="1"/>
+          </p:nvPr>
+        </p:nvSpPr>
+        <p:spPr>
+          <a:xfrm>
+            <a:off x="838200" y="1690688"/>
+            <a:ext cx="10515600" cy="4486275"/>
+          </a:xfrm>
+        </p:spPr>
+        <p:txBody>
+          <a:bodyPr>
+            <a:normAutofit/>
+          </a:bodyPr>
+          <a:lstStyle/>
+          <a:p>
+            <a:pPr algn="l"/>
+            <a:r>
+              <a:rPr lang="en-US" sz="2400" b="1" i="0" dirty="0">
+                <a:solidFill>
+                  <a:srgbClr val="212121"/>
+                </a:solidFill>
+                <a:effectLst/>
+                <a:latin typeface="+mn-lt"/>
+              </a:rPr>
+              <a:t>Hypothesis</a:t>
+            </a:r>
+            <a:r>
+              <a:rPr lang="en-US" sz="2300" b="1" i="0" dirty="0">
+                <a:solidFill>
+                  <a:srgbClr val="212121"/>
+                </a:solidFill>
+                <a:effectLst/>
+                <a:latin typeface="+mn-lt"/>
+              </a:rPr>
+              <a:t> 1: Political Party Affiliation and COVID-19 Case Counts</a:t>
+            </a:r>
+            <a:r>
+              <a:rPr lang="en-US" sz="2300" b="0" i="0" dirty="0">
+                <a:solidFill>
+                  <a:srgbClr val="212121"/>
+                </a:solidFill>
+                <a:effectLst/>
+                <a:latin typeface="+mn-lt"/>
+              </a:rPr>
+              <a:t> </a:t>
+            </a:r>
+          </a:p>
+          <a:p>
+            <a:pPr lvl="1"/>
+            <a:r>
+              <a:rPr lang="en-US" sz="2200" b="0" i="0" dirty="0">
+                <a:solidFill>
+                  <a:srgbClr val="212121"/>
+                </a:solidFill>
+                <a:effectLst/>
+                <a:latin typeface="+mn-lt"/>
+              </a:rPr>
+              <a:t>There is a significant correlation between the political party of the winning candidate in a state and the total number of COVID-19 cases reported in that state.</a:t>
+            </a:r>
+          </a:p>
+          <a:p>
+            <a:pPr lvl="1"/>
+            <a:endParaRPr lang="en-US" sz="1200" b="0" i="0" dirty="0">
+              <a:solidFill>
+                <a:srgbClr val="212121"/>
+              </a:solidFill>
+              <a:effectLst/>
+              <a:latin typeface="+mn-lt"/>
+            </a:endParaRPr>
+          </a:p>
+          <a:p>
+            <a:pPr algn="l"/>
+            <a:r>
+              <a:rPr lang="en-US" sz="2400" b="1" i="0" dirty="0">
+                <a:solidFill>
+                  <a:srgbClr val="212121"/>
+                </a:solidFill>
+                <a:effectLst/>
+                <a:latin typeface="+mn-lt"/>
+              </a:rPr>
+              <a:t>Hypothesis</a:t>
+            </a:r>
+            <a:r>
+              <a:rPr lang="en-US" sz="2300" b="1" i="0" dirty="0">
+                <a:solidFill>
+                  <a:srgbClr val="212121"/>
+                </a:solidFill>
+                <a:effectLst/>
+                <a:latin typeface="+mn-lt"/>
+              </a:rPr>
+              <a:t> 2: Voter Turnout and COVID-19 Case Counts</a:t>
+            </a:r>
+            <a:r>
+              <a:rPr lang="en-US" sz="2300" b="0" i="0" dirty="0">
+                <a:solidFill>
+                  <a:srgbClr val="212121"/>
+                </a:solidFill>
+                <a:effectLst/>
+                <a:latin typeface="+mn-lt"/>
+              </a:rPr>
+              <a:t> </a:t>
+            </a:r>
+          </a:p>
+          <a:p>
+            <a:pPr lvl="1"/>
+            <a:r>
+              <a:rPr lang="en-US" sz="2200" b="0" i="0" dirty="0">
+                <a:solidFill>
+                  <a:srgbClr val="212121"/>
+                </a:solidFill>
+                <a:effectLst/>
+                <a:latin typeface="+mn-lt"/>
+              </a:rPr>
+              <a:t>There is a significant relationship between voter turnout in a state and the total number of COVID-19 cases reported in that state.</a:t>
+            </a:r>
+          </a:p>
+          <a:p>
+            <a:pPr lvl="1"/>
+            <a:endParaRPr lang="en-US" sz="1200" b="0" i="0" dirty="0">
+              <a:solidFill>
+                <a:srgbClr val="212121"/>
+              </a:solidFill>
+              <a:effectLst/>
+              <a:latin typeface="+mn-lt"/>
+            </a:endParaRPr>
+          </a:p>
+          <a:p>
+            <a:pPr algn="l"/>
+            <a:r>
+              <a:rPr lang="en-US" sz="2300" b="1" i="0" dirty="0">
+                <a:solidFill>
+                  <a:srgbClr val="212121"/>
+                </a:solidFill>
+                <a:effectLst/>
+                <a:latin typeface="+mn-lt"/>
+              </a:rPr>
+              <a:t>Hypothesis 3: Population Size and COVID-19 Case Counts</a:t>
+            </a:r>
+            <a:r>
+              <a:rPr lang="en-US" sz="2300" b="0" i="0" dirty="0">
+                <a:solidFill>
+                  <a:srgbClr val="212121"/>
+                </a:solidFill>
+                <a:effectLst/>
+                <a:latin typeface="+mn-lt"/>
+              </a:rPr>
+              <a:t> </a:t>
+            </a:r>
+          </a:p>
+          <a:p>
+            <a:pPr lvl="1"/>
+            <a:r>
+              <a:rPr lang="en-US" sz="2200" b="0" i="0" dirty="0">
+                <a:solidFill>
+                  <a:srgbClr val="212121"/>
+                </a:solidFill>
+                <a:effectLst/>
+                <a:latin typeface="+mn-lt"/>
+              </a:rPr>
+              <a:t>There is a significant correlation between the population size of a state and the total number of COVID-19 cases reported in that state.</a:t>
+            </a:r>
+          </a:p>
+          <a:p>
+            <a:endParaRPr lang="en-US" dirty="0"/>
+          </a:p>
+        </p:txBody>
+      </p:sp>
+      <p:sp>
+        <p:nvSpPr>
+          <p:cNvPr id="4" name="Slide Number Placeholder 3">
+            <a:extLst>
+              <a:ext uri="{FF2B5EF4-FFF2-40B4-BE49-F238E27FC236}">
+                <a16:creationId xmlns:a16="http://schemas.microsoft.com/office/drawing/2014/main" id="{39D51366-FCF2-2141-302D-90F62FCEBB46}"/>
+              </a:ext>
+            </a:extLst>
+          </p:cNvPr>
+          <p:cNvSpPr>
+            <a:spLocks noGrp="1"/>
+          </p:cNvSpPr>
+          <p:nvPr>
+            <p:ph type="sldNum" sz="quarter" idx="12"/>
+          </p:nvPr>
+        </p:nvSpPr>
+        <p:spPr/>
+        <p:txBody>
+          <a:bodyPr/>
+          <a:lstStyle/>
+          <a:p>
+            <a:fld id="{BD0DFC8E-D006-4B55-BBF2-7AB50F8F017C}" type="slidenum">
+              <a:rPr lang="en-US" smtClean="0"/>
+              <a:t>11</a:t>
+            </a:fld>
+            <a:endParaRPr lang="en-US" dirty="0"/>
+          </a:p>
+        </p:txBody>
+      </p:sp>
+    </p:spTree>
+    <p:extLst>
+      <p:ext uri="{BB962C8B-B14F-4D97-AF65-F5344CB8AC3E}">
+        <p14:creationId xmlns:p14="http://schemas.microsoft.com/office/powerpoint/2010/main" val="1972063367"/>
+      </p:ext>
+    </p:extLst>
+  </p:cSld>
+  <p:clrMapOvr>
+    <a:masterClrMapping/>
+  </p:clrMapOvr>
+</p:sld>
+</file>
+
 <file path=ppt/slides/slide12.xml><?xml version="1.0" encoding="utf-8"?>
 <p:sld xmlns:a="http://schemas.openxmlformats.org/drawingml/2006/main" xmlns:r="http://schemas.openxmlformats.org/officeDocument/2006/relationships" xmlns:p="http://schemas.openxmlformats.org/presentationml/2006/main">
   <p:cSld>
@@ -8515,7 +8819,7 @@
           <p:cNvPr id="2" name="Title 1">
             <a:extLst>
               <a:ext uri="{FF2B5EF4-FFF2-40B4-BE49-F238E27FC236}">
-                <a16:creationId xmlns:a16="http://schemas.microsoft.com/office/drawing/2014/main" id="{D29B31B8-3B08-955E-ABDE-D7BA45C439D7}"/>
+                <a16:creationId xmlns:a16="http://schemas.microsoft.com/office/drawing/2014/main" id="{5B4A204C-CA1B-E276-A3AB-85B6A9BF2520}"/>
               </a:ext>
             </a:extLst>
           </p:cNvPr>
@@ -8524,40 +8828,46 @@
           </p:cNvSpPr>
           <p:nvPr>
             <p:ph type="title"/>
-          </p:nvPr>
-        </p:nvSpPr>
-        <p:spPr/>
-        <p:txBody>
-          <a:bodyPr/>
-          <a:lstStyle/>
-          <a:p>
-            <a:r>
-              <a:rPr lang="en-US" dirty="0"/>
-              <a:t>Hypothesis</a:t>
-            </a:r>
-          </a:p>
-        </p:txBody>
-      </p:sp>
-      <p:sp>
-        <p:nvSpPr>
-          <p:cNvPr id="3" name="Content Placeholder 2">
-            <a:extLst>
-              <a:ext uri="{FF2B5EF4-FFF2-40B4-BE49-F238E27FC236}">
-                <a16:creationId xmlns:a16="http://schemas.microsoft.com/office/drawing/2014/main" id="{D0983B0A-1A58-76AD-78A3-77E268FBF7F9}"/>
-              </a:ext>
-            </a:extLst>
-          </p:cNvPr>
-          <p:cNvSpPr>
-            <a:spLocks noGrp="1"/>
-          </p:cNvSpPr>
-          <p:nvPr>
-            <p:ph idx="1"/>
           </p:nvPr>
         </p:nvSpPr>
         <p:spPr>
           <a:xfrm>
-            <a:off x="838200" y="1690688"/>
-            <a:ext cx="10515600" cy="4486275"/>
+            <a:off x="838200" y="2949921"/>
+            <a:ext cx="10515600" cy="958158"/>
+          </a:xfrm>
+        </p:spPr>
+        <p:txBody>
+          <a:bodyPr/>
+          <a:lstStyle/>
+          <a:p>
+            <a:pPr algn="ctr"/>
+            <a:r>
+              <a:rPr lang="en-US" dirty="0"/>
+              <a:t>Stage 4: Machine Learning</a:t>
+            </a:r>
+          </a:p>
+        </p:txBody>
+      </p:sp>
+      <p:sp>
+        <p:nvSpPr>
+          <p:cNvPr id="3" name="Content Placeholder 2">
+            <a:extLst>
+              <a:ext uri="{FF2B5EF4-FFF2-40B4-BE49-F238E27FC236}">
+                <a16:creationId xmlns:a16="http://schemas.microsoft.com/office/drawing/2014/main" id="{56B899B6-989A-2B85-C3EB-8DF90F90622A}"/>
+              </a:ext>
+            </a:extLst>
+          </p:cNvPr>
+          <p:cNvSpPr>
+            <a:spLocks noGrp="1"/>
+          </p:cNvSpPr>
+          <p:nvPr>
+            <p:ph type="body" idx="1"/>
+          </p:nvPr>
+        </p:nvSpPr>
+        <p:spPr>
+          <a:xfrm>
+            <a:off x="838200" y="4040823"/>
+            <a:ext cx="10515600" cy="1500187"/>
           </a:xfrm>
         </p:spPr>
         <p:txBody>
@@ -8566,164 +8876,25 @@
           </a:bodyPr>
           <a:lstStyle/>
           <a:p>
-            <a:pPr algn="l"/>
-            <a:r>
-              <a:rPr lang="en-US" sz="2400" b="1" i="0" dirty="0">
-                <a:solidFill>
-                  <a:srgbClr val="212121"/>
-                </a:solidFill>
-                <a:effectLst/>
-                <a:latin typeface="+mn-lt"/>
-              </a:rPr>
-              <a:t>Hypothesis</a:t>
-            </a:r>
-            <a:r>
-              <a:rPr lang="en-US" sz="2300" b="1" i="0" dirty="0">
-                <a:solidFill>
-                  <a:srgbClr val="212121"/>
-                </a:solidFill>
-                <a:effectLst/>
-                <a:latin typeface="+mn-lt"/>
-              </a:rPr>
-              <a:t> 1: Political Party Affiliation and COVID-19 Case Counts</a:t>
-            </a:r>
-            <a:r>
-              <a:rPr lang="en-US" sz="2300" b="0" i="0" dirty="0">
-                <a:solidFill>
-                  <a:srgbClr val="212121"/>
-                </a:solidFill>
-                <a:effectLst/>
-                <a:latin typeface="+mn-lt"/>
-              </a:rPr>
-              <a:t> </a:t>
-            </a:r>
-          </a:p>
-          <a:p>
-            <a:pPr lvl="1"/>
-            <a:r>
-              <a:rPr lang="en-US" sz="2200" b="0" i="0" dirty="0">
-                <a:solidFill>
-                  <a:srgbClr val="212121"/>
-                </a:solidFill>
-                <a:effectLst/>
-                <a:latin typeface="+mn-lt"/>
-              </a:rPr>
-              <a:t>There is a significant correlation between the political party of the winning candidate in a state and the total number of COVID-19 cases reported in that state.</a:t>
-            </a:r>
-          </a:p>
-          <a:p>
-            <a:pPr lvl="1"/>
-            <a:endParaRPr lang="en-US" sz="1200" b="0" i="0" dirty="0">
-              <a:solidFill>
-                <a:srgbClr val="212121"/>
-              </a:solidFill>
-              <a:effectLst/>
-              <a:latin typeface="+mn-lt"/>
+            <a:pPr algn="ctr"/>
+            <a:r>
+              <a:rPr lang="en-US" dirty="0"/>
+              <a:t>Regression models (linear, polynomial), machine learning, predictions on COVID-19 cases/deaths</a:t>
+            </a:r>
+            <a:endParaRPr lang="en-US" dirty="0">
+              <a:highlight>
+                <a:srgbClr val="FFFF00"/>
+              </a:highlight>
             </a:endParaRPr>
           </a:p>
-          <a:p>
-            <a:pPr algn="l"/>
-            <a:r>
-              <a:rPr lang="en-US" sz="2400" b="1" i="0" dirty="0">
-                <a:solidFill>
-                  <a:srgbClr val="212121"/>
-                </a:solidFill>
-                <a:effectLst/>
-                <a:latin typeface="+mn-lt"/>
-              </a:rPr>
-              <a:t>Hypothesis</a:t>
-            </a:r>
-            <a:r>
-              <a:rPr lang="en-US" sz="2300" b="1" i="0" dirty="0">
-                <a:solidFill>
-                  <a:srgbClr val="212121"/>
-                </a:solidFill>
-                <a:effectLst/>
-                <a:latin typeface="+mn-lt"/>
-              </a:rPr>
-              <a:t> 2: Voter Turnout and COVID-19 Case Counts</a:t>
-            </a:r>
-            <a:r>
-              <a:rPr lang="en-US" sz="2300" b="0" i="0" dirty="0">
-                <a:solidFill>
-                  <a:srgbClr val="212121"/>
-                </a:solidFill>
-                <a:effectLst/>
-                <a:latin typeface="+mn-lt"/>
-              </a:rPr>
-              <a:t> </a:t>
-            </a:r>
-          </a:p>
-          <a:p>
-            <a:pPr lvl="1"/>
-            <a:r>
-              <a:rPr lang="en-US" sz="2200" b="0" i="0" dirty="0">
-                <a:solidFill>
-                  <a:srgbClr val="212121"/>
-                </a:solidFill>
-                <a:effectLst/>
-                <a:latin typeface="+mn-lt"/>
-              </a:rPr>
-              <a:t>There is a significant relationship between voter turnout in a state and the total number of COVID-19 cases reported in that state.</a:t>
-            </a:r>
-          </a:p>
-          <a:p>
-            <a:pPr lvl="1"/>
-            <a:endParaRPr lang="en-US" sz="1200" b="0" i="0" dirty="0">
-              <a:solidFill>
-                <a:srgbClr val="212121"/>
-              </a:solidFill>
-              <a:effectLst/>
-              <a:latin typeface="+mn-lt"/>
-            </a:endParaRPr>
-          </a:p>
-          <a:p>
-            <a:pPr algn="l"/>
-            <a:r>
-              <a:rPr lang="en-US" sz="2300" b="1" i="0" dirty="0">
-                <a:solidFill>
-                  <a:srgbClr val="212121"/>
-                </a:solidFill>
-                <a:effectLst/>
-                <a:latin typeface="+mn-lt"/>
-              </a:rPr>
-              <a:t>Hypothesis 3: Population Size and COVID-19 Case Counts</a:t>
-            </a:r>
-            <a:r>
-              <a:rPr lang="en-US" sz="2300" b="0" i="0" dirty="0">
-                <a:solidFill>
-                  <a:srgbClr val="212121"/>
-                </a:solidFill>
-                <a:effectLst/>
-                <a:latin typeface="+mn-lt"/>
-              </a:rPr>
-              <a:t> </a:t>
-            </a:r>
-          </a:p>
-          <a:p>
-            <a:pPr lvl="1"/>
-            <a:r>
-              <a:rPr lang="en-US" sz="2200" b="0" i="0" dirty="0">
-                <a:solidFill>
-                  <a:srgbClr val="212121"/>
-                </a:solidFill>
-                <a:effectLst/>
-                <a:latin typeface="+mn-lt"/>
-              </a:rPr>
-              <a:t>There is a significant correlation between the population size of a state and the total number of COVID-19 cases reported in that state.</a:t>
-            </a:r>
-          </a:p>
-          <a:p>
-            <a:endParaRPr lang="en-US" dirty="0"/>
-          </a:p>
-        </p:txBody>
-      </p:sp>
-      <p:sp>
-        <p:nvSpPr>
-          <p:cNvPr id="4" name="Slide Number Placeholder 3">
-            <a:extLst>
-              <a:ext uri="{FF2B5EF4-FFF2-40B4-BE49-F238E27FC236}">
-                <a16:creationId xmlns:a16="http://schemas.microsoft.com/office/drawing/2014/main" id="{39D51366-FCF2-2141-302D-90F62FCEBB46}"/>
+        </p:txBody>
+      </p:sp>
+      <p:sp>
+        <p:nvSpPr>
+          <p:cNvPr id="6" name="Slide Number Placeholder 5">
+            <a:extLst>
+              <a:ext uri="{FF2B5EF4-FFF2-40B4-BE49-F238E27FC236}">
+                <a16:creationId xmlns:a16="http://schemas.microsoft.com/office/drawing/2014/main" id="{FC08B894-EC56-0670-B8F5-628144CBEA1A}"/>
               </a:ext>
             </a:extLst>
           </p:cNvPr>
@@ -8743,14 +8914,14 @@
               <a:rPr lang="en-US" smtClean="0"/>
               <a:t>12</a:t>
             </a:fld>
-            <a:endParaRPr lang="en-US" dirty="0"/>
+            <a:endParaRPr lang="en-US"/>
           </a:p>
         </p:txBody>
       </p:sp>
     </p:spTree>
     <p:extLst>
       <p:ext uri="{BB962C8B-B14F-4D97-AF65-F5344CB8AC3E}">
-        <p14:creationId xmlns:p14="http://schemas.microsoft.com/office/powerpoint/2010/main" val="1972063367"/>
+        <p14:creationId xmlns:p14="http://schemas.microsoft.com/office/powerpoint/2010/main" val="871898229"/>
       </p:ext>
     </p:extLst>
   </p:cSld>
@@ -8779,10 +8950,10 @@
       </p:grpSpPr>
       <p:sp>
         <p:nvSpPr>
-          <p:cNvPr id="2" name="Title 1">
-            <a:extLst>
-              <a:ext uri="{FF2B5EF4-FFF2-40B4-BE49-F238E27FC236}">
-                <a16:creationId xmlns:a16="http://schemas.microsoft.com/office/drawing/2014/main" id="{5B4A204C-CA1B-E276-A3AB-85B6A9BF2520}"/>
+          <p:cNvPr id="18" name="Title 1">
+            <a:extLst>
+              <a:ext uri="{FF2B5EF4-FFF2-40B4-BE49-F238E27FC236}">
+                <a16:creationId xmlns:a16="http://schemas.microsoft.com/office/drawing/2014/main" id="{D4B2D4CE-1CCD-835E-26C5-4AF21C53A3E0}"/>
               </a:ext>
             </a:extLst>
           </p:cNvPr>
@@ -8795,101 +8966,189 @@
         </p:nvSpPr>
         <p:spPr>
           <a:xfrm>
-            <a:off x="838200" y="2949921"/>
-            <a:ext cx="10515600" cy="958158"/>
+            <a:off x="838200" y="365125"/>
+            <a:ext cx="10515600" cy="1325563"/>
           </a:xfrm>
         </p:spPr>
         <p:txBody>
           <a:bodyPr/>
           <a:lstStyle/>
           <a:p>
-            <a:pPr algn="ctr"/>
             <a:r>
               <a:rPr lang="en-US" dirty="0"/>
-              <a:t>Stage 4: Machine Learning</a:t>
-            </a:r>
-          </a:p>
-        </p:txBody>
-      </p:sp>
-      <p:sp>
-        <p:nvSpPr>
-          <p:cNvPr id="3" name="Content Placeholder 2">
-            <a:extLst>
-              <a:ext uri="{FF2B5EF4-FFF2-40B4-BE49-F238E27FC236}">
-                <a16:creationId xmlns:a16="http://schemas.microsoft.com/office/drawing/2014/main" id="{56B899B6-989A-2B85-C3EB-8DF90F90622A}"/>
-              </a:ext>
-            </a:extLst>
-          </p:cNvPr>
-          <p:cNvSpPr>
-            <a:spLocks noGrp="1"/>
-          </p:cNvSpPr>
-          <p:nvPr>
-            <p:ph type="body" idx="1"/>
+              <a:t>US Cases/Deaths Predictions</a:t>
+            </a:r>
+          </a:p>
+        </p:txBody>
+      </p:sp>
+      <p:sp>
+        <p:nvSpPr>
+          <p:cNvPr id="20" name="Slide Number Placeholder 3">
+            <a:extLst>
+              <a:ext uri="{FF2B5EF4-FFF2-40B4-BE49-F238E27FC236}">
+                <a16:creationId xmlns:a16="http://schemas.microsoft.com/office/drawing/2014/main" id="{8A79A400-E19F-F9E0-CCCE-2EC86119349A}"/>
+              </a:ext>
+            </a:extLst>
+          </p:cNvPr>
+          <p:cNvSpPr>
+            <a:spLocks noGrp="1"/>
+          </p:cNvSpPr>
+          <p:nvPr>
+            <p:ph type="sldNum" sz="quarter" idx="12"/>
           </p:nvPr>
         </p:nvSpPr>
         <p:spPr>
           <a:xfrm>
-            <a:off x="838200" y="4040823"/>
-            <a:ext cx="10515600" cy="1500187"/>
+            <a:off x="8610600" y="6356350"/>
+            <a:ext cx="2743200" cy="365125"/>
           </a:xfrm>
         </p:spPr>
         <p:txBody>
-          <a:bodyPr>
-            <a:normAutofit lnSpcReduction="10000"/>
-          </a:bodyPr>
-          <a:lstStyle/>
-          <a:p>
-            <a:pPr algn="ctr"/>
-            <a:r>
-              <a:rPr lang="en-US" dirty="0"/>
-              <a:t>Regression models (linear, polynomial), machine learning, predictions on COVID-19 cases/deaths</a:t>
-            </a:r>
-          </a:p>
-          <a:p>
-            <a:r>
-              <a:rPr lang="en-US" dirty="0">
-                <a:highlight>
-                  <a:srgbClr val="FFFF00"/>
-                </a:highlight>
-              </a:rPr>
-              <a:t>One slide each on individual predictions and whether they were correct or not</a:t>
-            </a:r>
-          </a:p>
-        </p:txBody>
-      </p:sp>
-      <p:sp>
-        <p:nvSpPr>
-          <p:cNvPr id="6" name="Slide Number Placeholder 5">
-            <a:extLst>
-              <a:ext uri="{FF2B5EF4-FFF2-40B4-BE49-F238E27FC236}">
-                <a16:creationId xmlns:a16="http://schemas.microsoft.com/office/drawing/2014/main" id="{FC08B894-EC56-0670-B8F5-628144CBEA1A}"/>
-              </a:ext>
-            </a:extLst>
-          </p:cNvPr>
-          <p:cNvSpPr>
-            <a:spLocks noGrp="1"/>
-          </p:cNvSpPr>
-          <p:nvPr>
-            <p:ph type="sldNum" sz="quarter" idx="12"/>
-          </p:nvPr>
-        </p:nvSpPr>
-        <p:spPr/>
-        <p:txBody>
-          <a:bodyPr/>
-          <a:lstStyle/>
-          <a:p>
+          <a:bodyPr/>
+          <a:lstStyle/>
+          <a:p>
+            <a:pPr>
+              <a:spcAft>
+                <a:spcPts val="600"/>
+              </a:spcAft>
+            </a:pPr>
             <a:fld id="{BD0DFC8E-D006-4B55-BBF2-7AB50F8F017C}" type="slidenum">
               <a:rPr lang="en-US" smtClean="0"/>
+              <a:pPr>
+                <a:spcAft>
+                  <a:spcPts val="600"/>
+                </a:spcAft>
+              </a:pPr>
               <a:t>13</a:t>
             </a:fld>
             <a:endParaRPr lang="en-US"/>
           </a:p>
         </p:txBody>
       </p:sp>
+      <p:pic>
+        <p:nvPicPr>
+          <p:cNvPr id="6" name="Picture 5" descr="A graph with a red line and blue line&#10;&#10;Description automatically generated">
+            <a:extLst>
+              <a:ext uri="{FF2B5EF4-FFF2-40B4-BE49-F238E27FC236}">
+                <a16:creationId xmlns:a16="http://schemas.microsoft.com/office/drawing/2014/main" id="{34CDBE4E-812C-0BD5-067D-CD6E4AEA741D}"/>
+              </a:ext>
+            </a:extLst>
+          </p:cNvPr>
+          <p:cNvPicPr>
+            <a:picLocks noChangeAspect="1"/>
+          </p:cNvPicPr>
+          <p:nvPr/>
+        </p:nvPicPr>
+        <p:blipFill>
+          <a:blip r:embed="rId3"/>
+          <a:stretch>
+            <a:fillRect/>
+          </a:stretch>
+        </p:blipFill>
+        <p:spPr>
+          <a:xfrm>
+            <a:off x="2232213" y="1693335"/>
+            <a:ext cx="3376192" cy="2161857"/>
+          </a:xfrm>
+          <a:prstGeom prst="rect">
+            <a:avLst/>
+          </a:prstGeom>
+        </p:spPr>
+      </p:pic>
+      <p:pic>
+        <p:nvPicPr>
+          <p:cNvPr id="8" name="Picture 7" descr="A graph showing the growth of a body&#10;&#10;Description automatically generated">
+            <a:extLst>
+              <a:ext uri="{FF2B5EF4-FFF2-40B4-BE49-F238E27FC236}">
+                <a16:creationId xmlns:a16="http://schemas.microsoft.com/office/drawing/2014/main" id="{5B7571EE-EC9D-0DB2-A0AC-2A1CF352AC17}"/>
+              </a:ext>
+            </a:extLst>
+          </p:cNvPr>
+          <p:cNvPicPr>
+            <a:picLocks noChangeAspect="1"/>
+          </p:cNvPicPr>
+          <p:nvPr/>
+        </p:nvPicPr>
+        <p:blipFill>
+          <a:blip r:embed="rId4"/>
+          <a:stretch>
+            <a:fillRect/>
+          </a:stretch>
+        </p:blipFill>
+        <p:spPr>
+          <a:xfrm>
+            <a:off x="5838555" y="1671565"/>
+            <a:ext cx="3376192" cy="2181378"/>
+          </a:xfrm>
+          <a:prstGeom prst="rect">
+            <a:avLst/>
+          </a:prstGeom>
+        </p:spPr>
+      </p:pic>
+      <p:pic>
+        <p:nvPicPr>
+          <p:cNvPr id="10" name="Picture 9" descr="A graph showing the growth of a number of cases&#10;&#10;Description automatically generated">
+            <a:extLst>
+              <a:ext uri="{FF2B5EF4-FFF2-40B4-BE49-F238E27FC236}">
+                <a16:creationId xmlns:a16="http://schemas.microsoft.com/office/drawing/2014/main" id="{A7988341-B118-DFEA-2C40-CF5A1DE9C59E}"/>
+              </a:ext>
+            </a:extLst>
+          </p:cNvPr>
+          <p:cNvPicPr>
+            <a:picLocks noChangeAspect="1"/>
+          </p:cNvPicPr>
+          <p:nvPr/>
+        </p:nvPicPr>
+        <p:blipFill>
+          <a:blip r:embed="rId5"/>
+          <a:stretch>
+            <a:fillRect/>
+          </a:stretch>
+        </p:blipFill>
+        <p:spPr>
+          <a:xfrm>
+            <a:off x="2232213" y="3855191"/>
+            <a:ext cx="3376192" cy="2199481"/>
+          </a:xfrm>
+          <a:prstGeom prst="rect">
+            <a:avLst/>
+          </a:prstGeom>
+        </p:spPr>
+      </p:pic>
+      <p:pic>
+        <p:nvPicPr>
+          <p:cNvPr id="12" name="Picture 11" descr="A graph showing the growth of a body&#10;&#10;Description automatically generated with medium confidence">
+            <a:extLst>
+              <a:ext uri="{FF2B5EF4-FFF2-40B4-BE49-F238E27FC236}">
+                <a16:creationId xmlns:a16="http://schemas.microsoft.com/office/drawing/2014/main" id="{EA3177C9-B629-B8B8-E747-CD4DE337D611}"/>
+              </a:ext>
+            </a:extLst>
+          </p:cNvPr>
+          <p:cNvPicPr>
+            <a:picLocks noChangeAspect="1"/>
+          </p:cNvPicPr>
+          <p:nvPr/>
+        </p:nvPicPr>
+        <p:blipFill>
+          <a:blip r:embed="rId6"/>
+          <a:stretch>
+            <a:fillRect/>
+          </a:stretch>
+        </p:blipFill>
+        <p:spPr>
+          <a:xfrm>
+            <a:off x="5838555" y="3859300"/>
+            <a:ext cx="3376672" cy="2195372"/>
+          </a:xfrm>
+          <a:prstGeom prst="rect">
+            <a:avLst/>
+          </a:prstGeom>
+        </p:spPr>
+      </p:pic>
     </p:spTree>
     <p:extLst>
       <p:ext uri="{BB962C8B-B14F-4D97-AF65-F5344CB8AC3E}">
-        <p14:creationId xmlns:p14="http://schemas.microsoft.com/office/powerpoint/2010/main" val="871898229"/>
+        <p14:creationId xmlns:p14="http://schemas.microsoft.com/office/powerpoint/2010/main" val="1070069613"/>
       </p:ext>
     </p:extLst>
   </p:cSld>
@@ -11228,7 +11487,7 @@
               <a:buAutoNum type="arabicPeriod"/>
             </a:pPr>
             <a:r>
-              <a:rPr lang="en-US" sz="2000" b="1" dirty="0">
+              <a:rPr lang="en-US" sz="2000" dirty="0">
                 <a:latin typeface="+mj-lt"/>
               </a:rPr>
               <a:t>Actual values     ii. Trendline     iii. 7-Day Moving Avg.</a:t>
@@ -11950,261 +12209,6 @@
             <p:ph type="title"/>
           </p:nvPr>
         </p:nvSpPr>
-        <p:spPr>
-          <a:xfrm>
-            <a:off x="838200" y="365126"/>
-            <a:ext cx="10515600" cy="315911"/>
-          </a:xfrm>
-        </p:spPr>
-        <p:txBody>
-          <a:bodyPr>
-            <a:normAutofit fontScale="90000"/>
-          </a:bodyPr>
-          <a:lstStyle/>
-          <a:p>
-            <a:r>
-              <a:rPr lang="en-US" dirty="0"/>
-              <a:t>Enrichment data</a:t>
-            </a:r>
-          </a:p>
-        </p:txBody>
-      </p:sp>
-      <p:sp>
-        <p:nvSpPr>
-          <p:cNvPr id="6" name="Content Placeholder 5">
-            <a:extLst>
-              <a:ext uri="{FF2B5EF4-FFF2-40B4-BE49-F238E27FC236}">
-                <a16:creationId xmlns:a16="http://schemas.microsoft.com/office/drawing/2014/main" id="{8B522ED7-7E31-26BF-CCDB-D7D5A7150758}"/>
-              </a:ext>
-            </a:extLst>
-          </p:cNvPr>
-          <p:cNvSpPr>
-            <a:spLocks noGrp="1"/>
-          </p:cNvSpPr>
-          <p:nvPr>
-            <p:ph idx="1"/>
-          </p:nvPr>
-        </p:nvSpPr>
-        <p:spPr>
-          <a:xfrm>
-            <a:off x="953349" y="921175"/>
-            <a:ext cx="10884747" cy="5408083"/>
-          </a:xfrm>
-        </p:spPr>
-        <p:txBody>
-          <a:bodyPr>
-            <a:normAutofit fontScale="77500" lnSpcReduction="20000"/>
-          </a:bodyPr>
-          <a:lstStyle/>
-          <a:p>
-            <a:r>
-              <a:rPr lang="en-US" b="1" dirty="0"/>
-              <a:t> GitHub account was created</a:t>
-            </a:r>
-            <a:r>
-              <a:rPr lang="en-US" dirty="0"/>
-              <a:t> – </a:t>
-            </a:r>
-            <a:r>
-              <a:rPr lang="en-US" b="1" dirty="0"/>
-              <a:t>https://github.com/aiwayemi/Group-1</a:t>
-            </a:r>
-          </a:p>
-          <a:p>
-            <a:pPr marL="0" indent="0">
-              <a:buNone/>
-            </a:pPr>
-            <a:endParaRPr lang="en-US" sz="2100" dirty="0"/>
-          </a:p>
-          <a:p>
-            <a:r>
-              <a:rPr lang="en-US" b="1" dirty="0"/>
-              <a:t>COVID-19 Dataset: Number of Cases, Number of Deaths, County Populations</a:t>
-            </a:r>
-            <a:endParaRPr lang="en-US" dirty="0"/>
-          </a:p>
-          <a:p>
-            <a:pPr marL="0" indent="0">
-              <a:buNone/>
-            </a:pPr>
-            <a:r>
-              <a:rPr lang="en-US" dirty="0"/>
-              <a:t>	</a:t>
-            </a:r>
-            <a:r>
-              <a:rPr lang="en-US" dirty="0">
-                <a:hlinkClick r:id="rId2"/>
-              </a:rPr>
-              <a:t>https://usafacts.org/visualizations/coronavirus-covid-19-spread-map/</a:t>
-            </a:r>
-            <a:endParaRPr lang="en-US" dirty="0"/>
-          </a:p>
-          <a:p>
-            <a:pPr marL="0" indent="0">
-              <a:buNone/>
-            </a:pPr>
-            <a:endParaRPr lang="en-US" sz="1500" dirty="0"/>
-          </a:p>
-          <a:p>
-            <a:r>
-              <a:rPr lang="en-US" b="1" dirty="0"/>
-              <a:t>Census Demographic ACS</a:t>
-            </a:r>
-          </a:p>
-          <a:p>
-            <a:pPr marL="0" indent="0">
-              <a:buNone/>
-            </a:pPr>
-            <a:r>
-              <a:rPr lang="en-US" dirty="0"/>
-              <a:t>	</a:t>
-            </a:r>
-            <a:r>
-              <a:rPr lang="en-US" dirty="0">
-                <a:hlinkClick r:id="rId3"/>
-              </a:rPr>
-              <a:t>https://data.census.gov/cedsci/table?q=dp&amp;tid=ACSDP1Y2018.DP05</a:t>
-            </a:r>
-            <a:endParaRPr lang="en-US" dirty="0"/>
-          </a:p>
-          <a:p>
-            <a:endParaRPr lang="en-US" sz="2100" dirty="0"/>
-          </a:p>
-          <a:p>
-            <a:r>
-              <a:rPr lang="en-US" b="1" dirty="0"/>
-              <a:t> ACS Social, Economic, and Housing</a:t>
-            </a:r>
-            <a:r>
-              <a:rPr lang="en-US" dirty="0"/>
-              <a:t> – 	</a:t>
-            </a:r>
-            <a:r>
-              <a:rPr lang="en-US" dirty="0">
-                <a:hlinkClick r:id="rId3"/>
-              </a:rPr>
-              <a:t>https://data.census.gov/cedsci/table?q=dp&amp;tid=ACSDP1Y2018.DP05</a:t>
-            </a:r>
-            <a:endParaRPr lang="en-US" dirty="0"/>
-          </a:p>
-          <a:p>
-            <a:endParaRPr lang="en-US" dirty="0"/>
-          </a:p>
-          <a:p>
-            <a:r>
-              <a:rPr lang="en-US" b="1" dirty="0"/>
-              <a:t>Employment Dataset- </a:t>
-            </a:r>
-          </a:p>
-          <a:p>
-            <a:pPr marL="457200" lvl="1" indent="0">
-              <a:buNone/>
-            </a:pPr>
-            <a:r>
-              <a:rPr lang="en-US" dirty="0"/>
-              <a:t>	</a:t>
-            </a:r>
-            <a:r>
-              <a:rPr lang="en-US" dirty="0">
-                <a:hlinkClick r:id="rId4"/>
-              </a:rPr>
-              <a:t>https://www.bls.gov/cew/downloadable-data-files.htm</a:t>
-            </a:r>
-            <a:endParaRPr lang="en-US" dirty="0"/>
-          </a:p>
-          <a:p>
-            <a:endParaRPr lang="en-US" dirty="0"/>
-          </a:p>
-          <a:p>
-            <a:r>
-              <a:rPr lang="en-US" b="1" dirty="0"/>
-              <a:t>Presidential Election Results (Political leanings) - 	</a:t>
-            </a:r>
-            <a:r>
-              <a:rPr lang="en-US" dirty="0">
-                <a:hlinkClick r:id="rId5"/>
-              </a:rPr>
-              <a:t>https://www.kaggle.com/unanimad/us-election-2020</a:t>
-            </a:r>
-            <a:endParaRPr lang="en-US" dirty="0"/>
-          </a:p>
-        </p:txBody>
-      </p:sp>
-      <p:sp>
-        <p:nvSpPr>
-          <p:cNvPr id="4" name="Slide Number Placeholder 3">
-            <a:extLst>
-              <a:ext uri="{FF2B5EF4-FFF2-40B4-BE49-F238E27FC236}">
-                <a16:creationId xmlns:a16="http://schemas.microsoft.com/office/drawing/2014/main" id="{FB0A8900-EB91-535B-24E6-C43C7D354E1B}"/>
-              </a:ext>
-            </a:extLst>
-          </p:cNvPr>
-          <p:cNvSpPr>
-            <a:spLocks noGrp="1"/>
-          </p:cNvSpPr>
-          <p:nvPr>
-            <p:ph type="sldNum" sz="quarter" idx="12"/>
-          </p:nvPr>
-        </p:nvSpPr>
-        <p:spPr/>
-        <p:txBody>
-          <a:bodyPr/>
-          <a:lstStyle/>
-          <a:p>
-            <a:fld id="{BD0DFC8E-D006-4B55-BBF2-7AB50F8F017C}" type="slidenum">
-              <a:rPr lang="en-US" smtClean="0"/>
-              <a:t>3</a:t>
-            </a:fld>
-            <a:endParaRPr lang="en-US"/>
-          </a:p>
-        </p:txBody>
-      </p:sp>
-    </p:spTree>
-    <p:extLst>
-      <p:ext uri="{BB962C8B-B14F-4D97-AF65-F5344CB8AC3E}">
-        <p14:creationId xmlns:p14="http://schemas.microsoft.com/office/powerpoint/2010/main" val="1535314736"/>
-      </p:ext>
-    </p:extLst>
-  </p:cSld>
-  <p:clrMapOvr>
-    <a:masterClrMapping/>
-  </p:clrMapOvr>
-</p:sld>
-</file>
-
-<file path=ppt/slides/slide4.xml><?xml version="1.0" encoding="utf-8"?>
-<p:sld xmlns:a="http://schemas.openxmlformats.org/drawingml/2006/main" xmlns:r="http://schemas.openxmlformats.org/officeDocument/2006/relationships" xmlns:p="http://schemas.openxmlformats.org/presentationml/2006/main">
-  <p:cSld>
-    <p:spTree>
-      <p:nvGrpSpPr>
-        <p:cNvPr id="1" name=""/>
-        <p:cNvGrpSpPr/>
-        <p:nvPr/>
-      </p:nvGrpSpPr>
-      <p:grpSpPr>
-        <a:xfrm>
-          <a:off x="0" y="0"/>
-          <a:ext cx="0" cy="0"/>
-          <a:chOff x="0" y="0"/>
-          <a:chExt cx="0" cy="0"/>
-        </a:xfrm>
-      </p:grpSpPr>
-      <p:sp>
-        <p:nvSpPr>
-          <p:cNvPr id="5" name="Title 4">
-            <a:extLst>
-              <a:ext uri="{FF2B5EF4-FFF2-40B4-BE49-F238E27FC236}">
-                <a16:creationId xmlns:a16="http://schemas.microsoft.com/office/drawing/2014/main" id="{4DC795EF-4395-F464-77CE-2BD2715DCA18}"/>
-              </a:ext>
-            </a:extLst>
-          </p:cNvPr>
-          <p:cNvSpPr>
-            <a:spLocks noGrp="1"/>
-          </p:cNvSpPr>
-          <p:nvPr>
-            <p:ph type="title"/>
-          </p:nvPr>
-        </p:nvSpPr>
         <p:spPr/>
         <p:txBody>
           <a:bodyPr/>
@@ -12315,7 +12319,7 @@
           <a:p>
             <a:fld id="{BD0DFC8E-D006-4B55-BBF2-7AB50F8F017C}" type="slidenum">
               <a:rPr lang="en-US" smtClean="0"/>
-              <a:t>4</a:t>
+              <a:t>3</a:t>
             </a:fld>
             <a:endParaRPr lang="en-US"/>
           </a:p>
@@ -12336,7 +12340,7 @@
           <p:nvPr/>
         </p:nvPicPr>
         <p:blipFill>
-          <a:blip r:embed="rId2">
+          <a:blip r:embed="rId3">
             <a:extLst>
               <a:ext uri="{28A0092B-C50C-407E-A947-70E740481C1C}">
                 <a14:useLocalDpi xmlns:a14="http://schemas.microsoft.com/office/drawing/2010/main" val="0"/>
@@ -12383,7 +12387,7 @@
           <p:nvPr/>
         </p:nvPicPr>
         <p:blipFill>
-          <a:blip r:embed="rId3">
+          <a:blip r:embed="rId4">
             <a:extLst>
               <a:ext uri="{28A0092B-C50C-407E-A947-70E740481C1C}">
                 <a14:useLocalDpi xmlns:a14="http://schemas.microsoft.com/office/drawing/2010/main" val="0"/>
@@ -12430,7 +12434,7 @@
           <p:nvPr/>
         </p:nvPicPr>
         <p:blipFill>
-          <a:blip r:embed="rId4">
+          <a:blip r:embed="rId5">
             <a:extLst>
               <a:ext uri="{28A0092B-C50C-407E-A947-70E740481C1C}">
                 <a14:useLocalDpi xmlns:a14="http://schemas.microsoft.com/office/drawing/2010/main" val="0"/>
@@ -12475,6 +12479,135 @@
 </p:sld>
 </file>
 
+<file path=ppt/slides/slide4.xml><?xml version="1.0" encoding="utf-8"?>
+<p:sld xmlns:a="http://schemas.openxmlformats.org/drawingml/2006/main" xmlns:r="http://schemas.openxmlformats.org/officeDocument/2006/relationships" xmlns:p="http://schemas.openxmlformats.org/presentationml/2006/main">
+  <p:cSld>
+    <p:spTree>
+      <p:nvGrpSpPr>
+        <p:cNvPr id="1" name=""/>
+        <p:cNvGrpSpPr/>
+        <p:nvPr/>
+      </p:nvGrpSpPr>
+      <p:grpSpPr>
+        <a:xfrm>
+          <a:off x="0" y="0"/>
+          <a:ext cx="0" cy="0"/>
+          <a:chOff x="0" y="0"/>
+          <a:chExt cx="0" cy="0"/>
+        </a:xfrm>
+      </p:grpSpPr>
+      <p:sp>
+        <p:nvSpPr>
+          <p:cNvPr id="2" name="Title 1">
+            <a:extLst>
+              <a:ext uri="{FF2B5EF4-FFF2-40B4-BE49-F238E27FC236}">
+                <a16:creationId xmlns:a16="http://schemas.microsoft.com/office/drawing/2014/main" id="{8948E6F6-71B7-E040-7E49-9DEA73B73CF8}"/>
+              </a:ext>
+            </a:extLst>
+          </p:cNvPr>
+          <p:cNvSpPr>
+            <a:spLocks noGrp="1"/>
+          </p:cNvSpPr>
+          <p:nvPr>
+            <p:ph type="title"/>
+          </p:nvPr>
+        </p:nvSpPr>
+        <p:spPr>
+          <a:xfrm>
+            <a:off x="838200" y="2981942"/>
+            <a:ext cx="10515600" cy="894116"/>
+          </a:xfrm>
+        </p:spPr>
+        <p:txBody>
+          <a:bodyPr>
+            <a:noAutofit/>
+          </a:bodyPr>
+          <a:lstStyle/>
+          <a:p>
+            <a:pPr algn="ctr"/>
+            <a:r>
+              <a:rPr lang="en-US" dirty="0"/>
+              <a:t>Stage 2: Data Modeling</a:t>
+            </a:r>
+          </a:p>
+        </p:txBody>
+      </p:sp>
+      <p:sp>
+        <p:nvSpPr>
+          <p:cNvPr id="3" name="Content Placeholder 2">
+            <a:extLst>
+              <a:ext uri="{FF2B5EF4-FFF2-40B4-BE49-F238E27FC236}">
+                <a16:creationId xmlns:a16="http://schemas.microsoft.com/office/drawing/2014/main" id="{CCCBD3F5-8831-EF9E-823E-0EC0933ACFF1}"/>
+              </a:ext>
+            </a:extLst>
+          </p:cNvPr>
+          <p:cNvSpPr>
+            <a:spLocks noGrp="1"/>
+          </p:cNvSpPr>
+          <p:nvPr>
+            <p:ph type="body" idx="1"/>
+          </p:nvPr>
+        </p:nvSpPr>
+        <p:spPr>
+          <a:xfrm>
+            <a:off x="838200" y="3967498"/>
+            <a:ext cx="10515600" cy="525800"/>
+          </a:xfrm>
+        </p:spPr>
+        <p:txBody>
+          <a:bodyPr/>
+          <a:lstStyle/>
+          <a:p>
+            <a:pPr algn="ctr"/>
+            <a:r>
+              <a:rPr lang="en-US" dirty="0"/>
+              <a:t>Weekly statistics &amp; trends</a:t>
+            </a:r>
+          </a:p>
+        </p:txBody>
+      </p:sp>
+      <p:sp>
+        <p:nvSpPr>
+          <p:cNvPr id="6" name="Slide Number Placeholder 5">
+            <a:extLst>
+              <a:ext uri="{FF2B5EF4-FFF2-40B4-BE49-F238E27FC236}">
+                <a16:creationId xmlns:a16="http://schemas.microsoft.com/office/drawing/2014/main" id="{97AE4315-90C4-3688-1ABB-32FE93BE7913}"/>
+              </a:ext>
+            </a:extLst>
+          </p:cNvPr>
+          <p:cNvSpPr>
+            <a:spLocks noGrp="1"/>
+          </p:cNvSpPr>
+          <p:nvPr>
+            <p:ph type="sldNum" sz="quarter" idx="12"/>
+          </p:nvPr>
+        </p:nvSpPr>
+        <p:spPr/>
+        <p:txBody>
+          <a:bodyPr/>
+          <a:lstStyle/>
+          <a:p>
+            <a:fld id="{BD0DFC8E-D006-4B55-BBF2-7AB50F8F017C}" type="slidenum">
+              <a:rPr lang="en-US" smtClean="0"/>
+              <a:t>4</a:t>
+            </a:fld>
+            <a:endParaRPr lang="en-US"/>
+          </a:p>
+        </p:txBody>
+      </p:sp>
+    </p:spTree>
+    <p:extLst>
+      <p:ext uri="{BB962C8B-B14F-4D97-AF65-F5344CB8AC3E}">
+        <p14:creationId xmlns:p14="http://schemas.microsoft.com/office/powerpoint/2010/main" val="2643852891"/>
+      </p:ext>
+    </p:extLst>
+  </p:cSld>
+  <p:clrMapOvr>
+    <a:masterClrMapping/>
+  </p:clrMapOvr>
+</p:sld>
+</file>
+
 <file path=ppt/slides/slide5.xml><?xml version="1.0" encoding="utf-8"?>
 <p:sld xmlns:a="http://schemas.openxmlformats.org/drawingml/2006/main" xmlns:r="http://schemas.openxmlformats.org/officeDocument/2006/relationships" xmlns:p="http://schemas.openxmlformats.org/presentationml/2006/main">
   <p:cSld>
@@ -12494,10 +12627,10 @@
       </p:grpSpPr>
       <p:sp>
         <p:nvSpPr>
-          <p:cNvPr id="2" name="Title 1">
-            <a:extLst>
-              <a:ext uri="{FF2B5EF4-FFF2-40B4-BE49-F238E27FC236}">
-                <a16:creationId xmlns:a16="http://schemas.microsoft.com/office/drawing/2014/main" id="{8948E6F6-71B7-E040-7E49-9DEA73B73CF8}"/>
+          <p:cNvPr id="11" name="Title 10">
+            <a:extLst>
+              <a:ext uri="{FF2B5EF4-FFF2-40B4-BE49-F238E27FC236}">
+                <a16:creationId xmlns:a16="http://schemas.microsoft.com/office/drawing/2014/main" id="{7733F8B2-4486-05C8-374A-1A0852AA9E87}"/>
               </a:ext>
             </a:extLst>
           </p:cNvPr>
@@ -12510,30 +12643,28 @@
         </p:nvSpPr>
         <p:spPr>
           <a:xfrm>
-            <a:off x="838200" y="2981942"/>
-            <a:ext cx="10515600" cy="894116"/>
+            <a:off x="838200" y="657350"/>
+            <a:ext cx="10515600" cy="745926"/>
           </a:xfrm>
         </p:spPr>
         <p:txBody>
-          <a:bodyPr>
-            <a:noAutofit/>
-          </a:bodyPr>
+          <a:bodyPr/>
           <a:lstStyle/>
           <a:p>
             <a:pPr algn="ctr"/>
             <a:r>
               <a:rPr lang="en-US" dirty="0"/>
-              <a:t>Stage 2: Data Modeling</a:t>
-            </a:r>
-          </a:p>
-        </p:txBody>
-      </p:sp>
-      <p:sp>
-        <p:nvSpPr>
-          <p:cNvPr id="3" name="Content Placeholder 2">
-            <a:extLst>
-              <a:ext uri="{FF2B5EF4-FFF2-40B4-BE49-F238E27FC236}">
-                <a16:creationId xmlns:a16="http://schemas.microsoft.com/office/drawing/2014/main" id="{CCCBD3F5-8831-EF9E-823E-0EC0933ACFF1}"/>
+              <a:t>Mean/median/mode trends</a:t>
+            </a:r>
+          </a:p>
+        </p:txBody>
+      </p:sp>
+      <p:sp>
+        <p:nvSpPr>
+          <p:cNvPr id="12" name="Text Placeholder 11">
+            <a:extLst>
+              <a:ext uri="{FF2B5EF4-FFF2-40B4-BE49-F238E27FC236}">
+                <a16:creationId xmlns:a16="http://schemas.microsoft.com/office/drawing/2014/main" id="{35669549-B46C-F6C3-5530-5175E6D66763}"/>
               </a:ext>
             </a:extLst>
           </p:cNvPr>
@@ -12546,8 +12677,8 @@
         </p:nvSpPr>
         <p:spPr>
           <a:xfrm>
-            <a:off x="838200" y="3967498"/>
-            <a:ext cx="10515600" cy="525800"/>
+            <a:off x="1086534" y="1535935"/>
+            <a:ext cx="4907865" cy="454230"/>
           </a:xfrm>
         </p:spPr>
         <p:txBody>
@@ -12557,17 +12688,80 @@
             <a:pPr algn="ctr"/>
             <a:r>
               <a:rPr lang="en-US" dirty="0"/>
-              <a:t>Weekly statistics &amp; trends</a:t>
-            </a:r>
-          </a:p>
-        </p:txBody>
-      </p:sp>
-      <p:sp>
-        <p:nvSpPr>
-          <p:cNvPr id="6" name="Slide Number Placeholder 5">
-            <a:extLst>
-              <a:ext uri="{FF2B5EF4-FFF2-40B4-BE49-F238E27FC236}">
-                <a16:creationId xmlns:a16="http://schemas.microsoft.com/office/drawing/2014/main" id="{97AE4315-90C4-3688-1ABB-32FE93BE7913}"/>
+              <a:t>CASES</a:t>
+            </a:r>
+          </a:p>
+        </p:txBody>
+      </p:sp>
+      <p:pic>
+        <p:nvPicPr>
+          <p:cNvPr id="18" name="Content Placeholder 17">
+            <a:extLst>
+              <a:ext uri="{FF2B5EF4-FFF2-40B4-BE49-F238E27FC236}">
+                <a16:creationId xmlns:a16="http://schemas.microsoft.com/office/drawing/2014/main" id="{421E6816-BC44-E88F-CE5C-1AA08AD088F6}"/>
+              </a:ext>
+            </a:extLst>
+          </p:cNvPr>
+          <p:cNvPicPr>
+            <a:picLocks noGrp="1" noChangeAspect="1"/>
+          </p:cNvPicPr>
+          <p:nvPr>
+            <p:ph sz="half" idx="2"/>
+          </p:nvPr>
+        </p:nvPicPr>
+        <p:blipFill>
+          <a:blip r:embed="rId3"/>
+          <a:stretch>
+            <a:fillRect/>
+          </a:stretch>
+        </p:blipFill>
+        <p:spPr>
+          <a:xfrm>
+            <a:off x="1086534" y="2047874"/>
+            <a:ext cx="4657941" cy="3598159"/>
+          </a:xfrm>
+        </p:spPr>
+      </p:pic>
+      <p:sp>
+        <p:nvSpPr>
+          <p:cNvPr id="14" name="Text Placeholder 13">
+            <a:extLst>
+              <a:ext uri="{FF2B5EF4-FFF2-40B4-BE49-F238E27FC236}">
+                <a16:creationId xmlns:a16="http://schemas.microsoft.com/office/drawing/2014/main" id="{DBA2AEF6-6AB4-7D86-CF57-F7EF155B0BD3}"/>
+              </a:ext>
+            </a:extLst>
+          </p:cNvPr>
+          <p:cNvSpPr>
+            <a:spLocks noGrp="1"/>
+          </p:cNvSpPr>
+          <p:nvPr>
+            <p:ph type="body" sz="quarter" idx="3"/>
+          </p:nvPr>
+        </p:nvSpPr>
+        <p:spPr>
+          <a:xfrm>
+            <a:off x="6309859" y="1500692"/>
+            <a:ext cx="5045528" cy="454230"/>
+          </a:xfrm>
+        </p:spPr>
+        <p:txBody>
+          <a:bodyPr/>
+          <a:lstStyle/>
+          <a:p>
+            <a:pPr algn="ctr"/>
+            <a:r>
+              <a:rPr lang="en-US" dirty="0"/>
+              <a:t>DEATHS</a:t>
+            </a:r>
+          </a:p>
+        </p:txBody>
+      </p:sp>
+      <p:sp>
+        <p:nvSpPr>
+          <p:cNvPr id="4" name="Slide Number Placeholder 3">
+            <a:extLst>
+              <a:ext uri="{FF2B5EF4-FFF2-40B4-BE49-F238E27FC236}">
+                <a16:creationId xmlns:a16="http://schemas.microsoft.com/office/drawing/2014/main" id="{B3733210-308B-C64F-9124-E63A3DFE5BE7}"/>
               </a:ext>
             </a:extLst>
           </p:cNvPr>
@@ -12591,10 +12785,154 @@
           </a:p>
         </p:txBody>
       </p:sp>
+      <p:pic>
+        <p:nvPicPr>
+          <p:cNvPr id="10" name="Picture 9">
+            <a:extLst>
+              <a:ext uri="{FF2B5EF4-FFF2-40B4-BE49-F238E27FC236}">
+                <a16:creationId xmlns:a16="http://schemas.microsoft.com/office/drawing/2014/main" id="{50781EF5-B959-A66B-9FDC-6253D9C790D3}"/>
+              </a:ext>
+            </a:extLst>
+          </p:cNvPr>
+          <p:cNvPicPr>
+            <a:picLocks noChangeAspect="1"/>
+          </p:cNvPicPr>
+          <p:nvPr/>
+        </p:nvPicPr>
+        <p:blipFill>
+          <a:blip r:embed="rId4"/>
+          <a:stretch>
+            <a:fillRect/>
+          </a:stretch>
+        </p:blipFill>
+        <p:spPr>
+          <a:xfrm>
+            <a:off x="6522168" y="2047875"/>
+            <a:ext cx="4483249" cy="3598159"/>
+          </a:xfrm>
+          <a:prstGeom prst="rect">
+            <a:avLst/>
+          </a:prstGeom>
+        </p:spPr>
+      </p:pic>
+      <p:sp>
+        <p:nvSpPr>
+          <p:cNvPr id="19" name="TextBox 18">
+            <a:extLst>
+              <a:ext uri="{FF2B5EF4-FFF2-40B4-BE49-F238E27FC236}">
+                <a16:creationId xmlns:a16="http://schemas.microsoft.com/office/drawing/2014/main" id="{4D23F0B5-4493-A7C7-2A9A-BD73AC613A78}"/>
+              </a:ext>
+            </a:extLst>
+          </p:cNvPr>
+          <p:cNvSpPr txBox="1"/>
+          <p:nvPr/>
+        </p:nvSpPr>
+        <p:spPr>
+          <a:xfrm>
+            <a:off x="1468418" y="5644300"/>
+            <a:ext cx="4401017" cy="646331"/>
+          </a:xfrm>
+          <a:prstGeom prst="rect">
+            <a:avLst/>
+          </a:prstGeom>
+          <a:noFill/>
+        </p:spPr>
+        <p:txBody>
+          <a:bodyPr wrap="square" rtlCol="0">
+            <a:spAutoFit/>
+          </a:bodyPr>
+          <a:lstStyle/>
+          <a:p>
+            <a:pPr algn="ctr"/>
+            <a:r>
+              <a:rPr lang="en-US" dirty="0">
+                <a:solidFill>
+                  <a:schemeClr val="tx1">
+                    <a:lumMod val="75000"/>
+                    <a:lumOff val="25000"/>
+                  </a:schemeClr>
+                </a:solidFill>
+              </a:rPr>
+              <a:t>Mean: 17844</a:t>
+            </a:r>
+          </a:p>
+          <a:p>
+            <a:pPr algn="ctr"/>
+            <a:r>
+              <a:rPr lang="en-US" dirty="0">
+                <a:solidFill>
+                  <a:schemeClr val="tx1">
+                    <a:lumMod val="75000"/>
+                    <a:lumOff val="25000"/>
+                  </a:schemeClr>
+                </a:solidFill>
+              </a:rPr>
+              <a:t>Median: 2864</a:t>
+            </a:r>
+          </a:p>
+        </p:txBody>
+      </p:sp>
+      <p:sp>
+        <p:nvSpPr>
+          <p:cNvPr id="23" name="TextBox 22">
+            <a:extLst>
+              <a:ext uri="{FF2B5EF4-FFF2-40B4-BE49-F238E27FC236}">
+                <a16:creationId xmlns:a16="http://schemas.microsoft.com/office/drawing/2014/main" id="{2180C9D6-3055-BD7C-38A5-8696333265D0}"/>
+              </a:ext>
+            </a:extLst>
+          </p:cNvPr>
+          <p:cNvSpPr txBox="1"/>
+          <p:nvPr/>
+        </p:nvSpPr>
+        <p:spPr>
+          <a:xfrm>
+            <a:off x="6411558" y="5644300"/>
+            <a:ext cx="4806166" cy="646331"/>
+          </a:xfrm>
+          <a:prstGeom prst="rect">
+            <a:avLst/>
+          </a:prstGeom>
+          <a:noFill/>
+        </p:spPr>
+        <p:txBody>
+          <a:bodyPr wrap="square" rtlCol="0">
+            <a:spAutoFit/>
+          </a:bodyPr>
+          <a:lstStyle/>
+          <a:p>
+            <a:pPr algn="ctr"/>
+            <a:r>
+              <a:rPr lang="en-US" dirty="0">
+                <a:solidFill>
+                  <a:schemeClr val="tx1">
+                    <a:lumMod val="75000"/>
+                    <a:lumOff val="25000"/>
+                  </a:schemeClr>
+                </a:solidFill>
+              </a:rPr>
+              <a:t>Mean: 472</a:t>
+            </a:r>
+          </a:p>
+          <a:p>
+            <a:pPr algn="ctr"/>
+            <a:r>
+              <a:rPr lang="en-US" dirty="0">
+                <a:solidFill>
+                  <a:schemeClr val="tx1">
+                    <a:lumMod val="75000"/>
+                    <a:lumOff val="25000"/>
+                  </a:schemeClr>
+                </a:solidFill>
+              </a:rPr>
+              <a:t>Median: 49</a:t>
+            </a:r>
+          </a:p>
+        </p:txBody>
+      </p:sp>
     </p:spTree>
     <p:extLst>
       <p:ext uri="{BB962C8B-B14F-4D97-AF65-F5344CB8AC3E}">
-        <p14:creationId xmlns:p14="http://schemas.microsoft.com/office/powerpoint/2010/main" val="2643852891"/>
+        <p14:creationId xmlns:p14="http://schemas.microsoft.com/office/powerpoint/2010/main" val="2216928431"/>
       </p:ext>
     </p:extLst>
   </p:cSld>
@@ -12623,10 +12961,10 @@
       </p:grpSpPr>
       <p:sp>
         <p:nvSpPr>
-          <p:cNvPr id="11" name="Title 10">
-            <a:extLst>
-              <a:ext uri="{FF2B5EF4-FFF2-40B4-BE49-F238E27FC236}">
-                <a16:creationId xmlns:a16="http://schemas.microsoft.com/office/drawing/2014/main" id="{7733F8B2-4486-05C8-374A-1A0852AA9E87}"/>
+          <p:cNvPr id="2" name="Title 1">
+            <a:extLst>
+              <a:ext uri="{FF2B5EF4-FFF2-40B4-BE49-F238E27FC236}">
+                <a16:creationId xmlns:a16="http://schemas.microsoft.com/office/drawing/2014/main" id="{BE294B4A-0F3D-665F-2B44-858A0687CC07}"/>
               </a:ext>
             </a:extLst>
           </p:cNvPr>
@@ -12639,8 +12977,8 @@
         </p:nvSpPr>
         <p:spPr>
           <a:xfrm>
-            <a:off x="838200" y="657350"/>
-            <a:ext cx="10515600" cy="745926"/>
+            <a:off x="838200" y="2944542"/>
+            <a:ext cx="10515600" cy="968916"/>
           </a:xfrm>
         </p:spPr>
         <p:txBody>
@@ -12650,17 +12988,17 @@
             <a:pPr algn="ctr"/>
             <a:r>
               <a:rPr lang="en-US" dirty="0"/>
-              <a:t>Mean/median/mode trends</a:t>
-            </a:r>
-          </a:p>
-        </p:txBody>
-      </p:sp>
-      <p:sp>
-        <p:nvSpPr>
-          <p:cNvPr id="12" name="Text Placeholder 11">
-            <a:extLst>
-              <a:ext uri="{FF2B5EF4-FFF2-40B4-BE49-F238E27FC236}">
-                <a16:creationId xmlns:a16="http://schemas.microsoft.com/office/drawing/2014/main" id="{35669549-B46C-F6C3-5530-5175E6D66763}"/>
+              <a:t>Stage 3: Individual work</a:t>
+            </a:r>
+          </a:p>
+        </p:txBody>
+      </p:sp>
+      <p:sp>
+        <p:nvSpPr>
+          <p:cNvPr id="3" name="Content Placeholder 2">
+            <a:extLst>
+              <a:ext uri="{FF2B5EF4-FFF2-40B4-BE49-F238E27FC236}">
+                <a16:creationId xmlns:a16="http://schemas.microsoft.com/office/drawing/2014/main" id="{B5B712E0-DA21-49DD-C542-65D2471E9FB3}"/>
               </a:ext>
             </a:extLst>
           </p:cNvPr>
@@ -12673,91 +13011,46 @@
         </p:nvSpPr>
         <p:spPr>
           <a:xfrm>
-            <a:off x="1086534" y="1535935"/>
-            <a:ext cx="4907865" cy="454230"/>
+            <a:off x="838200" y="4049526"/>
+            <a:ext cx="10515600" cy="1434119"/>
           </a:xfrm>
         </p:spPr>
         <p:txBody>
-          <a:bodyPr/>
+          <a:bodyPr>
+            <a:normAutofit/>
+          </a:bodyPr>
           <a:lstStyle/>
           <a:p>
             <a:pPr algn="ctr"/>
             <a:r>
               <a:rPr lang="en-US" dirty="0"/>
-              <a:t>CASES</a:t>
-            </a:r>
-          </a:p>
-        </p:txBody>
-      </p:sp>
-      <p:pic>
-        <p:nvPicPr>
-          <p:cNvPr id="18" name="Content Placeholder 17">
-            <a:extLst>
-              <a:ext uri="{FF2B5EF4-FFF2-40B4-BE49-F238E27FC236}">
-                <a16:creationId xmlns:a16="http://schemas.microsoft.com/office/drawing/2014/main" id="{421E6816-BC44-E88F-CE5C-1AA08AD088F6}"/>
-              </a:ext>
-            </a:extLst>
-          </p:cNvPr>
-          <p:cNvPicPr>
-            <a:picLocks noGrp="1" noChangeAspect="1"/>
-          </p:cNvPicPr>
-          <p:nvPr>
-            <p:ph sz="half" idx="2"/>
-          </p:nvPr>
-        </p:nvPicPr>
-        <p:blipFill>
-          <a:blip r:embed="rId3"/>
-          <a:stretch>
-            <a:fillRect/>
-          </a:stretch>
-        </p:blipFill>
-        <p:spPr>
-          <a:xfrm>
-            <a:off x="1086534" y="2047874"/>
-            <a:ext cx="4657941" cy="3598159"/>
-          </a:xfrm>
-        </p:spPr>
-      </p:pic>
-      <p:sp>
-        <p:nvSpPr>
-          <p:cNvPr id="14" name="Text Placeholder 13">
-            <a:extLst>
-              <a:ext uri="{FF2B5EF4-FFF2-40B4-BE49-F238E27FC236}">
-                <a16:creationId xmlns:a16="http://schemas.microsoft.com/office/drawing/2014/main" id="{DBA2AEF6-6AB4-7D86-CF57-F7EF155B0BD3}"/>
-              </a:ext>
-            </a:extLst>
-          </p:cNvPr>
-          <p:cNvSpPr>
-            <a:spLocks noGrp="1"/>
-          </p:cNvSpPr>
-          <p:nvPr>
-            <p:ph type="body" sz="quarter" idx="3"/>
-          </p:nvPr>
-        </p:nvSpPr>
-        <p:spPr>
-          <a:xfrm>
-            <a:off x="6309859" y="1500692"/>
-            <a:ext cx="5045528" cy="454230"/>
-          </a:xfrm>
-        </p:spPr>
-        <p:txBody>
-          <a:bodyPr/>
-          <a:lstStyle/>
-          <a:p>
-            <a:pPr algn="ctr"/>
+              <a:t>Using distributions across a chosen state &amp; enrichment data,</a:t>
+            </a:r>
+          </a:p>
+          <a:p>
+            <a:pPr algn="ctr">
+              <a:spcBef>
+                <a:spcPts val="0"/>
+              </a:spcBef>
+            </a:pPr>
             <a:r>
               <a:rPr lang="en-US" dirty="0"/>
-              <a:t>DEATHS</a:t>
-            </a:r>
-          </a:p>
-        </p:txBody>
-      </p:sp>
-      <p:sp>
-        <p:nvSpPr>
-          <p:cNvPr id="4" name="Slide Number Placeholder 3">
-            <a:extLst>
-              <a:ext uri="{FF2B5EF4-FFF2-40B4-BE49-F238E27FC236}">
-                <a16:creationId xmlns:a16="http://schemas.microsoft.com/office/drawing/2014/main" id="{B3733210-308B-C64F-9124-E63A3DFE5BE7}"/>
+              <a:t> develop formal hypotheses for testing</a:t>
+            </a:r>
+            <a:endParaRPr lang="en-US" dirty="0">
+              <a:highlight>
+                <a:srgbClr val="FFFF00"/>
+              </a:highlight>
+            </a:endParaRPr>
+          </a:p>
+        </p:txBody>
+      </p:sp>
+      <p:sp>
+        <p:nvSpPr>
+          <p:cNvPr id="6" name="Slide Number Placeholder 5">
+            <a:extLst>
+              <a:ext uri="{FF2B5EF4-FFF2-40B4-BE49-F238E27FC236}">
+                <a16:creationId xmlns:a16="http://schemas.microsoft.com/office/drawing/2014/main" id="{DD009CC9-0EDE-A47D-6FF2-7CC688AA8C8B}"/>
               </a:ext>
             </a:extLst>
           </p:cNvPr>
@@ -12781,154 +13074,10 @@
           </a:p>
         </p:txBody>
       </p:sp>
-      <p:pic>
-        <p:nvPicPr>
-          <p:cNvPr id="10" name="Picture 9">
-            <a:extLst>
-              <a:ext uri="{FF2B5EF4-FFF2-40B4-BE49-F238E27FC236}">
-                <a16:creationId xmlns:a16="http://schemas.microsoft.com/office/drawing/2014/main" id="{50781EF5-B959-A66B-9FDC-6253D9C790D3}"/>
-              </a:ext>
-            </a:extLst>
-          </p:cNvPr>
-          <p:cNvPicPr>
-            <a:picLocks noChangeAspect="1"/>
-          </p:cNvPicPr>
-          <p:nvPr/>
-        </p:nvPicPr>
-        <p:blipFill>
-          <a:blip r:embed="rId4"/>
-          <a:stretch>
-            <a:fillRect/>
-          </a:stretch>
-        </p:blipFill>
-        <p:spPr>
-          <a:xfrm>
-            <a:off x="6522168" y="2047875"/>
-            <a:ext cx="4483249" cy="3598159"/>
-          </a:xfrm>
-          <a:prstGeom prst="rect">
-            <a:avLst/>
-          </a:prstGeom>
-        </p:spPr>
-      </p:pic>
-      <p:sp>
-        <p:nvSpPr>
-          <p:cNvPr id="19" name="TextBox 18">
-            <a:extLst>
-              <a:ext uri="{FF2B5EF4-FFF2-40B4-BE49-F238E27FC236}">
-                <a16:creationId xmlns:a16="http://schemas.microsoft.com/office/drawing/2014/main" id="{4D23F0B5-4493-A7C7-2A9A-BD73AC613A78}"/>
-              </a:ext>
-            </a:extLst>
-          </p:cNvPr>
-          <p:cNvSpPr txBox="1"/>
-          <p:nvPr/>
-        </p:nvSpPr>
-        <p:spPr>
-          <a:xfrm>
-            <a:off x="1468418" y="5644300"/>
-            <a:ext cx="4401017" cy="646331"/>
-          </a:xfrm>
-          <a:prstGeom prst="rect">
-            <a:avLst/>
-          </a:prstGeom>
-          <a:noFill/>
-        </p:spPr>
-        <p:txBody>
-          <a:bodyPr wrap="square" rtlCol="0">
-            <a:spAutoFit/>
-          </a:bodyPr>
-          <a:lstStyle/>
-          <a:p>
-            <a:pPr algn="ctr"/>
-            <a:r>
-              <a:rPr lang="en-US" dirty="0">
-                <a:solidFill>
-                  <a:schemeClr val="tx1">
-                    <a:lumMod val="75000"/>
-                    <a:lumOff val="25000"/>
-                  </a:schemeClr>
-                </a:solidFill>
-              </a:rPr>
-              <a:t>Mean: 17844</a:t>
-            </a:r>
-          </a:p>
-          <a:p>
-            <a:pPr algn="ctr"/>
-            <a:r>
-              <a:rPr lang="en-US" dirty="0">
-                <a:solidFill>
-                  <a:schemeClr val="tx1">
-                    <a:lumMod val="75000"/>
-                    <a:lumOff val="25000"/>
-                  </a:schemeClr>
-                </a:solidFill>
-              </a:rPr>
-              <a:t>Median: 2864</a:t>
-            </a:r>
-          </a:p>
-        </p:txBody>
-      </p:sp>
-      <p:sp>
-        <p:nvSpPr>
-          <p:cNvPr id="23" name="TextBox 22">
-            <a:extLst>
-              <a:ext uri="{FF2B5EF4-FFF2-40B4-BE49-F238E27FC236}">
-                <a16:creationId xmlns:a16="http://schemas.microsoft.com/office/drawing/2014/main" id="{2180C9D6-3055-BD7C-38A5-8696333265D0}"/>
-              </a:ext>
-            </a:extLst>
-          </p:cNvPr>
-          <p:cNvSpPr txBox="1"/>
-          <p:nvPr/>
-        </p:nvSpPr>
-        <p:spPr>
-          <a:xfrm>
-            <a:off x="6411558" y="5644300"/>
-            <a:ext cx="4806166" cy="646331"/>
-          </a:xfrm>
-          <a:prstGeom prst="rect">
-            <a:avLst/>
-          </a:prstGeom>
-          <a:noFill/>
-        </p:spPr>
-        <p:txBody>
-          <a:bodyPr wrap="square" rtlCol="0">
-            <a:spAutoFit/>
-          </a:bodyPr>
-          <a:lstStyle/>
-          <a:p>
-            <a:pPr algn="ctr"/>
-            <a:r>
-              <a:rPr lang="en-US" dirty="0">
-                <a:solidFill>
-                  <a:schemeClr val="tx1">
-                    <a:lumMod val="75000"/>
-                    <a:lumOff val="25000"/>
-                  </a:schemeClr>
-                </a:solidFill>
-              </a:rPr>
-              <a:t>Mean: 472</a:t>
-            </a:r>
-          </a:p>
-          <a:p>
-            <a:pPr algn="ctr"/>
-            <a:r>
-              <a:rPr lang="en-US" dirty="0">
-                <a:solidFill>
-                  <a:schemeClr val="tx1">
-                    <a:lumMod val="75000"/>
-                    <a:lumOff val="25000"/>
-                  </a:schemeClr>
-                </a:solidFill>
-              </a:rPr>
-              <a:t>Median: 49</a:t>
-            </a:r>
-          </a:p>
-        </p:txBody>
-      </p:sp>
     </p:spTree>
     <p:extLst>
       <p:ext uri="{BB962C8B-B14F-4D97-AF65-F5344CB8AC3E}">
-        <p14:creationId xmlns:p14="http://schemas.microsoft.com/office/powerpoint/2010/main" val="2216928431"/>
+        <p14:creationId xmlns:p14="http://schemas.microsoft.com/office/powerpoint/2010/main" val="3782878391"/>
       </p:ext>
     </p:extLst>
   </p:cSld>
@@ -12957,96 +13106,10 @@
       </p:grpSpPr>
       <p:sp>
         <p:nvSpPr>
-          <p:cNvPr id="2" name="Title 1">
-            <a:extLst>
-              <a:ext uri="{FF2B5EF4-FFF2-40B4-BE49-F238E27FC236}">
-                <a16:creationId xmlns:a16="http://schemas.microsoft.com/office/drawing/2014/main" id="{BE294B4A-0F3D-665F-2B44-858A0687CC07}"/>
-              </a:ext>
-            </a:extLst>
-          </p:cNvPr>
-          <p:cNvSpPr>
-            <a:spLocks noGrp="1"/>
-          </p:cNvSpPr>
-          <p:nvPr>
-            <p:ph type="title"/>
-          </p:nvPr>
-        </p:nvSpPr>
-        <p:spPr>
-          <a:xfrm>
-            <a:off x="838200" y="2944542"/>
-            <a:ext cx="10515600" cy="968916"/>
-          </a:xfrm>
-        </p:spPr>
-        <p:txBody>
-          <a:bodyPr/>
-          <a:lstStyle/>
-          <a:p>
-            <a:pPr algn="ctr"/>
-            <a:r>
-              <a:rPr lang="en-US" dirty="0"/>
-              <a:t>Stage 3: Individual work</a:t>
-            </a:r>
-          </a:p>
-        </p:txBody>
-      </p:sp>
-      <p:sp>
-        <p:nvSpPr>
-          <p:cNvPr id="3" name="Content Placeholder 2">
-            <a:extLst>
-              <a:ext uri="{FF2B5EF4-FFF2-40B4-BE49-F238E27FC236}">
-                <a16:creationId xmlns:a16="http://schemas.microsoft.com/office/drawing/2014/main" id="{B5B712E0-DA21-49DD-C542-65D2471E9FB3}"/>
-              </a:ext>
-            </a:extLst>
-          </p:cNvPr>
-          <p:cNvSpPr>
-            <a:spLocks noGrp="1"/>
-          </p:cNvSpPr>
-          <p:nvPr>
-            <p:ph type="body" idx="1"/>
-          </p:nvPr>
-        </p:nvSpPr>
-        <p:spPr>
-          <a:xfrm>
-            <a:off x="838200" y="4049526"/>
-            <a:ext cx="10515600" cy="1434119"/>
-          </a:xfrm>
-        </p:spPr>
-        <p:txBody>
-          <a:bodyPr>
-            <a:normAutofit/>
-          </a:bodyPr>
-          <a:lstStyle/>
-          <a:p>
-            <a:pPr algn="ctr"/>
-            <a:r>
-              <a:rPr lang="en-US" dirty="0"/>
-              <a:t>Using distributions across a chosen state &amp; enrichment data,</a:t>
-            </a:r>
-          </a:p>
-          <a:p>
-            <a:pPr algn="ctr">
-              <a:spcBef>
-                <a:spcPts val="0"/>
-              </a:spcBef>
-            </a:pPr>
-            <a:r>
-              <a:rPr lang="en-US" dirty="0"/>
-              <a:t> develop formal hypotheses for testing</a:t>
-            </a:r>
-            <a:endParaRPr lang="en-US" dirty="0">
-              <a:highlight>
-                <a:srgbClr val="FFFF00"/>
-              </a:highlight>
-            </a:endParaRPr>
-          </a:p>
-        </p:txBody>
-      </p:sp>
-      <p:sp>
-        <p:nvSpPr>
-          <p:cNvPr id="6" name="Slide Number Placeholder 5">
-            <a:extLst>
-              <a:ext uri="{FF2B5EF4-FFF2-40B4-BE49-F238E27FC236}">
-                <a16:creationId xmlns:a16="http://schemas.microsoft.com/office/drawing/2014/main" id="{DD009CC9-0EDE-A47D-6FF2-7CC688AA8C8B}"/>
+          <p:cNvPr id="4" name="Slide Number Placeholder 3">
+            <a:extLst>
+              <a:ext uri="{FF2B5EF4-FFF2-40B4-BE49-F238E27FC236}">
+                <a16:creationId xmlns:a16="http://schemas.microsoft.com/office/drawing/2014/main" id="{1A20835A-50EC-D204-4515-7019B335C973}"/>
               </a:ext>
             </a:extLst>
           </p:cNvPr>
@@ -13070,10 +13133,285 @@
           </a:p>
         </p:txBody>
       </p:sp>
+      <p:sp>
+        <p:nvSpPr>
+          <p:cNvPr id="6" name="TextBox 5">
+            <a:extLst>
+              <a:ext uri="{FF2B5EF4-FFF2-40B4-BE49-F238E27FC236}">
+                <a16:creationId xmlns:a16="http://schemas.microsoft.com/office/drawing/2014/main" id="{CB8D7F04-13CA-5BBC-7A77-3D9D4B076D6D}"/>
+              </a:ext>
+            </a:extLst>
+          </p:cNvPr>
+          <p:cNvSpPr txBox="1"/>
+          <p:nvPr/>
+        </p:nvSpPr>
+        <p:spPr>
+          <a:xfrm>
+            <a:off x="460586" y="3853928"/>
+            <a:ext cx="11270827" cy="2785378"/>
+          </a:xfrm>
+          <a:prstGeom prst="rect">
+            <a:avLst/>
+          </a:prstGeom>
+          <a:noFill/>
+        </p:spPr>
+        <p:txBody>
+          <a:bodyPr wrap="square">
+            <a:spAutoFit/>
+          </a:bodyPr>
+          <a:lstStyle/>
+          <a:p>
+            <a:pPr marL="342900" indent="-342900" algn="just">
+              <a:spcAft>
+                <a:spcPts val="600"/>
+              </a:spcAft>
+              <a:buFont typeface="Arial" panose="020B0604020202020204" pitchFamily="34" charset="0"/>
+              <a:buChar char="•"/>
+            </a:pPr>
+            <a:r>
+              <a:rPr lang="en-US" sz="2000" b="1" dirty="0"/>
+              <a:t>Hypothesis 1: </a:t>
+            </a:r>
+            <a:r>
+              <a:rPr lang="en-US" sz="2000" dirty="0"/>
+              <a:t>There is a significant correlation between the total number of votes cast in the 2020 presidential election and the number of COVID-19 cases in New York counties between 2020-06-01 and 2021-01-03.</a:t>
+            </a:r>
+          </a:p>
+          <a:p>
+            <a:pPr marL="342900" indent="-342900" algn="just">
+              <a:spcAft>
+                <a:spcPts val="600"/>
+              </a:spcAft>
+              <a:buFont typeface="Arial" panose="020B0604020202020204" pitchFamily="34" charset="0"/>
+              <a:buChar char="•"/>
+            </a:pPr>
+            <a:r>
+              <a:rPr lang="en-US" sz="2000" b="1" dirty="0"/>
+              <a:t>Hypothesis 2: </a:t>
+            </a:r>
+            <a:r>
+              <a:rPr lang="en-US" sz="2000" dirty="0"/>
+              <a:t>Counties where a Democratic candidate won the election led to a higher number of COVID-19 cases compared to counties where a Republican candidate won.</a:t>
+            </a:r>
+          </a:p>
+          <a:p>
+            <a:pPr marL="342900" indent="-342900" algn="just">
+              <a:spcAft>
+                <a:spcPts val="600"/>
+              </a:spcAft>
+              <a:buFont typeface="Arial" panose="020B0604020202020204" pitchFamily="34" charset="0"/>
+              <a:buChar char="•"/>
+            </a:pPr>
+            <a:r>
+              <a:rPr lang="en-US" sz="2000" b="1" dirty="0"/>
+              <a:t>Hypothesis 3: </a:t>
+            </a:r>
+            <a:r>
+              <a:rPr lang="en-US" sz="2000" dirty="0"/>
+              <a:t>The victory of Joe Biden in the 2020 presidential election in New York has a significant influence on the increase in COVID-19 cases in the state.</a:t>
+            </a:r>
+          </a:p>
+          <a:p>
+            <a:pPr algn="just" rtl="0"/>
+            <a:endParaRPr lang="en-US" sz="2000" dirty="0"/>
+          </a:p>
+        </p:txBody>
+      </p:sp>
+      <p:sp>
+        <p:nvSpPr>
+          <p:cNvPr id="7" name="TextBox 6">
+            <a:extLst>
+              <a:ext uri="{FF2B5EF4-FFF2-40B4-BE49-F238E27FC236}">
+                <a16:creationId xmlns:a16="http://schemas.microsoft.com/office/drawing/2014/main" id="{FE52078A-E7CA-9013-93B3-686DFA0B282D}"/>
+              </a:ext>
+            </a:extLst>
+          </p:cNvPr>
+          <p:cNvSpPr txBox="1"/>
+          <p:nvPr/>
+        </p:nvSpPr>
+        <p:spPr>
+          <a:xfrm>
+            <a:off x="355598" y="464915"/>
+            <a:ext cx="11270827" cy="923330"/>
+          </a:xfrm>
+          <a:prstGeom prst="rect">
+            <a:avLst/>
+          </a:prstGeom>
+          <a:noFill/>
+        </p:spPr>
+        <p:txBody>
+          <a:bodyPr wrap="square">
+            <a:spAutoFit/>
+          </a:bodyPr>
+          <a:lstStyle/>
+          <a:p>
+            <a:pPr rtl="0"/>
+            <a:r>
+              <a:rPr kumimoji="0" lang="en-US" sz="5400" b="0" i="0" u="none" strike="noStrike" kern="1200" cap="none" spc="0" normalizeH="0" baseline="0" noProof="0" dirty="0">
+                <a:ln>
+                  <a:noFill/>
+                </a:ln>
+                <a:solidFill>
+                  <a:srgbClr val="0F2044"/>
+                </a:solidFill>
+                <a:effectLst/>
+                <a:uLnTx/>
+                <a:uFillTx/>
+                <a:latin typeface="Georgia" panose="02040502050405020303" pitchFamily="18" charset="0"/>
+                <a:ea typeface="+mj-ea"/>
+                <a:cs typeface="+mj-cs"/>
+              </a:rPr>
+              <a:t>Ayodeji </a:t>
+            </a:r>
+            <a:r>
+              <a:rPr kumimoji="0" lang="en-US" sz="5400" b="0" i="0" u="none" strike="noStrike" kern="1200" cap="none" spc="0" normalizeH="0" baseline="0" noProof="0" dirty="0" err="1">
+                <a:ln>
+                  <a:noFill/>
+                </a:ln>
+                <a:solidFill>
+                  <a:srgbClr val="0F2044"/>
+                </a:solidFill>
+                <a:effectLst/>
+                <a:uLnTx/>
+                <a:uFillTx/>
+                <a:latin typeface="Georgia" panose="02040502050405020303" pitchFamily="18" charset="0"/>
+                <a:ea typeface="+mj-ea"/>
+                <a:cs typeface="+mj-cs"/>
+              </a:rPr>
+              <a:t>Iwayemi</a:t>
+            </a:r>
+            <a:r>
+              <a:rPr kumimoji="0" lang="en-US" sz="5400" b="0" i="0" u="none" strike="noStrike" kern="1200" cap="none" spc="0" normalizeH="0" baseline="0" noProof="0" dirty="0">
+                <a:ln>
+                  <a:noFill/>
+                </a:ln>
+                <a:solidFill>
+                  <a:srgbClr val="0F2044"/>
+                </a:solidFill>
+                <a:effectLst/>
+                <a:uLnTx/>
+                <a:uFillTx/>
+                <a:latin typeface="Georgia" panose="02040502050405020303" pitchFamily="18" charset="0"/>
+                <a:ea typeface="+mj-ea"/>
+                <a:cs typeface="+mj-cs"/>
+              </a:rPr>
+              <a:t> –New York State</a:t>
+            </a:r>
+            <a:endParaRPr lang="en-US" sz="2800" dirty="0"/>
+          </a:p>
+        </p:txBody>
+      </p:sp>
+      <p:pic>
+        <p:nvPicPr>
+          <p:cNvPr id="2" name="Picture 1" descr="A graph of a number of cases&#10;&#10;Description automatically generated">
+            <a:extLst>
+              <a:ext uri="{FF2B5EF4-FFF2-40B4-BE49-F238E27FC236}">
+                <a16:creationId xmlns:a16="http://schemas.microsoft.com/office/drawing/2014/main" id="{B2BFAFCC-153E-94D9-116D-C0C8F133E8A3}"/>
+              </a:ext>
+            </a:extLst>
+          </p:cNvPr>
+          <p:cNvPicPr>
+            <a:picLocks noChangeAspect="1"/>
+          </p:cNvPicPr>
+          <p:nvPr/>
+        </p:nvPicPr>
+        <p:blipFill>
+          <a:blip r:embed="rId3">
+            <a:extLst>
+              <a:ext uri="{28A0092B-C50C-407E-A947-70E740481C1C}">
+                <a14:useLocalDpi xmlns:a14="http://schemas.microsoft.com/office/drawing/2010/main" val="0"/>
+              </a:ext>
+            </a:extLst>
+          </a:blip>
+          <a:stretch>
+            <a:fillRect/>
+          </a:stretch>
+        </p:blipFill>
+        <p:spPr>
+          <a:xfrm>
+            <a:off x="2423094" y="1527197"/>
+            <a:ext cx="3058757" cy="2332687"/>
+          </a:xfrm>
+          <a:prstGeom prst="rect">
+            <a:avLst/>
+          </a:prstGeom>
+        </p:spPr>
+      </p:pic>
+      <p:pic>
+        <p:nvPicPr>
+          <p:cNvPr id="3" name="Picture 2" descr="A graph with a blue line&#10;&#10;Description automatically generated">
+            <a:extLst>
+              <a:ext uri="{FF2B5EF4-FFF2-40B4-BE49-F238E27FC236}">
+                <a16:creationId xmlns:a16="http://schemas.microsoft.com/office/drawing/2014/main" id="{E9CE70FA-D5C6-EA8E-57C3-A8F5C20FC8FF}"/>
+              </a:ext>
+            </a:extLst>
+          </p:cNvPr>
+          <p:cNvPicPr>
+            <a:picLocks noChangeAspect="1"/>
+          </p:cNvPicPr>
+          <p:nvPr/>
+        </p:nvPicPr>
+        <p:blipFill>
+          <a:blip r:embed="rId4">
+            <a:extLst>
+              <a:ext uri="{28A0092B-C50C-407E-A947-70E740481C1C}">
+                <a14:useLocalDpi xmlns:a14="http://schemas.microsoft.com/office/drawing/2010/main" val="0"/>
+              </a:ext>
+            </a:extLst>
+          </a:blip>
+          <a:stretch>
+            <a:fillRect/>
+          </a:stretch>
+        </p:blipFill>
+        <p:spPr>
+          <a:xfrm>
+            <a:off x="6096001" y="1527197"/>
+            <a:ext cx="3058757" cy="2332686"/>
+          </a:xfrm>
+          <a:prstGeom prst="rect">
+            <a:avLst/>
+          </a:prstGeom>
+        </p:spPr>
+      </p:pic>
+      <p:sp>
+        <p:nvSpPr>
+          <p:cNvPr id="5" name="TextBox 4">
+            <a:extLst>
+              <a:ext uri="{FF2B5EF4-FFF2-40B4-BE49-F238E27FC236}">
+                <a16:creationId xmlns:a16="http://schemas.microsoft.com/office/drawing/2014/main" id="{97CA58CD-174D-4EB5-AA37-AD47636CAD1D}"/>
+              </a:ext>
+            </a:extLst>
+          </p:cNvPr>
+          <p:cNvSpPr txBox="1"/>
+          <p:nvPr/>
+        </p:nvSpPr>
+        <p:spPr>
+          <a:xfrm>
+            <a:off x="9684278" y="1649868"/>
+            <a:ext cx="1895891" cy="738664"/>
+          </a:xfrm>
+          <a:prstGeom prst="rect">
+            <a:avLst/>
+          </a:prstGeom>
+          <a:noFill/>
+        </p:spPr>
+        <p:txBody>
+          <a:bodyPr wrap="square">
+            <a:spAutoFit/>
+          </a:bodyPr>
+          <a:lstStyle/>
+          <a:p>
+            <a:r>
+              <a:rPr lang="en-US" sz="1050" b="1" dirty="0"/>
+              <a:t>Figures:  Poisson Distribution of COVID-19 cases and deaths in New York State</a:t>
+            </a:r>
+          </a:p>
+        </p:txBody>
+      </p:sp>
     </p:spTree>
     <p:extLst>
       <p:ext uri="{BB962C8B-B14F-4D97-AF65-F5344CB8AC3E}">
-        <p14:creationId xmlns:p14="http://schemas.microsoft.com/office/powerpoint/2010/main" val="3782878391"/>
+        <p14:creationId xmlns:p14="http://schemas.microsoft.com/office/powerpoint/2010/main" val="846081418"/>
       </p:ext>
     </p:extLst>
   </p:cSld>
@@ -13102,18 +13440,18 @@
       </p:grpSpPr>
       <p:sp>
         <p:nvSpPr>
-          <p:cNvPr id="4" name="Slide Number Placeholder 3">
-            <a:extLst>
-              <a:ext uri="{FF2B5EF4-FFF2-40B4-BE49-F238E27FC236}">
-                <a16:creationId xmlns:a16="http://schemas.microsoft.com/office/drawing/2014/main" id="{1A20835A-50EC-D204-4515-7019B335C973}"/>
-              </a:ext>
-            </a:extLst>
-          </p:cNvPr>
-          <p:cNvSpPr>
-            <a:spLocks noGrp="1"/>
-          </p:cNvSpPr>
-          <p:nvPr>
-            <p:ph type="sldNum" sz="quarter" idx="12"/>
+          <p:cNvPr id="2" name="Title 1">
+            <a:extLst>
+              <a:ext uri="{FF2B5EF4-FFF2-40B4-BE49-F238E27FC236}">
+                <a16:creationId xmlns:a16="http://schemas.microsoft.com/office/drawing/2014/main" id="{1692FA9F-CF39-A7AE-6A66-2DFACA6475D8}"/>
+              </a:ext>
+            </a:extLst>
+          </p:cNvPr>
+          <p:cNvSpPr>
+            <a:spLocks noGrp="1"/>
+          </p:cNvSpPr>
+          <p:nvPr>
+            <p:ph type="title"/>
           </p:nvPr>
         </p:nvSpPr>
         <p:spPr/>
@@ -13121,188 +13459,87 @@
           <a:bodyPr/>
           <a:lstStyle/>
           <a:p>
-            <a:fld id="{BD0DFC8E-D006-4B55-BBF2-7AB50F8F017C}" type="slidenum">
-              <a:rPr lang="en-US" smtClean="0"/>
-              <a:t>8</a:t>
-            </a:fld>
-            <a:endParaRPr lang="en-US"/>
-          </a:p>
-        </p:txBody>
-      </p:sp>
-      <p:sp>
-        <p:nvSpPr>
-          <p:cNvPr id="6" name="TextBox 5">
-            <a:extLst>
-              <a:ext uri="{FF2B5EF4-FFF2-40B4-BE49-F238E27FC236}">
-                <a16:creationId xmlns:a16="http://schemas.microsoft.com/office/drawing/2014/main" id="{CB8D7F04-13CA-5BBC-7A77-3D9D4B076D6D}"/>
-              </a:ext>
-            </a:extLst>
-          </p:cNvPr>
-          <p:cNvSpPr txBox="1"/>
-          <p:nvPr/>
+            <a:r>
+              <a:rPr lang="en-US" dirty="0"/>
+              <a:t>Employment – Kol Herget (SC)</a:t>
+            </a:r>
+          </a:p>
+        </p:txBody>
+      </p:sp>
+      <p:sp>
+        <p:nvSpPr>
+          <p:cNvPr id="3" name="Content Placeholder 2">
+            <a:extLst>
+              <a:ext uri="{FF2B5EF4-FFF2-40B4-BE49-F238E27FC236}">
+                <a16:creationId xmlns:a16="http://schemas.microsoft.com/office/drawing/2014/main" id="{6BA5FA6A-48CE-38FF-2666-8E237984281D}"/>
+              </a:ext>
+            </a:extLst>
+          </p:cNvPr>
+          <p:cNvSpPr>
+            <a:spLocks noGrp="1"/>
+          </p:cNvSpPr>
+          <p:nvPr>
+            <p:ph idx="1"/>
+          </p:nvPr>
         </p:nvSpPr>
         <p:spPr>
           <a:xfrm>
-            <a:off x="460586" y="3853928"/>
-            <a:ext cx="11270827" cy="2785378"/>
+            <a:off x="838200" y="4195482"/>
+            <a:ext cx="10515600" cy="1981480"/>
           </a:xfrm>
-          <a:prstGeom prst="rect">
-            <a:avLst/>
-          </a:prstGeom>
-          <a:noFill/>
         </p:spPr>
         <p:txBody>
-          <a:bodyPr wrap="square">
-            <a:spAutoFit/>
+          <a:bodyPr>
+            <a:normAutofit lnSpcReduction="10000"/>
           </a:bodyPr>
           <a:lstStyle/>
           <a:p>
-            <a:pPr marL="342900" indent="-342900" algn="just">
-              <a:spcAft>
-                <a:spcPts val="600"/>
-              </a:spcAft>
-              <a:buFont typeface="Arial" panose="020B0604020202020204" pitchFamily="34" charset="0"/>
-              <a:buChar char="•"/>
+            <a:pPr marL="0" indent="0">
+              <a:buNone/>
             </a:pPr>
             <a:r>
-              <a:rPr lang="en-US" sz="2000" b="1" dirty="0"/>
-              <a:t>Hypothesis 1: </a:t>
-            </a:r>
-            <a:r>
-              <a:rPr lang="en-US" sz="2000" dirty="0"/>
-              <a:t>There is a significant correlation between the total number of votes cast in the 2020 presidential election and the number of COVID-19 cases in New York counties between 2020-06-01 and 2021-01-03.</a:t>
-            </a:r>
-          </a:p>
-          <a:p>
-            <a:pPr marL="342900" indent="-342900" algn="just">
-              <a:spcAft>
-                <a:spcPts val="600"/>
-              </a:spcAft>
-              <a:buFont typeface="Arial" panose="020B0604020202020204" pitchFamily="34" charset="0"/>
-              <a:buChar char="•"/>
+              <a:rPr lang="en-US" dirty="0"/>
+              <a:t>Hypotheses:</a:t>
+            </a:r>
+          </a:p>
+          <a:p>
+            <a:pPr lvl="1"/>
+            <a:r>
+              <a:rPr lang="en-US" dirty="0"/>
+              <a:t>Higher employment level…</a:t>
+            </a:r>
+          </a:p>
+          <a:p>
+            <a:pPr lvl="1"/>
+            <a:r>
+              <a:rPr lang="en-US" dirty="0"/>
+              <a:t>Higher taxable annual wages…</a:t>
+            </a:r>
+          </a:p>
+          <a:p>
+            <a:pPr lvl="1"/>
+            <a:r>
+              <a:rPr lang="en-US" dirty="0"/>
+              <a:t>Higher establishments counts…</a:t>
+            </a:r>
+          </a:p>
+          <a:p>
+            <a:pPr marL="0" indent="0">
+              <a:buNone/>
             </a:pPr>
             <a:r>
-              <a:rPr lang="en-US" sz="2000" b="1" dirty="0"/>
-              <a:t>Hypothesis 2: </a:t>
-            </a:r>
-            <a:r>
-              <a:rPr lang="en-US" sz="2000" dirty="0"/>
-              <a:t>Counties where a Democratic candidate won the election led to a higher number of COVID-19 cases compared to counties where a Republican candidate won.</a:t>
-            </a:r>
-          </a:p>
-          <a:p>
-            <a:pPr marL="342900" indent="-342900" algn="just">
-              <a:spcAft>
-                <a:spcPts val="600"/>
-              </a:spcAft>
-              <a:buFont typeface="Arial" panose="020B0604020202020204" pitchFamily="34" charset="0"/>
-              <a:buChar char="•"/>
-            </a:pPr>
-            <a:r>
-              <a:rPr lang="en-US" sz="2000" b="1" dirty="0"/>
-              <a:t>Hypothesis 3: </a:t>
-            </a:r>
-            <a:r>
-              <a:rPr lang="en-US" sz="2000" dirty="0"/>
-              <a:t>The victory of Joe Biden in the 2020 presidential election in New York has a significant influence on the increase in COVID-19 cases in the state.</a:t>
-            </a:r>
-          </a:p>
-          <a:p>
-            <a:pPr algn="just" rtl="0"/>
-            <a:endParaRPr lang="en-US" sz="2000" dirty="0"/>
-          </a:p>
-        </p:txBody>
-      </p:sp>
-      <p:sp>
-        <p:nvSpPr>
-          <p:cNvPr id="7" name="TextBox 6">
-            <a:extLst>
-              <a:ext uri="{FF2B5EF4-FFF2-40B4-BE49-F238E27FC236}">
-                <a16:creationId xmlns:a16="http://schemas.microsoft.com/office/drawing/2014/main" id="{FE52078A-E7CA-9013-93B3-686DFA0B282D}"/>
-              </a:ext>
-            </a:extLst>
-          </p:cNvPr>
-          <p:cNvSpPr txBox="1"/>
-          <p:nvPr/>
-        </p:nvSpPr>
-        <p:spPr>
-          <a:xfrm>
-            <a:off x="355598" y="464915"/>
-            <a:ext cx="11270827" cy="923330"/>
-          </a:xfrm>
-          <a:prstGeom prst="rect">
-            <a:avLst/>
-          </a:prstGeom>
-          <a:noFill/>
-        </p:spPr>
-        <p:txBody>
-          <a:bodyPr wrap="square">
-            <a:spAutoFit/>
-          </a:bodyPr>
-          <a:lstStyle/>
-          <a:p>
-            <a:pPr rtl="0"/>
-            <a:r>
-              <a:rPr kumimoji="0" lang="en-US" sz="5400" b="0" i="0" u="none" strike="noStrike" kern="1200" cap="none" spc="0" normalizeH="0" baseline="0" noProof="0" dirty="0">
-                <a:ln>
-                  <a:noFill/>
-                </a:ln>
-                <a:solidFill>
-                  <a:srgbClr val="0F2044"/>
-                </a:solidFill>
-                <a:effectLst/>
-                <a:uLnTx/>
-                <a:uFillTx/>
-                <a:latin typeface="Georgia" panose="02040502050405020303" pitchFamily="18" charset="0"/>
-                <a:ea typeface="+mj-ea"/>
-                <a:cs typeface="+mj-cs"/>
-              </a:rPr>
-              <a:t>Ayodeji </a:t>
-            </a:r>
-            <a:r>
-              <a:rPr kumimoji="0" lang="en-US" sz="5400" b="0" i="0" u="none" strike="noStrike" kern="1200" cap="none" spc="0" normalizeH="0" baseline="0" noProof="0" dirty="0" err="1">
-                <a:ln>
-                  <a:noFill/>
-                </a:ln>
-                <a:solidFill>
-                  <a:srgbClr val="0F2044"/>
-                </a:solidFill>
-                <a:effectLst/>
-                <a:uLnTx/>
-                <a:uFillTx/>
-                <a:latin typeface="Georgia" panose="02040502050405020303" pitchFamily="18" charset="0"/>
-                <a:ea typeface="+mj-ea"/>
-                <a:cs typeface="+mj-cs"/>
-              </a:rPr>
-              <a:t>Iwayemi</a:t>
-            </a:r>
-            <a:r>
-              <a:rPr kumimoji="0" lang="en-US" sz="5400" b="0" i="0" u="none" strike="noStrike" kern="1200" cap="none" spc="0" normalizeH="0" baseline="0" noProof="0" dirty="0">
-                <a:ln>
-                  <a:noFill/>
-                </a:ln>
-                <a:solidFill>
-                  <a:srgbClr val="0F2044"/>
-                </a:solidFill>
-                <a:effectLst/>
-                <a:uLnTx/>
-                <a:uFillTx/>
-                <a:latin typeface="Georgia" panose="02040502050405020303" pitchFamily="18" charset="0"/>
-                <a:ea typeface="+mj-ea"/>
-                <a:cs typeface="+mj-cs"/>
-              </a:rPr>
-              <a:t> –New York State</a:t>
-            </a:r>
-            <a:endParaRPr lang="en-US" sz="2800" dirty="0"/>
+              <a:rPr lang="en-US" sz="2400" dirty="0"/>
+              <a:t>…lead to higher numbers of cases in all states</a:t>
+            </a:r>
           </a:p>
         </p:txBody>
       </p:sp>
       <p:pic>
         <p:nvPicPr>
-          <p:cNvPr id="2" name="Picture 1" descr="A graph of a number of cases&#10;&#10;Description automatically generated">
-            <a:extLst>
-              <a:ext uri="{FF2B5EF4-FFF2-40B4-BE49-F238E27FC236}">
-                <a16:creationId xmlns:a16="http://schemas.microsoft.com/office/drawing/2014/main" id="{B2BFAFCC-153E-94D9-116D-C0C8F133E8A3}"/>
+          <p:cNvPr id="5" name="Picture 4">
+            <a:extLst>
+              <a:ext uri="{FF2B5EF4-FFF2-40B4-BE49-F238E27FC236}">
+                <a16:creationId xmlns:a16="http://schemas.microsoft.com/office/drawing/2014/main" id="{4C066E62-B085-06AB-9ED1-0115BEC7D16B}"/>
               </a:ext>
             </a:extLst>
           </p:cNvPr>
@@ -13311,22 +13548,15 @@
           </p:cNvPicPr>
           <p:nvPr/>
         </p:nvPicPr>
-        <p:blipFill>
-          <a:blip r:embed="rId3">
-            <a:extLst>
-              <a:ext uri="{28A0092B-C50C-407E-A947-70E740481C1C}">
-                <a14:useLocalDpi xmlns:a14="http://schemas.microsoft.com/office/drawing/2010/main" val="0"/>
-              </a:ext>
-            </a:extLst>
-          </a:blip>
-          <a:stretch>
-            <a:fillRect/>
-          </a:stretch>
+        <p:blipFill rotWithShape="1">
+          <a:blip r:embed="rId3"/>
+          <a:srcRect t="1026" b="1"/>
+          <a:stretch/>
         </p:blipFill>
         <p:spPr>
           <a:xfrm>
-            <a:off x="2423094" y="1527197"/>
-            <a:ext cx="3058757" cy="2332687"/>
+            <a:off x="838199" y="1477399"/>
+            <a:ext cx="3268831" cy="2529361"/>
           </a:xfrm>
           <a:prstGeom prst="rect">
             <a:avLst/>
@@ -13335,10 +13565,10 @@
       </p:pic>
       <p:pic>
         <p:nvPicPr>
-          <p:cNvPr id="3" name="Picture 2" descr="A graph with a blue line&#10;&#10;Description automatically generated">
-            <a:extLst>
-              <a:ext uri="{FF2B5EF4-FFF2-40B4-BE49-F238E27FC236}">
-                <a16:creationId xmlns:a16="http://schemas.microsoft.com/office/drawing/2014/main" id="{E9CE70FA-D5C6-EA8E-57C3-A8F5C20FC8FF}"/>
+          <p:cNvPr id="7" name="Picture 6">
+            <a:extLst>
+              <a:ext uri="{FF2B5EF4-FFF2-40B4-BE49-F238E27FC236}">
+                <a16:creationId xmlns:a16="http://schemas.microsoft.com/office/drawing/2014/main" id="{F3B78F6A-568E-4923-72AF-5AF585AA4ADC}"/>
               </a:ext>
             </a:extLst>
           </p:cNvPr>
@@ -13355,14 +13585,43 @@
               </a:ext>
             </a:extLst>
           </a:blip>
+          <a:srcRect/>
+          <a:stretch/>
+        </p:blipFill>
+        <p:spPr>
+          <a:xfrm>
+            <a:off x="4270783" y="1477399"/>
+            <a:ext cx="3303387" cy="2529360"/>
+          </a:xfrm>
+          <a:prstGeom prst="rect">
+            <a:avLst/>
+          </a:prstGeom>
+        </p:spPr>
+      </p:pic>
+      <p:pic>
+        <p:nvPicPr>
+          <p:cNvPr id="9" name="Picture 8">
+            <a:extLst>
+              <a:ext uri="{FF2B5EF4-FFF2-40B4-BE49-F238E27FC236}">
+                <a16:creationId xmlns:a16="http://schemas.microsoft.com/office/drawing/2014/main" id="{E1096F58-4AB0-E1C1-38E3-5B48C5CAD003}"/>
+              </a:ext>
+            </a:extLst>
+          </p:cNvPr>
+          <p:cNvPicPr>
+            <a:picLocks noChangeAspect="1"/>
+          </p:cNvPicPr>
+          <p:nvPr/>
+        </p:nvPicPr>
+        <p:blipFill>
+          <a:blip r:embed="rId5"/>
           <a:stretch>
             <a:fillRect/>
           </a:stretch>
         </p:blipFill>
         <p:spPr>
           <a:xfrm>
-            <a:off x="6096001" y="1527197"/>
-            <a:ext cx="3058757" cy="2332686"/>
+            <a:off x="7696252" y="1477400"/>
+            <a:ext cx="3257310" cy="2529360"/>
           </a:xfrm>
           <a:prstGeom prst="rect">
             <a:avLst/>
@@ -13371,10 +13630,10 @@
       </p:pic>
       <p:sp>
         <p:nvSpPr>
-          <p:cNvPr id="5" name="TextBox 4">
-            <a:extLst>
-              <a:ext uri="{FF2B5EF4-FFF2-40B4-BE49-F238E27FC236}">
-                <a16:creationId xmlns:a16="http://schemas.microsoft.com/office/drawing/2014/main" id="{97CA58CD-174D-4EB5-AA37-AD47636CAD1D}"/>
+          <p:cNvPr id="10" name="TextBox 9">
+            <a:extLst>
+              <a:ext uri="{FF2B5EF4-FFF2-40B4-BE49-F238E27FC236}">
+                <a16:creationId xmlns:a16="http://schemas.microsoft.com/office/drawing/2014/main" id="{127A22CD-B57D-BEF5-48C0-5FA9B526A8B2}"/>
               </a:ext>
             </a:extLst>
           </p:cNvPr>
@@ -13383,8 +13642,8 @@
         </p:nvSpPr>
         <p:spPr>
           <a:xfrm>
-            <a:off x="9684278" y="1649868"/>
-            <a:ext cx="1895891" cy="738664"/>
+            <a:off x="8374828" y="4186148"/>
+            <a:ext cx="2616386" cy="738664"/>
           </a:xfrm>
           <a:prstGeom prst="rect">
             <a:avLst/>
@@ -13392,22 +13651,51 @@
           <a:noFill/>
         </p:spPr>
         <p:txBody>
-          <a:bodyPr wrap="square">
+          <a:bodyPr wrap="square" rtlCol="0">
             <a:spAutoFit/>
           </a:bodyPr>
           <a:lstStyle/>
           <a:p>
             <a:r>
-              <a:rPr lang="en-US" sz="1050" b="1" dirty="0"/>
-              <a:t>Figures:  Poisson Distribution of COVID-19 cases and deaths in New York State</a:t>
-            </a:r>
+              <a:rPr lang="en-US" sz="1400" i="1" dirty="0"/>
+              <a:t>Compared normalized data from each category against normalized COVID cases data</a:t>
+            </a:r>
+          </a:p>
+        </p:txBody>
+      </p:sp>
+      <p:sp>
+        <p:nvSpPr>
+          <p:cNvPr id="4" name="Slide Number Placeholder 3">
+            <a:extLst>
+              <a:ext uri="{FF2B5EF4-FFF2-40B4-BE49-F238E27FC236}">
+                <a16:creationId xmlns:a16="http://schemas.microsoft.com/office/drawing/2014/main" id="{B91EC445-2B2A-0102-2A2C-1DA52E774D81}"/>
+              </a:ext>
+            </a:extLst>
+          </p:cNvPr>
+          <p:cNvSpPr>
+            <a:spLocks noGrp="1"/>
+          </p:cNvSpPr>
+          <p:nvPr>
+            <p:ph type="sldNum" sz="quarter" idx="12"/>
+          </p:nvPr>
+        </p:nvSpPr>
+        <p:spPr/>
+        <p:txBody>
+          <a:bodyPr/>
+          <a:lstStyle/>
+          <a:p>
+            <a:fld id="{BD0DFC8E-D006-4B55-BBF2-7AB50F8F017C}" type="slidenum">
+              <a:rPr lang="en-US" smtClean="0"/>
+              <a:t>8</a:t>
+            </a:fld>
+            <a:endParaRPr lang="en-US"/>
           </a:p>
         </p:txBody>
       </p:sp>
     </p:spTree>
     <p:extLst>
       <p:ext uri="{BB962C8B-B14F-4D97-AF65-F5344CB8AC3E}">
-        <p14:creationId xmlns:p14="http://schemas.microsoft.com/office/powerpoint/2010/main" val="846081418"/>
+        <p14:creationId xmlns:p14="http://schemas.microsoft.com/office/powerpoint/2010/main" val="2093751284"/>
       </p:ext>
     </p:extLst>
   </p:cSld>
@@ -13439,7 +13727,7 @@
           <p:cNvPr id="2" name="Title 1">
             <a:extLst>
               <a:ext uri="{FF2B5EF4-FFF2-40B4-BE49-F238E27FC236}">
-                <a16:creationId xmlns:a16="http://schemas.microsoft.com/office/drawing/2014/main" id="{1692FA9F-CF39-A7AE-6A66-2DFACA6475D8}"/>
+                <a16:creationId xmlns:a16="http://schemas.microsoft.com/office/drawing/2014/main" id="{1266D3D0-145B-C09E-1869-AC96D4B3F0C1}"/>
               </a:ext>
             </a:extLst>
           </p:cNvPr>
@@ -13457,7 +13745,7 @@
           <a:p>
             <a:r>
               <a:rPr lang="en-US" dirty="0"/>
-              <a:t>Employment – Kol Herget (SC)</a:t>
+              <a:t>Housing - Kevin Hayes</a:t>
             </a:r>
           </a:p>
         </p:txBody>
@@ -13467,7 +13755,7 @@
           <p:cNvPr id="3" name="Content Placeholder 2">
             <a:extLst>
               <a:ext uri="{FF2B5EF4-FFF2-40B4-BE49-F238E27FC236}">
-                <a16:creationId xmlns:a16="http://schemas.microsoft.com/office/drawing/2014/main" id="{6BA5FA6A-48CE-38FF-2666-8E237984281D}"/>
+                <a16:creationId xmlns:a16="http://schemas.microsoft.com/office/drawing/2014/main" id="{56F64E25-C795-B257-2E57-46F801568744}"/>
               </a:ext>
             </a:extLst>
           </p:cNvPr>
@@ -13480,101 +13768,139 @@
         </p:nvSpPr>
         <p:spPr>
           <a:xfrm>
-            <a:off x="838200" y="4195482"/>
-            <a:ext cx="10515600" cy="1981480"/>
+            <a:off x="838200" y="4453591"/>
+            <a:ext cx="10515600" cy="1723372"/>
           </a:xfrm>
         </p:spPr>
         <p:txBody>
           <a:bodyPr>
-            <a:normAutofit lnSpcReduction="10000"/>
+            <a:normAutofit fontScale="70000" lnSpcReduction="20000"/>
           </a:bodyPr>
           <a:lstStyle/>
           <a:p>
-            <a:pPr marL="0" indent="0">
-              <a:buNone/>
-            </a:pPr>
-            <a:r>
-              <a:rPr lang="en-US" dirty="0"/>
-              <a:t>Hypotheses:</a:t>
-            </a:r>
-          </a:p>
-          <a:p>
-            <a:pPr lvl="1"/>
-            <a:r>
-              <a:rPr lang="en-US" dirty="0"/>
-              <a:t>Higher employment level…</a:t>
-            </a:r>
-          </a:p>
-          <a:p>
-            <a:pPr lvl="1"/>
-            <a:r>
-              <a:rPr lang="en-US" dirty="0"/>
-              <a:t>Higher taxable annual wages…</a:t>
-            </a:r>
-          </a:p>
-          <a:p>
-            <a:pPr lvl="1"/>
-            <a:r>
-              <a:rPr lang="en-US" dirty="0"/>
-              <a:t>Higher establishments counts…</a:t>
-            </a:r>
-          </a:p>
-          <a:p>
-            <a:pPr marL="0" indent="0">
-              <a:buNone/>
-            </a:pPr>
-            <a:r>
-              <a:rPr lang="en-US" sz="2400" dirty="0"/>
-              <a:t>…lead to higher numbers of cases in all states</a:t>
-            </a:r>
+            <a:r>
+              <a:rPr lang="en-US" b="0" i="0" dirty="0">
+                <a:effectLst/>
+                <a:highlight>
+                  <a:srgbClr val="FFFFFF"/>
+                </a:highlight>
+                <a:latin typeface="system-ui"/>
+              </a:rPr>
+              <a:t>Does having a higher total population of </a:t>
+            </a:r>
+            <a:r>
+              <a:rPr lang="en-US" b="0" i="0" dirty="0" err="1">
+                <a:effectLst/>
+                <a:highlight>
+                  <a:srgbClr val="FFFFFF"/>
+                </a:highlight>
+                <a:latin typeface="system-ui"/>
+              </a:rPr>
+              <a:t>hispanic</a:t>
+            </a:r>
+            <a:r>
+              <a:rPr lang="en-US" b="0" i="0" dirty="0">
+                <a:effectLst/>
+                <a:highlight>
+                  <a:srgbClr val="FFFFFF"/>
+                </a:highlight>
+                <a:latin typeface="system-ui"/>
+              </a:rPr>
+              <a:t> or </a:t>
+            </a:r>
+            <a:r>
+              <a:rPr lang="en-US" b="0" i="0" dirty="0" err="1">
+                <a:effectLst/>
+                <a:highlight>
+                  <a:srgbClr val="FFFFFF"/>
+                </a:highlight>
+                <a:latin typeface="system-ui"/>
+              </a:rPr>
+              <a:t>latino</a:t>
+            </a:r>
+            <a:r>
+              <a:rPr lang="en-US" b="0" i="0" dirty="0">
+                <a:effectLst/>
+                <a:highlight>
+                  <a:srgbClr val="FFFFFF"/>
+                </a:highlight>
+                <a:latin typeface="system-ui"/>
+              </a:rPr>
+              <a:t> people of any race in a given state lead to more covid-19 infections for that state? (Label: DP05_0073E)</a:t>
+            </a:r>
+          </a:p>
+          <a:p>
+            <a:r>
+              <a:rPr lang="en-US" b="0" i="0" dirty="0">
+                <a:effectLst/>
+                <a:highlight>
+                  <a:srgbClr val="FFFFFF"/>
+                </a:highlight>
+                <a:latin typeface="system-ui"/>
+              </a:rPr>
+              <a:t>Does having more people of 35 to 44 years of age in a given state lead to fewer covid-19 infections for that state? (Label: DP05_0011E)</a:t>
+            </a:r>
+          </a:p>
+          <a:p>
+            <a:r>
+              <a:rPr lang="en-US" b="0" i="0" dirty="0">
+                <a:effectLst/>
+                <a:highlight>
+                  <a:srgbClr val="FFFFFF"/>
+                </a:highlight>
+                <a:latin typeface="system-ui"/>
+              </a:rPr>
+              <a:t>Does having more people aged 60 to 64 in a given state lead to more covid-19 cases for that state? (Label : DP05_0014E)</a:t>
+            </a:r>
+            <a:endParaRPr lang="en-US" dirty="0"/>
+          </a:p>
+        </p:txBody>
+      </p:sp>
+      <p:sp>
+        <p:nvSpPr>
+          <p:cNvPr id="4" name="Slide Number Placeholder 3">
+            <a:extLst>
+              <a:ext uri="{FF2B5EF4-FFF2-40B4-BE49-F238E27FC236}">
+                <a16:creationId xmlns:a16="http://schemas.microsoft.com/office/drawing/2014/main" id="{14810756-614E-B658-4A79-F41E3A7D2FFC}"/>
+              </a:ext>
+            </a:extLst>
+          </p:cNvPr>
+          <p:cNvSpPr>
+            <a:spLocks noGrp="1"/>
+          </p:cNvSpPr>
+          <p:nvPr>
+            <p:ph type="sldNum" sz="quarter" idx="12"/>
+          </p:nvPr>
+        </p:nvSpPr>
+        <p:spPr/>
+        <p:txBody>
+          <a:bodyPr/>
+          <a:lstStyle/>
+          <a:p>
+            <a:fld id="{BD0DFC8E-D006-4B55-BBF2-7AB50F8F017C}" type="slidenum">
+              <a:rPr lang="en-US" smtClean="0"/>
+              <a:t>9</a:t>
+            </a:fld>
+            <a:endParaRPr lang="en-US"/>
           </a:p>
         </p:txBody>
       </p:sp>
       <p:pic>
         <p:nvPicPr>
-          <p:cNvPr id="5" name="Picture 4">
-            <a:extLst>
-              <a:ext uri="{FF2B5EF4-FFF2-40B4-BE49-F238E27FC236}">
-                <a16:creationId xmlns:a16="http://schemas.microsoft.com/office/drawing/2014/main" id="{4C066E62-B085-06AB-9ED1-0115BEC7D16B}"/>
+          <p:cNvPr id="5" name="Picture 2">
+            <a:extLst>
+              <a:ext uri="{FF2B5EF4-FFF2-40B4-BE49-F238E27FC236}">
+                <a16:creationId xmlns:a16="http://schemas.microsoft.com/office/drawing/2014/main" id="{D7E59CE7-EF02-74DF-A6F3-C6EC91925E1C}"/>
               </a:ext>
             </a:extLst>
           </p:cNvPr>
           <p:cNvPicPr>
-            <a:picLocks noChangeAspect="1"/>
-          </p:cNvPicPr>
-          <p:nvPr/>
-        </p:nvPicPr>
-        <p:blipFill rotWithShape="1">
-          <a:blip r:embed="rId3"/>
-          <a:srcRect t="1026" b="1"/>
-          <a:stretch/>
-        </p:blipFill>
-        <p:spPr>
-          <a:xfrm>
-            <a:off x="838199" y="1477399"/>
-            <a:ext cx="3268831" cy="2529361"/>
-          </a:xfrm>
-          <a:prstGeom prst="rect">
-            <a:avLst/>
-          </a:prstGeom>
-        </p:spPr>
-      </p:pic>
-      <p:pic>
-        <p:nvPicPr>
-          <p:cNvPr id="7" name="Picture 6">
-            <a:extLst>
-              <a:ext uri="{FF2B5EF4-FFF2-40B4-BE49-F238E27FC236}">
-                <a16:creationId xmlns:a16="http://schemas.microsoft.com/office/drawing/2014/main" id="{F3B78F6A-568E-4923-72AF-5AF585AA4ADC}"/>
-              </a:ext>
-            </a:extLst>
-          </p:cNvPr>
-          <p:cNvPicPr>
-            <a:picLocks noChangeAspect="1"/>
+            <a:picLocks noChangeAspect="1" noChangeArrowheads="1"/>
           </p:cNvPicPr>
           <p:nvPr/>
         </p:nvPicPr>
         <p:blipFill>
-          <a:blip r:embed="rId4">
+          <a:blip r:embed="rId2">
             <a:extLst>
               <a:ext uri="{28A0092B-C50C-407E-A947-70E740481C1C}">
                 <a14:useLocalDpi xmlns:a14="http://schemas.microsoft.com/office/drawing/2010/main" val="0"/>
@@ -13582,116 +13908,81 @@
             </a:extLst>
           </a:blip>
           <a:srcRect/>
-          <a:stretch/>
-        </p:blipFill>
-        <p:spPr>
-          <a:xfrm>
-            <a:off x="4270783" y="1477399"/>
-            <a:ext cx="3303387" cy="2529360"/>
-          </a:xfrm>
-          <a:prstGeom prst="rect">
-            <a:avLst/>
-          </a:prstGeom>
-        </p:spPr>
-      </p:pic>
-      <p:pic>
-        <p:nvPicPr>
-          <p:cNvPr id="9" name="Picture 8">
-            <a:extLst>
-              <a:ext uri="{FF2B5EF4-FFF2-40B4-BE49-F238E27FC236}">
-                <a16:creationId xmlns:a16="http://schemas.microsoft.com/office/drawing/2014/main" id="{E1096F58-4AB0-E1C1-38E3-5B48C5CAD003}"/>
-              </a:ext>
-            </a:extLst>
-          </p:cNvPr>
-          <p:cNvPicPr>
-            <a:picLocks noChangeAspect="1"/>
-          </p:cNvPicPr>
-          <p:nvPr/>
-        </p:nvPicPr>
-        <p:blipFill>
-          <a:blip r:embed="rId5"/>
           <a:stretch>
             <a:fillRect/>
           </a:stretch>
         </p:blipFill>
-        <p:spPr>
+        <p:spPr bwMode="auto">
           <a:xfrm>
-            <a:off x="7696252" y="1477400"/>
-            <a:ext cx="3257310" cy="2529360"/>
-          </a:xfrm>
-          <a:prstGeom prst="rect">
-            <a:avLst/>
-          </a:prstGeom>
-        </p:spPr>
-      </p:pic>
-      <p:sp>
-        <p:nvSpPr>
-          <p:cNvPr id="10" name="TextBox 9">
-            <a:extLst>
-              <a:ext uri="{FF2B5EF4-FFF2-40B4-BE49-F238E27FC236}">
-                <a16:creationId xmlns:a16="http://schemas.microsoft.com/office/drawing/2014/main" id="{127A22CD-B57D-BEF5-48C0-5FA9B526A8B2}"/>
-              </a:ext>
-            </a:extLst>
-          </p:cNvPr>
-          <p:cNvSpPr txBox="1"/>
-          <p:nvPr/>
-        </p:nvSpPr>
-        <p:spPr>
-          <a:xfrm>
-            <a:off x="8374828" y="4186148"/>
-            <a:ext cx="2616386" cy="738664"/>
+            <a:off x="1742769" y="1825626"/>
+            <a:ext cx="3075038" cy="2493027"/>
           </a:xfrm>
           <a:prstGeom prst="rect">
             <a:avLst/>
           </a:prstGeom>
           <a:noFill/>
+          <a:extLst>
+            <a:ext uri="{909E8E84-426E-40DD-AFC4-6F175D3DCCD1}">
+              <a14:hiddenFill xmlns:a14="http://schemas.microsoft.com/office/drawing/2010/main">
+                <a:solidFill>
+                  <a:srgbClr val="FFFFFF"/>
+                </a:solidFill>
+              </a14:hiddenFill>
+            </a:ext>
+          </a:extLst>
         </p:spPr>
-        <p:txBody>
-          <a:bodyPr wrap="square" rtlCol="0">
-            <a:spAutoFit/>
-          </a:bodyPr>
-          <a:lstStyle/>
-          <a:p>
-            <a:r>
-              <a:rPr lang="en-US" sz="1400" i="1" dirty="0"/>
-              <a:t>Compared normalized data from each category against normalized COVID cases data</a:t>
-            </a:r>
-          </a:p>
-        </p:txBody>
-      </p:sp>
-      <p:sp>
-        <p:nvSpPr>
-          <p:cNvPr id="4" name="Slide Number Placeholder 3">
-            <a:extLst>
-              <a:ext uri="{FF2B5EF4-FFF2-40B4-BE49-F238E27FC236}">
-                <a16:creationId xmlns:a16="http://schemas.microsoft.com/office/drawing/2014/main" id="{B91EC445-2B2A-0102-2A2C-1DA52E774D81}"/>
-              </a:ext>
-            </a:extLst>
-          </p:cNvPr>
-          <p:cNvSpPr>
-            <a:spLocks noGrp="1"/>
-          </p:cNvSpPr>
-          <p:nvPr>
-            <p:ph type="sldNum" sz="quarter" idx="12"/>
-          </p:nvPr>
-        </p:nvSpPr>
-        <p:spPr/>
-        <p:txBody>
-          <a:bodyPr/>
-          <a:lstStyle/>
-          <a:p>
-            <a:fld id="{BD0DFC8E-D006-4B55-BBF2-7AB50F8F017C}" type="slidenum">
-              <a:rPr lang="en-US" smtClean="0"/>
-              <a:t>9</a:t>
-            </a:fld>
-            <a:endParaRPr lang="en-US"/>
-          </a:p>
-        </p:txBody>
-      </p:sp>
+      </p:pic>
+      <p:pic>
+        <p:nvPicPr>
+          <p:cNvPr id="6" name="Picture 4">
+            <a:extLst>
+              <a:ext uri="{FF2B5EF4-FFF2-40B4-BE49-F238E27FC236}">
+                <a16:creationId xmlns:a16="http://schemas.microsoft.com/office/drawing/2014/main" id="{1F06D0C8-633D-4F2F-FDC1-780320C291B9}"/>
+              </a:ext>
+            </a:extLst>
+          </p:cNvPr>
+          <p:cNvPicPr>
+            <a:picLocks noChangeAspect="1" noChangeArrowheads="1"/>
+          </p:cNvPicPr>
+          <p:nvPr/>
+        </p:nvPicPr>
+        <p:blipFill>
+          <a:blip r:embed="rId3">
+            <a:extLst>
+              <a:ext uri="{28A0092B-C50C-407E-A947-70E740481C1C}">
+                <a14:useLocalDpi xmlns:a14="http://schemas.microsoft.com/office/drawing/2010/main" val="0"/>
+              </a:ext>
+            </a:extLst>
+          </a:blip>
+          <a:srcRect/>
+          <a:stretch>
+            <a:fillRect/>
+          </a:stretch>
+        </p:blipFill>
+        <p:spPr bwMode="auto">
+          <a:xfrm>
+            <a:off x="5046561" y="1825626"/>
+            <a:ext cx="3229873" cy="2498402"/>
+          </a:xfrm>
+          <a:prstGeom prst="rect">
+            <a:avLst/>
+          </a:prstGeom>
+          <a:noFill/>
+          <a:extLst>
+            <a:ext uri="{909E8E84-426E-40DD-AFC4-6F175D3DCCD1}">
+              <a14:hiddenFill xmlns:a14="http://schemas.microsoft.com/office/drawing/2010/main">
+                <a:solidFill>
+                  <a:srgbClr val="FFFFFF"/>
+                </a:solidFill>
+              </a14:hiddenFill>
+            </a:ext>
+          </a:extLst>
+        </p:spPr>
+      </p:pic>
     </p:spTree>
     <p:extLst>
       <p:ext uri="{BB962C8B-B14F-4D97-AF65-F5344CB8AC3E}">
-        <p14:creationId xmlns:p14="http://schemas.microsoft.com/office/powerpoint/2010/main" val="2093751284"/>
+        <p14:creationId xmlns:p14="http://schemas.microsoft.com/office/powerpoint/2010/main" val="1244231696"/>
       </p:ext>
     </p:extLst>
   </p:cSld>

</xml_diff>

<commit_message>
added international data for stage 2
</commit_message>
<xml_diff>
--- a/ProjPresentation.pptx
+++ b/ProjPresentation.pptx
@@ -1259,8 +1259,13 @@
           <a:p>
             <a:r>
               <a:rPr lang="en-US" dirty="0"/>
-              <a:t>Mode was always 0 for both</a:t>
-            </a:r>
+              <a:t>Mode was always 0 </a:t>
+            </a:r>
+            <a:r>
+              <a:rPr lang="en-US"/>
+              <a:t>for both</a:t>
+            </a:r>
+            <a:endParaRPr lang="en-US" dirty="0"/>
           </a:p>
         </p:txBody>
       </p:sp>
@@ -12677,7 +12682,7 @@
         </p:nvSpPr>
         <p:spPr>
           <a:xfrm>
-            <a:off x="1086534" y="1535935"/>
+            <a:off x="584775" y="1491040"/>
             <a:ext cx="4907865" cy="454230"/>
           </a:xfrm>
         </p:spPr>
@@ -12688,7 +12693,7 @@
             <a:pPr algn="ctr"/>
             <a:r>
               <a:rPr lang="en-US" dirty="0"/>
-              <a:t>CASES</a:t>
+              <a:t>US CASES</a:t>
             </a:r>
           </a:p>
         </p:txBody>
@@ -12717,8 +12722,8 @@
         </p:blipFill>
         <p:spPr>
           <a:xfrm>
-            <a:off x="1086534" y="2047874"/>
-            <a:ext cx="4657941" cy="3598159"/>
+            <a:off x="1086535" y="2047875"/>
+            <a:ext cx="3835090" cy="2962524"/>
           </a:xfrm>
         </p:spPr>
       </p:pic>
@@ -12740,7 +12745,7 @@
         </p:nvSpPr>
         <p:spPr>
           <a:xfrm>
-            <a:off x="6309859" y="1500692"/>
+            <a:off x="6637609" y="1489023"/>
             <a:ext cx="5045528" cy="454230"/>
           </a:xfrm>
         </p:spPr>
@@ -12751,7 +12756,7 @@
             <a:pPr algn="ctr"/>
             <a:r>
               <a:rPr lang="en-US" dirty="0"/>
-              <a:t>DEATHS</a:t>
+              <a:t>US DEATHS</a:t>
             </a:r>
           </a:p>
         </p:txBody>
@@ -12807,8 +12812,8 @@
         </p:blipFill>
         <p:spPr>
           <a:xfrm>
-            <a:off x="6522168" y="2047875"/>
-            <a:ext cx="4483249" cy="3598159"/>
+            <a:off x="7314159" y="2047876"/>
+            <a:ext cx="3691258" cy="2962524"/>
           </a:xfrm>
           <a:prstGeom prst="rect">
             <a:avLst/>
@@ -12829,7 +12834,7 @@
         </p:nvSpPr>
         <p:spPr>
           <a:xfrm>
-            <a:off x="1468418" y="5644300"/>
+            <a:off x="838200" y="5155708"/>
             <a:ext cx="4401017" cy="646331"/>
           </a:xfrm>
           <a:prstGeom prst="rect">
@@ -12886,7 +12891,7 @@
         </p:nvSpPr>
         <p:spPr>
           <a:xfrm>
-            <a:off x="6411558" y="5644300"/>
+            <a:off x="6952785" y="5158373"/>
             <a:ext cx="4806166" cy="646331"/>
           </a:xfrm>
           <a:prstGeom prst="rect">
@@ -12925,6 +12930,206 @@
                 </a:solidFill>
               </a:rPr>
               <a:t>Median: 49</a:t>
+            </a:r>
+          </a:p>
+        </p:txBody>
+      </p:sp>
+      <p:sp>
+        <p:nvSpPr>
+          <p:cNvPr id="3" name="TextBox 2">
+            <a:extLst>
+              <a:ext uri="{FF2B5EF4-FFF2-40B4-BE49-F238E27FC236}">
+                <a16:creationId xmlns:a16="http://schemas.microsoft.com/office/drawing/2014/main" id="{619FD3A5-4822-8078-48BA-57E2D0BBAB36}"/>
+              </a:ext>
+            </a:extLst>
+          </p:cNvPr>
+          <p:cNvSpPr txBox="1"/>
+          <p:nvPr/>
+        </p:nvSpPr>
+        <p:spPr>
+          <a:xfrm>
+            <a:off x="4819426" y="2450233"/>
+            <a:ext cx="2450951" cy="2031325"/>
+          </a:xfrm>
+          <a:prstGeom prst="rect">
+            <a:avLst/>
+          </a:prstGeom>
+          <a:noFill/>
+        </p:spPr>
+        <p:txBody>
+          <a:bodyPr wrap="square">
+            <a:spAutoFit/>
+          </a:bodyPr>
+          <a:lstStyle/>
+          <a:p>
+            <a:pPr algn="ctr"/>
+            <a:r>
+              <a:rPr lang="en-US" b="1" dirty="0">
+                <a:solidFill>
+                  <a:schemeClr val="tx1">
+                    <a:lumMod val="65000"/>
+                    <a:lumOff val="35000"/>
+                  </a:schemeClr>
+                </a:solidFill>
+              </a:rPr>
+              <a:t>   </a:t>
+            </a:r>
+            <a:r>
+              <a:rPr lang="en-US" sz="1600" b="1" dirty="0">
+                <a:solidFill>
+                  <a:schemeClr val="tx1">
+                    <a:lumMod val="65000"/>
+                    <a:lumOff val="35000"/>
+                  </a:schemeClr>
+                </a:solidFill>
+              </a:rPr>
+              <a:t>Cases            Deaths</a:t>
+            </a:r>
+            <a:endParaRPr lang="en-US" b="1" dirty="0">
+              <a:solidFill>
+                <a:schemeClr val="tx1">
+                  <a:lumMod val="65000"/>
+                  <a:lumOff val="35000"/>
+                </a:schemeClr>
+              </a:solidFill>
+            </a:endParaRPr>
+          </a:p>
+          <a:p>
+            <a:pPr algn="ctr"/>
+            <a:r>
+              <a:rPr lang="en-US" dirty="0">
+                <a:solidFill>
+                  <a:schemeClr val="tx1">
+                    <a:lumMod val="65000"/>
+                    <a:lumOff val="35000"/>
+                  </a:schemeClr>
+                </a:solidFill>
+              </a:rPr>
+              <a:t>1137 – JPN – 13 </a:t>
+            </a:r>
+          </a:p>
+          <a:p>
+            <a:pPr algn="ctr"/>
+            <a:r>
+              <a:rPr lang="en-US" dirty="0">
+                <a:solidFill>
+                  <a:schemeClr val="tx1">
+                    <a:lumMod val="65000"/>
+                    <a:lumOff val="35000"/>
+                  </a:schemeClr>
+                </a:solidFill>
+              </a:rPr>
+              <a:t>33963 – BRA – 732   </a:t>
+            </a:r>
+          </a:p>
+          <a:p>
+            <a:pPr algn="ctr"/>
+            <a:r>
+              <a:rPr lang="en-US" dirty="0">
+                <a:solidFill>
+                  <a:schemeClr val="tx1">
+                    <a:lumMod val="65000"/>
+                    <a:lumOff val="35000"/>
+                  </a:schemeClr>
+                </a:solidFill>
+              </a:rPr>
+              <a:t>  8410 – DEU – 217</a:t>
+            </a:r>
+          </a:p>
+          <a:p>
+            <a:pPr algn="ctr"/>
+            <a:r>
+              <a:rPr lang="en-US" dirty="0">
+                <a:solidFill>
+                  <a:schemeClr val="tx1">
+                    <a:lumMod val="65000"/>
+                    <a:lumOff val="35000"/>
+                  </a:schemeClr>
+                </a:solidFill>
+              </a:rPr>
+              <a:t>    1 – GRL – 0 </a:t>
+            </a:r>
+          </a:p>
+          <a:p>
+            <a:pPr algn="ctr"/>
+            <a:r>
+              <a:rPr lang="en-US" dirty="0">
+                <a:solidFill>
+                  <a:schemeClr val="tx1">
+                    <a:lumMod val="65000"/>
+                    <a:lumOff val="35000"/>
+                  </a:schemeClr>
+                </a:solidFill>
+              </a:rPr>
+              <a:t>  63 – CHN – 1 </a:t>
+            </a:r>
+          </a:p>
+          <a:p>
+            <a:pPr algn="ctr"/>
+            <a:r>
+              <a:rPr lang="en-US" dirty="0">
+                <a:solidFill>
+                  <a:schemeClr val="tx1">
+                    <a:lumMod val="65000"/>
+                    <a:lumOff val="35000"/>
+                  </a:schemeClr>
+                </a:solidFill>
+              </a:rPr>
+              <a:t>13615 – RUS – 256 </a:t>
+            </a:r>
+          </a:p>
+        </p:txBody>
+      </p:sp>
+      <p:sp>
+        <p:nvSpPr>
+          <p:cNvPr id="5" name="TextBox 4">
+            <a:extLst>
+              <a:ext uri="{FF2B5EF4-FFF2-40B4-BE49-F238E27FC236}">
+                <a16:creationId xmlns:a16="http://schemas.microsoft.com/office/drawing/2014/main" id="{DC98DF64-582C-B183-854A-74F2596A3574}"/>
+              </a:ext>
+            </a:extLst>
+          </p:cNvPr>
+          <p:cNvSpPr txBox="1"/>
+          <p:nvPr/>
+        </p:nvSpPr>
+        <p:spPr>
+          <a:xfrm>
+            <a:off x="4965407" y="1850538"/>
+            <a:ext cx="2348752" cy="646331"/>
+          </a:xfrm>
+          <a:prstGeom prst="rect">
+            <a:avLst/>
+          </a:prstGeom>
+          <a:noFill/>
+        </p:spPr>
+        <p:txBody>
+          <a:bodyPr wrap="square" rtlCol="0">
+            <a:spAutoFit/>
+          </a:bodyPr>
+          <a:lstStyle/>
+          <a:p>
+            <a:pPr algn="ctr"/>
+            <a:r>
+              <a:rPr lang="en-US" b="1" dirty="0">
+                <a:solidFill>
+                  <a:schemeClr val="tx1">
+                    <a:lumMod val="75000"/>
+                    <a:lumOff val="25000"/>
+                  </a:schemeClr>
+                </a:solidFill>
+              </a:rPr>
+              <a:t>Other countries </a:t>
+            </a:r>
+            <a:r>
+              <a:rPr lang="en-US" dirty="0">
+                <a:solidFill>
+                  <a:schemeClr val="tx1">
+                    <a:lumMod val="75000"/>
+                    <a:lumOff val="25000"/>
+                  </a:schemeClr>
+                </a:solidFill>
+              </a:rPr>
+              <a:t>(mean only)</a:t>
             </a:r>
           </a:p>
         </p:txBody>

</xml_diff>